<commit_message>
[add]:Write the tutorial and bonus contents.
</commit_message>
<xml_diff>
--- a/ProgramSlide.pptx
+++ b/ProgramSlide.pptx
@@ -5,19 +5,26 @@
     <p:sldMasterId id="2147483672" r:id="rId1"/>
   </p:sldMasterIdLst>
   <p:notesMasterIdLst>
-    <p:notesMasterId r:id="rId12"/>
+    <p:notesMasterId r:id="rId19"/>
   </p:notesMasterIdLst>
   <p:sldIdLst>
     <p:sldId id="256" r:id="rId2"/>
-    <p:sldId id="257" r:id="rId3"/>
-    <p:sldId id="258" r:id="rId4"/>
-    <p:sldId id="259" r:id="rId5"/>
-    <p:sldId id="260" r:id="rId6"/>
-    <p:sldId id="261" r:id="rId7"/>
-    <p:sldId id="262" r:id="rId8"/>
-    <p:sldId id="263" r:id="rId9"/>
-    <p:sldId id="264" r:id="rId10"/>
-    <p:sldId id="265" r:id="rId11"/>
+    <p:sldId id="269" r:id="rId3"/>
+    <p:sldId id="257" r:id="rId4"/>
+    <p:sldId id="258" r:id="rId5"/>
+    <p:sldId id="266" r:id="rId6"/>
+    <p:sldId id="270" r:id="rId7"/>
+    <p:sldId id="267" r:id="rId8"/>
+    <p:sldId id="272" r:id="rId9"/>
+    <p:sldId id="271" r:id="rId10"/>
+    <p:sldId id="268" r:id="rId11"/>
+    <p:sldId id="259" r:id="rId12"/>
+    <p:sldId id="260" r:id="rId13"/>
+    <p:sldId id="261" r:id="rId14"/>
+    <p:sldId id="262" r:id="rId15"/>
+    <p:sldId id="263" r:id="rId16"/>
+    <p:sldId id="264" r:id="rId17"/>
+    <p:sldId id="265" r:id="rId18"/>
   </p:sldIdLst>
   <p:sldSz cx="9144000" cy="6858000" type="screen4x3"/>
   <p:notesSz cx="6858000" cy="9144000"/>
@@ -116,6 +123,11 @@
       </a:defRPr>
     </a:lvl9pPr>
   </p:defaultTextStyle>
+  <p:extLst>
+    <p:ext uri="{EFAFB233-063F-42B5-8137-9DF3F51BA10A}">
+      <p15:sldGuideLst xmlns:p15="http://schemas.microsoft.com/office/powerpoint/2012/main"/>
+    </p:ext>
+  </p:extLst>
 </p:presentation>
 </file>
 
@@ -501,6 +513,90 @@
 </p:notesMaster>
 </file>
 
+<file path=ppt/notesSlides/notesSlide1.xml><?xml version="1.0" encoding="utf-8"?>
+<p:notes xmlns:a="http://schemas.openxmlformats.org/drawingml/2006/main" xmlns:r="http://schemas.openxmlformats.org/officeDocument/2006/relationships" xmlns:p="http://schemas.openxmlformats.org/presentationml/2006/main">
+  <p:cSld>
+    <p:spTree>
+      <p:nvGrpSpPr>
+        <p:cNvPr id="1" name=""/>
+        <p:cNvGrpSpPr/>
+        <p:nvPr/>
+      </p:nvGrpSpPr>
+      <p:grpSpPr>
+        <a:xfrm>
+          <a:off x="0" y="0"/>
+          <a:ext cx="0" cy="0"/>
+          <a:chOff x="0" y="0"/>
+          <a:chExt cx="0" cy="0"/>
+        </a:xfrm>
+      </p:grpSpPr>
+      <p:sp>
+        <p:nvSpPr>
+          <p:cNvPr id="2" name="スライド イメージ プレースホルダー 1"/>
+          <p:cNvSpPr>
+            <a:spLocks noGrp="1" noRot="1" noChangeAspect="1"/>
+          </p:cNvSpPr>
+          <p:nvPr>
+            <p:ph type="sldImg"/>
+          </p:nvPr>
+        </p:nvSpPr>
+        <p:spPr/>
+      </p:sp>
+      <p:sp>
+        <p:nvSpPr>
+          <p:cNvPr id="3" name="ノート プレースホルダー 2"/>
+          <p:cNvSpPr>
+            <a:spLocks noGrp="1"/>
+          </p:cNvSpPr>
+          <p:nvPr>
+            <p:ph type="body" idx="1"/>
+          </p:nvPr>
+        </p:nvSpPr>
+        <p:spPr/>
+        <p:txBody>
+          <a:bodyPr/>
+          <a:lstStyle/>
+          <a:p>
+            <a:endParaRPr lang="en-US" dirty="0"/>
+          </a:p>
+        </p:txBody>
+      </p:sp>
+      <p:sp>
+        <p:nvSpPr>
+          <p:cNvPr id="4" name="スライド番号プレースホルダー 3"/>
+          <p:cNvSpPr>
+            <a:spLocks noGrp="1"/>
+          </p:cNvSpPr>
+          <p:nvPr>
+            <p:ph type="sldNum" sz="quarter" idx="5"/>
+          </p:nvPr>
+        </p:nvSpPr>
+        <p:spPr/>
+        <p:txBody>
+          <a:bodyPr/>
+          <a:lstStyle/>
+          <a:p>
+            <a:fld id="{6DF5793B-1690-460C-BFA7-27BDCAC2B1A1}" type="slidenum">
+              <a:rPr lang="en-US" smtClean="0"/>
+              <a:t>7</a:t>
+            </a:fld>
+            <a:endParaRPr lang="en-US"/>
+          </a:p>
+        </p:txBody>
+      </p:sp>
+    </p:spTree>
+    <p:extLst>
+      <p:ext uri="{BB962C8B-B14F-4D97-AF65-F5344CB8AC3E}">
+        <p14:creationId xmlns:p14="http://schemas.microsoft.com/office/powerpoint/2010/main" val="2491234923"/>
+      </p:ext>
+    </p:extLst>
+  </p:cSld>
+  <p:clrMapOvr>
+    <a:masterClrMapping/>
+  </p:clrMapOvr>
+</p:notes>
+</file>
+
 <file path=ppt/slideLayouts/slideLayout1.xml><?xml version="1.0" encoding="utf-8"?>
 <p:sldLayout xmlns:a="http://schemas.openxmlformats.org/drawingml/2006/main" xmlns:r="http://schemas.openxmlformats.org/officeDocument/2006/relationships" xmlns:p="http://schemas.openxmlformats.org/presentationml/2006/main" type="title" preserve="1">
   <p:cSld name="タイトル スライド">
@@ -630,7 +726,7 @@
           <a:bodyPr/>
           <a:lstStyle/>
           <a:p>
-            <a:fld id="{74C32BBB-5CF2-4C82-8723-57873DA1ADBC}" type="datetime1">
+            <a:fld id="{B4665B6F-9B20-4B37-B621-0B1C1F2C90FB}" type="datetime1">
               <a:rPr lang="en-US" smtClean="0"/>
               <a:t>5/10/2023</a:t>
             </a:fld>
@@ -832,7 +928,7 @@
           <a:bodyPr/>
           <a:lstStyle/>
           <a:p>
-            <a:fld id="{29A6CC0D-33BD-4517-A34F-D83D9ACCA9B3}" type="datetime1">
+            <a:fld id="{C27C9AA3-0D49-477A-834F-6AFF7FAFB863}" type="datetime1">
               <a:rPr lang="en-US" smtClean="0"/>
               <a:t>5/10/2023</a:t>
             </a:fld>
@@ -1044,7 +1140,7 @@
           <a:bodyPr/>
           <a:lstStyle/>
           <a:p>
-            <a:fld id="{916FFF19-27D0-4AF9-B8F4-72C7EEC43BA7}" type="datetime1">
+            <a:fld id="{A8351093-7B23-4B93-BF0D-2F7040DF3D21}" type="datetime1">
               <a:rPr lang="en-US" smtClean="0"/>
               <a:t>5/10/2023</a:t>
             </a:fld>
@@ -1159,8 +1255,26 @@
         </p:nvSpPr>
         <p:spPr/>
         <p:txBody>
-          <a:bodyPr/>
-          <a:lstStyle/>
+          <a:bodyPr>
+            <a:normAutofit/>
+          </a:bodyPr>
+          <a:lstStyle>
+            <a:lvl1pPr>
+              <a:defRPr sz="3200"/>
+            </a:lvl1pPr>
+            <a:lvl2pPr>
+              <a:defRPr sz="2800"/>
+            </a:lvl2pPr>
+            <a:lvl3pPr>
+              <a:defRPr sz="2400"/>
+            </a:lvl3pPr>
+            <a:lvl4pPr>
+              <a:defRPr sz="2000"/>
+            </a:lvl4pPr>
+            <a:lvl5pPr>
+              <a:defRPr sz="2000"/>
+            </a:lvl5pPr>
+          </a:lstStyle>
           <a:p>
             <a:pPr lvl="0"/>
             <a:r>
@@ -1246,7 +1360,7 @@
           <a:bodyPr/>
           <a:lstStyle/>
           <a:p>
-            <a:fld id="{9A072E2F-AA0B-4EEC-BBC9-8F7A59B9CCBA}" type="datetime1">
+            <a:fld id="{BAE82DF5-EBE4-4A5F-9572-9683012F3869}" type="datetime1">
               <a:rPr lang="en-US" smtClean="0"/>
               <a:t>5/10/2023</a:t>
             </a:fld>
@@ -1495,7 +1609,7 @@
           <a:bodyPr/>
           <a:lstStyle/>
           <a:p>
-            <a:fld id="{5CDF8360-3659-4C0D-ABC8-08ABB3E896B2}" type="datetime1">
+            <a:fld id="{A2243B7C-847E-41AE-8FD2-E22768D99A06}" type="datetime1">
               <a:rPr lang="en-US" smtClean="0"/>
               <a:t>5/10/2023</a:t>
             </a:fld>
@@ -1791,7 +1905,7 @@
           <a:bodyPr/>
           <a:lstStyle/>
           <a:p>
-            <a:fld id="{D374EB85-1719-454E-A848-A897B5E091AD}" type="datetime1">
+            <a:fld id="{641B493E-BF0E-4591-A949-E568E69F4803}" type="datetime1">
               <a:rPr lang="en-US" smtClean="0"/>
               <a:t>5/10/2023</a:t>
             </a:fld>
@@ -2222,7 +2336,7 @@
           <a:bodyPr/>
           <a:lstStyle/>
           <a:p>
-            <a:fld id="{30F1034F-8F6D-4BEE-886C-D7E540CCB9C8}" type="datetime1">
+            <a:fld id="{DD1C41FA-F867-485D-BB9E-4BB1C77BF6D2}" type="datetime1">
               <a:rPr lang="en-US" smtClean="0"/>
               <a:t>5/10/2023</a:t>
             </a:fld>
@@ -2340,7 +2454,7 @@
           <a:bodyPr/>
           <a:lstStyle/>
           <a:p>
-            <a:fld id="{6BAEA4F5-DCEB-4B38-AF68-5DFB47D7D840}" type="datetime1">
+            <a:fld id="{BF2F607B-9AEB-4D6B-B787-CA31BF3221AF}" type="datetime1">
               <a:rPr lang="en-US" smtClean="0"/>
               <a:t>5/10/2023</a:t>
             </a:fld>
@@ -2435,7 +2549,7 @@
           <a:bodyPr/>
           <a:lstStyle/>
           <a:p>
-            <a:fld id="{674924B7-8AA8-4FDD-A641-DCC33D63B898}" type="datetime1">
+            <a:fld id="{6DD5D611-D82D-4557-A4B4-6CE561B5C83D}" type="datetime1">
               <a:rPr lang="en-US" smtClean="0"/>
               <a:t>5/10/2023</a:t>
             </a:fld>
@@ -2744,7 +2858,7 @@
           <a:bodyPr/>
           <a:lstStyle/>
           <a:p>
-            <a:fld id="{100572A8-2638-4695-9749-14C7CAFC0ED6}" type="datetime1">
+            <a:fld id="{AE96AADA-F019-47DD-8151-E2581BF6D2CF}" type="datetime1">
               <a:rPr lang="en-US" smtClean="0"/>
               <a:t>5/10/2023</a:t>
             </a:fld>
@@ -3001,7 +3115,7 @@
           <a:bodyPr/>
           <a:lstStyle/>
           <a:p>
-            <a:fld id="{572728CD-8B48-4581-8093-F98DAA20F764}" type="datetime1">
+            <a:fld id="{D938F34B-1050-4590-AF4B-F133D048AD45}" type="datetime1">
               <a:rPr lang="en-US" smtClean="0"/>
               <a:t>5/10/2023</a:t>
             </a:fld>
@@ -3246,7 +3360,7 @@
             </a:lvl1pPr>
           </a:lstStyle>
           <a:p>
-            <a:fld id="{510D9175-AC0D-4A16-A293-86952EC49281}" type="datetime1">
+            <a:fld id="{EB277427-05A3-4D74-B825-34D4130E89D5}" type="datetime1">
               <a:rPr lang="en-US" smtClean="0"/>
               <a:t>5/10/2023</a:t>
             </a:fld>
@@ -3354,7 +3468,7 @@
     <p:sldLayoutId id="2147483682" r:id="rId10"/>
     <p:sldLayoutId id="2147483683" r:id="rId11"/>
   </p:sldLayoutIdLst>
-  <p:hf hdr="0" dt="0"/>
+  <p:hf hdr="0" ftr="0" dt="0"/>
   <p:txStyles>
     <p:titleStyle>
       <a:lvl1pPr algn="l" defTabSz="914400" rtl="0" eaLnBrk="1" latinLnBrk="0" hangingPunct="1">
@@ -3678,7 +3792,7 @@
           <a:p>
             <a:r>
               <a:rPr lang="en-US" dirty="0"/>
-              <a:t>Programming</a:t>
+              <a:t>Program</a:t>
             </a:r>
           </a:p>
         </p:txBody>
@@ -3746,6 +3860,797 @@
           <p:cNvPr id="2" name="タイトル 1">
             <a:extLst>
               <a:ext uri="{FF2B5EF4-FFF2-40B4-BE49-F238E27FC236}">
+                <a16:creationId xmlns:a16="http://schemas.microsoft.com/office/drawing/2014/main" id="{B5A512A7-A58C-4D08-84CB-45DBCE5FE4B3}"/>
+              </a:ext>
+            </a:extLst>
+          </p:cNvPr>
+          <p:cNvSpPr>
+            <a:spLocks noGrp="1"/>
+          </p:cNvSpPr>
+          <p:nvPr>
+            <p:ph type="title"/>
+          </p:nvPr>
+        </p:nvSpPr>
+        <p:spPr/>
+        <p:txBody>
+          <a:bodyPr/>
+          <a:lstStyle/>
+          <a:p>
+            <a:r>
+              <a:rPr lang="en-US" dirty="0"/>
+              <a:t>Rule of variable name</a:t>
+            </a:r>
+          </a:p>
+        </p:txBody>
+      </p:sp>
+      <p:sp>
+        <p:nvSpPr>
+          <p:cNvPr id="3" name="コンテンツ プレースホルダー 2">
+            <a:extLst>
+              <a:ext uri="{FF2B5EF4-FFF2-40B4-BE49-F238E27FC236}">
+                <a16:creationId xmlns:a16="http://schemas.microsoft.com/office/drawing/2014/main" id="{F2C69D69-CC93-476C-915C-B693A69400EA}"/>
+              </a:ext>
+            </a:extLst>
+          </p:cNvPr>
+          <p:cNvSpPr>
+            <a:spLocks noGrp="1"/>
+          </p:cNvSpPr>
+          <p:nvPr>
+            <p:ph idx="1"/>
+          </p:nvPr>
+        </p:nvSpPr>
+        <p:spPr/>
+        <p:txBody>
+          <a:bodyPr/>
+          <a:lstStyle/>
+          <a:p>
+            <a:endParaRPr lang="en-US"/>
+          </a:p>
+        </p:txBody>
+      </p:sp>
+      <p:sp>
+        <p:nvSpPr>
+          <p:cNvPr id="5" name="スライド番号プレースホルダー 4">
+            <a:extLst>
+              <a:ext uri="{FF2B5EF4-FFF2-40B4-BE49-F238E27FC236}">
+                <a16:creationId xmlns:a16="http://schemas.microsoft.com/office/drawing/2014/main" id="{98BECDDE-B0F3-4E94-98E7-3B7862DCC91E}"/>
+              </a:ext>
+            </a:extLst>
+          </p:cNvPr>
+          <p:cNvSpPr>
+            <a:spLocks noGrp="1"/>
+          </p:cNvSpPr>
+          <p:nvPr>
+            <p:ph type="sldNum" sz="quarter" idx="12"/>
+          </p:nvPr>
+        </p:nvSpPr>
+        <p:spPr/>
+        <p:txBody>
+          <a:bodyPr/>
+          <a:lstStyle/>
+          <a:p>
+            <a:fld id="{F9AE1A6C-155A-45B5-BF6F-8FA332E74381}" type="slidenum">
+              <a:rPr lang="en-US" smtClean="0"/>
+              <a:pPr/>
+              <a:t>9</a:t>
+            </a:fld>
+            <a:endParaRPr lang="en-US" dirty="0"/>
+          </a:p>
+        </p:txBody>
+      </p:sp>
+    </p:spTree>
+    <p:extLst>
+      <p:ext uri="{BB962C8B-B14F-4D97-AF65-F5344CB8AC3E}">
+        <p14:creationId xmlns:p14="http://schemas.microsoft.com/office/powerpoint/2010/main" val="3326139796"/>
+      </p:ext>
+    </p:extLst>
+  </p:cSld>
+  <p:clrMapOvr>
+    <a:masterClrMapping/>
+  </p:clrMapOvr>
+</p:sld>
+</file>
+
+<file path=ppt/slides/slide11.xml><?xml version="1.0" encoding="utf-8"?>
+<p:sld xmlns:a="http://schemas.openxmlformats.org/drawingml/2006/main" xmlns:r="http://schemas.openxmlformats.org/officeDocument/2006/relationships" xmlns:p="http://schemas.openxmlformats.org/presentationml/2006/main">
+  <p:cSld>
+    <p:spTree>
+      <p:nvGrpSpPr>
+        <p:cNvPr id="1" name=""/>
+        <p:cNvGrpSpPr/>
+        <p:nvPr/>
+      </p:nvGrpSpPr>
+      <p:grpSpPr>
+        <a:xfrm>
+          <a:off x="0" y="0"/>
+          <a:ext cx="0" cy="0"/>
+          <a:chOff x="0" y="0"/>
+          <a:chExt cx="0" cy="0"/>
+        </a:xfrm>
+      </p:grpSpPr>
+      <p:sp>
+        <p:nvSpPr>
+          <p:cNvPr id="2" name="タイトル 1">
+            <a:extLst>
+              <a:ext uri="{FF2B5EF4-FFF2-40B4-BE49-F238E27FC236}">
+                <a16:creationId xmlns:a16="http://schemas.microsoft.com/office/drawing/2014/main" id="{9057BDD7-6E73-4210-B7F6-BF325E8CFBE5}"/>
+              </a:ext>
+            </a:extLst>
+          </p:cNvPr>
+          <p:cNvSpPr>
+            <a:spLocks noGrp="1"/>
+          </p:cNvSpPr>
+          <p:nvPr>
+            <p:ph type="title"/>
+          </p:nvPr>
+        </p:nvSpPr>
+        <p:spPr/>
+        <p:txBody>
+          <a:bodyPr/>
+          <a:lstStyle/>
+          <a:p>
+            <a:r>
+              <a:rPr lang="en-US" dirty="0"/>
+              <a:t>Conditional branch(if)</a:t>
+            </a:r>
+          </a:p>
+        </p:txBody>
+      </p:sp>
+      <p:sp>
+        <p:nvSpPr>
+          <p:cNvPr id="3" name="コンテンツ プレースホルダー 2">
+            <a:extLst>
+              <a:ext uri="{FF2B5EF4-FFF2-40B4-BE49-F238E27FC236}">
+                <a16:creationId xmlns:a16="http://schemas.microsoft.com/office/drawing/2014/main" id="{0D2DC0C9-A8B5-41C7-B965-B5D51D2A0B4B}"/>
+              </a:ext>
+            </a:extLst>
+          </p:cNvPr>
+          <p:cNvSpPr>
+            <a:spLocks noGrp="1"/>
+          </p:cNvSpPr>
+          <p:nvPr>
+            <p:ph idx="1"/>
+          </p:nvPr>
+        </p:nvSpPr>
+        <p:spPr/>
+        <p:txBody>
+          <a:bodyPr/>
+          <a:lstStyle/>
+          <a:p>
+            <a:endParaRPr lang="en-US" dirty="0"/>
+          </a:p>
+        </p:txBody>
+      </p:sp>
+      <p:sp>
+        <p:nvSpPr>
+          <p:cNvPr id="5" name="スライド番号プレースホルダー 4">
+            <a:extLst>
+              <a:ext uri="{FF2B5EF4-FFF2-40B4-BE49-F238E27FC236}">
+                <a16:creationId xmlns:a16="http://schemas.microsoft.com/office/drawing/2014/main" id="{0932FD42-5356-46B8-81DE-72A4A93CAA34}"/>
+              </a:ext>
+            </a:extLst>
+          </p:cNvPr>
+          <p:cNvSpPr>
+            <a:spLocks noGrp="1"/>
+          </p:cNvSpPr>
+          <p:nvPr>
+            <p:ph type="sldNum" sz="quarter" idx="12"/>
+          </p:nvPr>
+        </p:nvSpPr>
+        <p:spPr/>
+        <p:txBody>
+          <a:bodyPr/>
+          <a:lstStyle/>
+          <a:p>
+            <a:fld id="{F9AE1A6C-155A-45B5-BF6F-8FA332E74381}" type="slidenum">
+              <a:rPr lang="en-US" smtClean="0"/>
+              <a:pPr/>
+              <a:t>10</a:t>
+            </a:fld>
+            <a:endParaRPr lang="en-US" dirty="0"/>
+          </a:p>
+        </p:txBody>
+      </p:sp>
+    </p:spTree>
+    <p:extLst>
+      <p:ext uri="{BB962C8B-B14F-4D97-AF65-F5344CB8AC3E}">
+        <p14:creationId xmlns:p14="http://schemas.microsoft.com/office/powerpoint/2010/main" val="3452653827"/>
+      </p:ext>
+    </p:extLst>
+  </p:cSld>
+  <p:clrMapOvr>
+    <a:masterClrMapping/>
+  </p:clrMapOvr>
+</p:sld>
+</file>
+
+<file path=ppt/slides/slide12.xml><?xml version="1.0" encoding="utf-8"?>
+<p:sld xmlns:a="http://schemas.openxmlformats.org/drawingml/2006/main" xmlns:r="http://schemas.openxmlformats.org/officeDocument/2006/relationships" xmlns:p="http://schemas.openxmlformats.org/presentationml/2006/main">
+  <p:cSld>
+    <p:spTree>
+      <p:nvGrpSpPr>
+        <p:cNvPr id="1" name=""/>
+        <p:cNvGrpSpPr/>
+        <p:nvPr/>
+      </p:nvGrpSpPr>
+      <p:grpSpPr>
+        <a:xfrm>
+          <a:off x="0" y="0"/>
+          <a:ext cx="0" cy="0"/>
+          <a:chOff x="0" y="0"/>
+          <a:chExt cx="0" cy="0"/>
+        </a:xfrm>
+      </p:grpSpPr>
+      <p:sp>
+        <p:nvSpPr>
+          <p:cNvPr id="2" name="タイトル 1">
+            <a:extLst>
+              <a:ext uri="{FF2B5EF4-FFF2-40B4-BE49-F238E27FC236}">
+                <a16:creationId xmlns:a16="http://schemas.microsoft.com/office/drawing/2014/main" id="{A79A797C-41A1-4F8B-8105-C2ABA5D85AF2}"/>
+              </a:ext>
+            </a:extLst>
+          </p:cNvPr>
+          <p:cNvSpPr>
+            <a:spLocks noGrp="1"/>
+          </p:cNvSpPr>
+          <p:nvPr>
+            <p:ph type="title"/>
+          </p:nvPr>
+        </p:nvSpPr>
+        <p:spPr/>
+        <p:txBody>
+          <a:bodyPr/>
+          <a:lstStyle/>
+          <a:p>
+            <a:r>
+              <a:rPr lang="en-US" dirty="0"/>
+              <a:t>Repeat(for, while)</a:t>
+            </a:r>
+          </a:p>
+        </p:txBody>
+      </p:sp>
+      <p:sp>
+        <p:nvSpPr>
+          <p:cNvPr id="3" name="コンテンツ プレースホルダー 2">
+            <a:extLst>
+              <a:ext uri="{FF2B5EF4-FFF2-40B4-BE49-F238E27FC236}">
+                <a16:creationId xmlns:a16="http://schemas.microsoft.com/office/drawing/2014/main" id="{FE158364-C372-4B49-B871-864989973A92}"/>
+              </a:ext>
+            </a:extLst>
+          </p:cNvPr>
+          <p:cNvSpPr>
+            <a:spLocks noGrp="1"/>
+          </p:cNvSpPr>
+          <p:nvPr>
+            <p:ph idx="1"/>
+          </p:nvPr>
+        </p:nvSpPr>
+        <p:spPr/>
+        <p:txBody>
+          <a:bodyPr/>
+          <a:lstStyle/>
+          <a:p>
+            <a:endParaRPr lang="en-US"/>
+          </a:p>
+        </p:txBody>
+      </p:sp>
+      <p:sp>
+        <p:nvSpPr>
+          <p:cNvPr id="5" name="スライド番号プレースホルダー 4">
+            <a:extLst>
+              <a:ext uri="{FF2B5EF4-FFF2-40B4-BE49-F238E27FC236}">
+                <a16:creationId xmlns:a16="http://schemas.microsoft.com/office/drawing/2014/main" id="{AC27D5E8-9A83-4A09-B5EB-343C26C86426}"/>
+              </a:ext>
+            </a:extLst>
+          </p:cNvPr>
+          <p:cNvSpPr>
+            <a:spLocks noGrp="1"/>
+          </p:cNvSpPr>
+          <p:nvPr>
+            <p:ph type="sldNum" sz="quarter" idx="12"/>
+          </p:nvPr>
+        </p:nvSpPr>
+        <p:spPr/>
+        <p:txBody>
+          <a:bodyPr/>
+          <a:lstStyle/>
+          <a:p>
+            <a:fld id="{F9AE1A6C-155A-45B5-BF6F-8FA332E74381}" type="slidenum">
+              <a:rPr lang="en-US" smtClean="0"/>
+              <a:pPr/>
+              <a:t>11</a:t>
+            </a:fld>
+            <a:endParaRPr lang="en-US" dirty="0"/>
+          </a:p>
+        </p:txBody>
+      </p:sp>
+    </p:spTree>
+    <p:extLst>
+      <p:ext uri="{BB962C8B-B14F-4D97-AF65-F5344CB8AC3E}">
+        <p14:creationId xmlns:p14="http://schemas.microsoft.com/office/powerpoint/2010/main" val="2476710849"/>
+      </p:ext>
+    </p:extLst>
+  </p:cSld>
+  <p:clrMapOvr>
+    <a:masterClrMapping/>
+  </p:clrMapOvr>
+</p:sld>
+</file>
+
+<file path=ppt/slides/slide13.xml><?xml version="1.0" encoding="utf-8"?>
+<p:sld xmlns:a="http://schemas.openxmlformats.org/drawingml/2006/main" xmlns:r="http://schemas.openxmlformats.org/officeDocument/2006/relationships" xmlns:p="http://schemas.openxmlformats.org/presentationml/2006/main">
+  <p:cSld>
+    <p:spTree>
+      <p:nvGrpSpPr>
+        <p:cNvPr id="1" name=""/>
+        <p:cNvGrpSpPr/>
+        <p:nvPr/>
+      </p:nvGrpSpPr>
+      <p:grpSpPr>
+        <a:xfrm>
+          <a:off x="0" y="0"/>
+          <a:ext cx="0" cy="0"/>
+          <a:chOff x="0" y="0"/>
+          <a:chExt cx="0" cy="0"/>
+        </a:xfrm>
+      </p:grpSpPr>
+      <p:sp>
+        <p:nvSpPr>
+          <p:cNvPr id="2" name="タイトル 1">
+            <a:extLst>
+              <a:ext uri="{FF2B5EF4-FFF2-40B4-BE49-F238E27FC236}">
+                <a16:creationId xmlns:a16="http://schemas.microsoft.com/office/drawing/2014/main" id="{F6B36FFF-5648-4E54-83B1-95AB5C7DA3CB}"/>
+              </a:ext>
+            </a:extLst>
+          </p:cNvPr>
+          <p:cNvSpPr>
+            <a:spLocks noGrp="1"/>
+          </p:cNvSpPr>
+          <p:nvPr>
+            <p:ph type="title"/>
+          </p:nvPr>
+        </p:nvSpPr>
+        <p:spPr/>
+        <p:txBody>
+          <a:bodyPr/>
+          <a:lstStyle/>
+          <a:p>
+            <a:r>
+              <a:rPr lang="en-US" dirty="0"/>
+              <a:t>Function</a:t>
+            </a:r>
+          </a:p>
+        </p:txBody>
+      </p:sp>
+      <p:sp>
+        <p:nvSpPr>
+          <p:cNvPr id="3" name="コンテンツ プレースホルダー 2">
+            <a:extLst>
+              <a:ext uri="{FF2B5EF4-FFF2-40B4-BE49-F238E27FC236}">
+                <a16:creationId xmlns:a16="http://schemas.microsoft.com/office/drawing/2014/main" id="{3B3CCD9F-C8A0-4C66-A242-D9F826307A89}"/>
+              </a:ext>
+            </a:extLst>
+          </p:cNvPr>
+          <p:cNvSpPr>
+            <a:spLocks noGrp="1"/>
+          </p:cNvSpPr>
+          <p:nvPr>
+            <p:ph idx="1"/>
+          </p:nvPr>
+        </p:nvSpPr>
+        <p:spPr/>
+        <p:txBody>
+          <a:bodyPr/>
+          <a:lstStyle/>
+          <a:p>
+            <a:endParaRPr lang="en-US"/>
+          </a:p>
+        </p:txBody>
+      </p:sp>
+      <p:sp>
+        <p:nvSpPr>
+          <p:cNvPr id="5" name="スライド番号プレースホルダー 4">
+            <a:extLst>
+              <a:ext uri="{FF2B5EF4-FFF2-40B4-BE49-F238E27FC236}">
+                <a16:creationId xmlns:a16="http://schemas.microsoft.com/office/drawing/2014/main" id="{5AE19A5F-72FC-45C6-A95A-B0D52F671680}"/>
+              </a:ext>
+            </a:extLst>
+          </p:cNvPr>
+          <p:cNvSpPr>
+            <a:spLocks noGrp="1"/>
+          </p:cNvSpPr>
+          <p:nvPr>
+            <p:ph type="sldNum" sz="quarter" idx="12"/>
+          </p:nvPr>
+        </p:nvSpPr>
+        <p:spPr/>
+        <p:txBody>
+          <a:bodyPr/>
+          <a:lstStyle/>
+          <a:p>
+            <a:fld id="{F9AE1A6C-155A-45B5-BF6F-8FA332E74381}" type="slidenum">
+              <a:rPr lang="en-US" smtClean="0"/>
+              <a:pPr/>
+              <a:t>12</a:t>
+            </a:fld>
+            <a:endParaRPr lang="en-US" dirty="0"/>
+          </a:p>
+        </p:txBody>
+      </p:sp>
+    </p:spTree>
+    <p:extLst>
+      <p:ext uri="{BB962C8B-B14F-4D97-AF65-F5344CB8AC3E}">
+        <p14:creationId xmlns:p14="http://schemas.microsoft.com/office/powerpoint/2010/main" val="828934801"/>
+      </p:ext>
+    </p:extLst>
+  </p:cSld>
+  <p:clrMapOvr>
+    <a:masterClrMapping/>
+  </p:clrMapOvr>
+</p:sld>
+</file>
+
+<file path=ppt/slides/slide14.xml><?xml version="1.0" encoding="utf-8"?>
+<p:sld xmlns:a="http://schemas.openxmlformats.org/drawingml/2006/main" xmlns:r="http://schemas.openxmlformats.org/officeDocument/2006/relationships" xmlns:p="http://schemas.openxmlformats.org/presentationml/2006/main">
+  <p:cSld>
+    <p:spTree>
+      <p:nvGrpSpPr>
+        <p:cNvPr id="1" name=""/>
+        <p:cNvGrpSpPr/>
+        <p:nvPr/>
+      </p:nvGrpSpPr>
+      <p:grpSpPr>
+        <a:xfrm>
+          <a:off x="0" y="0"/>
+          <a:ext cx="0" cy="0"/>
+          <a:chOff x="0" y="0"/>
+          <a:chExt cx="0" cy="0"/>
+        </a:xfrm>
+      </p:grpSpPr>
+      <p:sp>
+        <p:nvSpPr>
+          <p:cNvPr id="2" name="タイトル 1">
+            <a:extLst>
+              <a:ext uri="{FF2B5EF4-FFF2-40B4-BE49-F238E27FC236}">
+                <a16:creationId xmlns:a16="http://schemas.microsoft.com/office/drawing/2014/main" id="{FAF5DC41-DAEF-44F8-BABF-BA1D49ACA002}"/>
+              </a:ext>
+            </a:extLst>
+          </p:cNvPr>
+          <p:cNvSpPr>
+            <a:spLocks noGrp="1"/>
+          </p:cNvSpPr>
+          <p:nvPr>
+            <p:ph type="title"/>
+          </p:nvPr>
+        </p:nvSpPr>
+        <p:spPr/>
+        <p:txBody>
+          <a:bodyPr/>
+          <a:lstStyle/>
+          <a:p>
+            <a:r>
+              <a:rPr lang="en-US" dirty="0"/>
+              <a:t>Error</a:t>
+            </a:r>
+          </a:p>
+        </p:txBody>
+      </p:sp>
+      <p:sp>
+        <p:nvSpPr>
+          <p:cNvPr id="3" name="コンテンツ プレースホルダー 2">
+            <a:extLst>
+              <a:ext uri="{FF2B5EF4-FFF2-40B4-BE49-F238E27FC236}">
+                <a16:creationId xmlns:a16="http://schemas.microsoft.com/office/drawing/2014/main" id="{E0FA2130-D6D3-4220-959F-C91BC53FAB78}"/>
+              </a:ext>
+            </a:extLst>
+          </p:cNvPr>
+          <p:cNvSpPr>
+            <a:spLocks noGrp="1"/>
+          </p:cNvSpPr>
+          <p:nvPr>
+            <p:ph idx="1"/>
+          </p:nvPr>
+        </p:nvSpPr>
+        <p:spPr/>
+        <p:txBody>
+          <a:bodyPr/>
+          <a:lstStyle/>
+          <a:p>
+            <a:endParaRPr lang="en-US"/>
+          </a:p>
+        </p:txBody>
+      </p:sp>
+      <p:sp>
+        <p:nvSpPr>
+          <p:cNvPr id="5" name="スライド番号プレースホルダー 4">
+            <a:extLst>
+              <a:ext uri="{FF2B5EF4-FFF2-40B4-BE49-F238E27FC236}">
+                <a16:creationId xmlns:a16="http://schemas.microsoft.com/office/drawing/2014/main" id="{4D897C1E-210D-40AA-B1A3-6D30B53F200F}"/>
+              </a:ext>
+            </a:extLst>
+          </p:cNvPr>
+          <p:cNvSpPr>
+            <a:spLocks noGrp="1"/>
+          </p:cNvSpPr>
+          <p:nvPr>
+            <p:ph type="sldNum" sz="quarter" idx="12"/>
+          </p:nvPr>
+        </p:nvSpPr>
+        <p:spPr/>
+        <p:txBody>
+          <a:bodyPr/>
+          <a:lstStyle/>
+          <a:p>
+            <a:fld id="{F9AE1A6C-155A-45B5-BF6F-8FA332E74381}" type="slidenum">
+              <a:rPr lang="en-US" smtClean="0"/>
+              <a:pPr/>
+              <a:t>13</a:t>
+            </a:fld>
+            <a:endParaRPr lang="en-US" dirty="0"/>
+          </a:p>
+        </p:txBody>
+      </p:sp>
+    </p:spTree>
+    <p:extLst>
+      <p:ext uri="{BB962C8B-B14F-4D97-AF65-F5344CB8AC3E}">
+        <p14:creationId xmlns:p14="http://schemas.microsoft.com/office/powerpoint/2010/main" val="107592700"/>
+      </p:ext>
+    </p:extLst>
+  </p:cSld>
+  <p:clrMapOvr>
+    <a:masterClrMapping/>
+  </p:clrMapOvr>
+</p:sld>
+</file>
+
+<file path=ppt/slides/slide15.xml><?xml version="1.0" encoding="utf-8"?>
+<p:sld xmlns:a="http://schemas.openxmlformats.org/drawingml/2006/main" xmlns:r="http://schemas.openxmlformats.org/officeDocument/2006/relationships" xmlns:p="http://schemas.openxmlformats.org/presentationml/2006/main">
+  <p:cSld>
+    <p:spTree>
+      <p:nvGrpSpPr>
+        <p:cNvPr id="1" name=""/>
+        <p:cNvGrpSpPr/>
+        <p:nvPr/>
+      </p:nvGrpSpPr>
+      <p:grpSpPr>
+        <a:xfrm>
+          <a:off x="0" y="0"/>
+          <a:ext cx="0" cy="0"/>
+          <a:chOff x="0" y="0"/>
+          <a:chExt cx="0" cy="0"/>
+        </a:xfrm>
+      </p:grpSpPr>
+      <p:sp>
+        <p:nvSpPr>
+          <p:cNvPr id="2" name="タイトル 1">
+            <a:extLst>
+              <a:ext uri="{FF2B5EF4-FFF2-40B4-BE49-F238E27FC236}">
+                <a16:creationId xmlns:a16="http://schemas.microsoft.com/office/drawing/2014/main" id="{8F0D12C3-4CDC-4F57-9D7E-A2DB95866AE8}"/>
+              </a:ext>
+            </a:extLst>
+          </p:cNvPr>
+          <p:cNvSpPr>
+            <a:spLocks noGrp="1"/>
+          </p:cNvSpPr>
+          <p:nvPr>
+            <p:ph type="title"/>
+          </p:nvPr>
+        </p:nvSpPr>
+        <p:spPr/>
+        <p:txBody>
+          <a:bodyPr/>
+          <a:lstStyle/>
+          <a:p>
+            <a:r>
+              <a:rPr lang="en-US" dirty="0"/>
+              <a:t>Summary</a:t>
+            </a:r>
+          </a:p>
+        </p:txBody>
+      </p:sp>
+      <p:sp>
+        <p:nvSpPr>
+          <p:cNvPr id="3" name="コンテンツ プレースホルダー 2">
+            <a:extLst>
+              <a:ext uri="{FF2B5EF4-FFF2-40B4-BE49-F238E27FC236}">
+                <a16:creationId xmlns:a16="http://schemas.microsoft.com/office/drawing/2014/main" id="{9CD5CAFA-55C1-4CBE-B983-ACB13AC199C5}"/>
+              </a:ext>
+            </a:extLst>
+          </p:cNvPr>
+          <p:cNvSpPr>
+            <a:spLocks noGrp="1"/>
+          </p:cNvSpPr>
+          <p:nvPr>
+            <p:ph idx="1"/>
+          </p:nvPr>
+        </p:nvSpPr>
+        <p:spPr/>
+        <p:txBody>
+          <a:bodyPr/>
+          <a:lstStyle/>
+          <a:p>
+            <a:endParaRPr lang="en-US"/>
+          </a:p>
+        </p:txBody>
+      </p:sp>
+      <p:sp>
+        <p:nvSpPr>
+          <p:cNvPr id="5" name="スライド番号プレースホルダー 4">
+            <a:extLst>
+              <a:ext uri="{FF2B5EF4-FFF2-40B4-BE49-F238E27FC236}">
+                <a16:creationId xmlns:a16="http://schemas.microsoft.com/office/drawing/2014/main" id="{EF72F589-D9F4-40B5-BFD0-A9881E9136BC}"/>
+              </a:ext>
+            </a:extLst>
+          </p:cNvPr>
+          <p:cNvSpPr>
+            <a:spLocks noGrp="1"/>
+          </p:cNvSpPr>
+          <p:nvPr>
+            <p:ph type="sldNum" sz="quarter" idx="12"/>
+          </p:nvPr>
+        </p:nvSpPr>
+        <p:spPr/>
+        <p:txBody>
+          <a:bodyPr/>
+          <a:lstStyle/>
+          <a:p>
+            <a:fld id="{F9AE1A6C-155A-45B5-BF6F-8FA332E74381}" type="slidenum">
+              <a:rPr lang="en-US" smtClean="0"/>
+              <a:pPr/>
+              <a:t>14</a:t>
+            </a:fld>
+            <a:endParaRPr lang="en-US" dirty="0"/>
+          </a:p>
+        </p:txBody>
+      </p:sp>
+    </p:spTree>
+    <p:extLst>
+      <p:ext uri="{BB962C8B-B14F-4D97-AF65-F5344CB8AC3E}">
+        <p14:creationId xmlns:p14="http://schemas.microsoft.com/office/powerpoint/2010/main" val="3274883772"/>
+      </p:ext>
+    </p:extLst>
+  </p:cSld>
+  <p:clrMapOvr>
+    <a:masterClrMapping/>
+  </p:clrMapOvr>
+</p:sld>
+</file>
+
+<file path=ppt/slides/slide16.xml><?xml version="1.0" encoding="utf-8"?>
+<p:sld xmlns:a="http://schemas.openxmlformats.org/drawingml/2006/main" xmlns:r="http://schemas.openxmlformats.org/officeDocument/2006/relationships" xmlns:p="http://schemas.openxmlformats.org/presentationml/2006/main">
+  <p:cSld>
+    <p:spTree>
+      <p:nvGrpSpPr>
+        <p:cNvPr id="1" name=""/>
+        <p:cNvGrpSpPr/>
+        <p:nvPr/>
+      </p:nvGrpSpPr>
+      <p:grpSpPr>
+        <a:xfrm>
+          <a:off x="0" y="0"/>
+          <a:ext cx="0" cy="0"/>
+          <a:chOff x="0" y="0"/>
+          <a:chExt cx="0" cy="0"/>
+        </a:xfrm>
+      </p:grpSpPr>
+      <p:sp>
+        <p:nvSpPr>
+          <p:cNvPr id="2" name="タイトル 1">
+            <a:extLst>
+              <a:ext uri="{FF2B5EF4-FFF2-40B4-BE49-F238E27FC236}">
+                <a16:creationId xmlns:a16="http://schemas.microsoft.com/office/drawing/2014/main" id="{1532B8A9-CC3C-4755-A0C2-83191887A59F}"/>
+              </a:ext>
+            </a:extLst>
+          </p:cNvPr>
+          <p:cNvSpPr>
+            <a:spLocks noGrp="1"/>
+          </p:cNvSpPr>
+          <p:nvPr>
+            <p:ph type="title"/>
+          </p:nvPr>
+        </p:nvSpPr>
+        <p:spPr/>
+        <p:txBody>
+          <a:bodyPr/>
+          <a:lstStyle/>
+          <a:p>
+            <a:r>
+              <a:rPr lang="en-US" dirty="0"/>
+              <a:t>References</a:t>
+            </a:r>
+          </a:p>
+        </p:txBody>
+      </p:sp>
+      <p:sp>
+        <p:nvSpPr>
+          <p:cNvPr id="3" name="コンテンツ プレースホルダー 2">
+            <a:extLst>
+              <a:ext uri="{FF2B5EF4-FFF2-40B4-BE49-F238E27FC236}">
+                <a16:creationId xmlns:a16="http://schemas.microsoft.com/office/drawing/2014/main" id="{0CFB61A8-0A55-494F-96FA-020C659922F5}"/>
+              </a:ext>
+            </a:extLst>
+          </p:cNvPr>
+          <p:cNvSpPr>
+            <a:spLocks noGrp="1"/>
+          </p:cNvSpPr>
+          <p:nvPr>
+            <p:ph idx="1"/>
+          </p:nvPr>
+        </p:nvSpPr>
+        <p:spPr/>
+        <p:txBody>
+          <a:bodyPr/>
+          <a:lstStyle/>
+          <a:p>
+            <a:endParaRPr lang="en-US" dirty="0"/>
+          </a:p>
+        </p:txBody>
+      </p:sp>
+      <p:sp>
+        <p:nvSpPr>
+          <p:cNvPr id="5" name="スライド番号プレースホルダー 4">
+            <a:extLst>
+              <a:ext uri="{FF2B5EF4-FFF2-40B4-BE49-F238E27FC236}">
+                <a16:creationId xmlns:a16="http://schemas.microsoft.com/office/drawing/2014/main" id="{D1D09D41-F574-4AE8-B82D-35FD724EA6EA}"/>
+              </a:ext>
+            </a:extLst>
+          </p:cNvPr>
+          <p:cNvSpPr>
+            <a:spLocks noGrp="1"/>
+          </p:cNvSpPr>
+          <p:nvPr>
+            <p:ph type="sldNum" sz="quarter" idx="12"/>
+          </p:nvPr>
+        </p:nvSpPr>
+        <p:spPr/>
+        <p:txBody>
+          <a:bodyPr/>
+          <a:lstStyle/>
+          <a:p>
+            <a:fld id="{F9AE1A6C-155A-45B5-BF6F-8FA332E74381}" type="slidenum">
+              <a:rPr lang="en-US" smtClean="0"/>
+              <a:pPr/>
+              <a:t>15</a:t>
+            </a:fld>
+            <a:endParaRPr lang="en-US" dirty="0"/>
+          </a:p>
+        </p:txBody>
+      </p:sp>
+    </p:spTree>
+    <p:extLst>
+      <p:ext uri="{BB962C8B-B14F-4D97-AF65-F5344CB8AC3E}">
+        <p14:creationId xmlns:p14="http://schemas.microsoft.com/office/powerpoint/2010/main" val="532900966"/>
+      </p:ext>
+    </p:extLst>
+  </p:cSld>
+  <p:clrMapOvr>
+    <a:masterClrMapping/>
+  </p:clrMapOvr>
+</p:sld>
+</file>
+
+<file path=ppt/slides/slide17.xml><?xml version="1.0" encoding="utf-8"?>
+<p:sld xmlns:a="http://schemas.openxmlformats.org/drawingml/2006/main" xmlns:r="http://schemas.openxmlformats.org/officeDocument/2006/relationships" xmlns:p="http://schemas.openxmlformats.org/presentationml/2006/main">
+  <p:cSld>
+    <p:spTree>
+      <p:nvGrpSpPr>
+        <p:cNvPr id="1" name=""/>
+        <p:cNvGrpSpPr/>
+        <p:nvPr/>
+      </p:nvGrpSpPr>
+      <p:grpSpPr>
+        <a:xfrm>
+          <a:off x="0" y="0"/>
+          <a:ext cx="0" cy="0"/>
+          <a:chOff x="0" y="0"/>
+          <a:chExt cx="0" cy="0"/>
+        </a:xfrm>
+      </p:grpSpPr>
+      <p:sp>
+        <p:nvSpPr>
+          <p:cNvPr id="2" name="タイトル 1">
+            <a:extLst>
+              <a:ext uri="{FF2B5EF4-FFF2-40B4-BE49-F238E27FC236}">
                 <a16:creationId xmlns:a16="http://schemas.microsoft.com/office/drawing/2014/main" id="{F841434E-D430-4496-8D5B-CE28B163C746}"/>
               </a:ext>
             </a:extLst>
@@ -3790,32 +4695,58 @@
           <a:bodyPr/>
           <a:lstStyle/>
           <a:p>
-            <a:endParaRPr lang="en-US"/>
-          </a:p>
-        </p:txBody>
-      </p:sp>
-      <p:sp>
-        <p:nvSpPr>
-          <p:cNvPr id="4" name="フッター プレースホルダー 3">
-            <a:extLst>
-              <a:ext uri="{FF2B5EF4-FFF2-40B4-BE49-F238E27FC236}">
-                <a16:creationId xmlns:a16="http://schemas.microsoft.com/office/drawing/2014/main" id="{DC200BA7-1938-40C4-AC5E-06F7E6B7D0DB}"/>
-              </a:ext>
-            </a:extLst>
-          </p:cNvPr>
-          <p:cNvSpPr>
-            <a:spLocks noGrp="1"/>
-          </p:cNvSpPr>
-          <p:nvPr>
-            <p:ph type="ftr" sz="quarter" idx="11"/>
-          </p:nvPr>
-        </p:nvSpPr>
-        <p:spPr/>
-        <p:txBody>
-          <a:bodyPr/>
-          <a:lstStyle/>
-          <a:p>
-            <a:endParaRPr lang="en-US"/>
+            <a:r>
+              <a:rPr lang="en-US" dirty="0" err="1"/>
+              <a:t>AtCoder</a:t>
+            </a:r>
+            <a:endParaRPr lang="en-US" dirty="0"/>
+          </a:p>
+          <a:p>
+            <a:pPr lvl="1"/>
+            <a:r>
+              <a:rPr lang="en-US" dirty="0">
+                <a:hlinkClick r:id="rId2"/>
+              </a:rPr>
+              <a:t>https://atcoder.jp/?lang=ja</a:t>
+            </a:r>
+            <a:endParaRPr lang="en-US" dirty="0"/>
+          </a:p>
+          <a:p>
+            <a:r>
+              <a:rPr lang="en-US" dirty="0" err="1"/>
+              <a:t>CodinGame</a:t>
+            </a:r>
+            <a:endParaRPr lang="en-US" dirty="0"/>
+          </a:p>
+          <a:p>
+            <a:pPr lvl="1"/>
+            <a:r>
+              <a:rPr lang="en-US" dirty="0">
+                <a:hlinkClick r:id="rId3"/>
+              </a:rPr>
+              <a:t>https://www.codingame.com/start</a:t>
+            </a:r>
+            <a:endParaRPr lang="en-US" dirty="0"/>
+          </a:p>
+          <a:p>
+            <a:r>
+              <a:rPr lang="en-US" dirty="0" err="1"/>
+              <a:t>Codeforces</a:t>
+            </a:r>
+            <a:endParaRPr lang="en-US" dirty="0"/>
+          </a:p>
+          <a:p>
+            <a:pPr lvl="1"/>
+            <a:r>
+              <a:rPr lang="en-US" dirty="0">
+                <a:hlinkClick r:id="rId4"/>
+              </a:rPr>
+              <a:t>https://codeforces.com/</a:t>
+            </a:r>
+            <a:endParaRPr lang="en-US" dirty="0"/>
+          </a:p>
+          <a:p>
+            <a:endParaRPr lang="en-US" dirty="0"/>
           </a:p>
         </p:txBody>
       </p:sp>
@@ -3843,7 +4774,7 @@
             <a:fld id="{F9AE1A6C-155A-45B5-BF6F-8FA332E74381}" type="slidenum">
               <a:rPr lang="en-US" smtClean="0"/>
               <a:pPr/>
-              <a:t>9</a:t>
+              <a:t>16</a:t>
             </a:fld>
             <a:endParaRPr lang="en-US" dirty="0"/>
           </a:p>
@@ -3884,7 +4815,7 @@
           <p:cNvPr id="2" name="タイトル 1">
             <a:extLst>
               <a:ext uri="{FF2B5EF4-FFF2-40B4-BE49-F238E27FC236}">
-                <a16:creationId xmlns:a16="http://schemas.microsoft.com/office/drawing/2014/main" id="{79669175-F6E9-4C2F-8D17-1FCBC4C031D9}"/>
+                <a16:creationId xmlns:a16="http://schemas.microsoft.com/office/drawing/2014/main" id="{2BE4186D-911D-4B3D-B478-FC94A546DA78}"/>
               </a:ext>
             </a:extLst>
           </p:cNvPr>
@@ -3902,7 +4833,7 @@
           <a:p>
             <a:r>
               <a:rPr lang="en-US" dirty="0"/>
-              <a:t>Table of Contents</a:t>
+              <a:t>Today’s goal</a:t>
             </a:r>
           </a:p>
         </p:txBody>
@@ -3912,7 +4843,7 @@
           <p:cNvPr id="3" name="コンテンツ プレースホルダー 2">
             <a:extLst>
               <a:ext uri="{FF2B5EF4-FFF2-40B4-BE49-F238E27FC236}">
-                <a16:creationId xmlns:a16="http://schemas.microsoft.com/office/drawing/2014/main" id="{F5FF7C6C-7D67-4696-BCC2-7872B53FC7FD}"/>
+                <a16:creationId xmlns:a16="http://schemas.microsoft.com/office/drawing/2014/main" id="{42176686-573D-4BB2-8DF0-1D2A5DB0D959}"/>
               </a:ext>
             </a:extLst>
           </p:cNvPr>
@@ -3928,52 +4859,16 @@
           <a:bodyPr/>
           <a:lstStyle/>
           <a:p>
-            <a:r>
-              <a:rPr lang="en-US" dirty="0"/>
-              <a:t>Tutorial</a:t>
-            </a:r>
-          </a:p>
-          <a:p>
-            <a:r>
-              <a:rPr lang="en-US" dirty="0"/>
-              <a:t>Conditional branch(if)</a:t>
-            </a:r>
-          </a:p>
-          <a:p>
-            <a:r>
-              <a:rPr lang="en-US" dirty="0"/>
-              <a:t>Repeat(for, while)</a:t>
-            </a:r>
-          </a:p>
-          <a:p>
-            <a:r>
-              <a:rPr lang="en-US" dirty="0"/>
-              <a:t>Function</a:t>
-            </a:r>
-          </a:p>
-          <a:p>
-            <a:r>
-              <a:rPr lang="en-US" dirty="0"/>
-              <a:t>Error</a:t>
-            </a:r>
-          </a:p>
-          <a:p>
-            <a:r>
-              <a:rPr lang="en-US" dirty="0"/>
-              <a:t>Summary</a:t>
-            </a:r>
-          </a:p>
-          <a:p>
-            <a:endParaRPr lang="en-US" dirty="0"/>
-          </a:p>
-        </p:txBody>
-      </p:sp>
-      <p:sp>
-        <p:nvSpPr>
-          <p:cNvPr id="4" name="フッター プレースホルダー 3">
+            <a:endParaRPr lang="en-US"/>
+          </a:p>
+        </p:txBody>
+      </p:sp>
+      <p:sp>
+        <p:nvSpPr>
+          <p:cNvPr id="4" name="スライド番号プレースホルダー 3">
             <a:extLst>
               <a:ext uri="{FF2B5EF4-FFF2-40B4-BE49-F238E27FC236}">
-                <a16:creationId xmlns:a16="http://schemas.microsoft.com/office/drawing/2014/main" id="{F8DF16BC-0888-4851-A637-830663722447}"/>
+                <a16:creationId xmlns:a16="http://schemas.microsoft.com/office/drawing/2014/main" id="{817F042C-8BB7-467C-8F85-3DB37A1FC370}"/>
               </a:ext>
             </a:extLst>
           </p:cNvPr>
@@ -3981,31 +4876,6 @@
             <a:spLocks noGrp="1"/>
           </p:cNvSpPr>
           <p:nvPr>
-            <p:ph type="ftr" sz="quarter" idx="11"/>
-          </p:nvPr>
-        </p:nvSpPr>
-        <p:spPr/>
-        <p:txBody>
-          <a:bodyPr/>
-          <a:lstStyle/>
-          <a:p>
-            <a:endParaRPr lang="en-US"/>
-          </a:p>
-        </p:txBody>
-      </p:sp>
-      <p:sp>
-        <p:nvSpPr>
-          <p:cNvPr id="5" name="スライド番号プレースホルダー 4">
-            <a:extLst>
-              <a:ext uri="{FF2B5EF4-FFF2-40B4-BE49-F238E27FC236}">
-                <a16:creationId xmlns:a16="http://schemas.microsoft.com/office/drawing/2014/main" id="{334E4976-FB62-4C92-A705-CA80F280BF60}"/>
-              </a:ext>
-            </a:extLst>
-          </p:cNvPr>
-          <p:cNvSpPr>
-            <a:spLocks noGrp="1"/>
-          </p:cNvSpPr>
-          <p:nvPr>
             <p:ph type="sldNum" sz="quarter" idx="12"/>
           </p:nvPr>
         </p:nvSpPr>
@@ -4016,16 +4886,17 @@
           <a:p>
             <a:fld id="{F9AE1A6C-155A-45B5-BF6F-8FA332E74381}" type="slidenum">
               <a:rPr lang="en-US" smtClean="0"/>
+              <a:pPr/>
               <a:t>1</a:t>
             </a:fld>
-            <a:endParaRPr lang="en-US"/>
+            <a:endParaRPr lang="en-US" dirty="0"/>
           </a:p>
         </p:txBody>
       </p:sp>
     </p:spTree>
     <p:extLst>
       <p:ext uri="{BB962C8B-B14F-4D97-AF65-F5344CB8AC3E}">
-        <p14:creationId xmlns:p14="http://schemas.microsoft.com/office/powerpoint/2010/main" val="523522626"/>
+        <p14:creationId xmlns:p14="http://schemas.microsoft.com/office/powerpoint/2010/main" val="1437990430"/>
       </p:ext>
     </p:extLst>
   </p:cSld>
@@ -4057,7 +4928,7 @@
           <p:cNvPr id="2" name="タイトル 1">
             <a:extLst>
               <a:ext uri="{FF2B5EF4-FFF2-40B4-BE49-F238E27FC236}">
-                <a16:creationId xmlns:a16="http://schemas.microsoft.com/office/drawing/2014/main" id="{B88AF49B-EA78-4570-95E4-6EA9852AF855}"/>
+                <a16:creationId xmlns:a16="http://schemas.microsoft.com/office/drawing/2014/main" id="{79669175-F6E9-4C2F-8D17-1FCBC4C031D9}"/>
               </a:ext>
             </a:extLst>
           </p:cNvPr>
@@ -4075,7 +4946,7 @@
           <a:p>
             <a:r>
               <a:rPr lang="en-US" dirty="0"/>
-              <a:t>Tutorial</a:t>
+              <a:t>Table of Contents</a:t>
             </a:r>
           </a:p>
         </p:txBody>
@@ -4085,7 +4956,7 @@
           <p:cNvPr id="3" name="コンテンツ プレースホルダー 2">
             <a:extLst>
               <a:ext uri="{FF2B5EF4-FFF2-40B4-BE49-F238E27FC236}">
-                <a16:creationId xmlns:a16="http://schemas.microsoft.com/office/drawing/2014/main" id="{B87262C7-F22B-4897-82DD-0D2F4A93A2B2}"/>
+                <a16:creationId xmlns:a16="http://schemas.microsoft.com/office/drawing/2014/main" id="{F5FF7C6C-7D67-4696-BCC2-7872B53FC7FD}"/>
               </a:ext>
             </a:extLst>
           </p:cNvPr>
@@ -4103,29 +4974,50 @@
           <a:p>
             <a:r>
               <a:rPr lang="en-US" dirty="0"/>
-              <a:t>Input and Output</a:t>
+              <a:t>Tutorial</a:t>
             </a:r>
           </a:p>
           <a:p>
             <a:r>
               <a:rPr lang="en-US" dirty="0"/>
-              <a:t>Data type</a:t>
+              <a:t>Conditional branch(if)</a:t>
             </a:r>
           </a:p>
           <a:p>
             <a:r>
               <a:rPr lang="en-US" dirty="0"/>
-              <a:t>Rule of variable name</a:t>
-            </a:r>
-          </a:p>
-        </p:txBody>
-      </p:sp>
-      <p:sp>
-        <p:nvSpPr>
-          <p:cNvPr id="4" name="フッター プレースホルダー 3">
+              <a:t>Repeat(for, while)</a:t>
+            </a:r>
+          </a:p>
+          <a:p>
+            <a:r>
+              <a:rPr lang="en-US" dirty="0"/>
+              <a:t>Function</a:t>
+            </a:r>
+          </a:p>
+          <a:p>
+            <a:r>
+              <a:rPr lang="en-US" dirty="0"/>
+              <a:t>Error</a:t>
+            </a:r>
+          </a:p>
+          <a:p>
+            <a:r>
+              <a:rPr lang="en-US" dirty="0"/>
+              <a:t>Summary</a:t>
+            </a:r>
+          </a:p>
+          <a:p>
+            <a:endParaRPr lang="en-US" dirty="0"/>
+          </a:p>
+        </p:txBody>
+      </p:sp>
+      <p:sp>
+        <p:nvSpPr>
+          <p:cNvPr id="5" name="スライド番号プレースホルダー 4">
             <a:extLst>
               <a:ext uri="{FF2B5EF4-FFF2-40B4-BE49-F238E27FC236}">
-                <a16:creationId xmlns:a16="http://schemas.microsoft.com/office/drawing/2014/main" id="{FA9F31C1-7E08-4120-8CDE-84AEF5854873}"/>
+                <a16:creationId xmlns:a16="http://schemas.microsoft.com/office/drawing/2014/main" id="{334E4976-FB62-4C92-A705-CA80F280BF60}"/>
               </a:ext>
             </a:extLst>
           </p:cNvPr>
@@ -4133,31 +5025,6 @@
             <a:spLocks noGrp="1"/>
           </p:cNvSpPr>
           <p:nvPr>
-            <p:ph type="ftr" sz="quarter" idx="11"/>
-          </p:nvPr>
-        </p:nvSpPr>
-        <p:spPr/>
-        <p:txBody>
-          <a:bodyPr/>
-          <a:lstStyle/>
-          <a:p>
-            <a:endParaRPr lang="en-US"/>
-          </a:p>
-        </p:txBody>
-      </p:sp>
-      <p:sp>
-        <p:nvSpPr>
-          <p:cNvPr id="5" name="スライド番号プレースホルダー 4">
-            <a:extLst>
-              <a:ext uri="{FF2B5EF4-FFF2-40B4-BE49-F238E27FC236}">
-                <a16:creationId xmlns:a16="http://schemas.microsoft.com/office/drawing/2014/main" id="{6BE97389-6D0B-4E13-A211-6F977585BB0E}"/>
-              </a:ext>
-            </a:extLst>
-          </p:cNvPr>
-          <p:cNvSpPr>
-            <a:spLocks noGrp="1"/>
-          </p:cNvSpPr>
-          <p:nvPr>
             <p:ph type="sldNum" sz="quarter" idx="12"/>
           </p:nvPr>
         </p:nvSpPr>
@@ -4168,17 +5035,16 @@
           <a:p>
             <a:fld id="{F9AE1A6C-155A-45B5-BF6F-8FA332E74381}" type="slidenum">
               <a:rPr lang="en-US" smtClean="0"/>
-              <a:pPr/>
               <a:t>2</a:t>
             </a:fld>
-            <a:endParaRPr lang="en-US" dirty="0"/>
+            <a:endParaRPr lang="en-US"/>
           </a:p>
         </p:txBody>
       </p:sp>
     </p:spTree>
     <p:extLst>
       <p:ext uri="{BB962C8B-B14F-4D97-AF65-F5344CB8AC3E}">
-        <p14:creationId xmlns:p14="http://schemas.microsoft.com/office/powerpoint/2010/main" val="4164304242"/>
+        <p14:creationId xmlns:p14="http://schemas.microsoft.com/office/powerpoint/2010/main" val="523522626"/>
       </p:ext>
     </p:extLst>
   </p:cSld>
@@ -4210,7 +5076,7 @@
           <p:cNvPr id="2" name="タイトル 1">
             <a:extLst>
               <a:ext uri="{FF2B5EF4-FFF2-40B4-BE49-F238E27FC236}">
-                <a16:creationId xmlns:a16="http://schemas.microsoft.com/office/drawing/2014/main" id="{9057BDD7-6E73-4210-B7F6-BF325E8CFBE5}"/>
+                <a16:creationId xmlns:a16="http://schemas.microsoft.com/office/drawing/2014/main" id="{B88AF49B-EA78-4570-95E4-6EA9852AF855}"/>
               </a:ext>
             </a:extLst>
           </p:cNvPr>
@@ -4228,7 +5094,7 @@
           <a:p>
             <a:r>
               <a:rPr lang="en-US" dirty="0"/>
-              <a:t>Conditional branch(if)</a:t>
+              <a:t>Tutorial</a:t>
             </a:r>
           </a:p>
         </p:txBody>
@@ -4238,7 +5104,7 @@
           <p:cNvPr id="3" name="コンテンツ プレースホルダー 2">
             <a:extLst>
               <a:ext uri="{FF2B5EF4-FFF2-40B4-BE49-F238E27FC236}">
-                <a16:creationId xmlns:a16="http://schemas.microsoft.com/office/drawing/2014/main" id="{0D2DC0C9-A8B5-41C7-B965-B5D51D2A0B4B}"/>
+                <a16:creationId xmlns:a16="http://schemas.microsoft.com/office/drawing/2014/main" id="{B87262C7-F22B-4897-82DD-0D2F4A93A2B2}"/>
               </a:ext>
             </a:extLst>
           </p:cNvPr>
@@ -4254,32 +5120,28 @@
           <a:bodyPr/>
           <a:lstStyle/>
           <a:p>
-            <a:endParaRPr lang="en-US" dirty="0"/>
-          </a:p>
-        </p:txBody>
-      </p:sp>
-      <p:sp>
-        <p:nvSpPr>
-          <p:cNvPr id="4" name="フッター プレースホルダー 3">
-            <a:extLst>
-              <a:ext uri="{FF2B5EF4-FFF2-40B4-BE49-F238E27FC236}">
-                <a16:creationId xmlns:a16="http://schemas.microsoft.com/office/drawing/2014/main" id="{5F6347BE-7B5D-4EC1-B9A4-826F8F09E032}"/>
-              </a:ext>
-            </a:extLst>
-          </p:cNvPr>
-          <p:cNvSpPr>
-            <a:spLocks noGrp="1"/>
-          </p:cNvSpPr>
-          <p:nvPr>
-            <p:ph type="ftr" sz="quarter" idx="11"/>
-          </p:nvPr>
-        </p:nvSpPr>
-        <p:spPr/>
-        <p:txBody>
-          <a:bodyPr/>
-          <a:lstStyle/>
-          <a:p>
-            <a:endParaRPr lang="en-US"/>
+            <a:r>
+              <a:rPr lang="en-US" dirty="0"/>
+              <a:t>Input and Output</a:t>
+            </a:r>
+          </a:p>
+          <a:p>
+            <a:r>
+              <a:rPr lang="en-US" dirty="0"/>
+              <a:t>Data type</a:t>
+            </a:r>
+          </a:p>
+          <a:p>
+            <a:r>
+              <a:rPr lang="en-US" dirty="0"/>
+              <a:t>Arithmetic operation</a:t>
+            </a:r>
+          </a:p>
+          <a:p>
+            <a:r>
+              <a:rPr lang="en-US" dirty="0"/>
+              <a:t>Rule of variable name</a:t>
+            </a:r>
           </a:p>
         </p:txBody>
       </p:sp>
@@ -4288,7 +5150,7 @@
           <p:cNvPr id="5" name="スライド番号プレースホルダー 4">
             <a:extLst>
               <a:ext uri="{FF2B5EF4-FFF2-40B4-BE49-F238E27FC236}">
-                <a16:creationId xmlns:a16="http://schemas.microsoft.com/office/drawing/2014/main" id="{0932FD42-5356-46B8-81DE-72A4A93CAA34}"/>
+                <a16:creationId xmlns:a16="http://schemas.microsoft.com/office/drawing/2014/main" id="{6BE97389-6D0B-4E13-A211-6F977585BB0E}"/>
               </a:ext>
             </a:extLst>
           </p:cNvPr>
@@ -4316,7 +5178,7 @@
     </p:spTree>
     <p:extLst>
       <p:ext uri="{BB962C8B-B14F-4D97-AF65-F5344CB8AC3E}">
-        <p14:creationId xmlns:p14="http://schemas.microsoft.com/office/powerpoint/2010/main" val="3452653827"/>
+        <p14:creationId xmlns:p14="http://schemas.microsoft.com/office/powerpoint/2010/main" val="4164304242"/>
       </p:ext>
     </p:extLst>
   </p:cSld>
@@ -4348,7 +5210,7 @@
           <p:cNvPr id="2" name="タイトル 1">
             <a:extLst>
               <a:ext uri="{FF2B5EF4-FFF2-40B4-BE49-F238E27FC236}">
-                <a16:creationId xmlns:a16="http://schemas.microsoft.com/office/drawing/2014/main" id="{A79A797C-41A1-4F8B-8105-C2ABA5D85AF2}"/>
+                <a16:creationId xmlns:a16="http://schemas.microsoft.com/office/drawing/2014/main" id="{0B12B137-D144-408E-93D9-0BD13518D030}"/>
               </a:ext>
             </a:extLst>
           </p:cNvPr>
@@ -4366,7 +5228,7 @@
           <a:p>
             <a:r>
               <a:rPr lang="en-US" dirty="0"/>
-              <a:t>Repeat(for, while)</a:t>
+              <a:t>Output</a:t>
             </a:r>
           </a:p>
         </p:txBody>
@@ -4376,7 +5238,7 @@
           <p:cNvPr id="3" name="コンテンツ プレースホルダー 2">
             <a:extLst>
               <a:ext uri="{FF2B5EF4-FFF2-40B4-BE49-F238E27FC236}">
-                <a16:creationId xmlns:a16="http://schemas.microsoft.com/office/drawing/2014/main" id="{FE158364-C372-4B49-B871-864989973A92}"/>
+                <a16:creationId xmlns:a16="http://schemas.microsoft.com/office/drawing/2014/main" id="{CDF476F1-50EB-4525-AD58-3424E28B8171}"/>
               </a:ext>
             </a:extLst>
           </p:cNvPr>
@@ -4387,37 +5249,38 @@
             <p:ph idx="1"/>
           </p:nvPr>
         </p:nvSpPr>
-        <p:spPr/>
-        <p:txBody>
-          <a:bodyPr/>
-          <a:lstStyle/>
-          <a:p>
-            <a:endParaRPr lang="en-US"/>
-          </a:p>
-        </p:txBody>
-      </p:sp>
-      <p:sp>
-        <p:nvSpPr>
-          <p:cNvPr id="4" name="フッター プレースホルダー 3">
-            <a:extLst>
-              <a:ext uri="{FF2B5EF4-FFF2-40B4-BE49-F238E27FC236}">
-                <a16:creationId xmlns:a16="http://schemas.microsoft.com/office/drawing/2014/main" id="{233B0E54-F1CB-4E7D-823C-C151BF037EE5}"/>
-              </a:ext>
-            </a:extLst>
-          </p:cNvPr>
-          <p:cNvSpPr>
-            <a:spLocks noGrp="1"/>
-          </p:cNvSpPr>
-          <p:nvPr>
-            <p:ph type="ftr" sz="quarter" idx="11"/>
-          </p:nvPr>
-        </p:nvSpPr>
-        <p:spPr/>
-        <p:txBody>
-          <a:bodyPr/>
-          <a:lstStyle/>
-          <a:p>
-            <a:endParaRPr lang="en-US"/>
+        <p:spPr>
+          <a:xfrm>
+            <a:off x="628650" y="1825625"/>
+            <a:ext cx="7886700" cy="769793"/>
+          </a:xfrm>
+        </p:spPr>
+        <p:txBody>
+          <a:bodyPr>
+            <a:normAutofit/>
+          </a:bodyPr>
+          <a:lstStyle/>
+          <a:p>
+            <a:pPr marL="0" indent="0">
+              <a:buNone/>
+            </a:pPr>
+            <a:r>
+              <a:rPr lang="ja-JP" altLang="en-US" dirty="0"/>
+              <a:t>出力は</a:t>
+            </a:r>
+            <a:r>
+              <a:rPr lang="en-US" altLang="ja-JP" dirty="0">
+                <a:solidFill>
+                  <a:schemeClr val="tx2"/>
+                </a:solidFill>
+              </a:rPr>
+              <a:t>print</a:t>
+            </a:r>
+            <a:r>
+              <a:rPr lang="ja-JP" altLang="en-US" dirty="0"/>
+              <a:t>を使う</a:t>
+            </a:r>
+            <a:endParaRPr lang="en-US" dirty="0"/>
           </a:p>
         </p:txBody>
       </p:sp>
@@ -4426,7 +5289,7 @@
           <p:cNvPr id="5" name="スライド番号プレースホルダー 4">
             <a:extLst>
               <a:ext uri="{FF2B5EF4-FFF2-40B4-BE49-F238E27FC236}">
-                <a16:creationId xmlns:a16="http://schemas.microsoft.com/office/drawing/2014/main" id="{AC27D5E8-9A83-4A09-B5EB-343C26C86426}"/>
+                <a16:creationId xmlns:a16="http://schemas.microsoft.com/office/drawing/2014/main" id="{FB1097F2-29F5-4DD9-BFA8-30363EA9AFBB}"/>
               </a:ext>
             </a:extLst>
           </p:cNvPr>
@@ -4451,10 +5314,222 @@
           </a:p>
         </p:txBody>
       </p:sp>
+      <p:sp>
+        <p:nvSpPr>
+          <p:cNvPr id="7" name="コンテンツ プレースホルダー 2">
+            <a:extLst>
+              <a:ext uri="{FF2B5EF4-FFF2-40B4-BE49-F238E27FC236}">
+                <a16:creationId xmlns:a16="http://schemas.microsoft.com/office/drawing/2014/main" id="{A33827B7-15B1-4264-BBAF-2C64BA218C21}"/>
+              </a:ext>
+            </a:extLst>
+          </p:cNvPr>
+          <p:cNvSpPr txBox="1">
+            <a:spLocks/>
+          </p:cNvSpPr>
+          <p:nvPr/>
+        </p:nvSpPr>
+        <p:spPr>
+          <a:xfrm>
+            <a:off x="628650" y="4090988"/>
+            <a:ext cx="7886700" cy="769793"/>
+          </a:xfrm>
+          <a:prstGeom prst="rect">
+            <a:avLst/>
+          </a:prstGeom>
+        </p:spPr>
+        <p:txBody>
+          <a:bodyPr vert="horz" lIns="91440" tIns="45720" rIns="91440" bIns="45720" rtlCol="0">
+            <a:normAutofit/>
+          </a:bodyPr>
+          <a:lstStyle>
+            <a:lvl1pPr marL="228600" indent="-228600" algn="l" defTabSz="914400" rtl="0" eaLnBrk="1" latinLnBrk="0" hangingPunct="1">
+              <a:lnSpc>
+                <a:spcPct val="90000"/>
+              </a:lnSpc>
+              <a:spcBef>
+                <a:spcPts val="1000"/>
+              </a:spcBef>
+              <a:buFont typeface="Arial" panose="020B0604020202020204" pitchFamily="34" charset="0"/>
+              <a:buChar char="•"/>
+              <a:defRPr sz="3200" kern="1200">
+                <a:solidFill>
+                  <a:schemeClr val="tx1"/>
+                </a:solidFill>
+                <a:latin typeface="+mn-lt"/>
+                <a:ea typeface="+mn-ea"/>
+                <a:cs typeface="+mn-cs"/>
+              </a:defRPr>
+            </a:lvl1pPr>
+            <a:lvl2pPr marL="685800" indent="-228600" algn="l" defTabSz="914400" rtl="0" eaLnBrk="1" latinLnBrk="0" hangingPunct="1">
+              <a:lnSpc>
+                <a:spcPct val="90000"/>
+              </a:lnSpc>
+              <a:spcBef>
+                <a:spcPts val="500"/>
+              </a:spcBef>
+              <a:buFont typeface="Arial" panose="020B0604020202020204" pitchFamily="34" charset="0"/>
+              <a:buChar char="•"/>
+              <a:defRPr sz="2800" kern="1200">
+                <a:solidFill>
+                  <a:schemeClr val="tx1"/>
+                </a:solidFill>
+                <a:latin typeface="+mn-lt"/>
+                <a:ea typeface="+mn-ea"/>
+                <a:cs typeface="+mn-cs"/>
+              </a:defRPr>
+            </a:lvl2pPr>
+            <a:lvl3pPr marL="1143000" indent="-228600" algn="l" defTabSz="914400" rtl="0" eaLnBrk="1" latinLnBrk="0" hangingPunct="1">
+              <a:lnSpc>
+                <a:spcPct val="90000"/>
+              </a:lnSpc>
+              <a:spcBef>
+                <a:spcPts val="500"/>
+              </a:spcBef>
+              <a:buFont typeface="Arial" panose="020B0604020202020204" pitchFamily="34" charset="0"/>
+              <a:buChar char="•"/>
+              <a:defRPr sz="2400" kern="1200">
+                <a:solidFill>
+                  <a:schemeClr val="tx1"/>
+                </a:solidFill>
+                <a:latin typeface="+mn-lt"/>
+                <a:ea typeface="+mn-ea"/>
+                <a:cs typeface="+mn-cs"/>
+              </a:defRPr>
+            </a:lvl3pPr>
+            <a:lvl4pPr marL="1600200" indent="-228600" algn="l" defTabSz="914400" rtl="0" eaLnBrk="1" latinLnBrk="0" hangingPunct="1">
+              <a:lnSpc>
+                <a:spcPct val="90000"/>
+              </a:lnSpc>
+              <a:spcBef>
+                <a:spcPts val="500"/>
+              </a:spcBef>
+              <a:buFont typeface="Arial" panose="020B0604020202020204" pitchFamily="34" charset="0"/>
+              <a:buChar char="•"/>
+              <a:defRPr sz="2000" kern="1200">
+                <a:solidFill>
+                  <a:schemeClr val="tx1"/>
+                </a:solidFill>
+                <a:latin typeface="+mn-lt"/>
+                <a:ea typeface="+mn-ea"/>
+                <a:cs typeface="+mn-cs"/>
+              </a:defRPr>
+            </a:lvl4pPr>
+            <a:lvl5pPr marL="2057400" indent="-228600" algn="l" defTabSz="914400" rtl="0" eaLnBrk="1" latinLnBrk="0" hangingPunct="1">
+              <a:lnSpc>
+                <a:spcPct val="90000"/>
+              </a:lnSpc>
+              <a:spcBef>
+                <a:spcPts val="500"/>
+              </a:spcBef>
+              <a:buFont typeface="Arial" panose="020B0604020202020204" pitchFamily="34" charset="0"/>
+              <a:buChar char="•"/>
+              <a:defRPr sz="2000" kern="1200">
+                <a:solidFill>
+                  <a:schemeClr val="tx1"/>
+                </a:solidFill>
+                <a:latin typeface="+mn-lt"/>
+                <a:ea typeface="+mn-ea"/>
+                <a:cs typeface="+mn-cs"/>
+              </a:defRPr>
+            </a:lvl5pPr>
+            <a:lvl6pPr marL="2514600" indent="-228600" algn="l" defTabSz="914400" rtl="0" eaLnBrk="1" latinLnBrk="0" hangingPunct="1">
+              <a:lnSpc>
+                <a:spcPct val="90000"/>
+              </a:lnSpc>
+              <a:spcBef>
+                <a:spcPts val="500"/>
+              </a:spcBef>
+              <a:buFont typeface="Arial" panose="020B0604020202020204" pitchFamily="34" charset="0"/>
+              <a:buChar char="•"/>
+              <a:defRPr sz="1800" kern="1200">
+                <a:solidFill>
+                  <a:schemeClr val="tx1"/>
+                </a:solidFill>
+                <a:latin typeface="+mn-lt"/>
+                <a:ea typeface="+mn-ea"/>
+                <a:cs typeface="+mn-cs"/>
+              </a:defRPr>
+            </a:lvl6pPr>
+            <a:lvl7pPr marL="2971800" indent="-228600" algn="l" defTabSz="914400" rtl="0" eaLnBrk="1" latinLnBrk="0" hangingPunct="1">
+              <a:lnSpc>
+                <a:spcPct val="90000"/>
+              </a:lnSpc>
+              <a:spcBef>
+                <a:spcPts val="500"/>
+              </a:spcBef>
+              <a:buFont typeface="Arial" panose="020B0604020202020204" pitchFamily="34" charset="0"/>
+              <a:buChar char="•"/>
+              <a:defRPr sz="1800" kern="1200">
+                <a:solidFill>
+                  <a:schemeClr val="tx1"/>
+                </a:solidFill>
+                <a:latin typeface="+mn-lt"/>
+                <a:ea typeface="+mn-ea"/>
+                <a:cs typeface="+mn-cs"/>
+              </a:defRPr>
+            </a:lvl7pPr>
+            <a:lvl8pPr marL="3429000" indent="-228600" algn="l" defTabSz="914400" rtl="0" eaLnBrk="1" latinLnBrk="0" hangingPunct="1">
+              <a:lnSpc>
+                <a:spcPct val="90000"/>
+              </a:lnSpc>
+              <a:spcBef>
+                <a:spcPts val="500"/>
+              </a:spcBef>
+              <a:buFont typeface="Arial" panose="020B0604020202020204" pitchFamily="34" charset="0"/>
+              <a:buChar char="•"/>
+              <a:defRPr sz="1800" kern="1200">
+                <a:solidFill>
+                  <a:schemeClr val="tx1"/>
+                </a:solidFill>
+                <a:latin typeface="+mn-lt"/>
+                <a:ea typeface="+mn-ea"/>
+                <a:cs typeface="+mn-cs"/>
+              </a:defRPr>
+            </a:lvl8pPr>
+            <a:lvl9pPr marL="3886200" indent="-228600" algn="l" defTabSz="914400" rtl="0" eaLnBrk="1" latinLnBrk="0" hangingPunct="1">
+              <a:lnSpc>
+                <a:spcPct val="90000"/>
+              </a:lnSpc>
+              <a:spcBef>
+                <a:spcPts val="500"/>
+              </a:spcBef>
+              <a:buFont typeface="Arial" panose="020B0604020202020204" pitchFamily="34" charset="0"/>
+              <a:buChar char="•"/>
+              <a:defRPr sz="1800" kern="1200">
+                <a:solidFill>
+                  <a:schemeClr val="tx1"/>
+                </a:solidFill>
+                <a:latin typeface="+mn-lt"/>
+                <a:ea typeface="+mn-ea"/>
+                <a:cs typeface="+mn-cs"/>
+              </a:defRPr>
+            </a:lvl9pPr>
+          </a:lstStyle>
+          <a:p>
+            <a:pPr marL="0" indent="0">
+              <a:buFont typeface="Arial" panose="020B0604020202020204" pitchFamily="34" charset="0"/>
+              <a:buNone/>
+            </a:pPr>
+            <a:r>
+              <a:rPr lang="en-US" altLang="ja-JP" dirty="0">
+                <a:solidFill>
+                  <a:schemeClr val="tx2"/>
+                </a:solidFill>
+              </a:rPr>
+              <a:t>format</a:t>
+            </a:r>
+            <a:r>
+              <a:rPr lang="ja-JP" altLang="en-US" dirty="0"/>
+              <a:t>でレイアウトを指定</a:t>
+            </a:r>
+            <a:endParaRPr lang="en-US" dirty="0"/>
+          </a:p>
+        </p:txBody>
+      </p:sp>
     </p:spTree>
     <p:extLst>
       <p:ext uri="{BB962C8B-B14F-4D97-AF65-F5344CB8AC3E}">
-        <p14:creationId xmlns:p14="http://schemas.microsoft.com/office/powerpoint/2010/main" val="2476710849"/>
+        <p14:creationId xmlns:p14="http://schemas.microsoft.com/office/powerpoint/2010/main" val="974265376"/>
       </p:ext>
     </p:extLst>
   </p:cSld>
@@ -4486,7 +5561,7 @@
           <p:cNvPr id="2" name="タイトル 1">
             <a:extLst>
               <a:ext uri="{FF2B5EF4-FFF2-40B4-BE49-F238E27FC236}">
-                <a16:creationId xmlns:a16="http://schemas.microsoft.com/office/drawing/2014/main" id="{F6B36FFF-5648-4E54-83B1-95AB5C7DA3CB}"/>
+                <a16:creationId xmlns:a16="http://schemas.microsoft.com/office/drawing/2014/main" id="{A5A5A66B-03D3-4DF9-A175-FD22B62AE61C}"/>
               </a:ext>
             </a:extLst>
           </p:cNvPr>
@@ -4504,7 +5579,7 @@
           <a:p>
             <a:r>
               <a:rPr lang="en-US" dirty="0"/>
-              <a:t>Function</a:t>
+              <a:t>Input</a:t>
             </a:r>
           </a:p>
         </p:txBody>
@@ -4514,7 +5589,7 @@
           <p:cNvPr id="3" name="コンテンツ プレースホルダー 2">
             <a:extLst>
               <a:ext uri="{FF2B5EF4-FFF2-40B4-BE49-F238E27FC236}">
-                <a16:creationId xmlns:a16="http://schemas.microsoft.com/office/drawing/2014/main" id="{3B3CCD9F-C8A0-4C66-A242-D9F826307A89}"/>
+                <a16:creationId xmlns:a16="http://schemas.microsoft.com/office/drawing/2014/main" id="{5CA9D54C-10C3-450B-9924-B7486095457A}"/>
               </a:ext>
             </a:extLst>
           </p:cNvPr>
@@ -4525,46 +5600,45 @@
             <p:ph idx="1"/>
           </p:nvPr>
         </p:nvSpPr>
-        <p:spPr/>
-        <p:txBody>
-          <a:bodyPr/>
-          <a:lstStyle/>
-          <a:p>
-            <a:endParaRPr lang="en-US"/>
-          </a:p>
-        </p:txBody>
-      </p:sp>
-      <p:sp>
-        <p:nvSpPr>
-          <p:cNvPr id="4" name="フッター プレースホルダー 3">
+        <p:spPr>
+          <a:xfrm>
+            <a:off x="628650" y="1825625"/>
+            <a:ext cx="7886700" cy="603539"/>
+          </a:xfrm>
+        </p:spPr>
+        <p:txBody>
+          <a:bodyPr/>
+          <a:lstStyle/>
+          <a:p>
+            <a:pPr marL="0" indent="0">
+              <a:buNone/>
+            </a:pPr>
+            <a:r>
+              <a:rPr lang="ja-JP" altLang="en-US" dirty="0"/>
+              <a:t>入力は</a:t>
+            </a:r>
+            <a:r>
+              <a:rPr lang="en-US" altLang="ja-JP" dirty="0">
+                <a:solidFill>
+                  <a:schemeClr val="tx2"/>
+                </a:solidFill>
+              </a:rPr>
+              <a:t>input</a:t>
+            </a:r>
+            <a:r>
+              <a:rPr lang="ja-JP" altLang="en-US" dirty="0"/>
+              <a:t>を使う</a:t>
+            </a:r>
+            <a:endParaRPr lang="en-US" altLang="ja-JP" dirty="0"/>
+          </a:p>
+        </p:txBody>
+      </p:sp>
+      <p:sp>
+        <p:nvSpPr>
+          <p:cNvPr id="4" name="スライド番号プレースホルダー 3">
             <a:extLst>
               <a:ext uri="{FF2B5EF4-FFF2-40B4-BE49-F238E27FC236}">
-                <a16:creationId xmlns:a16="http://schemas.microsoft.com/office/drawing/2014/main" id="{77B9C64D-5403-4C0F-9E00-B394AEF8223D}"/>
-              </a:ext>
-            </a:extLst>
-          </p:cNvPr>
-          <p:cNvSpPr>
-            <a:spLocks noGrp="1"/>
-          </p:cNvSpPr>
-          <p:nvPr>
-            <p:ph type="ftr" sz="quarter" idx="11"/>
-          </p:nvPr>
-        </p:nvSpPr>
-        <p:spPr/>
-        <p:txBody>
-          <a:bodyPr/>
-          <a:lstStyle/>
-          <a:p>
-            <a:endParaRPr lang="en-US"/>
-          </a:p>
-        </p:txBody>
-      </p:sp>
-      <p:sp>
-        <p:nvSpPr>
-          <p:cNvPr id="5" name="スライド番号プレースホルダー 4">
-            <a:extLst>
-              <a:ext uri="{FF2B5EF4-FFF2-40B4-BE49-F238E27FC236}">
-                <a16:creationId xmlns:a16="http://schemas.microsoft.com/office/drawing/2014/main" id="{5AE19A5F-72FC-45C6-A95A-B0D52F671680}"/>
+                <a16:creationId xmlns:a16="http://schemas.microsoft.com/office/drawing/2014/main" id="{ED24ED34-5423-461B-8621-999E27713218}"/>
               </a:ext>
             </a:extLst>
           </p:cNvPr>
@@ -4589,10 +5663,214 @@
           </a:p>
         </p:txBody>
       </p:sp>
+      <p:sp>
+        <p:nvSpPr>
+          <p:cNvPr id="5" name="コンテンツ プレースホルダー 2">
+            <a:extLst>
+              <a:ext uri="{FF2B5EF4-FFF2-40B4-BE49-F238E27FC236}">
+                <a16:creationId xmlns:a16="http://schemas.microsoft.com/office/drawing/2014/main" id="{81FD5281-342A-4EC7-B6BE-18D2D1656752}"/>
+              </a:ext>
+            </a:extLst>
+          </p:cNvPr>
+          <p:cNvSpPr txBox="1">
+            <a:spLocks/>
+          </p:cNvSpPr>
+          <p:nvPr/>
+        </p:nvSpPr>
+        <p:spPr>
+          <a:xfrm>
+            <a:off x="628650" y="3686753"/>
+            <a:ext cx="7886700" cy="603539"/>
+          </a:xfrm>
+          <a:prstGeom prst="rect">
+            <a:avLst/>
+          </a:prstGeom>
+        </p:spPr>
+        <p:txBody>
+          <a:bodyPr vert="horz" lIns="91440" tIns="45720" rIns="91440" bIns="45720" rtlCol="0">
+            <a:normAutofit/>
+          </a:bodyPr>
+          <a:lstStyle>
+            <a:lvl1pPr marL="228600" indent="-228600" algn="l" defTabSz="914400" rtl="0" eaLnBrk="1" latinLnBrk="0" hangingPunct="1">
+              <a:lnSpc>
+                <a:spcPct val="90000"/>
+              </a:lnSpc>
+              <a:spcBef>
+                <a:spcPts val="1000"/>
+              </a:spcBef>
+              <a:buFont typeface="Arial" panose="020B0604020202020204" pitchFamily="34" charset="0"/>
+              <a:buChar char="•"/>
+              <a:defRPr sz="3200" kern="1200">
+                <a:solidFill>
+                  <a:schemeClr val="tx1"/>
+                </a:solidFill>
+                <a:latin typeface="+mn-lt"/>
+                <a:ea typeface="+mn-ea"/>
+                <a:cs typeface="+mn-cs"/>
+              </a:defRPr>
+            </a:lvl1pPr>
+            <a:lvl2pPr marL="685800" indent="-228600" algn="l" defTabSz="914400" rtl="0" eaLnBrk="1" latinLnBrk="0" hangingPunct="1">
+              <a:lnSpc>
+                <a:spcPct val="90000"/>
+              </a:lnSpc>
+              <a:spcBef>
+                <a:spcPts val="500"/>
+              </a:spcBef>
+              <a:buFont typeface="Arial" panose="020B0604020202020204" pitchFamily="34" charset="0"/>
+              <a:buChar char="•"/>
+              <a:defRPr sz="2800" kern="1200">
+                <a:solidFill>
+                  <a:schemeClr val="tx1"/>
+                </a:solidFill>
+                <a:latin typeface="+mn-lt"/>
+                <a:ea typeface="+mn-ea"/>
+                <a:cs typeface="+mn-cs"/>
+              </a:defRPr>
+            </a:lvl2pPr>
+            <a:lvl3pPr marL="1143000" indent="-228600" algn="l" defTabSz="914400" rtl="0" eaLnBrk="1" latinLnBrk="0" hangingPunct="1">
+              <a:lnSpc>
+                <a:spcPct val="90000"/>
+              </a:lnSpc>
+              <a:spcBef>
+                <a:spcPts val="500"/>
+              </a:spcBef>
+              <a:buFont typeface="Arial" panose="020B0604020202020204" pitchFamily="34" charset="0"/>
+              <a:buChar char="•"/>
+              <a:defRPr sz="2400" kern="1200">
+                <a:solidFill>
+                  <a:schemeClr val="tx1"/>
+                </a:solidFill>
+                <a:latin typeface="+mn-lt"/>
+                <a:ea typeface="+mn-ea"/>
+                <a:cs typeface="+mn-cs"/>
+              </a:defRPr>
+            </a:lvl3pPr>
+            <a:lvl4pPr marL="1600200" indent="-228600" algn="l" defTabSz="914400" rtl="0" eaLnBrk="1" latinLnBrk="0" hangingPunct="1">
+              <a:lnSpc>
+                <a:spcPct val="90000"/>
+              </a:lnSpc>
+              <a:spcBef>
+                <a:spcPts val="500"/>
+              </a:spcBef>
+              <a:buFont typeface="Arial" panose="020B0604020202020204" pitchFamily="34" charset="0"/>
+              <a:buChar char="•"/>
+              <a:defRPr sz="2000" kern="1200">
+                <a:solidFill>
+                  <a:schemeClr val="tx1"/>
+                </a:solidFill>
+                <a:latin typeface="+mn-lt"/>
+                <a:ea typeface="+mn-ea"/>
+                <a:cs typeface="+mn-cs"/>
+              </a:defRPr>
+            </a:lvl4pPr>
+            <a:lvl5pPr marL="2057400" indent="-228600" algn="l" defTabSz="914400" rtl="0" eaLnBrk="1" latinLnBrk="0" hangingPunct="1">
+              <a:lnSpc>
+                <a:spcPct val="90000"/>
+              </a:lnSpc>
+              <a:spcBef>
+                <a:spcPts val="500"/>
+              </a:spcBef>
+              <a:buFont typeface="Arial" panose="020B0604020202020204" pitchFamily="34" charset="0"/>
+              <a:buChar char="•"/>
+              <a:defRPr sz="2000" kern="1200">
+                <a:solidFill>
+                  <a:schemeClr val="tx1"/>
+                </a:solidFill>
+                <a:latin typeface="+mn-lt"/>
+                <a:ea typeface="+mn-ea"/>
+                <a:cs typeface="+mn-cs"/>
+              </a:defRPr>
+            </a:lvl5pPr>
+            <a:lvl6pPr marL="2514600" indent="-228600" algn="l" defTabSz="914400" rtl="0" eaLnBrk="1" latinLnBrk="0" hangingPunct="1">
+              <a:lnSpc>
+                <a:spcPct val="90000"/>
+              </a:lnSpc>
+              <a:spcBef>
+                <a:spcPts val="500"/>
+              </a:spcBef>
+              <a:buFont typeface="Arial" panose="020B0604020202020204" pitchFamily="34" charset="0"/>
+              <a:buChar char="•"/>
+              <a:defRPr sz="1800" kern="1200">
+                <a:solidFill>
+                  <a:schemeClr val="tx1"/>
+                </a:solidFill>
+                <a:latin typeface="+mn-lt"/>
+                <a:ea typeface="+mn-ea"/>
+                <a:cs typeface="+mn-cs"/>
+              </a:defRPr>
+            </a:lvl6pPr>
+            <a:lvl7pPr marL="2971800" indent="-228600" algn="l" defTabSz="914400" rtl="0" eaLnBrk="1" latinLnBrk="0" hangingPunct="1">
+              <a:lnSpc>
+                <a:spcPct val="90000"/>
+              </a:lnSpc>
+              <a:spcBef>
+                <a:spcPts val="500"/>
+              </a:spcBef>
+              <a:buFont typeface="Arial" panose="020B0604020202020204" pitchFamily="34" charset="0"/>
+              <a:buChar char="•"/>
+              <a:defRPr sz="1800" kern="1200">
+                <a:solidFill>
+                  <a:schemeClr val="tx1"/>
+                </a:solidFill>
+                <a:latin typeface="+mn-lt"/>
+                <a:ea typeface="+mn-ea"/>
+                <a:cs typeface="+mn-cs"/>
+              </a:defRPr>
+            </a:lvl7pPr>
+            <a:lvl8pPr marL="3429000" indent="-228600" algn="l" defTabSz="914400" rtl="0" eaLnBrk="1" latinLnBrk="0" hangingPunct="1">
+              <a:lnSpc>
+                <a:spcPct val="90000"/>
+              </a:lnSpc>
+              <a:spcBef>
+                <a:spcPts val="500"/>
+              </a:spcBef>
+              <a:buFont typeface="Arial" panose="020B0604020202020204" pitchFamily="34" charset="0"/>
+              <a:buChar char="•"/>
+              <a:defRPr sz="1800" kern="1200">
+                <a:solidFill>
+                  <a:schemeClr val="tx1"/>
+                </a:solidFill>
+                <a:latin typeface="+mn-lt"/>
+                <a:ea typeface="+mn-ea"/>
+                <a:cs typeface="+mn-cs"/>
+              </a:defRPr>
+            </a:lvl8pPr>
+            <a:lvl9pPr marL="3886200" indent="-228600" algn="l" defTabSz="914400" rtl="0" eaLnBrk="1" latinLnBrk="0" hangingPunct="1">
+              <a:lnSpc>
+                <a:spcPct val="90000"/>
+              </a:lnSpc>
+              <a:spcBef>
+                <a:spcPts val="500"/>
+              </a:spcBef>
+              <a:buFont typeface="Arial" panose="020B0604020202020204" pitchFamily="34" charset="0"/>
+              <a:buChar char="•"/>
+              <a:defRPr sz="1800" kern="1200">
+                <a:solidFill>
+                  <a:schemeClr val="tx1"/>
+                </a:solidFill>
+                <a:latin typeface="+mn-lt"/>
+                <a:ea typeface="+mn-ea"/>
+                <a:cs typeface="+mn-cs"/>
+              </a:defRPr>
+            </a:lvl9pPr>
+          </a:lstStyle>
+          <a:p>
+            <a:pPr marL="0" indent="0">
+              <a:buFont typeface="Arial" panose="020B0604020202020204" pitchFamily="34" charset="0"/>
+              <a:buNone/>
+            </a:pPr>
+            <a:r>
+              <a:rPr lang="ja-JP" altLang="en-US" dirty="0"/>
+              <a:t>数値の入力はキャストが必要</a:t>
+            </a:r>
+            <a:endParaRPr lang="en-US" altLang="ja-JP" dirty="0"/>
+          </a:p>
+        </p:txBody>
+      </p:sp>
     </p:spTree>
     <p:extLst>
       <p:ext uri="{BB962C8B-B14F-4D97-AF65-F5344CB8AC3E}">
-        <p14:creationId xmlns:p14="http://schemas.microsoft.com/office/powerpoint/2010/main" val="828934801"/>
+        <p14:creationId xmlns:p14="http://schemas.microsoft.com/office/powerpoint/2010/main" val="4227691236"/>
       </p:ext>
     </p:extLst>
   </p:cSld>
@@ -4624,7 +5902,7 @@
           <p:cNvPr id="2" name="タイトル 1">
             <a:extLst>
               <a:ext uri="{FF2B5EF4-FFF2-40B4-BE49-F238E27FC236}">
-                <a16:creationId xmlns:a16="http://schemas.microsoft.com/office/drawing/2014/main" id="{FAF5DC41-DAEF-44F8-BABF-BA1D49ACA002}"/>
+                <a16:creationId xmlns:a16="http://schemas.microsoft.com/office/drawing/2014/main" id="{D74ECB86-7F07-44E8-B5C8-DDD91296999A}"/>
               </a:ext>
             </a:extLst>
           </p:cNvPr>
@@ -4642,67 +5920,282 @@
           <a:p>
             <a:r>
               <a:rPr lang="en-US" dirty="0"/>
-              <a:t>Error</a:t>
-            </a:r>
-          </a:p>
-        </p:txBody>
-      </p:sp>
-      <p:sp>
-        <p:nvSpPr>
-          <p:cNvPr id="3" name="コンテンツ プレースホルダー 2">
+              <a:t>Data type</a:t>
+            </a:r>
+          </a:p>
+        </p:txBody>
+      </p:sp>
+      <p:graphicFrame>
+        <p:nvGraphicFramePr>
+          <p:cNvPr id="7" name="コンテンツ プレースホルダー 6">
             <a:extLst>
               <a:ext uri="{FF2B5EF4-FFF2-40B4-BE49-F238E27FC236}">
-                <a16:creationId xmlns:a16="http://schemas.microsoft.com/office/drawing/2014/main" id="{E0FA2130-D6D3-4220-959F-C91BC53FAB78}"/>
+                <a16:creationId xmlns:a16="http://schemas.microsoft.com/office/drawing/2014/main" id="{A0F84F2C-80EE-429D-8B93-40A011AD7978}"/>
               </a:ext>
             </a:extLst>
           </p:cNvPr>
-          <p:cNvSpPr>
-            <a:spLocks noGrp="1"/>
-          </p:cNvSpPr>
+          <p:cNvGraphicFramePr>
+            <a:graphicFrameLocks noGrp="1"/>
+          </p:cNvGraphicFramePr>
           <p:nvPr>
             <p:ph idx="1"/>
-          </p:nvPr>
-        </p:nvSpPr>
-        <p:spPr/>
-        <p:txBody>
-          <a:bodyPr/>
-          <a:lstStyle/>
-          <a:p>
-            <a:endParaRPr lang="en-US"/>
-          </a:p>
-        </p:txBody>
-      </p:sp>
-      <p:sp>
-        <p:nvSpPr>
-          <p:cNvPr id="4" name="フッター プレースホルダー 3">
-            <a:extLst>
-              <a:ext uri="{FF2B5EF4-FFF2-40B4-BE49-F238E27FC236}">
-                <a16:creationId xmlns:a16="http://schemas.microsoft.com/office/drawing/2014/main" id="{22FBFB1F-9EAD-4A9F-A7D6-A03CF7EC9927}"/>
-              </a:ext>
-            </a:extLst>
-          </p:cNvPr>
-          <p:cNvSpPr>
-            <a:spLocks noGrp="1"/>
-          </p:cNvSpPr>
-          <p:nvPr>
-            <p:ph type="ftr" sz="quarter" idx="11"/>
-          </p:nvPr>
-        </p:nvSpPr>
-        <p:spPr/>
-        <p:txBody>
-          <a:bodyPr/>
-          <a:lstStyle/>
-          <a:p>
-            <a:endParaRPr lang="en-US"/>
-          </a:p>
-        </p:txBody>
-      </p:sp>
+            <p:extLst>
+              <p:ext uri="{D42A27DB-BD31-4B8C-83A1-F6EECF244321}">
+                <p14:modId xmlns:p14="http://schemas.microsoft.com/office/powerpoint/2010/main" val="2930572645"/>
+              </p:ext>
+            </p:extLst>
+          </p:nvPr>
+        </p:nvGraphicFramePr>
+        <p:xfrm>
+          <a:off x="1157005" y="2681316"/>
+          <a:ext cx="6829990" cy="3017520"/>
+        </p:xfrm>
+        <a:graphic>
+          <a:graphicData uri="http://schemas.openxmlformats.org/drawingml/2006/table">
+            <a:tbl>
+              <a:tblPr firstRow="1">
+                <a:tableStyleId>{9D7B26C5-4107-4FEC-AEDC-1716B250A1EF}</a:tableStyleId>
+              </a:tblPr>
+              <a:tblGrid>
+                <a:gridCol w="1645990">
+                  <a:extLst>
+                    <a:ext uri="{9D8B030D-6E8A-4147-A177-3AD203B41FA5}">
+                      <a16:colId xmlns:a16="http://schemas.microsoft.com/office/drawing/2014/main" val="962391357"/>
+                    </a:ext>
+                  </a:extLst>
+                </a:gridCol>
+                <a:gridCol w="5184000">
+                  <a:extLst>
+                    <a:ext uri="{9D8B030D-6E8A-4147-A177-3AD203B41FA5}">
+                      <a16:colId xmlns:a16="http://schemas.microsoft.com/office/drawing/2014/main" val="1208510133"/>
+                    </a:ext>
+                  </a:extLst>
+                </a:gridCol>
+              </a:tblGrid>
+              <a:tr h="404091">
+                <a:tc>
+                  <a:txBody>
+                    <a:bodyPr/>
+                    <a:lstStyle/>
+                    <a:p>
+                      <a:pPr algn="ctr"/>
+                      <a:r>
+                        <a:rPr lang="en-US" sz="2800" dirty="0"/>
+                        <a:t>Type</a:t>
+                      </a:r>
+                    </a:p>
+                  </a:txBody>
+                  <a:tcPr anchor="ctr"/>
+                </a:tc>
+                <a:tc>
+                  <a:txBody>
+                    <a:bodyPr/>
+                    <a:lstStyle/>
+                    <a:p>
+                      <a:pPr algn="ctr"/>
+                      <a:r>
+                        <a:rPr lang="en-US" sz="2800" dirty="0"/>
+                        <a:t>Explain</a:t>
+                      </a:r>
+                    </a:p>
+                  </a:txBody>
+                  <a:tcPr/>
+                </a:tc>
+                <a:extLst>
+                  <a:ext uri="{0D108BD9-81ED-4DB2-BD59-A6C34878D82A}">
+                    <a16:rowId xmlns:a16="http://schemas.microsoft.com/office/drawing/2014/main" val="1445083909"/>
+                  </a:ext>
+                </a:extLst>
+              </a:tr>
+              <a:tr h="370840">
+                <a:tc>
+                  <a:txBody>
+                    <a:bodyPr/>
+                    <a:lstStyle/>
+                    <a:p>
+                      <a:pPr algn="ctr"/>
+                      <a:r>
+                        <a:rPr lang="en-US" sz="2800" dirty="0"/>
+                        <a:t>int</a:t>
+                      </a:r>
+                    </a:p>
+                  </a:txBody>
+                  <a:tcPr anchor="ctr"/>
+                </a:tc>
+                <a:tc>
+                  <a:txBody>
+                    <a:bodyPr/>
+                    <a:lstStyle/>
+                    <a:p>
+                      <a:pPr algn="ctr"/>
+                      <a:r>
+                        <a:rPr lang="ja-JP" altLang="en-US" sz="2800" dirty="0"/>
+                        <a:t>浮動小数点を含まない数値</a:t>
+                      </a:r>
+                      <a:endParaRPr lang="en-US" sz="2800" dirty="0"/>
+                    </a:p>
+                  </a:txBody>
+                  <a:tcPr/>
+                </a:tc>
+                <a:extLst>
+                  <a:ext uri="{0D108BD9-81ED-4DB2-BD59-A6C34878D82A}">
+                    <a16:rowId xmlns:a16="http://schemas.microsoft.com/office/drawing/2014/main" val="2509464497"/>
+                  </a:ext>
+                </a:extLst>
+              </a:tr>
+              <a:tr h="370840">
+                <a:tc>
+                  <a:txBody>
+                    <a:bodyPr/>
+                    <a:lstStyle/>
+                    <a:p>
+                      <a:pPr algn="ctr"/>
+                      <a:r>
+                        <a:rPr lang="en-US" sz="2800" dirty="0"/>
+                        <a:t>float</a:t>
+                      </a:r>
+                    </a:p>
+                  </a:txBody>
+                  <a:tcPr anchor="ctr"/>
+                </a:tc>
+                <a:tc>
+                  <a:txBody>
+                    <a:bodyPr/>
+                    <a:lstStyle/>
+                    <a:p>
+                      <a:pPr algn="ctr"/>
+                      <a:r>
+                        <a:rPr lang="ja-JP" altLang="en-US" sz="2800" dirty="0"/>
+                        <a:t>浮動小数点を含む数値</a:t>
+                      </a:r>
+                      <a:endParaRPr lang="en-US" sz="2800" dirty="0"/>
+                    </a:p>
+                  </a:txBody>
+                  <a:tcPr/>
+                </a:tc>
+                <a:extLst>
+                  <a:ext uri="{0D108BD9-81ED-4DB2-BD59-A6C34878D82A}">
+                    <a16:rowId xmlns:a16="http://schemas.microsoft.com/office/drawing/2014/main" val="3997930024"/>
+                  </a:ext>
+                </a:extLst>
+              </a:tr>
+              <a:tr h="370840">
+                <a:tc>
+                  <a:txBody>
+                    <a:bodyPr/>
+                    <a:lstStyle/>
+                    <a:p>
+                      <a:pPr algn="ctr"/>
+                      <a:r>
+                        <a:rPr lang="en-US" sz="2800" dirty="0"/>
+                        <a:t>str</a:t>
+                      </a:r>
+                    </a:p>
+                  </a:txBody>
+                  <a:tcPr anchor="ctr"/>
+                </a:tc>
+                <a:tc>
+                  <a:txBody>
+                    <a:bodyPr/>
+                    <a:lstStyle/>
+                    <a:p>
+                      <a:pPr algn="ctr"/>
+                      <a:r>
+                        <a:rPr lang="ja-JP" altLang="en-US" sz="2800" dirty="0"/>
+                        <a:t>「</a:t>
+                      </a:r>
+                      <a:r>
+                        <a:rPr lang="en-US" altLang="ja-JP" sz="2800" dirty="0"/>
+                        <a:t>’’</a:t>
+                      </a:r>
+                      <a:r>
+                        <a:rPr lang="ja-JP" altLang="en-US" sz="2800" dirty="0"/>
+                        <a:t>」または「</a:t>
+                      </a:r>
+                      <a:r>
+                        <a:rPr lang="en-US" altLang="ja-JP" sz="2800" dirty="0"/>
+                        <a:t>””</a:t>
+                      </a:r>
+                      <a:r>
+                        <a:rPr lang="ja-JP" altLang="en-US" sz="2800" dirty="0"/>
+                        <a:t>」で囲われた，</a:t>
+                      </a:r>
+                      <a:br>
+                        <a:rPr lang="en-US" altLang="ja-JP" sz="2800" dirty="0"/>
+                      </a:br>
+                      <a:r>
+                        <a:rPr lang="ja-JP" altLang="en-US" sz="2800" dirty="0"/>
+                        <a:t>文字列</a:t>
+                      </a:r>
+                      <a:endParaRPr lang="en-US" sz="2800" dirty="0"/>
+                    </a:p>
+                  </a:txBody>
+                  <a:tcPr/>
+                </a:tc>
+                <a:extLst>
+                  <a:ext uri="{0D108BD9-81ED-4DB2-BD59-A6C34878D82A}">
+                    <a16:rowId xmlns:a16="http://schemas.microsoft.com/office/drawing/2014/main" val="3680982520"/>
+                  </a:ext>
+                </a:extLst>
+              </a:tr>
+              <a:tr h="370840">
+                <a:tc>
+                  <a:txBody>
+                    <a:bodyPr/>
+                    <a:lstStyle/>
+                    <a:p>
+                      <a:pPr algn="ctr"/>
+                      <a:r>
+                        <a:rPr lang="en-US" sz="2800" dirty="0"/>
+                        <a:t>bool</a:t>
+                      </a:r>
+                    </a:p>
+                  </a:txBody>
+                  <a:tcPr anchor="ctr"/>
+                </a:tc>
+                <a:tc>
+                  <a:txBody>
+                    <a:bodyPr/>
+                    <a:lstStyle/>
+                    <a:p>
+                      <a:pPr algn="ctr"/>
+                      <a:r>
+                        <a:rPr lang="en-US" sz="2800" dirty="0"/>
+                        <a:t>True</a:t>
+                      </a:r>
+                      <a:r>
+                        <a:rPr lang="ja-JP" altLang="en-US" sz="2800" dirty="0"/>
+                        <a:t>または</a:t>
+                      </a:r>
+                      <a:r>
+                        <a:rPr lang="en-US" altLang="ja-JP" sz="2800" dirty="0"/>
+                        <a:t>False</a:t>
+                      </a:r>
+                      <a:r>
+                        <a:rPr lang="ja-JP" altLang="en-US" sz="2800" dirty="0"/>
+                        <a:t>で定義する</a:t>
+                      </a:r>
+                      <a:endParaRPr lang="en-US" sz="2800" dirty="0"/>
+                    </a:p>
+                  </a:txBody>
+                  <a:tcPr/>
+                </a:tc>
+                <a:extLst>
+                  <a:ext uri="{0D108BD9-81ED-4DB2-BD59-A6C34878D82A}">
+                    <a16:rowId xmlns:a16="http://schemas.microsoft.com/office/drawing/2014/main" val="3069440572"/>
+                  </a:ext>
+                </a:extLst>
+              </a:tr>
+            </a:tbl>
+          </a:graphicData>
+        </a:graphic>
+      </p:graphicFrame>
       <p:sp>
         <p:nvSpPr>
           <p:cNvPr id="5" name="スライド番号プレースホルダー 4">
             <a:extLst>
               <a:ext uri="{FF2B5EF4-FFF2-40B4-BE49-F238E27FC236}">
-                <a16:creationId xmlns:a16="http://schemas.microsoft.com/office/drawing/2014/main" id="{4D897C1E-210D-40AA-B1A3-6D30B53F200F}"/>
+                <a16:creationId xmlns:a16="http://schemas.microsoft.com/office/drawing/2014/main" id="{A88BFB20-6B88-41B5-92EE-FBE6A277D6F6}"/>
               </a:ext>
             </a:extLst>
           </p:cNvPr>
@@ -4727,10 +6220,214 @@
           </a:p>
         </p:txBody>
       </p:sp>
+      <p:sp>
+        <p:nvSpPr>
+          <p:cNvPr id="9" name="コンテンツ プレースホルダー 2">
+            <a:extLst>
+              <a:ext uri="{FF2B5EF4-FFF2-40B4-BE49-F238E27FC236}">
+                <a16:creationId xmlns:a16="http://schemas.microsoft.com/office/drawing/2014/main" id="{1EFE1F25-17DE-4F12-9DF7-031FB8DF3F56}"/>
+              </a:ext>
+            </a:extLst>
+          </p:cNvPr>
+          <p:cNvSpPr txBox="1">
+            <a:spLocks/>
+          </p:cNvSpPr>
+          <p:nvPr/>
+        </p:nvSpPr>
+        <p:spPr>
+          <a:xfrm>
+            <a:off x="628650" y="1690689"/>
+            <a:ext cx="7886700" cy="769793"/>
+          </a:xfrm>
+          <a:prstGeom prst="rect">
+            <a:avLst/>
+          </a:prstGeom>
+        </p:spPr>
+        <p:txBody>
+          <a:bodyPr vert="horz" lIns="91440" tIns="45720" rIns="91440" bIns="45720" rtlCol="0">
+            <a:normAutofit/>
+          </a:bodyPr>
+          <a:lstStyle>
+            <a:lvl1pPr marL="228600" indent="-228600" algn="l" defTabSz="914400" rtl="0" eaLnBrk="1" latinLnBrk="0" hangingPunct="1">
+              <a:lnSpc>
+                <a:spcPct val="90000"/>
+              </a:lnSpc>
+              <a:spcBef>
+                <a:spcPts val="1000"/>
+              </a:spcBef>
+              <a:buFont typeface="Arial" panose="020B0604020202020204" pitchFamily="34" charset="0"/>
+              <a:buChar char="•"/>
+              <a:defRPr sz="3200" kern="1200">
+                <a:solidFill>
+                  <a:schemeClr val="tx1"/>
+                </a:solidFill>
+                <a:latin typeface="+mn-lt"/>
+                <a:ea typeface="+mn-ea"/>
+                <a:cs typeface="+mn-cs"/>
+              </a:defRPr>
+            </a:lvl1pPr>
+            <a:lvl2pPr marL="685800" indent="-228600" algn="l" defTabSz="914400" rtl="0" eaLnBrk="1" latinLnBrk="0" hangingPunct="1">
+              <a:lnSpc>
+                <a:spcPct val="90000"/>
+              </a:lnSpc>
+              <a:spcBef>
+                <a:spcPts val="500"/>
+              </a:spcBef>
+              <a:buFont typeface="Arial" panose="020B0604020202020204" pitchFamily="34" charset="0"/>
+              <a:buChar char="•"/>
+              <a:defRPr sz="2800" kern="1200">
+                <a:solidFill>
+                  <a:schemeClr val="tx1"/>
+                </a:solidFill>
+                <a:latin typeface="+mn-lt"/>
+                <a:ea typeface="+mn-ea"/>
+                <a:cs typeface="+mn-cs"/>
+              </a:defRPr>
+            </a:lvl2pPr>
+            <a:lvl3pPr marL="1143000" indent="-228600" algn="l" defTabSz="914400" rtl="0" eaLnBrk="1" latinLnBrk="0" hangingPunct="1">
+              <a:lnSpc>
+                <a:spcPct val="90000"/>
+              </a:lnSpc>
+              <a:spcBef>
+                <a:spcPts val="500"/>
+              </a:spcBef>
+              <a:buFont typeface="Arial" panose="020B0604020202020204" pitchFamily="34" charset="0"/>
+              <a:buChar char="•"/>
+              <a:defRPr sz="2400" kern="1200">
+                <a:solidFill>
+                  <a:schemeClr val="tx1"/>
+                </a:solidFill>
+                <a:latin typeface="+mn-lt"/>
+                <a:ea typeface="+mn-ea"/>
+                <a:cs typeface="+mn-cs"/>
+              </a:defRPr>
+            </a:lvl3pPr>
+            <a:lvl4pPr marL="1600200" indent="-228600" algn="l" defTabSz="914400" rtl="0" eaLnBrk="1" latinLnBrk="0" hangingPunct="1">
+              <a:lnSpc>
+                <a:spcPct val="90000"/>
+              </a:lnSpc>
+              <a:spcBef>
+                <a:spcPts val="500"/>
+              </a:spcBef>
+              <a:buFont typeface="Arial" panose="020B0604020202020204" pitchFamily="34" charset="0"/>
+              <a:buChar char="•"/>
+              <a:defRPr sz="2000" kern="1200">
+                <a:solidFill>
+                  <a:schemeClr val="tx1"/>
+                </a:solidFill>
+                <a:latin typeface="+mn-lt"/>
+                <a:ea typeface="+mn-ea"/>
+                <a:cs typeface="+mn-cs"/>
+              </a:defRPr>
+            </a:lvl4pPr>
+            <a:lvl5pPr marL="2057400" indent="-228600" algn="l" defTabSz="914400" rtl="0" eaLnBrk="1" latinLnBrk="0" hangingPunct="1">
+              <a:lnSpc>
+                <a:spcPct val="90000"/>
+              </a:lnSpc>
+              <a:spcBef>
+                <a:spcPts val="500"/>
+              </a:spcBef>
+              <a:buFont typeface="Arial" panose="020B0604020202020204" pitchFamily="34" charset="0"/>
+              <a:buChar char="•"/>
+              <a:defRPr sz="2000" kern="1200">
+                <a:solidFill>
+                  <a:schemeClr val="tx1"/>
+                </a:solidFill>
+                <a:latin typeface="+mn-lt"/>
+                <a:ea typeface="+mn-ea"/>
+                <a:cs typeface="+mn-cs"/>
+              </a:defRPr>
+            </a:lvl5pPr>
+            <a:lvl6pPr marL="2514600" indent="-228600" algn="l" defTabSz="914400" rtl="0" eaLnBrk="1" latinLnBrk="0" hangingPunct="1">
+              <a:lnSpc>
+                <a:spcPct val="90000"/>
+              </a:lnSpc>
+              <a:spcBef>
+                <a:spcPts val="500"/>
+              </a:spcBef>
+              <a:buFont typeface="Arial" panose="020B0604020202020204" pitchFamily="34" charset="0"/>
+              <a:buChar char="•"/>
+              <a:defRPr sz="1800" kern="1200">
+                <a:solidFill>
+                  <a:schemeClr val="tx1"/>
+                </a:solidFill>
+                <a:latin typeface="+mn-lt"/>
+                <a:ea typeface="+mn-ea"/>
+                <a:cs typeface="+mn-cs"/>
+              </a:defRPr>
+            </a:lvl6pPr>
+            <a:lvl7pPr marL="2971800" indent="-228600" algn="l" defTabSz="914400" rtl="0" eaLnBrk="1" latinLnBrk="0" hangingPunct="1">
+              <a:lnSpc>
+                <a:spcPct val="90000"/>
+              </a:lnSpc>
+              <a:spcBef>
+                <a:spcPts val="500"/>
+              </a:spcBef>
+              <a:buFont typeface="Arial" panose="020B0604020202020204" pitchFamily="34" charset="0"/>
+              <a:buChar char="•"/>
+              <a:defRPr sz="1800" kern="1200">
+                <a:solidFill>
+                  <a:schemeClr val="tx1"/>
+                </a:solidFill>
+                <a:latin typeface="+mn-lt"/>
+                <a:ea typeface="+mn-ea"/>
+                <a:cs typeface="+mn-cs"/>
+              </a:defRPr>
+            </a:lvl7pPr>
+            <a:lvl8pPr marL="3429000" indent="-228600" algn="l" defTabSz="914400" rtl="0" eaLnBrk="1" latinLnBrk="0" hangingPunct="1">
+              <a:lnSpc>
+                <a:spcPct val="90000"/>
+              </a:lnSpc>
+              <a:spcBef>
+                <a:spcPts val="500"/>
+              </a:spcBef>
+              <a:buFont typeface="Arial" panose="020B0604020202020204" pitchFamily="34" charset="0"/>
+              <a:buChar char="•"/>
+              <a:defRPr sz="1800" kern="1200">
+                <a:solidFill>
+                  <a:schemeClr val="tx1"/>
+                </a:solidFill>
+                <a:latin typeface="+mn-lt"/>
+                <a:ea typeface="+mn-ea"/>
+                <a:cs typeface="+mn-cs"/>
+              </a:defRPr>
+            </a:lvl8pPr>
+            <a:lvl9pPr marL="3886200" indent="-228600" algn="l" defTabSz="914400" rtl="0" eaLnBrk="1" latinLnBrk="0" hangingPunct="1">
+              <a:lnSpc>
+                <a:spcPct val="90000"/>
+              </a:lnSpc>
+              <a:spcBef>
+                <a:spcPts val="500"/>
+              </a:spcBef>
+              <a:buFont typeface="Arial" panose="020B0604020202020204" pitchFamily="34" charset="0"/>
+              <a:buChar char="•"/>
+              <a:defRPr sz="1800" kern="1200">
+                <a:solidFill>
+                  <a:schemeClr val="tx1"/>
+                </a:solidFill>
+                <a:latin typeface="+mn-lt"/>
+                <a:ea typeface="+mn-ea"/>
+                <a:cs typeface="+mn-cs"/>
+              </a:defRPr>
+            </a:lvl9pPr>
+          </a:lstStyle>
+          <a:p>
+            <a:pPr marL="0" indent="0">
+              <a:buFont typeface="Arial" panose="020B0604020202020204" pitchFamily="34" charset="0"/>
+              <a:buNone/>
+            </a:pPr>
+            <a:r>
+              <a:rPr lang="ja-JP" altLang="en-US" dirty="0"/>
+              <a:t>単一変数の型を以下に示す</a:t>
+            </a:r>
+            <a:endParaRPr lang="en-US" dirty="0"/>
+          </a:p>
+        </p:txBody>
+      </p:sp>
     </p:spTree>
     <p:extLst>
       <p:ext uri="{BB962C8B-B14F-4D97-AF65-F5344CB8AC3E}">
-        <p14:creationId xmlns:p14="http://schemas.microsoft.com/office/powerpoint/2010/main" val="107592700"/>
+        <p14:creationId xmlns:p14="http://schemas.microsoft.com/office/powerpoint/2010/main" val="2500654060"/>
       </p:ext>
     </p:extLst>
   </p:cSld>
@@ -4762,7 +6459,7 @@
           <p:cNvPr id="2" name="タイトル 1">
             <a:extLst>
               <a:ext uri="{FF2B5EF4-FFF2-40B4-BE49-F238E27FC236}">
-                <a16:creationId xmlns:a16="http://schemas.microsoft.com/office/drawing/2014/main" id="{8F0D12C3-4CDC-4F57-9D7E-A2DB95866AE8}"/>
+                <a16:creationId xmlns:a16="http://schemas.microsoft.com/office/drawing/2014/main" id="{05388522-166D-4368-B999-B34DBE07EC63}"/>
               </a:ext>
             </a:extLst>
           </p:cNvPr>
@@ -4780,7 +6477,7 @@
           <a:p>
             <a:r>
               <a:rPr lang="en-US" dirty="0"/>
-              <a:t>Summary</a:t>
+              <a:t>Data type</a:t>
             </a:r>
           </a:p>
         </p:txBody>
@@ -4790,7 +6487,7 @@
           <p:cNvPr id="3" name="コンテンツ プレースホルダー 2">
             <a:extLst>
               <a:ext uri="{FF2B5EF4-FFF2-40B4-BE49-F238E27FC236}">
-                <a16:creationId xmlns:a16="http://schemas.microsoft.com/office/drawing/2014/main" id="{9CD5CAFA-55C1-4CBE-B983-ACB13AC199C5}"/>
+                <a16:creationId xmlns:a16="http://schemas.microsoft.com/office/drawing/2014/main" id="{C0C4E755-0218-42EA-AE6E-AFDB115440C9}"/>
               </a:ext>
             </a:extLst>
           </p:cNvPr>
@@ -4801,46 +6498,33 @@
             <p:ph idx="1"/>
           </p:nvPr>
         </p:nvSpPr>
-        <p:spPr/>
-        <p:txBody>
-          <a:bodyPr/>
-          <a:lstStyle/>
-          <a:p>
-            <a:endParaRPr lang="en-US"/>
-          </a:p>
-        </p:txBody>
-      </p:sp>
-      <p:sp>
-        <p:nvSpPr>
-          <p:cNvPr id="4" name="フッター プレースホルダー 3">
+        <p:spPr>
+          <a:xfrm>
+            <a:off x="628650" y="1825625"/>
+            <a:ext cx="7886700" cy="723611"/>
+          </a:xfrm>
+        </p:spPr>
+        <p:txBody>
+          <a:bodyPr/>
+          <a:lstStyle/>
+          <a:p>
+            <a:pPr marL="0" indent="0">
+              <a:buNone/>
+            </a:pPr>
+            <a:r>
+              <a:rPr lang="ja-JP" altLang="en-US" dirty="0"/>
+              <a:t>複数の変数を含むデータ型について</a:t>
+            </a:r>
+            <a:endParaRPr lang="en-US" dirty="0"/>
+          </a:p>
+        </p:txBody>
+      </p:sp>
+      <p:sp>
+        <p:nvSpPr>
+          <p:cNvPr id="4" name="スライド番号プレースホルダー 3">
             <a:extLst>
               <a:ext uri="{FF2B5EF4-FFF2-40B4-BE49-F238E27FC236}">
-                <a16:creationId xmlns:a16="http://schemas.microsoft.com/office/drawing/2014/main" id="{9A539EF2-80DF-4BCB-A60B-7325C646579D}"/>
-              </a:ext>
-            </a:extLst>
-          </p:cNvPr>
-          <p:cNvSpPr>
-            <a:spLocks noGrp="1"/>
-          </p:cNvSpPr>
-          <p:nvPr>
-            <p:ph type="ftr" sz="quarter" idx="11"/>
-          </p:nvPr>
-        </p:nvSpPr>
-        <p:spPr/>
-        <p:txBody>
-          <a:bodyPr/>
-          <a:lstStyle/>
-          <a:p>
-            <a:endParaRPr lang="en-US"/>
-          </a:p>
-        </p:txBody>
-      </p:sp>
-      <p:sp>
-        <p:nvSpPr>
-          <p:cNvPr id="5" name="スライド番号プレースホルダー 4">
-            <a:extLst>
-              <a:ext uri="{FF2B5EF4-FFF2-40B4-BE49-F238E27FC236}">
-                <a16:creationId xmlns:a16="http://schemas.microsoft.com/office/drawing/2014/main" id="{EF72F589-D9F4-40B5-BFD0-A9881E9136BC}"/>
+                <a16:creationId xmlns:a16="http://schemas.microsoft.com/office/drawing/2014/main" id="{DC9E9AFD-978B-442B-8A25-2C602EF88522}"/>
               </a:ext>
             </a:extLst>
           </p:cNvPr>
@@ -4865,10 +6549,263 @@
           </a:p>
         </p:txBody>
       </p:sp>
+      <p:graphicFrame>
+        <p:nvGraphicFramePr>
+          <p:cNvPr id="6" name="コンテンツ プレースホルダー 6">
+            <a:extLst>
+              <a:ext uri="{FF2B5EF4-FFF2-40B4-BE49-F238E27FC236}">
+                <a16:creationId xmlns:a16="http://schemas.microsoft.com/office/drawing/2014/main" id="{AB854BB3-F251-4BCE-82A3-A1D9A295F7DE}"/>
+              </a:ext>
+            </a:extLst>
+          </p:cNvPr>
+          <p:cNvGraphicFramePr>
+            <a:graphicFrameLocks/>
+          </p:cNvGraphicFramePr>
+          <p:nvPr>
+            <p:extLst>
+              <p:ext uri="{D42A27DB-BD31-4B8C-83A1-F6EECF244321}">
+                <p14:modId xmlns:p14="http://schemas.microsoft.com/office/powerpoint/2010/main" val="2703892032"/>
+              </p:ext>
+            </p:extLst>
+          </p:nvPr>
+        </p:nvGraphicFramePr>
+        <p:xfrm>
+          <a:off x="2455402" y="2549236"/>
+          <a:ext cx="4233195" cy="1828800"/>
+        </p:xfrm>
+        <a:graphic>
+          <a:graphicData uri="http://schemas.openxmlformats.org/drawingml/2006/table">
+            <a:tbl>
+              <a:tblPr firstRow="1">
+                <a:tableStyleId>{9D7B26C5-4107-4FEC-AEDC-1716B250A1EF}</a:tableStyleId>
+              </a:tblPr>
+              <a:tblGrid>
+                <a:gridCol w="1800000">
+                  <a:extLst>
+                    <a:ext uri="{9D8B030D-6E8A-4147-A177-3AD203B41FA5}">
+                      <a16:colId xmlns:a16="http://schemas.microsoft.com/office/drawing/2014/main" val="962391357"/>
+                    </a:ext>
+                  </a:extLst>
+                </a:gridCol>
+                <a:gridCol w="921195">
+                  <a:extLst>
+                    <a:ext uri="{9D8B030D-6E8A-4147-A177-3AD203B41FA5}">
+                      <a16:colId xmlns:a16="http://schemas.microsoft.com/office/drawing/2014/main" val="1208510133"/>
+                    </a:ext>
+                  </a:extLst>
+                </a:gridCol>
+                <a:gridCol w="1512000">
+                  <a:extLst>
+                    <a:ext uri="{9D8B030D-6E8A-4147-A177-3AD203B41FA5}">
+                      <a16:colId xmlns:a16="http://schemas.microsoft.com/office/drawing/2014/main" val="3817286862"/>
+                    </a:ext>
+                  </a:extLst>
+                </a:gridCol>
+              </a:tblGrid>
+              <a:tr h="323188">
+                <a:tc>
+                  <a:txBody>
+                    <a:bodyPr/>
+                    <a:lstStyle/>
+                    <a:p>
+                      <a:pPr algn="ctr"/>
+                      <a:r>
+                        <a:rPr lang="en-US" sz="2400" dirty="0"/>
+                        <a:t>Type</a:t>
+                      </a:r>
+                    </a:p>
+                  </a:txBody>
+                  <a:tcPr/>
+                </a:tc>
+                <a:tc>
+                  <a:txBody>
+                    <a:bodyPr/>
+                    <a:lstStyle/>
+                    <a:p>
+                      <a:pPr algn="ctr"/>
+                      <a:r>
+                        <a:rPr lang="en-US" sz="2400" dirty="0"/>
+                        <a:t>key</a:t>
+                      </a:r>
+                    </a:p>
+                  </a:txBody>
+                  <a:tcPr/>
+                </a:tc>
+                <a:tc>
+                  <a:txBody>
+                    <a:bodyPr/>
+                    <a:lstStyle/>
+                    <a:p>
+                      <a:pPr algn="ctr"/>
+                      <a:r>
+                        <a:rPr lang="en-US" sz="2400" dirty="0"/>
+                        <a:t>change</a:t>
+                      </a:r>
+                    </a:p>
+                  </a:txBody>
+                  <a:tcPr/>
+                </a:tc>
+                <a:extLst>
+                  <a:ext uri="{0D108BD9-81ED-4DB2-BD59-A6C34878D82A}">
+                    <a16:rowId xmlns:a16="http://schemas.microsoft.com/office/drawing/2014/main" val="1445083909"/>
+                  </a:ext>
+                </a:extLst>
+              </a:tr>
+              <a:tr h="370840">
+                <a:tc>
+                  <a:txBody>
+                    <a:bodyPr/>
+                    <a:lstStyle/>
+                    <a:p>
+                      <a:pPr algn="ctr"/>
+                      <a:r>
+                        <a:rPr lang="en-US" sz="2400" dirty="0"/>
+                        <a:t>list</a:t>
+                      </a:r>
+                    </a:p>
+                  </a:txBody>
+                  <a:tcPr/>
+                </a:tc>
+                <a:tc>
+                  <a:txBody>
+                    <a:bodyPr/>
+                    <a:lstStyle/>
+                    <a:p>
+                      <a:pPr algn="ctr"/>
+                      <a:r>
+                        <a:rPr lang="en-US" sz="2400" dirty="0"/>
+                        <a:t>index</a:t>
+                      </a:r>
+                    </a:p>
+                  </a:txBody>
+                  <a:tcPr/>
+                </a:tc>
+                <a:tc>
+                  <a:txBody>
+                    <a:bodyPr/>
+                    <a:lstStyle/>
+                    <a:p>
+                      <a:pPr algn="ctr"/>
+                      <a:r>
+                        <a:rPr lang="en-US" sz="2400" dirty="0"/>
+                        <a:t>O</a:t>
+                      </a:r>
+                    </a:p>
+                  </a:txBody>
+                  <a:tcPr/>
+                </a:tc>
+                <a:extLst>
+                  <a:ext uri="{0D108BD9-81ED-4DB2-BD59-A6C34878D82A}">
+                    <a16:rowId xmlns:a16="http://schemas.microsoft.com/office/drawing/2014/main" val="2509464497"/>
+                  </a:ext>
+                </a:extLst>
+              </a:tr>
+              <a:tr h="370840">
+                <a:tc>
+                  <a:txBody>
+                    <a:bodyPr/>
+                    <a:lstStyle/>
+                    <a:p>
+                      <a:pPr algn="ctr"/>
+                      <a:r>
+                        <a:rPr lang="en-US" sz="2400" dirty="0"/>
+                        <a:t>tuple</a:t>
+                      </a:r>
+                    </a:p>
+                  </a:txBody>
+                  <a:tcPr/>
+                </a:tc>
+                <a:tc>
+                  <a:txBody>
+                    <a:bodyPr/>
+                    <a:lstStyle/>
+                    <a:p>
+                      <a:pPr algn="ctr"/>
+                      <a:r>
+                        <a:rPr lang="en-US" sz="2400" dirty="0"/>
+                        <a:t>index</a:t>
+                      </a:r>
+                    </a:p>
+                  </a:txBody>
+                  <a:tcPr/>
+                </a:tc>
+                <a:tc>
+                  <a:txBody>
+                    <a:bodyPr/>
+                    <a:lstStyle/>
+                    <a:p>
+                      <a:pPr algn="ctr"/>
+                      <a:r>
+                        <a:rPr lang="en-US" sz="2400" dirty="0"/>
+                        <a:t>X</a:t>
+                      </a:r>
+                    </a:p>
+                  </a:txBody>
+                  <a:tcPr/>
+                </a:tc>
+                <a:extLst>
+                  <a:ext uri="{0D108BD9-81ED-4DB2-BD59-A6C34878D82A}">
+                    <a16:rowId xmlns:a16="http://schemas.microsoft.com/office/drawing/2014/main" val="3997930024"/>
+                  </a:ext>
+                </a:extLst>
+              </a:tr>
+              <a:tr h="370840">
+                <a:tc>
+                  <a:txBody>
+                    <a:bodyPr/>
+                    <a:lstStyle/>
+                    <a:p>
+                      <a:pPr algn="ctr"/>
+                      <a:r>
+                        <a:rPr lang="en-US" sz="2400" dirty="0"/>
+                        <a:t>dictionary</a:t>
+                      </a:r>
+                    </a:p>
+                  </a:txBody>
+                  <a:tcPr/>
+                </a:tc>
+                <a:tc>
+                  <a:txBody>
+                    <a:bodyPr/>
+                    <a:lstStyle/>
+                    <a:p>
+                      <a:pPr algn="ctr"/>
+                      <a:r>
+                        <a:rPr lang="en-US" sz="2400" dirty="0"/>
+                        <a:t>key</a:t>
+                      </a:r>
+                    </a:p>
+                  </a:txBody>
+                  <a:tcPr/>
+                </a:tc>
+                <a:tc>
+                  <a:txBody>
+                    <a:bodyPr/>
+                    <a:lstStyle/>
+                    <a:p>
+                      <a:pPr algn="ctr"/>
+                      <a:r>
+                        <a:rPr lang="en-US" sz="2400" dirty="0"/>
+                        <a:t>O</a:t>
+                      </a:r>
+                    </a:p>
+                  </a:txBody>
+                  <a:tcPr/>
+                </a:tc>
+                <a:extLst>
+                  <a:ext uri="{0D108BD9-81ED-4DB2-BD59-A6C34878D82A}">
+                    <a16:rowId xmlns:a16="http://schemas.microsoft.com/office/drawing/2014/main" val="3069440572"/>
+                  </a:ext>
+                </a:extLst>
+              </a:tr>
+            </a:tbl>
+          </a:graphicData>
+        </a:graphic>
+      </p:graphicFrame>
     </p:spTree>
     <p:extLst>
       <p:ext uri="{BB962C8B-B14F-4D97-AF65-F5344CB8AC3E}">
-        <p14:creationId xmlns:p14="http://schemas.microsoft.com/office/powerpoint/2010/main" val="3274883772"/>
+        <p14:creationId xmlns:p14="http://schemas.microsoft.com/office/powerpoint/2010/main" val="1372742497"/>
       </p:ext>
     </p:extLst>
   </p:cSld>
@@ -4900,7 +6837,7 @@
           <p:cNvPr id="2" name="タイトル 1">
             <a:extLst>
               <a:ext uri="{FF2B5EF4-FFF2-40B4-BE49-F238E27FC236}">
-                <a16:creationId xmlns:a16="http://schemas.microsoft.com/office/drawing/2014/main" id="{1532B8A9-CC3C-4755-A0C2-83191887A59F}"/>
+                <a16:creationId xmlns:a16="http://schemas.microsoft.com/office/drawing/2014/main" id="{73BC409B-7086-4869-86C9-8AE2A600224B}"/>
               </a:ext>
             </a:extLst>
           </p:cNvPr>
@@ -4918,7 +6855,7 @@
           <a:p>
             <a:r>
               <a:rPr lang="en-US" dirty="0"/>
-              <a:t>References</a:t>
+              <a:t>Arithmetic operation</a:t>
             </a:r>
           </a:p>
         </p:txBody>
@@ -4928,7 +6865,7 @@
           <p:cNvPr id="3" name="コンテンツ プレースホルダー 2">
             <a:extLst>
               <a:ext uri="{FF2B5EF4-FFF2-40B4-BE49-F238E27FC236}">
-                <a16:creationId xmlns:a16="http://schemas.microsoft.com/office/drawing/2014/main" id="{0CFB61A8-0A55-494F-96FA-020C659922F5}"/>
+                <a16:creationId xmlns:a16="http://schemas.microsoft.com/office/drawing/2014/main" id="{6BBDF45C-2541-431D-8003-5AC8510C5B6D}"/>
               </a:ext>
             </a:extLst>
           </p:cNvPr>
@@ -4950,35 +6887,10 @@
       </p:sp>
       <p:sp>
         <p:nvSpPr>
-          <p:cNvPr id="4" name="フッター プレースホルダー 3">
+          <p:cNvPr id="4" name="スライド番号プレースホルダー 3">
             <a:extLst>
               <a:ext uri="{FF2B5EF4-FFF2-40B4-BE49-F238E27FC236}">
-                <a16:creationId xmlns:a16="http://schemas.microsoft.com/office/drawing/2014/main" id="{60B7DB15-038C-4529-8840-552A5824E0A8}"/>
-              </a:ext>
-            </a:extLst>
-          </p:cNvPr>
-          <p:cNvSpPr>
-            <a:spLocks noGrp="1"/>
-          </p:cNvSpPr>
-          <p:nvPr>
-            <p:ph type="ftr" sz="quarter" idx="11"/>
-          </p:nvPr>
-        </p:nvSpPr>
-        <p:spPr/>
-        <p:txBody>
-          <a:bodyPr/>
-          <a:lstStyle/>
-          <a:p>
-            <a:endParaRPr lang="en-US"/>
-          </a:p>
-        </p:txBody>
-      </p:sp>
-      <p:sp>
-        <p:nvSpPr>
-          <p:cNvPr id="5" name="スライド番号プレースホルダー 4">
-            <a:extLst>
-              <a:ext uri="{FF2B5EF4-FFF2-40B4-BE49-F238E27FC236}">
-                <a16:creationId xmlns:a16="http://schemas.microsoft.com/office/drawing/2014/main" id="{D1D09D41-F574-4AE8-B82D-35FD724EA6EA}"/>
+                <a16:creationId xmlns:a16="http://schemas.microsoft.com/office/drawing/2014/main" id="{CC1A3460-1316-4CC5-92ED-556299A37FD3}"/>
               </a:ext>
             </a:extLst>
           </p:cNvPr>
@@ -5006,7 +6918,7 @@
     </p:spTree>
     <p:extLst>
       <p:ext uri="{BB962C8B-B14F-4D97-AF65-F5344CB8AC3E}">
-        <p14:creationId xmlns:p14="http://schemas.microsoft.com/office/powerpoint/2010/main" val="532900966"/>
+        <p14:creationId xmlns:p14="http://schemas.microsoft.com/office/powerpoint/2010/main" val="4054855624"/>
       </p:ext>
     </p:extLst>
   </p:cSld>

</xml_diff>

<commit_message>
[add]:Change 'Arithmetic operation' to 'Operation' and write operation
</commit_message>
<xml_diff>
--- a/ProgramSlide.pptx
+++ b/ProgramSlide.pptx
@@ -5,7 +5,7 @@
     <p:sldMasterId id="2147483672" r:id="rId1"/>
   </p:sldMasterIdLst>
   <p:notesMasterIdLst>
-    <p:notesMasterId r:id="rId19"/>
+    <p:notesMasterId r:id="rId21"/>
   </p:notesMasterIdLst>
   <p:sldIdLst>
     <p:sldId id="256" r:id="rId2"/>
@@ -17,14 +17,16 @@
     <p:sldId id="267" r:id="rId8"/>
     <p:sldId id="272" r:id="rId9"/>
     <p:sldId id="271" r:id="rId10"/>
-    <p:sldId id="268" r:id="rId11"/>
-    <p:sldId id="259" r:id="rId12"/>
-    <p:sldId id="260" r:id="rId13"/>
-    <p:sldId id="261" r:id="rId14"/>
-    <p:sldId id="262" r:id="rId15"/>
-    <p:sldId id="263" r:id="rId16"/>
-    <p:sldId id="264" r:id="rId17"/>
-    <p:sldId id="265" r:id="rId18"/>
+    <p:sldId id="273" r:id="rId11"/>
+    <p:sldId id="274" r:id="rId12"/>
+    <p:sldId id="268" r:id="rId13"/>
+    <p:sldId id="259" r:id="rId14"/>
+    <p:sldId id="260" r:id="rId15"/>
+    <p:sldId id="261" r:id="rId16"/>
+    <p:sldId id="262" r:id="rId17"/>
+    <p:sldId id="263" r:id="rId18"/>
+    <p:sldId id="264" r:id="rId19"/>
+    <p:sldId id="265" r:id="rId20"/>
   </p:sldIdLst>
   <p:sldSz cx="9144000" cy="6858000" type="screen4x3"/>
   <p:notesSz cx="6858000" cy="9144000"/>
@@ -3860,7 +3862,7 @@
           <p:cNvPr id="2" name="タイトル 1">
             <a:extLst>
               <a:ext uri="{FF2B5EF4-FFF2-40B4-BE49-F238E27FC236}">
-                <a16:creationId xmlns:a16="http://schemas.microsoft.com/office/drawing/2014/main" id="{B5A512A7-A58C-4D08-84CB-45DBCE5FE4B3}"/>
+                <a16:creationId xmlns:a16="http://schemas.microsoft.com/office/drawing/2014/main" id="{53DEE263-B642-42D8-F401-1E2ADD4998B7}"/>
               </a:ext>
             </a:extLst>
           </p:cNvPr>
@@ -3877,9 +3879,10 @@
           <a:lstStyle/>
           <a:p>
             <a:r>
-              <a:rPr lang="en-US" dirty="0"/>
-              <a:t>Rule of variable name</a:t>
-            </a:r>
+              <a:rPr lang="en-US" altLang="ja-JP" dirty="0"/>
+              <a:t>Operation</a:t>
+            </a:r>
+            <a:endParaRPr kumimoji="1" lang="ja-JP" altLang="en-US" dirty="0"/>
           </a:p>
         </p:txBody>
       </p:sp>
@@ -3888,7 +3891,7 @@
           <p:cNvPr id="3" name="コンテンツ プレースホルダー 2">
             <a:extLst>
               <a:ext uri="{FF2B5EF4-FFF2-40B4-BE49-F238E27FC236}">
-                <a16:creationId xmlns:a16="http://schemas.microsoft.com/office/drawing/2014/main" id="{F2C69D69-CC93-476C-915C-B693A69400EA}"/>
+                <a16:creationId xmlns:a16="http://schemas.microsoft.com/office/drawing/2014/main" id="{F602A87C-462F-6903-0651-3FB3F50FB41F}"/>
               </a:ext>
             </a:extLst>
           </p:cNvPr>
@@ -3904,16 +3907,35 @@
           <a:bodyPr/>
           <a:lstStyle/>
           <a:p>
-            <a:endParaRPr lang="en-US"/>
-          </a:p>
-        </p:txBody>
-      </p:sp>
-      <p:sp>
-        <p:nvSpPr>
-          <p:cNvPr id="5" name="スライド番号プレースホルダー 4">
+            <a:r>
+              <a:rPr kumimoji="1" lang="ja-JP" altLang="en-US" dirty="0"/>
+              <a:t>算術，累算代入，比較演算に触れる</a:t>
+            </a:r>
+            <a:endParaRPr kumimoji="1" lang="en-US" altLang="ja-JP" dirty="0"/>
+          </a:p>
+          <a:p>
+            <a:pPr lvl="1"/>
+            <a:r>
+              <a:rPr kumimoji="1" lang="ja-JP" altLang="en-US" dirty="0"/>
+              <a:t>ほかの演算子には各自</a:t>
+            </a:r>
+            <a:r>
+              <a:rPr kumimoji="1" lang="en-US" altLang="ja-JP" dirty="0"/>
+              <a:t>References</a:t>
+            </a:r>
+            <a:r>
+              <a:rPr kumimoji="1" lang="ja-JP" altLang="en-US" dirty="0"/>
+              <a:t>から飛んでみてください．</a:t>
+            </a:r>
+          </a:p>
+        </p:txBody>
+      </p:sp>
+      <p:sp>
+        <p:nvSpPr>
+          <p:cNvPr id="4" name="スライド番号プレースホルダー 3">
             <a:extLst>
               <a:ext uri="{FF2B5EF4-FFF2-40B4-BE49-F238E27FC236}">
-                <a16:creationId xmlns:a16="http://schemas.microsoft.com/office/drawing/2014/main" id="{98BECDDE-B0F3-4E94-98E7-3B7862DCC91E}"/>
+                <a16:creationId xmlns:a16="http://schemas.microsoft.com/office/drawing/2014/main" id="{8BED96A7-14A6-A6A4-FA66-27AA530816C3}"/>
               </a:ext>
             </a:extLst>
           </p:cNvPr>
@@ -3941,7 +3963,7 @@
     </p:spTree>
     <p:extLst>
       <p:ext uri="{BB962C8B-B14F-4D97-AF65-F5344CB8AC3E}">
-        <p14:creationId xmlns:p14="http://schemas.microsoft.com/office/powerpoint/2010/main" val="3326139796"/>
+        <p14:creationId xmlns:p14="http://schemas.microsoft.com/office/powerpoint/2010/main" val="145045063"/>
       </p:ext>
     </p:extLst>
   </p:cSld>
@@ -3973,7 +3995,7 @@
           <p:cNvPr id="2" name="タイトル 1">
             <a:extLst>
               <a:ext uri="{FF2B5EF4-FFF2-40B4-BE49-F238E27FC236}">
-                <a16:creationId xmlns:a16="http://schemas.microsoft.com/office/drawing/2014/main" id="{9057BDD7-6E73-4210-B7F6-BF325E8CFBE5}"/>
+                <a16:creationId xmlns:a16="http://schemas.microsoft.com/office/drawing/2014/main" id="{1A1C2531-626C-6E37-8D8A-32B29157975B}"/>
               </a:ext>
             </a:extLst>
           </p:cNvPr>
@@ -3990,9 +4012,10 @@
           <a:lstStyle/>
           <a:p>
             <a:r>
-              <a:rPr lang="en-US" dirty="0"/>
-              <a:t>Conditional branch(if)</a:t>
-            </a:r>
+              <a:rPr lang="en-US" altLang="ja-JP" dirty="0"/>
+              <a:t>Operation</a:t>
+            </a:r>
+            <a:endParaRPr kumimoji="1" lang="ja-JP" altLang="en-US" dirty="0"/>
           </a:p>
         </p:txBody>
       </p:sp>
@@ -4001,7 +4024,7 @@
           <p:cNvPr id="3" name="コンテンツ プレースホルダー 2">
             <a:extLst>
               <a:ext uri="{FF2B5EF4-FFF2-40B4-BE49-F238E27FC236}">
-                <a16:creationId xmlns:a16="http://schemas.microsoft.com/office/drawing/2014/main" id="{0D2DC0C9-A8B5-41C7-B965-B5D51D2A0B4B}"/>
+                <a16:creationId xmlns:a16="http://schemas.microsoft.com/office/drawing/2014/main" id="{189FE876-F3C0-4273-038D-26254ADB9602}"/>
               </a:ext>
             </a:extLst>
           </p:cNvPr>
@@ -4012,21 +4035,32 @@
             <p:ph idx="1"/>
           </p:nvPr>
         </p:nvSpPr>
-        <p:spPr/>
-        <p:txBody>
-          <a:bodyPr/>
-          <a:lstStyle/>
-          <a:p>
-            <a:endParaRPr lang="en-US" dirty="0"/>
-          </a:p>
-        </p:txBody>
-      </p:sp>
-      <p:sp>
-        <p:nvSpPr>
-          <p:cNvPr id="5" name="スライド番号プレースホルダー 4">
+        <p:spPr>
+          <a:xfrm>
+            <a:off x="628650" y="1825625"/>
+            <a:ext cx="7886700" cy="548120"/>
+          </a:xfrm>
+        </p:spPr>
+        <p:txBody>
+          <a:bodyPr/>
+          <a:lstStyle/>
+          <a:p>
+            <a:pPr marL="0" indent="0">
+              <a:buNone/>
+            </a:pPr>
+            <a:r>
+              <a:rPr kumimoji="1" lang="ja-JP" altLang="en-US" dirty="0"/>
+              <a:t>算術演算子</a:t>
+            </a:r>
+          </a:p>
+        </p:txBody>
+      </p:sp>
+      <p:sp>
+        <p:nvSpPr>
+          <p:cNvPr id="4" name="スライド番号プレースホルダー 3">
             <a:extLst>
               <a:ext uri="{FF2B5EF4-FFF2-40B4-BE49-F238E27FC236}">
-                <a16:creationId xmlns:a16="http://schemas.microsoft.com/office/drawing/2014/main" id="{0932FD42-5356-46B8-81DE-72A4A93CAA34}"/>
+                <a16:creationId xmlns:a16="http://schemas.microsoft.com/office/drawing/2014/main" id="{15CCD8CE-8283-D5E7-AD54-62648600C188}"/>
               </a:ext>
             </a:extLst>
           </p:cNvPr>
@@ -4051,10 +4085,314 @@
           </a:p>
         </p:txBody>
       </p:sp>
+      <p:graphicFrame>
+        <p:nvGraphicFramePr>
+          <p:cNvPr id="5" name="コンテンツ プレースホルダー 6">
+            <a:extLst>
+              <a:ext uri="{FF2B5EF4-FFF2-40B4-BE49-F238E27FC236}">
+                <a16:creationId xmlns:a16="http://schemas.microsoft.com/office/drawing/2014/main" id="{BE7B118C-D452-862E-2BCC-AB089908427F}"/>
+              </a:ext>
+            </a:extLst>
+          </p:cNvPr>
+          <p:cNvGraphicFramePr>
+            <a:graphicFrameLocks/>
+          </p:cNvGraphicFramePr>
+          <p:nvPr>
+            <p:extLst>
+              <p:ext uri="{D42A27DB-BD31-4B8C-83A1-F6EECF244321}">
+                <p14:modId xmlns:p14="http://schemas.microsoft.com/office/powerpoint/2010/main" val="1805128470"/>
+              </p:ext>
+            </p:extLst>
+          </p:nvPr>
+        </p:nvGraphicFramePr>
+        <p:xfrm>
+          <a:off x="628652" y="2373745"/>
+          <a:ext cx="3808250" cy="3627120"/>
+        </p:xfrm>
+        <a:graphic>
+          <a:graphicData uri="http://schemas.openxmlformats.org/drawingml/2006/table">
+            <a:tbl>
+              <a:tblPr firstRow="1">
+                <a:tableStyleId>{9D7B26C5-4107-4FEC-AEDC-1716B250A1EF}</a:tableStyleId>
+              </a:tblPr>
+              <a:tblGrid>
+                <a:gridCol w="1603375">
+                  <a:extLst>
+                    <a:ext uri="{9D8B030D-6E8A-4147-A177-3AD203B41FA5}">
+                      <a16:colId xmlns:a16="http://schemas.microsoft.com/office/drawing/2014/main" val="962391357"/>
+                    </a:ext>
+                  </a:extLst>
+                </a:gridCol>
+                <a:gridCol w="2204875">
+                  <a:extLst>
+                    <a:ext uri="{9D8B030D-6E8A-4147-A177-3AD203B41FA5}">
+                      <a16:colId xmlns:a16="http://schemas.microsoft.com/office/drawing/2014/main" val="1208510133"/>
+                    </a:ext>
+                  </a:extLst>
+                </a:gridCol>
+              </a:tblGrid>
+              <a:tr h="373725">
+                <a:tc>
+                  <a:txBody>
+                    <a:bodyPr/>
+                    <a:lstStyle/>
+                    <a:p>
+                      <a:pPr algn="ctr"/>
+                      <a:r>
+                        <a:rPr lang="en-US" sz="2800" dirty="0"/>
+                        <a:t>Operator</a:t>
+                      </a:r>
+                    </a:p>
+                  </a:txBody>
+                  <a:tcPr anchor="ctr"/>
+                </a:tc>
+                <a:tc>
+                  <a:txBody>
+                    <a:bodyPr/>
+                    <a:lstStyle/>
+                    <a:p>
+                      <a:pPr algn="ctr"/>
+                      <a:r>
+                        <a:rPr lang="en-US" sz="2800" dirty="0"/>
+                        <a:t>Explain</a:t>
+                      </a:r>
+                    </a:p>
+                  </a:txBody>
+                  <a:tcPr/>
+                </a:tc>
+                <a:extLst>
+                  <a:ext uri="{0D108BD9-81ED-4DB2-BD59-A6C34878D82A}">
+                    <a16:rowId xmlns:a16="http://schemas.microsoft.com/office/drawing/2014/main" val="1445083909"/>
+                  </a:ext>
+                </a:extLst>
+              </a:tr>
+              <a:tr h="370840">
+                <a:tc>
+                  <a:txBody>
+                    <a:bodyPr/>
+                    <a:lstStyle/>
+                    <a:p>
+                      <a:pPr algn="ctr"/>
+                      <a:r>
+                        <a:rPr lang="en-US" sz="2800" dirty="0"/>
+                        <a:t>+</a:t>
+                      </a:r>
+                    </a:p>
+                  </a:txBody>
+                  <a:tcPr anchor="ctr"/>
+                </a:tc>
+                <a:tc>
+                  <a:txBody>
+                    <a:bodyPr/>
+                    <a:lstStyle/>
+                    <a:p>
+                      <a:pPr algn="ctr"/>
+                      <a:r>
+                        <a:rPr lang="ja-JP" altLang="en-US" sz="2800" dirty="0"/>
+                        <a:t>加算</a:t>
+                      </a:r>
+                      <a:endParaRPr lang="en-US" sz="2800" dirty="0"/>
+                    </a:p>
+                  </a:txBody>
+                  <a:tcPr/>
+                </a:tc>
+                <a:extLst>
+                  <a:ext uri="{0D108BD9-81ED-4DB2-BD59-A6C34878D82A}">
+                    <a16:rowId xmlns:a16="http://schemas.microsoft.com/office/drawing/2014/main" val="1574725563"/>
+                  </a:ext>
+                </a:extLst>
+              </a:tr>
+              <a:tr h="370840">
+                <a:tc>
+                  <a:txBody>
+                    <a:bodyPr/>
+                    <a:lstStyle/>
+                    <a:p>
+                      <a:pPr algn="ctr"/>
+                      <a:r>
+                        <a:rPr lang="en-US" altLang="ja-JP" sz="2800" dirty="0"/>
+                        <a:t>-</a:t>
+                      </a:r>
+                      <a:endParaRPr lang="en-US" sz="2800" dirty="0"/>
+                    </a:p>
+                  </a:txBody>
+                  <a:tcPr anchor="ctr"/>
+                </a:tc>
+                <a:tc>
+                  <a:txBody>
+                    <a:bodyPr/>
+                    <a:lstStyle/>
+                    <a:p>
+                      <a:pPr algn="ctr"/>
+                      <a:r>
+                        <a:rPr lang="ja-JP" altLang="en-US" sz="2800" dirty="0"/>
+                        <a:t>減算</a:t>
+                      </a:r>
+                      <a:endParaRPr lang="en-US" sz="2800" dirty="0"/>
+                    </a:p>
+                  </a:txBody>
+                  <a:tcPr/>
+                </a:tc>
+                <a:extLst>
+                  <a:ext uri="{0D108BD9-81ED-4DB2-BD59-A6C34878D82A}">
+                    <a16:rowId xmlns:a16="http://schemas.microsoft.com/office/drawing/2014/main" val="3397082867"/>
+                  </a:ext>
+                </a:extLst>
+              </a:tr>
+              <a:tr h="370840">
+                <a:tc>
+                  <a:txBody>
+                    <a:bodyPr/>
+                    <a:lstStyle/>
+                    <a:p>
+                      <a:pPr algn="ctr"/>
+                      <a:r>
+                        <a:rPr lang="en-US" altLang="ja-JP" sz="2800" dirty="0"/>
+                        <a:t>*</a:t>
+                      </a:r>
+                      <a:endParaRPr lang="en-US" sz="2800" dirty="0"/>
+                    </a:p>
+                  </a:txBody>
+                  <a:tcPr anchor="ctr"/>
+                </a:tc>
+                <a:tc>
+                  <a:txBody>
+                    <a:bodyPr/>
+                    <a:lstStyle/>
+                    <a:p>
+                      <a:pPr algn="ctr"/>
+                      <a:r>
+                        <a:rPr lang="ja-JP" altLang="en-US" sz="2800" dirty="0"/>
+                        <a:t>乗算</a:t>
+                      </a:r>
+                      <a:endParaRPr lang="en-US" sz="2800" dirty="0"/>
+                    </a:p>
+                  </a:txBody>
+                  <a:tcPr/>
+                </a:tc>
+                <a:extLst>
+                  <a:ext uri="{0D108BD9-81ED-4DB2-BD59-A6C34878D82A}">
+                    <a16:rowId xmlns:a16="http://schemas.microsoft.com/office/drawing/2014/main" val="2714680815"/>
+                  </a:ext>
+                </a:extLst>
+              </a:tr>
+              <a:tr h="370840">
+                <a:tc>
+                  <a:txBody>
+                    <a:bodyPr/>
+                    <a:lstStyle/>
+                    <a:p>
+                      <a:pPr algn="ctr"/>
+                      <a:r>
+                        <a:rPr lang="en-US" sz="2800" dirty="0"/>
+                        <a:t>/</a:t>
+                      </a:r>
+                    </a:p>
+                  </a:txBody>
+                  <a:tcPr anchor="ctr"/>
+                </a:tc>
+                <a:tc>
+                  <a:txBody>
+                    <a:bodyPr/>
+                    <a:lstStyle/>
+                    <a:p>
+                      <a:pPr algn="ctr"/>
+                      <a:r>
+                        <a:rPr lang="ja-JP" altLang="en-US" sz="2800" dirty="0"/>
+                        <a:t>除算</a:t>
+                      </a:r>
+                      <a:endParaRPr lang="en-US" sz="2800" dirty="0"/>
+                    </a:p>
+                  </a:txBody>
+                  <a:tcPr/>
+                </a:tc>
+                <a:extLst>
+                  <a:ext uri="{0D108BD9-81ED-4DB2-BD59-A6C34878D82A}">
+                    <a16:rowId xmlns:a16="http://schemas.microsoft.com/office/drawing/2014/main" val="1430187955"/>
+                  </a:ext>
+                </a:extLst>
+              </a:tr>
+              <a:tr h="0">
+                <a:tc>
+                  <a:txBody>
+                    <a:bodyPr/>
+                    <a:lstStyle/>
+                    <a:p>
+                      <a:pPr algn="ctr"/>
+                      <a:r>
+                        <a:rPr lang="en-US" altLang="ja-JP" sz="2800" dirty="0"/>
+                        <a:t>%</a:t>
+                      </a:r>
+                      <a:endParaRPr lang="en-US" sz="2800" dirty="0"/>
+                    </a:p>
+                  </a:txBody>
+                  <a:tcPr anchor="ctr"/>
+                </a:tc>
+                <a:tc>
+                  <a:txBody>
+                    <a:bodyPr/>
+                    <a:lstStyle/>
+                    <a:p>
+                      <a:pPr algn="ctr"/>
+                      <a:r>
+                        <a:rPr lang="ja-JP" altLang="en-US" sz="2800" dirty="0"/>
+                        <a:t>余り</a:t>
+                      </a:r>
+                      <a:endParaRPr lang="en-US" sz="2800" dirty="0"/>
+                    </a:p>
+                  </a:txBody>
+                  <a:tcPr/>
+                </a:tc>
+                <a:extLst>
+                  <a:ext uri="{0D108BD9-81ED-4DB2-BD59-A6C34878D82A}">
+                    <a16:rowId xmlns:a16="http://schemas.microsoft.com/office/drawing/2014/main" val="3798942226"/>
+                  </a:ext>
+                </a:extLst>
+              </a:tr>
+              <a:tr h="370840">
+                <a:tc>
+                  <a:txBody>
+                    <a:bodyPr/>
+                    <a:lstStyle/>
+                    <a:p>
+                      <a:pPr algn="ctr"/>
+                      <a:r>
+                        <a:rPr lang="en-US" sz="2800" dirty="0"/>
+                        <a:t>//</a:t>
+                      </a:r>
+                    </a:p>
+                  </a:txBody>
+                  <a:tcPr anchor="ctr"/>
+                </a:tc>
+                <a:tc>
+                  <a:txBody>
+                    <a:bodyPr/>
+                    <a:lstStyle/>
+                    <a:p>
+                      <a:pPr algn="ctr"/>
+                      <a:r>
+                        <a:rPr lang="ja-JP" altLang="en-US" sz="2800" dirty="0"/>
+                        <a:t>整数除算</a:t>
+                      </a:r>
+                      <a:endParaRPr lang="en-US" sz="2800" dirty="0"/>
+                    </a:p>
+                  </a:txBody>
+                  <a:tcPr/>
+                </a:tc>
+                <a:extLst>
+                  <a:ext uri="{0D108BD9-81ED-4DB2-BD59-A6C34878D82A}">
+                    <a16:rowId xmlns:a16="http://schemas.microsoft.com/office/drawing/2014/main" val="562012678"/>
+                  </a:ext>
+                </a:extLst>
+              </a:tr>
+            </a:tbl>
+          </a:graphicData>
+        </a:graphic>
+      </p:graphicFrame>
     </p:spTree>
     <p:extLst>
       <p:ext uri="{BB962C8B-B14F-4D97-AF65-F5344CB8AC3E}">
-        <p14:creationId xmlns:p14="http://schemas.microsoft.com/office/powerpoint/2010/main" val="3452653827"/>
+        <p14:creationId xmlns:p14="http://schemas.microsoft.com/office/powerpoint/2010/main" val="3485176884"/>
       </p:ext>
     </p:extLst>
   </p:cSld>
@@ -4086,7 +4424,7 @@
           <p:cNvPr id="2" name="タイトル 1">
             <a:extLst>
               <a:ext uri="{FF2B5EF4-FFF2-40B4-BE49-F238E27FC236}">
-                <a16:creationId xmlns:a16="http://schemas.microsoft.com/office/drawing/2014/main" id="{A79A797C-41A1-4F8B-8105-C2ABA5D85AF2}"/>
+                <a16:creationId xmlns:a16="http://schemas.microsoft.com/office/drawing/2014/main" id="{B5A512A7-A58C-4D08-84CB-45DBCE5FE4B3}"/>
               </a:ext>
             </a:extLst>
           </p:cNvPr>
@@ -4104,7 +4442,7 @@
           <a:p>
             <a:r>
               <a:rPr lang="en-US" dirty="0"/>
-              <a:t>Repeat(for, while)</a:t>
+              <a:t>Rule of variable name</a:t>
             </a:r>
           </a:p>
         </p:txBody>
@@ -4114,7 +4452,7 @@
           <p:cNvPr id="3" name="コンテンツ プレースホルダー 2">
             <a:extLst>
               <a:ext uri="{FF2B5EF4-FFF2-40B4-BE49-F238E27FC236}">
-                <a16:creationId xmlns:a16="http://schemas.microsoft.com/office/drawing/2014/main" id="{FE158364-C372-4B49-B871-864989973A92}"/>
+                <a16:creationId xmlns:a16="http://schemas.microsoft.com/office/drawing/2014/main" id="{F2C69D69-CC93-476C-915C-B693A69400EA}"/>
               </a:ext>
             </a:extLst>
           </p:cNvPr>
@@ -4139,7 +4477,7 @@
           <p:cNvPr id="5" name="スライド番号プレースホルダー 4">
             <a:extLst>
               <a:ext uri="{FF2B5EF4-FFF2-40B4-BE49-F238E27FC236}">
-                <a16:creationId xmlns:a16="http://schemas.microsoft.com/office/drawing/2014/main" id="{AC27D5E8-9A83-4A09-B5EB-343C26C86426}"/>
+                <a16:creationId xmlns:a16="http://schemas.microsoft.com/office/drawing/2014/main" id="{98BECDDE-B0F3-4E94-98E7-3B7862DCC91E}"/>
               </a:ext>
             </a:extLst>
           </p:cNvPr>
@@ -4167,7 +4505,7 @@
     </p:spTree>
     <p:extLst>
       <p:ext uri="{BB962C8B-B14F-4D97-AF65-F5344CB8AC3E}">
-        <p14:creationId xmlns:p14="http://schemas.microsoft.com/office/powerpoint/2010/main" val="2476710849"/>
+        <p14:creationId xmlns:p14="http://schemas.microsoft.com/office/powerpoint/2010/main" val="3326139796"/>
       </p:ext>
     </p:extLst>
   </p:cSld>
@@ -4199,7 +4537,7 @@
           <p:cNvPr id="2" name="タイトル 1">
             <a:extLst>
               <a:ext uri="{FF2B5EF4-FFF2-40B4-BE49-F238E27FC236}">
-                <a16:creationId xmlns:a16="http://schemas.microsoft.com/office/drawing/2014/main" id="{F6B36FFF-5648-4E54-83B1-95AB5C7DA3CB}"/>
+                <a16:creationId xmlns:a16="http://schemas.microsoft.com/office/drawing/2014/main" id="{9057BDD7-6E73-4210-B7F6-BF325E8CFBE5}"/>
               </a:ext>
             </a:extLst>
           </p:cNvPr>
@@ -4217,7 +4555,7 @@
           <a:p>
             <a:r>
               <a:rPr lang="en-US" dirty="0"/>
-              <a:t>Function</a:t>
+              <a:t>Conditional branch(if)</a:t>
             </a:r>
           </a:p>
         </p:txBody>
@@ -4227,7 +4565,7 @@
           <p:cNvPr id="3" name="コンテンツ プレースホルダー 2">
             <a:extLst>
               <a:ext uri="{FF2B5EF4-FFF2-40B4-BE49-F238E27FC236}">
-                <a16:creationId xmlns:a16="http://schemas.microsoft.com/office/drawing/2014/main" id="{3B3CCD9F-C8A0-4C66-A242-D9F826307A89}"/>
+                <a16:creationId xmlns:a16="http://schemas.microsoft.com/office/drawing/2014/main" id="{0D2DC0C9-A8B5-41C7-B965-B5D51D2A0B4B}"/>
               </a:ext>
             </a:extLst>
           </p:cNvPr>
@@ -4243,7 +4581,7 @@
           <a:bodyPr/>
           <a:lstStyle/>
           <a:p>
-            <a:endParaRPr lang="en-US"/>
+            <a:endParaRPr lang="en-US" dirty="0"/>
           </a:p>
         </p:txBody>
       </p:sp>
@@ -4252,7 +4590,7 @@
           <p:cNvPr id="5" name="スライド番号プレースホルダー 4">
             <a:extLst>
               <a:ext uri="{FF2B5EF4-FFF2-40B4-BE49-F238E27FC236}">
-                <a16:creationId xmlns:a16="http://schemas.microsoft.com/office/drawing/2014/main" id="{5AE19A5F-72FC-45C6-A95A-B0D52F671680}"/>
+                <a16:creationId xmlns:a16="http://schemas.microsoft.com/office/drawing/2014/main" id="{0932FD42-5356-46B8-81DE-72A4A93CAA34}"/>
               </a:ext>
             </a:extLst>
           </p:cNvPr>
@@ -4280,7 +4618,7 @@
     </p:spTree>
     <p:extLst>
       <p:ext uri="{BB962C8B-B14F-4D97-AF65-F5344CB8AC3E}">
-        <p14:creationId xmlns:p14="http://schemas.microsoft.com/office/powerpoint/2010/main" val="828934801"/>
+        <p14:creationId xmlns:p14="http://schemas.microsoft.com/office/powerpoint/2010/main" val="3452653827"/>
       </p:ext>
     </p:extLst>
   </p:cSld>
@@ -4312,7 +4650,7 @@
           <p:cNvPr id="2" name="タイトル 1">
             <a:extLst>
               <a:ext uri="{FF2B5EF4-FFF2-40B4-BE49-F238E27FC236}">
-                <a16:creationId xmlns:a16="http://schemas.microsoft.com/office/drawing/2014/main" id="{FAF5DC41-DAEF-44F8-BABF-BA1D49ACA002}"/>
+                <a16:creationId xmlns:a16="http://schemas.microsoft.com/office/drawing/2014/main" id="{A79A797C-41A1-4F8B-8105-C2ABA5D85AF2}"/>
               </a:ext>
             </a:extLst>
           </p:cNvPr>
@@ -4330,7 +4668,7 @@
           <a:p>
             <a:r>
               <a:rPr lang="en-US" dirty="0"/>
-              <a:t>Error</a:t>
+              <a:t>Repeat(for, while)</a:t>
             </a:r>
           </a:p>
         </p:txBody>
@@ -4340,7 +4678,7 @@
           <p:cNvPr id="3" name="コンテンツ プレースホルダー 2">
             <a:extLst>
               <a:ext uri="{FF2B5EF4-FFF2-40B4-BE49-F238E27FC236}">
-                <a16:creationId xmlns:a16="http://schemas.microsoft.com/office/drawing/2014/main" id="{E0FA2130-D6D3-4220-959F-C91BC53FAB78}"/>
+                <a16:creationId xmlns:a16="http://schemas.microsoft.com/office/drawing/2014/main" id="{FE158364-C372-4B49-B871-864989973A92}"/>
               </a:ext>
             </a:extLst>
           </p:cNvPr>
@@ -4365,7 +4703,7 @@
           <p:cNvPr id="5" name="スライド番号プレースホルダー 4">
             <a:extLst>
               <a:ext uri="{FF2B5EF4-FFF2-40B4-BE49-F238E27FC236}">
-                <a16:creationId xmlns:a16="http://schemas.microsoft.com/office/drawing/2014/main" id="{4D897C1E-210D-40AA-B1A3-6D30B53F200F}"/>
+                <a16:creationId xmlns:a16="http://schemas.microsoft.com/office/drawing/2014/main" id="{AC27D5E8-9A83-4A09-B5EB-343C26C86426}"/>
               </a:ext>
             </a:extLst>
           </p:cNvPr>
@@ -4393,7 +4731,7 @@
     </p:spTree>
     <p:extLst>
       <p:ext uri="{BB962C8B-B14F-4D97-AF65-F5344CB8AC3E}">
-        <p14:creationId xmlns:p14="http://schemas.microsoft.com/office/powerpoint/2010/main" val="107592700"/>
+        <p14:creationId xmlns:p14="http://schemas.microsoft.com/office/powerpoint/2010/main" val="2476710849"/>
       </p:ext>
     </p:extLst>
   </p:cSld>
@@ -4425,7 +4763,7 @@
           <p:cNvPr id="2" name="タイトル 1">
             <a:extLst>
               <a:ext uri="{FF2B5EF4-FFF2-40B4-BE49-F238E27FC236}">
-                <a16:creationId xmlns:a16="http://schemas.microsoft.com/office/drawing/2014/main" id="{8F0D12C3-4CDC-4F57-9D7E-A2DB95866AE8}"/>
+                <a16:creationId xmlns:a16="http://schemas.microsoft.com/office/drawing/2014/main" id="{F6B36FFF-5648-4E54-83B1-95AB5C7DA3CB}"/>
               </a:ext>
             </a:extLst>
           </p:cNvPr>
@@ -4443,7 +4781,7 @@
           <a:p>
             <a:r>
               <a:rPr lang="en-US" dirty="0"/>
-              <a:t>Summary</a:t>
+              <a:t>Function</a:t>
             </a:r>
           </a:p>
         </p:txBody>
@@ -4453,7 +4791,7 @@
           <p:cNvPr id="3" name="コンテンツ プレースホルダー 2">
             <a:extLst>
               <a:ext uri="{FF2B5EF4-FFF2-40B4-BE49-F238E27FC236}">
-                <a16:creationId xmlns:a16="http://schemas.microsoft.com/office/drawing/2014/main" id="{9CD5CAFA-55C1-4CBE-B983-ACB13AC199C5}"/>
+                <a16:creationId xmlns:a16="http://schemas.microsoft.com/office/drawing/2014/main" id="{3B3CCD9F-C8A0-4C66-A242-D9F826307A89}"/>
               </a:ext>
             </a:extLst>
           </p:cNvPr>
@@ -4478,7 +4816,7 @@
           <p:cNvPr id="5" name="スライド番号プレースホルダー 4">
             <a:extLst>
               <a:ext uri="{FF2B5EF4-FFF2-40B4-BE49-F238E27FC236}">
-                <a16:creationId xmlns:a16="http://schemas.microsoft.com/office/drawing/2014/main" id="{EF72F589-D9F4-40B5-BFD0-A9881E9136BC}"/>
+                <a16:creationId xmlns:a16="http://schemas.microsoft.com/office/drawing/2014/main" id="{5AE19A5F-72FC-45C6-A95A-B0D52F671680}"/>
               </a:ext>
             </a:extLst>
           </p:cNvPr>
@@ -4506,7 +4844,7 @@
     </p:spTree>
     <p:extLst>
       <p:ext uri="{BB962C8B-B14F-4D97-AF65-F5344CB8AC3E}">
-        <p14:creationId xmlns:p14="http://schemas.microsoft.com/office/powerpoint/2010/main" val="3274883772"/>
+        <p14:creationId xmlns:p14="http://schemas.microsoft.com/office/powerpoint/2010/main" val="828934801"/>
       </p:ext>
     </p:extLst>
   </p:cSld>
@@ -4538,7 +4876,7 @@
           <p:cNvPr id="2" name="タイトル 1">
             <a:extLst>
               <a:ext uri="{FF2B5EF4-FFF2-40B4-BE49-F238E27FC236}">
-                <a16:creationId xmlns:a16="http://schemas.microsoft.com/office/drawing/2014/main" id="{1532B8A9-CC3C-4755-A0C2-83191887A59F}"/>
+                <a16:creationId xmlns:a16="http://schemas.microsoft.com/office/drawing/2014/main" id="{FAF5DC41-DAEF-44F8-BABF-BA1D49ACA002}"/>
               </a:ext>
             </a:extLst>
           </p:cNvPr>
@@ -4556,7 +4894,7 @@
           <a:p>
             <a:r>
               <a:rPr lang="en-US" dirty="0"/>
-              <a:t>References</a:t>
+              <a:t>Error</a:t>
             </a:r>
           </a:p>
         </p:txBody>
@@ -4566,7 +4904,7 @@
           <p:cNvPr id="3" name="コンテンツ プレースホルダー 2">
             <a:extLst>
               <a:ext uri="{FF2B5EF4-FFF2-40B4-BE49-F238E27FC236}">
-                <a16:creationId xmlns:a16="http://schemas.microsoft.com/office/drawing/2014/main" id="{0CFB61A8-0A55-494F-96FA-020C659922F5}"/>
+                <a16:creationId xmlns:a16="http://schemas.microsoft.com/office/drawing/2014/main" id="{E0FA2130-D6D3-4220-959F-C91BC53FAB78}"/>
               </a:ext>
             </a:extLst>
           </p:cNvPr>
@@ -4582,7 +4920,7 @@
           <a:bodyPr/>
           <a:lstStyle/>
           <a:p>
-            <a:endParaRPr lang="en-US" dirty="0"/>
+            <a:endParaRPr lang="en-US"/>
           </a:p>
         </p:txBody>
       </p:sp>
@@ -4591,7 +4929,7 @@
           <p:cNvPr id="5" name="スライド番号プレースホルダー 4">
             <a:extLst>
               <a:ext uri="{FF2B5EF4-FFF2-40B4-BE49-F238E27FC236}">
-                <a16:creationId xmlns:a16="http://schemas.microsoft.com/office/drawing/2014/main" id="{D1D09D41-F574-4AE8-B82D-35FD724EA6EA}"/>
+                <a16:creationId xmlns:a16="http://schemas.microsoft.com/office/drawing/2014/main" id="{4D897C1E-210D-40AA-B1A3-6D30B53F200F}"/>
               </a:ext>
             </a:extLst>
           </p:cNvPr>
@@ -4619,7 +4957,7 @@
     </p:spTree>
     <p:extLst>
       <p:ext uri="{BB962C8B-B14F-4D97-AF65-F5344CB8AC3E}">
-        <p14:creationId xmlns:p14="http://schemas.microsoft.com/office/powerpoint/2010/main" val="532900966"/>
+        <p14:creationId xmlns:p14="http://schemas.microsoft.com/office/powerpoint/2010/main" val="107592700"/>
       </p:ext>
     </p:extLst>
   </p:cSld>
@@ -4651,6 +4989,249 @@
           <p:cNvPr id="2" name="タイトル 1">
             <a:extLst>
               <a:ext uri="{FF2B5EF4-FFF2-40B4-BE49-F238E27FC236}">
+                <a16:creationId xmlns:a16="http://schemas.microsoft.com/office/drawing/2014/main" id="{8F0D12C3-4CDC-4F57-9D7E-A2DB95866AE8}"/>
+              </a:ext>
+            </a:extLst>
+          </p:cNvPr>
+          <p:cNvSpPr>
+            <a:spLocks noGrp="1"/>
+          </p:cNvSpPr>
+          <p:nvPr>
+            <p:ph type="title"/>
+          </p:nvPr>
+        </p:nvSpPr>
+        <p:spPr/>
+        <p:txBody>
+          <a:bodyPr/>
+          <a:lstStyle/>
+          <a:p>
+            <a:r>
+              <a:rPr lang="en-US" dirty="0"/>
+              <a:t>Summary</a:t>
+            </a:r>
+          </a:p>
+        </p:txBody>
+      </p:sp>
+      <p:sp>
+        <p:nvSpPr>
+          <p:cNvPr id="3" name="コンテンツ プレースホルダー 2">
+            <a:extLst>
+              <a:ext uri="{FF2B5EF4-FFF2-40B4-BE49-F238E27FC236}">
+                <a16:creationId xmlns:a16="http://schemas.microsoft.com/office/drawing/2014/main" id="{9CD5CAFA-55C1-4CBE-B983-ACB13AC199C5}"/>
+              </a:ext>
+            </a:extLst>
+          </p:cNvPr>
+          <p:cNvSpPr>
+            <a:spLocks noGrp="1"/>
+          </p:cNvSpPr>
+          <p:nvPr>
+            <p:ph idx="1"/>
+          </p:nvPr>
+        </p:nvSpPr>
+        <p:spPr/>
+        <p:txBody>
+          <a:bodyPr/>
+          <a:lstStyle/>
+          <a:p>
+            <a:endParaRPr lang="en-US"/>
+          </a:p>
+        </p:txBody>
+      </p:sp>
+      <p:sp>
+        <p:nvSpPr>
+          <p:cNvPr id="5" name="スライド番号プレースホルダー 4">
+            <a:extLst>
+              <a:ext uri="{FF2B5EF4-FFF2-40B4-BE49-F238E27FC236}">
+                <a16:creationId xmlns:a16="http://schemas.microsoft.com/office/drawing/2014/main" id="{EF72F589-D9F4-40B5-BFD0-A9881E9136BC}"/>
+              </a:ext>
+            </a:extLst>
+          </p:cNvPr>
+          <p:cNvSpPr>
+            <a:spLocks noGrp="1"/>
+          </p:cNvSpPr>
+          <p:nvPr>
+            <p:ph type="sldNum" sz="quarter" idx="12"/>
+          </p:nvPr>
+        </p:nvSpPr>
+        <p:spPr/>
+        <p:txBody>
+          <a:bodyPr/>
+          <a:lstStyle/>
+          <a:p>
+            <a:fld id="{F9AE1A6C-155A-45B5-BF6F-8FA332E74381}" type="slidenum">
+              <a:rPr lang="en-US" smtClean="0"/>
+              <a:pPr/>
+              <a:t>16</a:t>
+            </a:fld>
+            <a:endParaRPr lang="en-US" dirty="0"/>
+          </a:p>
+        </p:txBody>
+      </p:sp>
+    </p:spTree>
+    <p:extLst>
+      <p:ext uri="{BB962C8B-B14F-4D97-AF65-F5344CB8AC3E}">
+        <p14:creationId xmlns:p14="http://schemas.microsoft.com/office/powerpoint/2010/main" val="3274883772"/>
+      </p:ext>
+    </p:extLst>
+  </p:cSld>
+  <p:clrMapOvr>
+    <a:masterClrMapping/>
+  </p:clrMapOvr>
+</p:sld>
+</file>
+
+<file path=ppt/slides/slide18.xml><?xml version="1.0" encoding="utf-8"?>
+<p:sld xmlns:a="http://schemas.openxmlformats.org/drawingml/2006/main" xmlns:r="http://schemas.openxmlformats.org/officeDocument/2006/relationships" xmlns:p="http://schemas.openxmlformats.org/presentationml/2006/main">
+  <p:cSld>
+    <p:spTree>
+      <p:nvGrpSpPr>
+        <p:cNvPr id="1" name=""/>
+        <p:cNvGrpSpPr/>
+        <p:nvPr/>
+      </p:nvGrpSpPr>
+      <p:grpSpPr>
+        <a:xfrm>
+          <a:off x="0" y="0"/>
+          <a:ext cx="0" cy="0"/>
+          <a:chOff x="0" y="0"/>
+          <a:chExt cx="0" cy="0"/>
+        </a:xfrm>
+      </p:grpSpPr>
+      <p:sp>
+        <p:nvSpPr>
+          <p:cNvPr id="2" name="タイトル 1">
+            <a:extLst>
+              <a:ext uri="{FF2B5EF4-FFF2-40B4-BE49-F238E27FC236}">
+                <a16:creationId xmlns:a16="http://schemas.microsoft.com/office/drawing/2014/main" id="{1532B8A9-CC3C-4755-A0C2-83191887A59F}"/>
+              </a:ext>
+            </a:extLst>
+          </p:cNvPr>
+          <p:cNvSpPr>
+            <a:spLocks noGrp="1"/>
+          </p:cNvSpPr>
+          <p:nvPr>
+            <p:ph type="title"/>
+          </p:nvPr>
+        </p:nvSpPr>
+        <p:spPr/>
+        <p:txBody>
+          <a:bodyPr/>
+          <a:lstStyle/>
+          <a:p>
+            <a:r>
+              <a:rPr lang="en-US" dirty="0"/>
+              <a:t>References</a:t>
+            </a:r>
+          </a:p>
+        </p:txBody>
+      </p:sp>
+      <p:sp>
+        <p:nvSpPr>
+          <p:cNvPr id="3" name="コンテンツ プレースホルダー 2">
+            <a:extLst>
+              <a:ext uri="{FF2B5EF4-FFF2-40B4-BE49-F238E27FC236}">
+                <a16:creationId xmlns:a16="http://schemas.microsoft.com/office/drawing/2014/main" id="{0CFB61A8-0A55-494F-96FA-020C659922F5}"/>
+              </a:ext>
+            </a:extLst>
+          </p:cNvPr>
+          <p:cNvSpPr>
+            <a:spLocks noGrp="1"/>
+          </p:cNvSpPr>
+          <p:nvPr>
+            <p:ph idx="1"/>
+          </p:nvPr>
+        </p:nvSpPr>
+        <p:spPr/>
+        <p:txBody>
+          <a:bodyPr/>
+          <a:lstStyle/>
+          <a:p>
+            <a:r>
+              <a:rPr lang="ja-JP" altLang="en-US" dirty="0"/>
+              <a:t>演算子について</a:t>
+            </a:r>
+            <a:endParaRPr lang="en-US" altLang="ja-JP" dirty="0"/>
+          </a:p>
+          <a:p>
+            <a:pPr lvl="1"/>
+            <a:r>
+              <a:rPr lang="en-US" dirty="0">
+                <a:hlinkClick r:id="rId2"/>
+              </a:rPr>
+              <a:t>https://atmarkit.itmedia.co.jp/ait/articles/1907/23/news010.html</a:t>
+            </a:r>
+            <a:endParaRPr lang="en-US" dirty="0"/>
+          </a:p>
+          <a:p>
+            <a:endParaRPr lang="en-US" dirty="0"/>
+          </a:p>
+        </p:txBody>
+      </p:sp>
+      <p:sp>
+        <p:nvSpPr>
+          <p:cNvPr id="5" name="スライド番号プレースホルダー 4">
+            <a:extLst>
+              <a:ext uri="{FF2B5EF4-FFF2-40B4-BE49-F238E27FC236}">
+                <a16:creationId xmlns:a16="http://schemas.microsoft.com/office/drawing/2014/main" id="{D1D09D41-F574-4AE8-B82D-35FD724EA6EA}"/>
+              </a:ext>
+            </a:extLst>
+          </p:cNvPr>
+          <p:cNvSpPr>
+            <a:spLocks noGrp="1"/>
+          </p:cNvSpPr>
+          <p:nvPr>
+            <p:ph type="sldNum" sz="quarter" idx="12"/>
+          </p:nvPr>
+        </p:nvSpPr>
+        <p:spPr/>
+        <p:txBody>
+          <a:bodyPr/>
+          <a:lstStyle/>
+          <a:p>
+            <a:fld id="{F9AE1A6C-155A-45B5-BF6F-8FA332E74381}" type="slidenum">
+              <a:rPr lang="en-US" smtClean="0"/>
+              <a:pPr/>
+              <a:t>17</a:t>
+            </a:fld>
+            <a:endParaRPr lang="en-US" dirty="0"/>
+          </a:p>
+        </p:txBody>
+      </p:sp>
+    </p:spTree>
+    <p:extLst>
+      <p:ext uri="{BB962C8B-B14F-4D97-AF65-F5344CB8AC3E}">
+        <p14:creationId xmlns:p14="http://schemas.microsoft.com/office/powerpoint/2010/main" val="532900966"/>
+      </p:ext>
+    </p:extLst>
+  </p:cSld>
+  <p:clrMapOvr>
+    <a:masterClrMapping/>
+  </p:clrMapOvr>
+</p:sld>
+</file>
+
+<file path=ppt/slides/slide19.xml><?xml version="1.0" encoding="utf-8"?>
+<p:sld xmlns:a="http://schemas.openxmlformats.org/drawingml/2006/main" xmlns:r="http://schemas.openxmlformats.org/officeDocument/2006/relationships" xmlns:p="http://schemas.openxmlformats.org/presentationml/2006/main">
+  <p:cSld>
+    <p:spTree>
+      <p:nvGrpSpPr>
+        <p:cNvPr id="1" name=""/>
+        <p:cNvGrpSpPr/>
+        <p:nvPr/>
+      </p:nvGrpSpPr>
+      <p:grpSpPr>
+        <a:xfrm>
+          <a:off x="0" y="0"/>
+          <a:ext cx="0" cy="0"/>
+          <a:chOff x="0" y="0"/>
+          <a:chExt cx="0" cy="0"/>
+        </a:xfrm>
+      </p:grpSpPr>
+      <p:sp>
+        <p:nvSpPr>
+          <p:cNvPr id="2" name="タイトル 1">
+            <a:extLst>
+              <a:ext uri="{FF2B5EF4-FFF2-40B4-BE49-F238E27FC236}">
                 <a16:creationId xmlns:a16="http://schemas.microsoft.com/office/drawing/2014/main" id="{F841434E-D430-4496-8D5B-CE28B163C746}"/>
               </a:ext>
             </a:extLst>
@@ -4774,7 +5355,7 @@
             <a:fld id="{F9AE1A6C-155A-45B5-BF6F-8FA332E74381}" type="slidenum">
               <a:rPr lang="en-US" smtClean="0"/>
               <a:pPr/>
-              <a:t>16</a:t>
+              <a:t>18</a:t>
             </a:fld>
             <a:endParaRPr lang="en-US" dirty="0"/>
           </a:p>
@@ -4859,7 +5440,7 @@
           <a:bodyPr/>
           <a:lstStyle/>
           <a:p>
-            <a:endParaRPr lang="en-US"/>
+            <a:endParaRPr lang="en-US" dirty="0"/>
           </a:p>
         </p:txBody>
       </p:sp>
@@ -5134,7 +5715,7 @@
           <a:p>
             <a:r>
               <a:rPr lang="en-US" dirty="0"/>
-              <a:t>Arithmetic operation</a:t>
+              <a:t>Operation</a:t>
             </a:r>
           </a:p>
           <a:p>
@@ -6855,7 +7436,7 @@
           <a:p>
             <a:r>
               <a:rPr lang="en-US" dirty="0"/>
-              <a:t>Arithmetic operation</a:t>
+              <a:t>Operation</a:t>
             </a:r>
           </a:p>
         </p:txBody>
@@ -6876,11 +7457,23 @@
             <p:ph idx="1"/>
           </p:nvPr>
         </p:nvSpPr>
-        <p:spPr/>
-        <p:txBody>
-          <a:bodyPr/>
-          <a:lstStyle/>
-          <a:p>
+        <p:spPr>
+          <a:xfrm>
+            <a:off x="628650" y="1535979"/>
+            <a:ext cx="7886700" cy="705139"/>
+          </a:xfrm>
+        </p:spPr>
+        <p:txBody>
+          <a:bodyPr/>
+          <a:lstStyle/>
+          <a:p>
+            <a:pPr marL="0" indent="0">
+              <a:buNone/>
+            </a:pPr>
+            <a:r>
+              <a:rPr lang="ja-JP" altLang="en-US" dirty="0"/>
+              <a:t>演算子のタイプ</a:t>
+            </a:r>
             <a:endParaRPr lang="en-US" dirty="0"/>
           </a:p>
         </p:txBody>
@@ -6915,6 +7508,317 @@
           </a:p>
         </p:txBody>
       </p:sp>
+      <p:graphicFrame>
+        <p:nvGraphicFramePr>
+          <p:cNvPr id="5" name="コンテンツ プレースホルダー 6">
+            <a:extLst>
+              <a:ext uri="{FF2B5EF4-FFF2-40B4-BE49-F238E27FC236}">
+                <a16:creationId xmlns:a16="http://schemas.microsoft.com/office/drawing/2014/main" id="{762B875C-BC74-AFD4-E8FB-CE1CA5974A02}"/>
+              </a:ext>
+            </a:extLst>
+          </p:cNvPr>
+          <p:cNvGraphicFramePr>
+            <a:graphicFrameLocks/>
+          </p:cNvGraphicFramePr>
+          <p:nvPr>
+            <p:extLst>
+              <p:ext uri="{D42A27DB-BD31-4B8C-83A1-F6EECF244321}">
+                <p14:modId xmlns:p14="http://schemas.microsoft.com/office/powerpoint/2010/main" val="3924463685"/>
+              </p:ext>
+            </p:extLst>
+          </p:nvPr>
+        </p:nvGraphicFramePr>
+        <p:xfrm>
+          <a:off x="212436" y="2241118"/>
+          <a:ext cx="8663709" cy="4053840"/>
+        </p:xfrm>
+        <a:graphic>
+          <a:graphicData uri="http://schemas.openxmlformats.org/drawingml/2006/table">
+            <a:tbl>
+              <a:tblPr firstRow="1">
+                <a:tableStyleId>{9D7B26C5-4107-4FEC-AEDC-1716B250A1EF}</a:tableStyleId>
+              </a:tblPr>
+              <a:tblGrid>
+                <a:gridCol w="2556581">
+                  <a:extLst>
+                    <a:ext uri="{9D8B030D-6E8A-4147-A177-3AD203B41FA5}">
+                      <a16:colId xmlns:a16="http://schemas.microsoft.com/office/drawing/2014/main" val="962391357"/>
+                    </a:ext>
+                  </a:extLst>
+                </a:gridCol>
+                <a:gridCol w="6107128">
+                  <a:extLst>
+                    <a:ext uri="{9D8B030D-6E8A-4147-A177-3AD203B41FA5}">
+                      <a16:colId xmlns:a16="http://schemas.microsoft.com/office/drawing/2014/main" val="1208510133"/>
+                    </a:ext>
+                  </a:extLst>
+                </a:gridCol>
+              </a:tblGrid>
+              <a:tr h="373725">
+                <a:tc>
+                  <a:txBody>
+                    <a:bodyPr/>
+                    <a:lstStyle/>
+                    <a:p>
+                      <a:pPr algn="ctr"/>
+                      <a:r>
+                        <a:rPr lang="en-US" sz="2800" dirty="0"/>
+                        <a:t>Operator</a:t>
+                      </a:r>
+                    </a:p>
+                  </a:txBody>
+                  <a:tcPr anchor="ctr"/>
+                </a:tc>
+                <a:tc>
+                  <a:txBody>
+                    <a:bodyPr/>
+                    <a:lstStyle/>
+                    <a:p>
+                      <a:pPr algn="ctr"/>
+                      <a:r>
+                        <a:rPr lang="en-US" sz="2800" dirty="0"/>
+                        <a:t>Explain</a:t>
+                      </a:r>
+                    </a:p>
+                  </a:txBody>
+                  <a:tcPr/>
+                </a:tc>
+                <a:extLst>
+                  <a:ext uri="{0D108BD9-81ED-4DB2-BD59-A6C34878D82A}">
+                    <a16:rowId xmlns:a16="http://schemas.microsoft.com/office/drawing/2014/main" val="1445083909"/>
+                  </a:ext>
+                </a:extLst>
+              </a:tr>
+              <a:tr h="370840">
+                <a:tc>
+                  <a:txBody>
+                    <a:bodyPr/>
+                    <a:lstStyle/>
+                    <a:p>
+                      <a:pPr algn="ctr"/>
+                      <a:r>
+                        <a:rPr lang="ja-JP" altLang="en-US" sz="2800" dirty="0"/>
+                        <a:t>代入</a:t>
+                      </a:r>
+                      <a:endParaRPr lang="en-US" sz="2800" dirty="0"/>
+                    </a:p>
+                  </a:txBody>
+                  <a:tcPr anchor="ctr"/>
+                </a:tc>
+                <a:tc>
+                  <a:txBody>
+                    <a:bodyPr/>
+                    <a:lstStyle/>
+                    <a:p>
+                      <a:pPr algn="ctr"/>
+                      <a:r>
+                        <a:rPr lang="ja-JP" altLang="en-US" sz="2800" dirty="0"/>
+                        <a:t>代入を行う</a:t>
+                      </a:r>
+                      <a:endParaRPr lang="en-US" sz="2800" dirty="0"/>
+                    </a:p>
+                  </a:txBody>
+                  <a:tcPr/>
+                </a:tc>
+                <a:extLst>
+                  <a:ext uri="{0D108BD9-81ED-4DB2-BD59-A6C34878D82A}">
+                    <a16:rowId xmlns:a16="http://schemas.microsoft.com/office/drawing/2014/main" val="1574725563"/>
+                  </a:ext>
+                </a:extLst>
+              </a:tr>
+              <a:tr h="370840">
+                <a:tc>
+                  <a:txBody>
+                    <a:bodyPr/>
+                    <a:lstStyle/>
+                    <a:p>
+                      <a:pPr algn="ctr"/>
+                      <a:r>
+                        <a:rPr lang="ja-JP" altLang="en-US" sz="2800" dirty="0"/>
+                        <a:t>算術</a:t>
+                      </a:r>
+                      <a:endParaRPr lang="en-US" sz="2800" dirty="0"/>
+                    </a:p>
+                  </a:txBody>
+                  <a:tcPr anchor="ctr"/>
+                </a:tc>
+                <a:tc>
+                  <a:txBody>
+                    <a:bodyPr/>
+                    <a:lstStyle/>
+                    <a:p>
+                      <a:pPr algn="ctr"/>
+                      <a:r>
+                        <a:rPr lang="en-US" altLang="ja-JP" sz="2800" dirty="0"/>
+                        <a:t>+, -</a:t>
+                      </a:r>
+                      <a:r>
+                        <a:rPr lang="ja-JP" altLang="en-US" sz="2800" dirty="0"/>
+                        <a:t>などの計算に使う</a:t>
+                      </a:r>
+                      <a:endParaRPr lang="en-US" sz="2800" dirty="0"/>
+                    </a:p>
+                  </a:txBody>
+                  <a:tcPr/>
+                </a:tc>
+                <a:extLst>
+                  <a:ext uri="{0D108BD9-81ED-4DB2-BD59-A6C34878D82A}">
+                    <a16:rowId xmlns:a16="http://schemas.microsoft.com/office/drawing/2014/main" val="3397082867"/>
+                  </a:ext>
+                </a:extLst>
+              </a:tr>
+              <a:tr h="370840">
+                <a:tc>
+                  <a:txBody>
+                    <a:bodyPr/>
+                    <a:lstStyle/>
+                    <a:p>
+                      <a:pPr algn="ctr"/>
+                      <a:r>
+                        <a:rPr lang="ja-JP" altLang="en-US" sz="2800" dirty="0"/>
+                        <a:t>累算代入</a:t>
+                      </a:r>
+                      <a:endParaRPr lang="en-US" sz="2800" dirty="0"/>
+                    </a:p>
+                  </a:txBody>
+                  <a:tcPr anchor="ctr"/>
+                </a:tc>
+                <a:tc>
+                  <a:txBody>
+                    <a:bodyPr/>
+                    <a:lstStyle/>
+                    <a:p>
+                      <a:pPr algn="ctr"/>
+                      <a:r>
+                        <a:rPr lang="ja-JP" altLang="en-US" sz="2800" dirty="0"/>
+                        <a:t>右辺と左辺の値を演算</a:t>
+                      </a:r>
+                      <a:endParaRPr lang="en-US" sz="2800" dirty="0"/>
+                    </a:p>
+                  </a:txBody>
+                  <a:tcPr/>
+                </a:tc>
+                <a:extLst>
+                  <a:ext uri="{0D108BD9-81ED-4DB2-BD59-A6C34878D82A}">
+                    <a16:rowId xmlns:a16="http://schemas.microsoft.com/office/drawing/2014/main" val="2714680815"/>
+                  </a:ext>
+                </a:extLst>
+              </a:tr>
+              <a:tr h="370840">
+                <a:tc>
+                  <a:txBody>
+                    <a:bodyPr/>
+                    <a:lstStyle/>
+                    <a:p>
+                      <a:pPr algn="ctr"/>
+                      <a:r>
+                        <a:rPr lang="ja-JP" altLang="en-US" sz="2800" dirty="0"/>
+                        <a:t>比較</a:t>
+                      </a:r>
+                      <a:endParaRPr lang="en-US" sz="2800" dirty="0"/>
+                    </a:p>
+                  </a:txBody>
+                  <a:tcPr anchor="ctr"/>
+                </a:tc>
+                <a:tc>
+                  <a:txBody>
+                    <a:bodyPr/>
+                    <a:lstStyle/>
+                    <a:p>
+                      <a:pPr algn="ctr"/>
+                      <a:r>
+                        <a:rPr lang="ja-JP" altLang="en-US" sz="2800" dirty="0"/>
+                        <a:t>値の比較や，リスト内要素の存在確認に使用</a:t>
+                      </a:r>
+                      <a:endParaRPr lang="en-US" sz="2800" dirty="0"/>
+                    </a:p>
+                  </a:txBody>
+                  <a:tcPr/>
+                </a:tc>
+                <a:extLst>
+                  <a:ext uri="{0D108BD9-81ED-4DB2-BD59-A6C34878D82A}">
+                    <a16:rowId xmlns:a16="http://schemas.microsoft.com/office/drawing/2014/main" val="1430187955"/>
+                  </a:ext>
+                </a:extLst>
+              </a:tr>
+              <a:tr h="0">
+                <a:tc>
+                  <a:txBody>
+                    <a:bodyPr/>
+                    <a:lstStyle/>
+                    <a:p>
+                      <a:pPr algn="ctr"/>
+                      <a:r>
+                        <a:rPr lang="ja-JP" altLang="en-US" sz="2800" dirty="0"/>
+                        <a:t>ブール</a:t>
+                      </a:r>
+                      <a:endParaRPr lang="en-US" sz="2800" dirty="0"/>
+                    </a:p>
+                  </a:txBody>
+                  <a:tcPr anchor="ctr"/>
+                </a:tc>
+                <a:tc>
+                  <a:txBody>
+                    <a:bodyPr/>
+                    <a:lstStyle/>
+                    <a:p>
+                      <a:pPr algn="ctr"/>
+                      <a:r>
+                        <a:rPr lang="ja-JP" altLang="en-US" sz="2800" dirty="0"/>
+                        <a:t>真偽値のブール演算を行う</a:t>
+                      </a:r>
+                      <a:endParaRPr lang="en-US" sz="2800" dirty="0"/>
+                    </a:p>
+                  </a:txBody>
+                  <a:tcPr/>
+                </a:tc>
+                <a:extLst>
+                  <a:ext uri="{0D108BD9-81ED-4DB2-BD59-A6C34878D82A}">
+                    <a16:rowId xmlns:a16="http://schemas.microsoft.com/office/drawing/2014/main" val="3798942226"/>
+                  </a:ext>
+                </a:extLst>
+              </a:tr>
+              <a:tr h="370840">
+                <a:tc>
+                  <a:txBody>
+                    <a:bodyPr/>
+                    <a:lstStyle/>
+                    <a:p>
+                      <a:pPr algn="ctr"/>
+                      <a:r>
+                        <a:rPr lang="ja-JP" altLang="en-US" sz="2800" dirty="0"/>
+                        <a:t>ビット</a:t>
+                      </a:r>
+                      <a:endParaRPr lang="en-US" sz="2800" dirty="0"/>
+                    </a:p>
+                  </a:txBody>
+                  <a:tcPr anchor="ctr"/>
+                </a:tc>
+                <a:tc>
+                  <a:txBody>
+                    <a:bodyPr/>
+                    <a:lstStyle/>
+                    <a:p>
+                      <a:pPr algn="ctr"/>
+                      <a:r>
+                        <a:rPr lang="ja-JP" altLang="en-US" sz="2800" dirty="0"/>
+                        <a:t>ビットごとの演算</a:t>
+                      </a:r>
+                      <a:endParaRPr lang="en-US" sz="2800" dirty="0"/>
+                    </a:p>
+                  </a:txBody>
+                  <a:tcPr/>
+                </a:tc>
+                <a:extLst>
+                  <a:ext uri="{0D108BD9-81ED-4DB2-BD59-A6C34878D82A}">
+                    <a16:rowId xmlns:a16="http://schemas.microsoft.com/office/drawing/2014/main" val="562012678"/>
+                  </a:ext>
+                </a:extLst>
+              </a:tr>
+            </a:tbl>
+          </a:graphicData>
+        </a:graphic>
+      </p:graphicFrame>
     </p:spTree>
     <p:extLst>
       <p:ext uri="{BB962C8B-B14F-4D97-AF65-F5344CB8AC3E}">

</xml_diff>

<commit_message>
[add]:Write operation and rule of variable name.
</commit_message>
<xml_diff>
--- a/ProgramSlide.pptx
+++ b/ProgramSlide.pptx
@@ -5,7 +5,7 @@
     <p:sldMasterId id="2147483672" r:id="rId1"/>
   </p:sldMasterIdLst>
   <p:notesMasterIdLst>
-    <p:notesMasterId r:id="rId21"/>
+    <p:notesMasterId r:id="rId30"/>
   </p:notesMasterIdLst>
   <p:sldIdLst>
     <p:sldId id="256" r:id="rId2"/>
@@ -19,14 +19,23 @@
     <p:sldId id="271" r:id="rId10"/>
     <p:sldId id="273" r:id="rId11"/>
     <p:sldId id="274" r:id="rId12"/>
-    <p:sldId id="268" r:id="rId13"/>
-    <p:sldId id="259" r:id="rId14"/>
-    <p:sldId id="260" r:id="rId15"/>
-    <p:sldId id="261" r:id="rId16"/>
-    <p:sldId id="262" r:id="rId17"/>
-    <p:sldId id="263" r:id="rId18"/>
-    <p:sldId id="264" r:id="rId19"/>
-    <p:sldId id="265" r:id="rId20"/>
+    <p:sldId id="275" r:id="rId13"/>
+    <p:sldId id="278" r:id="rId14"/>
+    <p:sldId id="276" r:id="rId15"/>
+    <p:sldId id="277" r:id="rId16"/>
+    <p:sldId id="268" r:id="rId17"/>
+    <p:sldId id="279" r:id="rId18"/>
+    <p:sldId id="281" r:id="rId19"/>
+    <p:sldId id="282" r:id="rId20"/>
+    <p:sldId id="284" r:id="rId21"/>
+    <p:sldId id="283" r:id="rId22"/>
+    <p:sldId id="259" r:id="rId23"/>
+    <p:sldId id="260" r:id="rId24"/>
+    <p:sldId id="261" r:id="rId25"/>
+    <p:sldId id="262" r:id="rId26"/>
+    <p:sldId id="263" r:id="rId27"/>
+    <p:sldId id="264" r:id="rId28"/>
+    <p:sldId id="265" r:id="rId29"/>
   </p:sldIdLst>
   <p:sldSz cx="9144000" cy="6858000" type="screen4x3"/>
   <p:notesSz cx="6858000" cy="9144000"/>
@@ -126,6 +135,46 @@
     </a:lvl9pPr>
   </p:defaultTextStyle>
   <p:extLst>
+    <p:ext uri="{521415D9-36F7-43E2-AB2F-B90AF26B5E84}">
+      <p14:sectionLst xmlns:p14="http://schemas.microsoft.com/office/powerpoint/2010/main">
+        <p14:section name="既定のセクション" id="{3E1E5D69-3F9F-449E-8849-47EB1206D39E}">
+          <p14:sldIdLst>
+            <p14:sldId id="256"/>
+            <p14:sldId id="269"/>
+            <p14:sldId id="257"/>
+            <p14:sldId id="258"/>
+            <p14:sldId id="266"/>
+            <p14:sldId id="270"/>
+            <p14:sldId id="267"/>
+            <p14:sldId id="272"/>
+            <p14:sldId id="271"/>
+            <p14:sldId id="273"/>
+            <p14:sldId id="274"/>
+            <p14:sldId id="275"/>
+            <p14:sldId id="278"/>
+            <p14:sldId id="276"/>
+            <p14:sldId id="277"/>
+            <p14:sldId id="268"/>
+            <p14:sldId id="279"/>
+            <p14:sldId id="281"/>
+            <p14:sldId id="282"/>
+            <p14:sldId id="284"/>
+            <p14:sldId id="283"/>
+            <p14:sldId id="259"/>
+            <p14:sldId id="260"/>
+            <p14:sldId id="261"/>
+            <p14:sldId id="262"/>
+            <p14:sldId id="263"/>
+          </p14:sldIdLst>
+        </p14:section>
+        <p14:section name="After" id="{0DE5CF78-CFD0-40C3-9E8F-BC47F44A3ABA}">
+          <p14:sldIdLst>
+            <p14:sldId id="264"/>
+            <p14:sldId id="265"/>
+          </p14:sldIdLst>
+        </p14:section>
+      </p14:sectionLst>
+    </p:ext>
     <p:ext uri="{EFAFB233-063F-42B5-8137-9DF3F51BA10A}">
       <p15:sldGuideLst xmlns:p15="http://schemas.microsoft.com/office/powerpoint/2012/main"/>
     </p:ext>
@@ -215,7 +264,7 @@
           <a:p>
             <a:fld id="{61F9A76B-08C7-4C1E-AD37-3452ECB1BEEB}" type="datetimeFigureOut">
               <a:rPr lang="en-US" smtClean="0"/>
-              <a:t>5/10/2023</a:t>
+              <a:t>5/11/2023</a:t>
             </a:fld>
             <a:endParaRPr lang="en-US"/>
           </a:p>
@@ -730,7 +779,7 @@
           <a:p>
             <a:fld id="{B4665B6F-9B20-4B37-B621-0B1C1F2C90FB}" type="datetime1">
               <a:rPr lang="en-US" smtClean="0"/>
-              <a:t>5/10/2023</a:t>
+              <a:t>5/11/2023</a:t>
             </a:fld>
             <a:endParaRPr lang="en-US"/>
           </a:p>
@@ -932,7 +981,7 @@
           <a:p>
             <a:fld id="{C27C9AA3-0D49-477A-834F-6AFF7FAFB863}" type="datetime1">
               <a:rPr lang="en-US" smtClean="0"/>
-              <a:t>5/10/2023</a:t>
+              <a:t>5/11/2023</a:t>
             </a:fld>
             <a:endParaRPr lang="en-US"/>
           </a:p>
@@ -1144,7 +1193,7 @@
           <a:p>
             <a:fld id="{A8351093-7B23-4B93-BF0D-2F7040DF3D21}" type="datetime1">
               <a:rPr lang="en-US" smtClean="0"/>
-              <a:t>5/10/2023</a:t>
+              <a:t>5/11/2023</a:t>
             </a:fld>
             <a:endParaRPr lang="en-US"/>
           </a:p>
@@ -1364,7 +1413,7 @@
           <a:p>
             <a:fld id="{BAE82DF5-EBE4-4A5F-9572-9683012F3869}" type="datetime1">
               <a:rPr lang="en-US" smtClean="0"/>
-              <a:t>5/10/2023</a:t>
+              <a:t>5/11/2023</a:t>
             </a:fld>
             <a:endParaRPr lang="en-US"/>
           </a:p>
@@ -1613,7 +1662,7 @@
           <a:p>
             <a:fld id="{A2243B7C-847E-41AE-8FD2-E22768D99A06}" type="datetime1">
               <a:rPr lang="en-US" smtClean="0"/>
-              <a:t>5/10/2023</a:t>
+              <a:t>5/11/2023</a:t>
             </a:fld>
             <a:endParaRPr lang="en-US"/>
           </a:p>
@@ -1909,7 +1958,7 @@
           <a:p>
             <a:fld id="{641B493E-BF0E-4591-A949-E568E69F4803}" type="datetime1">
               <a:rPr lang="en-US" smtClean="0"/>
-              <a:t>5/10/2023</a:t>
+              <a:t>5/11/2023</a:t>
             </a:fld>
             <a:endParaRPr lang="en-US"/>
           </a:p>
@@ -2340,7 +2389,7 @@
           <a:p>
             <a:fld id="{DD1C41FA-F867-485D-BB9E-4BB1C77BF6D2}" type="datetime1">
               <a:rPr lang="en-US" smtClean="0"/>
-              <a:t>5/10/2023</a:t>
+              <a:t>5/11/2023</a:t>
             </a:fld>
             <a:endParaRPr lang="en-US"/>
           </a:p>
@@ -2458,7 +2507,7 @@
           <a:p>
             <a:fld id="{BF2F607B-9AEB-4D6B-B787-CA31BF3221AF}" type="datetime1">
               <a:rPr lang="en-US" smtClean="0"/>
-              <a:t>5/10/2023</a:t>
+              <a:t>5/11/2023</a:t>
             </a:fld>
             <a:endParaRPr lang="en-US"/>
           </a:p>
@@ -2553,7 +2602,7 @@
           <a:p>
             <a:fld id="{6DD5D611-D82D-4557-A4B4-6CE561B5C83D}" type="datetime1">
               <a:rPr lang="en-US" smtClean="0"/>
-              <a:t>5/10/2023</a:t>
+              <a:t>5/11/2023</a:t>
             </a:fld>
             <a:endParaRPr lang="en-US"/>
           </a:p>
@@ -2862,7 +2911,7 @@
           <a:p>
             <a:fld id="{AE96AADA-F019-47DD-8151-E2581BF6D2CF}" type="datetime1">
               <a:rPr lang="en-US" smtClean="0"/>
-              <a:t>5/10/2023</a:t>
+              <a:t>5/11/2023</a:t>
             </a:fld>
             <a:endParaRPr lang="en-US"/>
           </a:p>
@@ -3119,7 +3168,7 @@
           <a:p>
             <a:fld id="{D938F34B-1050-4590-AF4B-F133D048AD45}" type="datetime1">
               <a:rPr lang="en-US" smtClean="0"/>
-              <a:t>5/10/2023</a:t>
+              <a:t>5/11/2023</a:t>
             </a:fld>
             <a:endParaRPr lang="en-US"/>
           </a:p>
@@ -3364,7 +3413,7 @@
           <a:p>
             <a:fld id="{EB277427-05A3-4D74-B825-34D4130E89D5}" type="datetime1">
               <a:rPr lang="en-US" smtClean="0"/>
-              <a:t>5/10/2023</a:t>
+              <a:t>5/11/2023</a:t>
             </a:fld>
             <a:endParaRPr lang="en-US"/>
           </a:p>
@@ -4050,7 +4099,7 @@
             </a:pPr>
             <a:r>
               <a:rPr kumimoji="1" lang="ja-JP" altLang="en-US" dirty="0"/>
-              <a:t>算術演算子</a:t>
+              <a:t>算術演算</a:t>
             </a:r>
           </a:p>
         </p:txBody>
@@ -4100,14 +4149,14 @@
           <p:nvPr>
             <p:extLst>
               <p:ext uri="{D42A27DB-BD31-4B8C-83A1-F6EECF244321}">
-                <p14:modId xmlns:p14="http://schemas.microsoft.com/office/powerpoint/2010/main" val="1805128470"/>
+                <p14:modId xmlns:p14="http://schemas.microsoft.com/office/powerpoint/2010/main" val="30707962"/>
               </p:ext>
             </p:extLst>
           </p:nvPr>
         </p:nvGraphicFramePr>
         <p:xfrm>
           <a:off x="628652" y="2373745"/>
-          <a:ext cx="3808250" cy="3627120"/>
+          <a:ext cx="3808250" cy="4145280"/>
         </p:xfrm>
         <a:graphic>
           <a:graphicData uri="http://schemas.openxmlformats.org/drawingml/2006/table">
@@ -4385,6 +4434,42 @@
                   </a:ext>
                 </a:extLst>
               </a:tr>
+              <a:tr h="370840">
+                <a:tc>
+                  <a:txBody>
+                    <a:bodyPr/>
+                    <a:lstStyle/>
+                    <a:p>
+                      <a:pPr algn="ctr"/>
+                      <a:r>
+                        <a:rPr lang="en-US" sz="2800" dirty="0"/>
+                        <a:t>**</a:t>
+                      </a:r>
+                    </a:p>
+                  </a:txBody>
+                  <a:tcPr anchor="ctr"/>
+                </a:tc>
+                <a:tc>
+                  <a:txBody>
+                    <a:bodyPr/>
+                    <a:lstStyle/>
+                    <a:p>
+                      <a:pPr algn="ctr"/>
+                      <a:r>
+                        <a:rPr lang="ja-JP" altLang="en-US" sz="2800" dirty="0"/>
+                        <a:t>累乗</a:t>
+                      </a:r>
+                      <a:endParaRPr lang="en-US" sz="2800" dirty="0"/>
+                    </a:p>
+                  </a:txBody>
+                  <a:tcPr/>
+                </a:tc>
+                <a:extLst>
+                  <a:ext uri="{0D108BD9-81ED-4DB2-BD59-A6C34878D82A}">
+                    <a16:rowId xmlns:a16="http://schemas.microsoft.com/office/drawing/2014/main" val="754619094"/>
+                  </a:ext>
+                </a:extLst>
+              </a:tr>
             </a:tbl>
           </a:graphicData>
         </a:graphic>
@@ -4424,7 +4509,7 @@
           <p:cNvPr id="2" name="タイトル 1">
             <a:extLst>
               <a:ext uri="{FF2B5EF4-FFF2-40B4-BE49-F238E27FC236}">
-                <a16:creationId xmlns:a16="http://schemas.microsoft.com/office/drawing/2014/main" id="{B5A512A7-A58C-4D08-84CB-45DBCE5FE4B3}"/>
+                <a16:creationId xmlns:a16="http://schemas.microsoft.com/office/drawing/2014/main" id="{76E659E8-CD1A-49E4-A952-816A2324AEDA}"/>
               </a:ext>
             </a:extLst>
           </p:cNvPr>
@@ -4442,7 +4527,7 @@
           <a:p>
             <a:r>
               <a:rPr lang="en-US" dirty="0"/>
-              <a:t>Rule of variable name</a:t>
+              <a:t>Operation</a:t>
             </a:r>
           </a:p>
         </p:txBody>
@@ -4452,7 +4537,7 @@
           <p:cNvPr id="3" name="コンテンツ プレースホルダー 2">
             <a:extLst>
               <a:ext uri="{FF2B5EF4-FFF2-40B4-BE49-F238E27FC236}">
-                <a16:creationId xmlns:a16="http://schemas.microsoft.com/office/drawing/2014/main" id="{F2C69D69-CC93-476C-915C-B693A69400EA}"/>
+                <a16:creationId xmlns:a16="http://schemas.microsoft.com/office/drawing/2014/main" id="{5B9E60CF-D1D8-4488-A4B6-F92FBF7470D2}"/>
               </a:ext>
             </a:extLst>
           </p:cNvPr>
@@ -4463,21 +4548,58 @@
             <p:ph idx="1"/>
           </p:nvPr>
         </p:nvSpPr>
-        <p:spPr/>
-        <p:txBody>
-          <a:bodyPr/>
-          <a:lstStyle/>
-          <a:p>
-            <a:endParaRPr lang="en-US"/>
-          </a:p>
-        </p:txBody>
-      </p:sp>
-      <p:sp>
-        <p:nvSpPr>
-          <p:cNvPr id="5" name="スライド番号プレースホルダー 4">
+        <p:spPr>
+          <a:xfrm>
+            <a:off x="628650" y="1825625"/>
+            <a:ext cx="7886700" cy="3780848"/>
+          </a:xfrm>
+        </p:spPr>
+        <p:txBody>
+          <a:bodyPr>
+            <a:normAutofit/>
+          </a:bodyPr>
+          <a:lstStyle/>
+          <a:p>
+            <a:pPr marL="0" indent="0">
+              <a:buNone/>
+            </a:pPr>
+            <a:r>
+              <a:rPr lang="ja-JP" altLang="en-US" sz="4000" dirty="0"/>
+              <a:t>累算代入演算</a:t>
+            </a:r>
+            <a:endParaRPr lang="en-US" altLang="ja-JP" sz="4000" dirty="0"/>
+          </a:p>
+          <a:p>
+            <a:pPr marL="0" indent="0">
+              <a:buNone/>
+            </a:pPr>
+            <a:endParaRPr lang="en-US" sz="3600" dirty="0"/>
+          </a:p>
+          <a:p>
+            <a:pPr marL="0" indent="0">
+              <a:buNone/>
+            </a:pPr>
+            <a:r>
+              <a:rPr lang="ja-JP" altLang="en-US" dirty="0"/>
+              <a:t>右辺と左辺の計算結果を左辺に</a:t>
+            </a:r>
+            <a:br>
+              <a:rPr lang="en-US" altLang="ja-JP" dirty="0"/>
+            </a:br>
+            <a:r>
+              <a:rPr lang="ja-JP" altLang="en-US" dirty="0"/>
+              <a:t>与える</a:t>
+            </a:r>
+            <a:endParaRPr lang="en-US" dirty="0"/>
+          </a:p>
+        </p:txBody>
+      </p:sp>
+      <p:sp>
+        <p:nvSpPr>
+          <p:cNvPr id="4" name="スライド番号プレースホルダー 3">
             <a:extLst>
               <a:ext uri="{FF2B5EF4-FFF2-40B4-BE49-F238E27FC236}">
-                <a16:creationId xmlns:a16="http://schemas.microsoft.com/office/drawing/2014/main" id="{98BECDDE-B0F3-4E94-98E7-3B7862DCC91E}"/>
+                <a16:creationId xmlns:a16="http://schemas.microsoft.com/office/drawing/2014/main" id="{DC728001-57F5-46CC-B40F-0DC91AEF41B9}"/>
               </a:ext>
             </a:extLst>
           </p:cNvPr>
@@ -4505,7 +4627,7 @@
     </p:spTree>
     <p:extLst>
       <p:ext uri="{BB962C8B-B14F-4D97-AF65-F5344CB8AC3E}">
-        <p14:creationId xmlns:p14="http://schemas.microsoft.com/office/powerpoint/2010/main" val="3326139796"/>
+        <p14:creationId xmlns:p14="http://schemas.microsoft.com/office/powerpoint/2010/main" val="1290043535"/>
       </p:ext>
     </p:extLst>
   </p:cSld>
@@ -4537,7 +4659,7 @@
           <p:cNvPr id="2" name="タイトル 1">
             <a:extLst>
               <a:ext uri="{FF2B5EF4-FFF2-40B4-BE49-F238E27FC236}">
-                <a16:creationId xmlns:a16="http://schemas.microsoft.com/office/drawing/2014/main" id="{9057BDD7-6E73-4210-B7F6-BF325E8CFBE5}"/>
+                <a16:creationId xmlns:a16="http://schemas.microsoft.com/office/drawing/2014/main" id="{76E659E8-CD1A-49E4-A952-816A2324AEDA}"/>
               </a:ext>
             </a:extLst>
           </p:cNvPr>
@@ -4555,7 +4677,7 @@
           <a:p>
             <a:r>
               <a:rPr lang="en-US" dirty="0"/>
-              <a:t>Conditional branch(if)</a:t>
+              <a:t>Operation</a:t>
             </a:r>
           </a:p>
         </p:txBody>
@@ -4565,7 +4687,7 @@
           <p:cNvPr id="3" name="コンテンツ プレースホルダー 2">
             <a:extLst>
               <a:ext uri="{FF2B5EF4-FFF2-40B4-BE49-F238E27FC236}">
-                <a16:creationId xmlns:a16="http://schemas.microsoft.com/office/drawing/2014/main" id="{0D2DC0C9-A8B5-41C7-B965-B5D51D2A0B4B}"/>
+                <a16:creationId xmlns:a16="http://schemas.microsoft.com/office/drawing/2014/main" id="{5B9E60CF-D1D8-4488-A4B6-F92FBF7470D2}"/>
               </a:ext>
             </a:extLst>
           </p:cNvPr>
@@ -4576,21 +4698,33 @@
             <p:ph idx="1"/>
           </p:nvPr>
         </p:nvSpPr>
-        <p:spPr/>
-        <p:txBody>
-          <a:bodyPr/>
-          <a:lstStyle/>
-          <a:p>
+        <p:spPr>
+          <a:xfrm>
+            <a:off x="628650" y="1825625"/>
+            <a:ext cx="7886700" cy="668193"/>
+          </a:xfrm>
+        </p:spPr>
+        <p:txBody>
+          <a:bodyPr/>
+          <a:lstStyle/>
+          <a:p>
+            <a:pPr marL="0" indent="0">
+              <a:buNone/>
+            </a:pPr>
+            <a:r>
+              <a:rPr lang="ja-JP" altLang="en-US" dirty="0"/>
+              <a:t>累算代入演算</a:t>
+            </a:r>
             <a:endParaRPr lang="en-US" dirty="0"/>
           </a:p>
         </p:txBody>
       </p:sp>
       <p:sp>
         <p:nvSpPr>
-          <p:cNvPr id="5" name="スライド番号プレースホルダー 4">
+          <p:cNvPr id="4" name="スライド番号プレースホルダー 3">
             <a:extLst>
               <a:ext uri="{FF2B5EF4-FFF2-40B4-BE49-F238E27FC236}">
-                <a16:creationId xmlns:a16="http://schemas.microsoft.com/office/drawing/2014/main" id="{0932FD42-5356-46B8-81DE-72A4A93CAA34}"/>
+                <a16:creationId xmlns:a16="http://schemas.microsoft.com/office/drawing/2014/main" id="{DC728001-57F5-46CC-B40F-0DC91AEF41B9}"/>
               </a:ext>
             </a:extLst>
           </p:cNvPr>
@@ -4615,10 +4749,346 @@
           </a:p>
         </p:txBody>
       </p:sp>
+      <p:graphicFrame>
+        <p:nvGraphicFramePr>
+          <p:cNvPr id="5" name="コンテンツ プレースホルダー 6">
+            <a:extLst>
+              <a:ext uri="{FF2B5EF4-FFF2-40B4-BE49-F238E27FC236}">
+                <a16:creationId xmlns:a16="http://schemas.microsoft.com/office/drawing/2014/main" id="{DDD453A0-78E6-4C90-A559-3B999580745A}"/>
+              </a:ext>
+            </a:extLst>
+          </p:cNvPr>
+          <p:cNvGraphicFramePr>
+            <a:graphicFrameLocks/>
+          </p:cNvGraphicFramePr>
+          <p:nvPr>
+            <p:extLst/>
+          </p:nvPr>
+        </p:nvGraphicFramePr>
+        <p:xfrm>
+          <a:off x="628652" y="2373745"/>
+          <a:ext cx="3808250" cy="4145280"/>
+        </p:xfrm>
+        <a:graphic>
+          <a:graphicData uri="http://schemas.openxmlformats.org/drawingml/2006/table">
+            <a:tbl>
+              <a:tblPr firstRow="1">
+                <a:tableStyleId>{9D7B26C5-4107-4FEC-AEDC-1716B250A1EF}</a:tableStyleId>
+              </a:tblPr>
+              <a:tblGrid>
+                <a:gridCol w="1603375">
+                  <a:extLst>
+                    <a:ext uri="{9D8B030D-6E8A-4147-A177-3AD203B41FA5}">
+                      <a16:colId xmlns:a16="http://schemas.microsoft.com/office/drawing/2014/main" val="962391357"/>
+                    </a:ext>
+                  </a:extLst>
+                </a:gridCol>
+                <a:gridCol w="2204875">
+                  <a:extLst>
+                    <a:ext uri="{9D8B030D-6E8A-4147-A177-3AD203B41FA5}">
+                      <a16:colId xmlns:a16="http://schemas.microsoft.com/office/drawing/2014/main" val="1208510133"/>
+                    </a:ext>
+                  </a:extLst>
+                </a:gridCol>
+              </a:tblGrid>
+              <a:tr h="373725">
+                <a:tc>
+                  <a:txBody>
+                    <a:bodyPr/>
+                    <a:lstStyle/>
+                    <a:p>
+                      <a:pPr algn="ctr"/>
+                      <a:r>
+                        <a:rPr lang="en-US" sz="2800" dirty="0"/>
+                        <a:t>Operator</a:t>
+                      </a:r>
+                    </a:p>
+                  </a:txBody>
+                  <a:tcPr anchor="ctr"/>
+                </a:tc>
+                <a:tc>
+                  <a:txBody>
+                    <a:bodyPr/>
+                    <a:lstStyle/>
+                    <a:p>
+                      <a:pPr algn="ctr"/>
+                      <a:r>
+                        <a:rPr lang="en-US" sz="2800" dirty="0"/>
+                        <a:t>Explain</a:t>
+                      </a:r>
+                    </a:p>
+                  </a:txBody>
+                  <a:tcPr/>
+                </a:tc>
+                <a:extLst>
+                  <a:ext uri="{0D108BD9-81ED-4DB2-BD59-A6C34878D82A}">
+                    <a16:rowId xmlns:a16="http://schemas.microsoft.com/office/drawing/2014/main" val="1445083909"/>
+                  </a:ext>
+                </a:extLst>
+              </a:tr>
+              <a:tr h="370840">
+                <a:tc>
+                  <a:txBody>
+                    <a:bodyPr/>
+                    <a:lstStyle/>
+                    <a:p>
+                      <a:pPr algn="ctr"/>
+                      <a:r>
+                        <a:rPr lang="en-US" sz="2800" dirty="0"/>
+                        <a:t>+=</a:t>
+                      </a:r>
+                    </a:p>
+                  </a:txBody>
+                  <a:tcPr anchor="ctr"/>
+                </a:tc>
+                <a:tc>
+                  <a:txBody>
+                    <a:bodyPr/>
+                    <a:lstStyle/>
+                    <a:p>
+                      <a:pPr algn="ctr"/>
+                      <a:r>
+                        <a:rPr lang="ja-JP" altLang="en-US" sz="2800" dirty="0"/>
+                        <a:t>加算</a:t>
+                      </a:r>
+                      <a:endParaRPr lang="en-US" sz="2800" dirty="0"/>
+                    </a:p>
+                  </a:txBody>
+                  <a:tcPr/>
+                </a:tc>
+                <a:extLst>
+                  <a:ext uri="{0D108BD9-81ED-4DB2-BD59-A6C34878D82A}">
+                    <a16:rowId xmlns:a16="http://schemas.microsoft.com/office/drawing/2014/main" val="1574725563"/>
+                  </a:ext>
+                </a:extLst>
+              </a:tr>
+              <a:tr h="370840">
+                <a:tc>
+                  <a:txBody>
+                    <a:bodyPr/>
+                    <a:lstStyle/>
+                    <a:p>
+                      <a:pPr algn="ctr"/>
+                      <a:r>
+                        <a:rPr lang="en-US" altLang="ja-JP" sz="2800" dirty="0"/>
+                        <a:t>-=</a:t>
+                      </a:r>
+                      <a:endParaRPr lang="en-US" sz="2800" dirty="0"/>
+                    </a:p>
+                  </a:txBody>
+                  <a:tcPr anchor="ctr"/>
+                </a:tc>
+                <a:tc>
+                  <a:txBody>
+                    <a:bodyPr/>
+                    <a:lstStyle/>
+                    <a:p>
+                      <a:pPr algn="ctr"/>
+                      <a:r>
+                        <a:rPr lang="ja-JP" altLang="en-US" sz="2800" dirty="0"/>
+                        <a:t>減算</a:t>
+                      </a:r>
+                      <a:endParaRPr lang="en-US" sz="2800" dirty="0"/>
+                    </a:p>
+                  </a:txBody>
+                  <a:tcPr/>
+                </a:tc>
+                <a:extLst>
+                  <a:ext uri="{0D108BD9-81ED-4DB2-BD59-A6C34878D82A}">
+                    <a16:rowId xmlns:a16="http://schemas.microsoft.com/office/drawing/2014/main" val="3397082867"/>
+                  </a:ext>
+                </a:extLst>
+              </a:tr>
+              <a:tr h="370840">
+                <a:tc>
+                  <a:txBody>
+                    <a:bodyPr/>
+                    <a:lstStyle/>
+                    <a:p>
+                      <a:pPr algn="ctr"/>
+                      <a:r>
+                        <a:rPr lang="en-US" altLang="ja-JP" sz="2800" dirty="0"/>
+                        <a:t>*=</a:t>
+                      </a:r>
+                      <a:endParaRPr lang="en-US" sz="2800" dirty="0"/>
+                    </a:p>
+                  </a:txBody>
+                  <a:tcPr anchor="ctr"/>
+                </a:tc>
+                <a:tc>
+                  <a:txBody>
+                    <a:bodyPr/>
+                    <a:lstStyle/>
+                    <a:p>
+                      <a:pPr algn="ctr"/>
+                      <a:r>
+                        <a:rPr lang="ja-JP" altLang="en-US" sz="2800" dirty="0"/>
+                        <a:t>乗算</a:t>
+                      </a:r>
+                      <a:endParaRPr lang="en-US" sz="2800" dirty="0"/>
+                    </a:p>
+                  </a:txBody>
+                  <a:tcPr/>
+                </a:tc>
+                <a:extLst>
+                  <a:ext uri="{0D108BD9-81ED-4DB2-BD59-A6C34878D82A}">
+                    <a16:rowId xmlns:a16="http://schemas.microsoft.com/office/drawing/2014/main" val="2714680815"/>
+                  </a:ext>
+                </a:extLst>
+              </a:tr>
+              <a:tr h="370840">
+                <a:tc>
+                  <a:txBody>
+                    <a:bodyPr/>
+                    <a:lstStyle/>
+                    <a:p>
+                      <a:pPr algn="ctr"/>
+                      <a:r>
+                        <a:rPr lang="en-US" sz="2800" dirty="0"/>
+                        <a:t>/=</a:t>
+                      </a:r>
+                    </a:p>
+                  </a:txBody>
+                  <a:tcPr anchor="ctr"/>
+                </a:tc>
+                <a:tc>
+                  <a:txBody>
+                    <a:bodyPr/>
+                    <a:lstStyle/>
+                    <a:p>
+                      <a:pPr algn="ctr"/>
+                      <a:r>
+                        <a:rPr lang="ja-JP" altLang="en-US" sz="2800" dirty="0"/>
+                        <a:t>除算</a:t>
+                      </a:r>
+                      <a:endParaRPr lang="en-US" sz="2800" dirty="0"/>
+                    </a:p>
+                  </a:txBody>
+                  <a:tcPr/>
+                </a:tc>
+                <a:extLst>
+                  <a:ext uri="{0D108BD9-81ED-4DB2-BD59-A6C34878D82A}">
+                    <a16:rowId xmlns:a16="http://schemas.microsoft.com/office/drawing/2014/main" val="1430187955"/>
+                  </a:ext>
+                </a:extLst>
+              </a:tr>
+              <a:tr h="0">
+                <a:tc>
+                  <a:txBody>
+                    <a:bodyPr/>
+                    <a:lstStyle/>
+                    <a:p>
+                      <a:pPr algn="ctr"/>
+                      <a:r>
+                        <a:rPr lang="en-US" altLang="ja-JP" sz="2800" dirty="0"/>
+                        <a:t>%=</a:t>
+                      </a:r>
+                      <a:endParaRPr lang="en-US" sz="2800" dirty="0"/>
+                    </a:p>
+                  </a:txBody>
+                  <a:tcPr anchor="ctr"/>
+                </a:tc>
+                <a:tc>
+                  <a:txBody>
+                    <a:bodyPr/>
+                    <a:lstStyle/>
+                    <a:p>
+                      <a:pPr algn="ctr"/>
+                      <a:r>
+                        <a:rPr lang="ja-JP" altLang="en-US" sz="2800" dirty="0"/>
+                        <a:t>余り</a:t>
+                      </a:r>
+                      <a:endParaRPr lang="en-US" sz="2800" dirty="0"/>
+                    </a:p>
+                  </a:txBody>
+                  <a:tcPr/>
+                </a:tc>
+                <a:extLst>
+                  <a:ext uri="{0D108BD9-81ED-4DB2-BD59-A6C34878D82A}">
+                    <a16:rowId xmlns:a16="http://schemas.microsoft.com/office/drawing/2014/main" val="3798942226"/>
+                  </a:ext>
+                </a:extLst>
+              </a:tr>
+              <a:tr h="370840">
+                <a:tc>
+                  <a:txBody>
+                    <a:bodyPr/>
+                    <a:lstStyle/>
+                    <a:p>
+                      <a:pPr algn="ctr"/>
+                      <a:r>
+                        <a:rPr lang="en-US" sz="2800" dirty="0"/>
+                        <a:t>//=</a:t>
+                      </a:r>
+                    </a:p>
+                  </a:txBody>
+                  <a:tcPr anchor="ctr"/>
+                </a:tc>
+                <a:tc>
+                  <a:txBody>
+                    <a:bodyPr/>
+                    <a:lstStyle/>
+                    <a:p>
+                      <a:pPr algn="ctr"/>
+                      <a:r>
+                        <a:rPr lang="ja-JP" altLang="en-US" sz="2800" dirty="0"/>
+                        <a:t>整数除算</a:t>
+                      </a:r>
+                      <a:endParaRPr lang="en-US" sz="2800" dirty="0"/>
+                    </a:p>
+                  </a:txBody>
+                  <a:tcPr/>
+                </a:tc>
+                <a:extLst>
+                  <a:ext uri="{0D108BD9-81ED-4DB2-BD59-A6C34878D82A}">
+                    <a16:rowId xmlns:a16="http://schemas.microsoft.com/office/drawing/2014/main" val="562012678"/>
+                  </a:ext>
+                </a:extLst>
+              </a:tr>
+              <a:tr h="370840">
+                <a:tc>
+                  <a:txBody>
+                    <a:bodyPr/>
+                    <a:lstStyle/>
+                    <a:p>
+                      <a:pPr algn="ctr"/>
+                      <a:r>
+                        <a:rPr lang="en-US" sz="2800" dirty="0"/>
+                        <a:t>**=</a:t>
+                      </a:r>
+                    </a:p>
+                  </a:txBody>
+                  <a:tcPr anchor="ctr"/>
+                </a:tc>
+                <a:tc>
+                  <a:txBody>
+                    <a:bodyPr/>
+                    <a:lstStyle/>
+                    <a:p>
+                      <a:pPr algn="ctr"/>
+                      <a:r>
+                        <a:rPr lang="ja-JP" altLang="en-US" sz="2800" dirty="0"/>
+                        <a:t>累乗</a:t>
+                      </a:r>
+                      <a:endParaRPr lang="en-US" sz="2800" dirty="0"/>
+                    </a:p>
+                  </a:txBody>
+                  <a:tcPr/>
+                </a:tc>
+                <a:extLst>
+                  <a:ext uri="{0D108BD9-81ED-4DB2-BD59-A6C34878D82A}">
+                    <a16:rowId xmlns:a16="http://schemas.microsoft.com/office/drawing/2014/main" val="2585066991"/>
+                  </a:ext>
+                </a:extLst>
+              </a:tr>
+            </a:tbl>
+          </a:graphicData>
+        </a:graphic>
+      </p:graphicFrame>
     </p:spTree>
     <p:extLst>
       <p:ext uri="{BB962C8B-B14F-4D97-AF65-F5344CB8AC3E}">
-        <p14:creationId xmlns:p14="http://schemas.microsoft.com/office/powerpoint/2010/main" val="3452653827"/>
+        <p14:creationId xmlns:p14="http://schemas.microsoft.com/office/powerpoint/2010/main" val="1726052864"/>
       </p:ext>
     </p:extLst>
   </p:cSld>
@@ -4650,7 +5120,7 @@
           <p:cNvPr id="2" name="タイトル 1">
             <a:extLst>
               <a:ext uri="{FF2B5EF4-FFF2-40B4-BE49-F238E27FC236}">
-                <a16:creationId xmlns:a16="http://schemas.microsoft.com/office/drawing/2014/main" id="{A79A797C-41A1-4F8B-8105-C2ABA5D85AF2}"/>
+                <a16:creationId xmlns:a16="http://schemas.microsoft.com/office/drawing/2014/main" id="{76E659E8-CD1A-49E4-A952-816A2324AEDA}"/>
               </a:ext>
             </a:extLst>
           </p:cNvPr>
@@ -4668,7 +5138,7 @@
           <a:p>
             <a:r>
               <a:rPr lang="en-US" dirty="0"/>
-              <a:t>Repeat(for, while)</a:t>
+              <a:t>Operation</a:t>
             </a:r>
           </a:p>
         </p:txBody>
@@ -4678,7 +5148,7 @@
           <p:cNvPr id="3" name="コンテンツ プレースホルダー 2">
             <a:extLst>
               <a:ext uri="{FF2B5EF4-FFF2-40B4-BE49-F238E27FC236}">
-                <a16:creationId xmlns:a16="http://schemas.microsoft.com/office/drawing/2014/main" id="{FE158364-C372-4B49-B871-864989973A92}"/>
+                <a16:creationId xmlns:a16="http://schemas.microsoft.com/office/drawing/2014/main" id="{5B9E60CF-D1D8-4488-A4B6-F92FBF7470D2}"/>
               </a:ext>
             </a:extLst>
           </p:cNvPr>
@@ -4689,21 +5159,49 @@
             <p:ph idx="1"/>
           </p:nvPr>
         </p:nvSpPr>
-        <p:spPr/>
-        <p:txBody>
-          <a:bodyPr/>
-          <a:lstStyle/>
-          <a:p>
-            <a:endParaRPr lang="en-US"/>
-          </a:p>
-        </p:txBody>
-      </p:sp>
-      <p:sp>
-        <p:nvSpPr>
-          <p:cNvPr id="5" name="スライド番号プレースホルダー 4">
+        <p:spPr>
+          <a:xfrm>
+            <a:off x="628650" y="1825625"/>
+            <a:ext cx="7886700" cy="2709430"/>
+          </a:xfrm>
+        </p:spPr>
+        <p:txBody>
+          <a:bodyPr/>
+          <a:lstStyle/>
+          <a:p>
+            <a:pPr marL="0" indent="0">
+              <a:buNone/>
+            </a:pPr>
+            <a:r>
+              <a:rPr lang="ja-JP" altLang="en-US" sz="4000" dirty="0"/>
+              <a:t>比較演算</a:t>
+            </a:r>
+            <a:endParaRPr lang="en-US" altLang="ja-JP" sz="4000" dirty="0"/>
+          </a:p>
+          <a:p>
+            <a:pPr marL="0" indent="0">
+              <a:buNone/>
+            </a:pPr>
+            <a:endParaRPr lang="en-US" altLang="ja-JP" dirty="0"/>
+          </a:p>
+          <a:p>
+            <a:pPr marL="0" indent="0">
+              <a:buNone/>
+            </a:pPr>
+            <a:r>
+              <a:rPr lang="ja-JP" altLang="en-US" dirty="0"/>
+              <a:t>左側と右側を比較して条件に合致するかどうかを調べる際に使用する．</a:t>
+            </a:r>
+            <a:endParaRPr lang="en-US" dirty="0"/>
+          </a:p>
+        </p:txBody>
+      </p:sp>
+      <p:sp>
+        <p:nvSpPr>
+          <p:cNvPr id="4" name="スライド番号プレースホルダー 3">
             <a:extLst>
               <a:ext uri="{FF2B5EF4-FFF2-40B4-BE49-F238E27FC236}">
-                <a16:creationId xmlns:a16="http://schemas.microsoft.com/office/drawing/2014/main" id="{AC27D5E8-9A83-4A09-B5EB-343C26C86426}"/>
+                <a16:creationId xmlns:a16="http://schemas.microsoft.com/office/drawing/2014/main" id="{DC728001-57F5-46CC-B40F-0DC91AEF41B9}"/>
               </a:ext>
             </a:extLst>
           </p:cNvPr>
@@ -4731,7 +5229,7 @@
     </p:spTree>
     <p:extLst>
       <p:ext uri="{BB962C8B-B14F-4D97-AF65-F5344CB8AC3E}">
-        <p14:creationId xmlns:p14="http://schemas.microsoft.com/office/powerpoint/2010/main" val="2476710849"/>
+        <p14:creationId xmlns:p14="http://schemas.microsoft.com/office/powerpoint/2010/main" val="443802293"/>
       </p:ext>
     </p:extLst>
   </p:cSld>
@@ -4763,7 +5261,7 @@
           <p:cNvPr id="2" name="タイトル 1">
             <a:extLst>
               <a:ext uri="{FF2B5EF4-FFF2-40B4-BE49-F238E27FC236}">
-                <a16:creationId xmlns:a16="http://schemas.microsoft.com/office/drawing/2014/main" id="{F6B36FFF-5648-4E54-83B1-95AB5C7DA3CB}"/>
+                <a16:creationId xmlns:a16="http://schemas.microsoft.com/office/drawing/2014/main" id="{76E659E8-CD1A-49E4-A952-816A2324AEDA}"/>
               </a:ext>
             </a:extLst>
           </p:cNvPr>
@@ -4781,7 +5279,7 @@
           <a:p>
             <a:r>
               <a:rPr lang="en-US" dirty="0"/>
-              <a:t>Function</a:t>
+              <a:t>Operation</a:t>
             </a:r>
           </a:p>
         </p:txBody>
@@ -4791,7 +5289,7 @@
           <p:cNvPr id="3" name="コンテンツ プレースホルダー 2">
             <a:extLst>
               <a:ext uri="{FF2B5EF4-FFF2-40B4-BE49-F238E27FC236}">
-                <a16:creationId xmlns:a16="http://schemas.microsoft.com/office/drawing/2014/main" id="{3B3CCD9F-C8A0-4C66-A242-D9F826307A89}"/>
+                <a16:creationId xmlns:a16="http://schemas.microsoft.com/office/drawing/2014/main" id="{5B9E60CF-D1D8-4488-A4B6-F92FBF7470D2}"/>
               </a:ext>
             </a:extLst>
           </p:cNvPr>
@@ -4802,21 +5300,33 @@
             <p:ph idx="1"/>
           </p:nvPr>
         </p:nvSpPr>
-        <p:spPr/>
-        <p:txBody>
-          <a:bodyPr/>
-          <a:lstStyle/>
-          <a:p>
-            <a:endParaRPr lang="en-US"/>
-          </a:p>
-        </p:txBody>
-      </p:sp>
-      <p:sp>
-        <p:nvSpPr>
-          <p:cNvPr id="5" name="スライド番号プレースホルダー 4">
+        <p:spPr>
+          <a:xfrm>
+            <a:off x="628650" y="1825625"/>
+            <a:ext cx="7886700" cy="668193"/>
+          </a:xfrm>
+        </p:spPr>
+        <p:txBody>
+          <a:bodyPr/>
+          <a:lstStyle/>
+          <a:p>
+            <a:pPr marL="0" indent="0">
+              <a:buNone/>
+            </a:pPr>
+            <a:r>
+              <a:rPr lang="ja-JP" altLang="en-US" dirty="0"/>
+              <a:t>比較演算</a:t>
+            </a:r>
+            <a:endParaRPr lang="en-US" dirty="0"/>
+          </a:p>
+        </p:txBody>
+      </p:sp>
+      <p:sp>
+        <p:nvSpPr>
+          <p:cNvPr id="4" name="スライド番号プレースホルダー 3">
             <a:extLst>
               <a:ext uri="{FF2B5EF4-FFF2-40B4-BE49-F238E27FC236}">
-                <a16:creationId xmlns:a16="http://schemas.microsoft.com/office/drawing/2014/main" id="{5AE19A5F-72FC-45C6-A95A-B0D52F671680}"/>
+                <a16:creationId xmlns:a16="http://schemas.microsoft.com/office/drawing/2014/main" id="{DC728001-57F5-46CC-B40F-0DC91AEF41B9}"/>
               </a:ext>
             </a:extLst>
           </p:cNvPr>
@@ -4841,10 +5351,355 @@
           </a:p>
         </p:txBody>
       </p:sp>
+      <p:graphicFrame>
+        <p:nvGraphicFramePr>
+          <p:cNvPr id="5" name="コンテンツ プレースホルダー 6">
+            <a:extLst>
+              <a:ext uri="{FF2B5EF4-FFF2-40B4-BE49-F238E27FC236}">
+                <a16:creationId xmlns:a16="http://schemas.microsoft.com/office/drawing/2014/main" id="{BD59B23E-6DAE-480D-823A-EB765EBDA2F0}"/>
+              </a:ext>
+            </a:extLst>
+          </p:cNvPr>
+          <p:cNvGraphicFramePr>
+            <a:graphicFrameLocks/>
+          </p:cNvGraphicFramePr>
+          <p:nvPr>
+            <p:extLst>
+              <p:ext uri="{D42A27DB-BD31-4B8C-83A1-F6EECF244321}">
+                <p14:modId xmlns:p14="http://schemas.microsoft.com/office/powerpoint/2010/main" val="2217052373"/>
+              </p:ext>
+            </p:extLst>
+          </p:nvPr>
+        </p:nvGraphicFramePr>
+        <p:xfrm>
+          <a:off x="628650" y="2493818"/>
+          <a:ext cx="7886700" cy="3108960"/>
+        </p:xfrm>
+        <a:graphic>
+          <a:graphicData uri="http://schemas.openxmlformats.org/drawingml/2006/table">
+            <a:tbl>
+              <a:tblPr firstRow="1">
+                <a:tableStyleId>{9D7B26C5-4107-4FEC-AEDC-1716B250A1EF}</a:tableStyleId>
+              </a:tblPr>
+              <a:tblGrid>
+                <a:gridCol w="1933427">
+                  <a:extLst>
+                    <a:ext uri="{9D8B030D-6E8A-4147-A177-3AD203B41FA5}">
+                      <a16:colId xmlns:a16="http://schemas.microsoft.com/office/drawing/2014/main" val="962391357"/>
+                    </a:ext>
+                  </a:extLst>
+                </a:gridCol>
+                <a:gridCol w="5953273">
+                  <a:extLst>
+                    <a:ext uri="{9D8B030D-6E8A-4147-A177-3AD203B41FA5}">
+                      <a16:colId xmlns:a16="http://schemas.microsoft.com/office/drawing/2014/main" val="1208510133"/>
+                    </a:ext>
+                  </a:extLst>
+                </a:gridCol>
+              </a:tblGrid>
+              <a:tr h="373725">
+                <a:tc>
+                  <a:txBody>
+                    <a:bodyPr/>
+                    <a:lstStyle/>
+                    <a:p>
+                      <a:pPr algn="ctr"/>
+                      <a:r>
+                        <a:rPr lang="en-US" sz="2800" dirty="0"/>
+                        <a:t>Operator</a:t>
+                      </a:r>
+                    </a:p>
+                  </a:txBody>
+                  <a:tcPr anchor="ctr"/>
+                </a:tc>
+                <a:tc>
+                  <a:txBody>
+                    <a:bodyPr/>
+                    <a:lstStyle/>
+                    <a:p>
+                      <a:pPr algn="ctr"/>
+                      <a:r>
+                        <a:rPr lang="en-US" sz="2800" dirty="0"/>
+                        <a:t>Explain</a:t>
+                      </a:r>
+                    </a:p>
+                  </a:txBody>
+                  <a:tcPr/>
+                </a:tc>
+                <a:extLst>
+                  <a:ext uri="{0D108BD9-81ED-4DB2-BD59-A6C34878D82A}">
+                    <a16:rowId xmlns:a16="http://schemas.microsoft.com/office/drawing/2014/main" val="1445083909"/>
+                  </a:ext>
+                </a:extLst>
+              </a:tr>
+              <a:tr h="370840">
+                <a:tc>
+                  <a:txBody>
+                    <a:bodyPr/>
+                    <a:lstStyle/>
+                    <a:p>
+                      <a:pPr algn="ctr"/>
+                      <a:r>
+                        <a:rPr lang="en-US" sz="2800" dirty="0"/>
+                        <a:t>==</a:t>
+                      </a:r>
+                    </a:p>
+                  </a:txBody>
+                  <a:tcPr anchor="ctr"/>
+                </a:tc>
+                <a:tc>
+                  <a:txBody>
+                    <a:bodyPr/>
+                    <a:lstStyle/>
+                    <a:p>
+                      <a:pPr algn="ctr"/>
+                      <a:r>
+                        <a:rPr lang="en-US" sz="2800" dirty="0"/>
+                        <a:t>2</a:t>
+                      </a:r>
+                      <a:r>
+                        <a:rPr lang="ja-JP" altLang="en-US" sz="2800" dirty="0" err="1"/>
+                        <a:t>つの</a:t>
+                      </a:r>
+                      <a:r>
+                        <a:rPr lang="ja-JP" altLang="en-US" sz="2800" dirty="0"/>
+                        <a:t>オブジェクトが等しいか</a:t>
+                      </a:r>
+                      <a:endParaRPr lang="en-US" sz="2800" dirty="0"/>
+                    </a:p>
+                  </a:txBody>
+                  <a:tcPr/>
+                </a:tc>
+                <a:extLst>
+                  <a:ext uri="{0D108BD9-81ED-4DB2-BD59-A6C34878D82A}">
+                    <a16:rowId xmlns:a16="http://schemas.microsoft.com/office/drawing/2014/main" val="1574725563"/>
+                  </a:ext>
+                </a:extLst>
+              </a:tr>
+              <a:tr h="370840">
+                <a:tc>
+                  <a:txBody>
+                    <a:bodyPr/>
+                    <a:lstStyle/>
+                    <a:p>
+                      <a:pPr algn="ctr"/>
+                      <a:r>
+                        <a:rPr lang="en-US" sz="2800" dirty="0"/>
+                        <a:t>!=</a:t>
+                      </a:r>
+                    </a:p>
+                  </a:txBody>
+                  <a:tcPr anchor="ctr"/>
+                </a:tc>
+                <a:tc>
+                  <a:txBody>
+                    <a:bodyPr/>
+                    <a:lstStyle/>
+                    <a:p>
+                      <a:pPr marL="0" marR="0" lvl="0" indent="0" algn="ctr" defTabSz="914400" rtl="0" eaLnBrk="1" fontAlgn="auto" latinLnBrk="0" hangingPunct="1">
+                        <a:lnSpc>
+                          <a:spcPct val="100000"/>
+                        </a:lnSpc>
+                        <a:spcBef>
+                          <a:spcPts val="0"/>
+                        </a:spcBef>
+                        <a:spcAft>
+                          <a:spcPts val="0"/>
+                        </a:spcAft>
+                        <a:buClrTx/>
+                        <a:buSzTx/>
+                        <a:buFontTx/>
+                        <a:buNone/>
+                        <a:tabLst/>
+                        <a:defRPr/>
+                      </a:pPr>
+                      <a:r>
+                        <a:rPr lang="en-US" sz="2800" dirty="0"/>
+                        <a:t>2</a:t>
+                      </a:r>
+                      <a:r>
+                        <a:rPr lang="ja-JP" altLang="en-US" sz="2800" dirty="0" err="1"/>
+                        <a:t>つの</a:t>
+                      </a:r>
+                      <a:r>
+                        <a:rPr lang="ja-JP" altLang="en-US" sz="2800" dirty="0"/>
+                        <a:t>オブジェクトが異なるか</a:t>
+                      </a:r>
+                      <a:endParaRPr lang="en-US" sz="2800" dirty="0"/>
+                    </a:p>
+                  </a:txBody>
+                  <a:tcPr/>
+                </a:tc>
+                <a:extLst>
+                  <a:ext uri="{0D108BD9-81ED-4DB2-BD59-A6C34878D82A}">
+                    <a16:rowId xmlns:a16="http://schemas.microsoft.com/office/drawing/2014/main" val="3397082867"/>
+                  </a:ext>
+                </a:extLst>
+              </a:tr>
+              <a:tr h="439622">
+                <a:tc>
+                  <a:txBody>
+                    <a:bodyPr/>
+                    <a:lstStyle/>
+                    <a:p>
+                      <a:pPr algn="ctr"/>
+                      <a:r>
+                        <a:rPr lang="en-US" sz="2800" dirty="0"/>
+                        <a:t>&lt;(&gt;)</a:t>
+                      </a:r>
+                    </a:p>
+                  </a:txBody>
+                  <a:tcPr anchor="ctr"/>
+                </a:tc>
+                <a:tc>
+                  <a:txBody>
+                    <a:bodyPr/>
+                    <a:lstStyle/>
+                    <a:p>
+                      <a:pPr algn="ctr"/>
+                      <a:r>
+                        <a:rPr lang="ja-JP" altLang="en-US" sz="2800" dirty="0"/>
+                        <a:t>左が右よりも大きい</a:t>
+                      </a:r>
+                      <a:r>
+                        <a:rPr lang="en-US" altLang="ja-JP" sz="2800" dirty="0"/>
+                        <a:t>(</a:t>
+                      </a:r>
+                      <a:r>
+                        <a:rPr lang="ja-JP" altLang="en-US" sz="2800" dirty="0"/>
+                        <a:t>小さい</a:t>
+                      </a:r>
+                      <a:r>
+                        <a:rPr lang="en-US" altLang="ja-JP" sz="2800" dirty="0"/>
+                        <a:t>)</a:t>
+                      </a:r>
+                      <a:r>
+                        <a:rPr lang="ja-JP" altLang="en-US" sz="2800" dirty="0"/>
+                        <a:t>か</a:t>
+                      </a:r>
+                      <a:endParaRPr lang="en-US" sz="2800" dirty="0"/>
+                    </a:p>
+                  </a:txBody>
+                  <a:tcPr/>
+                </a:tc>
+                <a:extLst>
+                  <a:ext uri="{0D108BD9-81ED-4DB2-BD59-A6C34878D82A}">
+                    <a16:rowId xmlns:a16="http://schemas.microsoft.com/office/drawing/2014/main" val="2714680815"/>
+                  </a:ext>
+                </a:extLst>
+              </a:tr>
+              <a:tr h="370840">
+                <a:tc>
+                  <a:txBody>
+                    <a:bodyPr/>
+                    <a:lstStyle/>
+                    <a:p>
+                      <a:pPr algn="ctr"/>
+                      <a:r>
+                        <a:rPr lang="en-US" sz="2800" dirty="0"/>
+                        <a:t>&lt;=(&gt;=)</a:t>
+                      </a:r>
+                    </a:p>
+                  </a:txBody>
+                  <a:tcPr anchor="ctr"/>
+                </a:tc>
+                <a:tc>
+                  <a:txBody>
+                    <a:bodyPr/>
+                    <a:lstStyle/>
+                    <a:p>
+                      <a:pPr marL="0" marR="0" lvl="0" indent="0" algn="ctr" defTabSz="914400" rtl="0" eaLnBrk="1" fontAlgn="auto" latinLnBrk="0" hangingPunct="1">
+                        <a:lnSpc>
+                          <a:spcPct val="100000"/>
+                        </a:lnSpc>
+                        <a:spcBef>
+                          <a:spcPts val="0"/>
+                        </a:spcBef>
+                        <a:spcAft>
+                          <a:spcPts val="0"/>
+                        </a:spcAft>
+                        <a:buClrTx/>
+                        <a:buSzTx/>
+                        <a:buFontTx/>
+                        <a:buNone/>
+                        <a:tabLst/>
+                        <a:defRPr/>
+                      </a:pPr>
+                      <a:r>
+                        <a:rPr lang="ja-JP" altLang="en-US" sz="2800" dirty="0"/>
+                        <a:t>左が右以上</a:t>
+                      </a:r>
+                      <a:r>
+                        <a:rPr lang="en-US" altLang="ja-JP" sz="2800" dirty="0"/>
+                        <a:t>(</a:t>
+                      </a:r>
+                      <a:r>
+                        <a:rPr lang="ja-JP" altLang="en-US" sz="2800" dirty="0"/>
+                        <a:t>以下</a:t>
+                      </a:r>
+                      <a:r>
+                        <a:rPr lang="en-US" altLang="ja-JP" sz="2800" dirty="0"/>
+                        <a:t>)</a:t>
+                      </a:r>
+                      <a:r>
+                        <a:rPr lang="ja-JP" altLang="en-US" sz="2800" dirty="0"/>
+                        <a:t>か</a:t>
+                      </a:r>
+                      <a:endParaRPr lang="en-US" sz="2800" dirty="0"/>
+                    </a:p>
+                  </a:txBody>
+                  <a:tcPr/>
+                </a:tc>
+                <a:extLst>
+                  <a:ext uri="{0D108BD9-81ED-4DB2-BD59-A6C34878D82A}">
+                    <a16:rowId xmlns:a16="http://schemas.microsoft.com/office/drawing/2014/main" val="1430187955"/>
+                  </a:ext>
+                </a:extLst>
+              </a:tr>
+              <a:tr h="0">
+                <a:tc>
+                  <a:txBody>
+                    <a:bodyPr/>
+                    <a:lstStyle/>
+                    <a:p>
+                      <a:pPr algn="ctr"/>
+                      <a:r>
+                        <a:rPr lang="en-US" sz="2800" dirty="0"/>
+                        <a:t>is</a:t>
+                      </a:r>
+                    </a:p>
+                  </a:txBody>
+                  <a:tcPr anchor="ctr"/>
+                </a:tc>
+                <a:tc>
+                  <a:txBody>
+                    <a:bodyPr/>
+                    <a:lstStyle/>
+                    <a:p>
+                      <a:pPr algn="ctr"/>
+                      <a:r>
+                        <a:rPr lang="ja-JP" altLang="en-US" sz="2800" dirty="0"/>
+                        <a:t>同一のオブジェクトかどうか</a:t>
+                      </a:r>
+                      <a:endParaRPr lang="en-US" sz="2800" dirty="0"/>
+                    </a:p>
+                  </a:txBody>
+                  <a:tcPr/>
+                </a:tc>
+                <a:extLst>
+                  <a:ext uri="{0D108BD9-81ED-4DB2-BD59-A6C34878D82A}">
+                    <a16:rowId xmlns:a16="http://schemas.microsoft.com/office/drawing/2014/main" val="3798942226"/>
+                  </a:ext>
+                </a:extLst>
+              </a:tr>
+            </a:tbl>
+          </a:graphicData>
+        </a:graphic>
+      </p:graphicFrame>
     </p:spTree>
     <p:extLst>
       <p:ext uri="{BB962C8B-B14F-4D97-AF65-F5344CB8AC3E}">
-        <p14:creationId xmlns:p14="http://schemas.microsoft.com/office/powerpoint/2010/main" val="828934801"/>
+        <p14:creationId xmlns:p14="http://schemas.microsoft.com/office/powerpoint/2010/main" val="2392833200"/>
       </p:ext>
     </p:extLst>
   </p:cSld>
@@ -4876,7 +5731,7 @@
           <p:cNvPr id="2" name="タイトル 1">
             <a:extLst>
               <a:ext uri="{FF2B5EF4-FFF2-40B4-BE49-F238E27FC236}">
-                <a16:creationId xmlns:a16="http://schemas.microsoft.com/office/drawing/2014/main" id="{FAF5DC41-DAEF-44F8-BABF-BA1D49ACA002}"/>
+                <a16:creationId xmlns:a16="http://schemas.microsoft.com/office/drawing/2014/main" id="{B5A512A7-A58C-4D08-84CB-45DBCE5FE4B3}"/>
               </a:ext>
             </a:extLst>
           </p:cNvPr>
@@ -4894,7 +5749,7 @@
           <a:p>
             <a:r>
               <a:rPr lang="en-US" dirty="0"/>
-              <a:t>Error</a:t>
+              <a:t>Rule of variable name</a:t>
             </a:r>
           </a:p>
         </p:txBody>
@@ -4904,7 +5759,7 @@
           <p:cNvPr id="3" name="コンテンツ プレースホルダー 2">
             <a:extLst>
               <a:ext uri="{FF2B5EF4-FFF2-40B4-BE49-F238E27FC236}">
-                <a16:creationId xmlns:a16="http://schemas.microsoft.com/office/drawing/2014/main" id="{E0FA2130-D6D3-4220-959F-C91BC53FAB78}"/>
+                <a16:creationId xmlns:a16="http://schemas.microsoft.com/office/drawing/2014/main" id="{F2C69D69-CC93-476C-915C-B693A69400EA}"/>
               </a:ext>
             </a:extLst>
           </p:cNvPr>
@@ -4915,12 +5770,57 @@
             <p:ph idx="1"/>
           </p:nvPr>
         </p:nvSpPr>
-        <p:spPr/>
-        <p:txBody>
-          <a:bodyPr/>
-          <a:lstStyle/>
-          <a:p>
-            <a:endParaRPr lang="en-US"/>
+        <p:spPr>
+          <a:xfrm>
+            <a:off x="628650" y="1825625"/>
+            <a:ext cx="7886700" cy="4351338"/>
+          </a:xfrm>
+        </p:spPr>
+        <p:txBody>
+          <a:bodyPr/>
+          <a:lstStyle/>
+          <a:p>
+            <a:pPr marL="0" indent="0">
+              <a:buNone/>
+            </a:pPr>
+            <a:r>
+              <a:rPr lang="ja-JP" altLang="en-US" dirty="0"/>
+              <a:t>分かりやすい変数名を作る理由</a:t>
+            </a:r>
+            <a:endParaRPr lang="en-US" altLang="ja-JP" dirty="0"/>
+          </a:p>
+          <a:p>
+            <a:pPr>
+              <a:buFontTx/>
+              <a:buChar char="-"/>
+            </a:pPr>
+            <a:r>
+              <a:rPr lang="ja-JP" altLang="en-US" dirty="0"/>
+              <a:t>コードの中での再利用がしやすい</a:t>
+            </a:r>
+            <a:endParaRPr lang="en-US" altLang="ja-JP" dirty="0"/>
+          </a:p>
+          <a:p>
+            <a:pPr>
+              <a:buFontTx/>
+              <a:buChar char="-"/>
+            </a:pPr>
+            <a:r>
+              <a:rPr lang="ja-JP" altLang="en-US" dirty="0"/>
+              <a:t>見返したときに理解しやすくなる</a:t>
+            </a:r>
+            <a:endParaRPr lang="en-US" altLang="ja-JP" dirty="0"/>
+          </a:p>
+          <a:p>
+            <a:pPr>
+              <a:buFontTx/>
+              <a:buChar char="-"/>
+            </a:pPr>
+            <a:r>
+              <a:rPr lang="ja-JP" altLang="en-US" dirty="0"/>
+              <a:t>コードを書くスピードが上がる</a:t>
+            </a:r>
+            <a:endParaRPr lang="en-US" altLang="ja-JP" dirty="0"/>
           </a:p>
         </p:txBody>
       </p:sp>
@@ -4929,7 +5829,7 @@
           <p:cNvPr id="5" name="スライド番号プレースホルダー 4">
             <a:extLst>
               <a:ext uri="{FF2B5EF4-FFF2-40B4-BE49-F238E27FC236}">
-                <a16:creationId xmlns:a16="http://schemas.microsoft.com/office/drawing/2014/main" id="{4D897C1E-210D-40AA-B1A3-6D30B53F200F}"/>
+                <a16:creationId xmlns:a16="http://schemas.microsoft.com/office/drawing/2014/main" id="{98BECDDE-B0F3-4E94-98E7-3B7862DCC91E}"/>
               </a:ext>
             </a:extLst>
           </p:cNvPr>
@@ -4957,7 +5857,7 @@
     </p:spTree>
     <p:extLst>
       <p:ext uri="{BB962C8B-B14F-4D97-AF65-F5344CB8AC3E}">
-        <p14:creationId xmlns:p14="http://schemas.microsoft.com/office/powerpoint/2010/main" val="107592700"/>
+        <p14:creationId xmlns:p14="http://schemas.microsoft.com/office/powerpoint/2010/main" val="3326139796"/>
       </p:ext>
     </p:extLst>
   </p:cSld>
@@ -4989,7 +5889,7 @@
           <p:cNvPr id="2" name="タイトル 1">
             <a:extLst>
               <a:ext uri="{FF2B5EF4-FFF2-40B4-BE49-F238E27FC236}">
-                <a16:creationId xmlns:a16="http://schemas.microsoft.com/office/drawing/2014/main" id="{8F0D12C3-4CDC-4F57-9D7E-A2DB95866AE8}"/>
+                <a16:creationId xmlns:a16="http://schemas.microsoft.com/office/drawing/2014/main" id="{B5A512A7-A58C-4D08-84CB-45DBCE5FE4B3}"/>
               </a:ext>
             </a:extLst>
           </p:cNvPr>
@@ -5007,7 +5907,7 @@
           <a:p>
             <a:r>
               <a:rPr lang="en-US" dirty="0"/>
-              <a:t>Summary</a:t>
+              <a:t>Rule of variable name</a:t>
             </a:r>
           </a:p>
         </p:txBody>
@@ -5017,7 +5917,7 @@
           <p:cNvPr id="3" name="コンテンツ プレースホルダー 2">
             <a:extLst>
               <a:ext uri="{FF2B5EF4-FFF2-40B4-BE49-F238E27FC236}">
-                <a16:creationId xmlns:a16="http://schemas.microsoft.com/office/drawing/2014/main" id="{9CD5CAFA-55C1-4CBE-B983-ACB13AC199C5}"/>
+                <a16:creationId xmlns:a16="http://schemas.microsoft.com/office/drawing/2014/main" id="{F2C69D69-CC93-476C-915C-B693A69400EA}"/>
               </a:ext>
             </a:extLst>
           </p:cNvPr>
@@ -5028,12 +5928,54 @@
             <p:ph idx="1"/>
           </p:nvPr>
         </p:nvSpPr>
-        <p:spPr/>
-        <p:txBody>
-          <a:bodyPr/>
-          <a:lstStyle/>
-          <a:p>
-            <a:endParaRPr lang="en-US"/>
+        <p:spPr>
+          <a:xfrm>
+            <a:off x="628650" y="1825625"/>
+            <a:ext cx="7886700" cy="4351338"/>
+          </a:xfrm>
+        </p:spPr>
+        <p:txBody>
+          <a:bodyPr/>
+          <a:lstStyle/>
+          <a:p>
+            <a:pPr marL="0" indent="0">
+              <a:buNone/>
+            </a:pPr>
+            <a:r>
+              <a:rPr lang="ja-JP" altLang="en-US" dirty="0"/>
+              <a:t>分かりやすい変数名の基準</a:t>
+            </a:r>
+            <a:endParaRPr lang="en-US" altLang="ja-JP" dirty="0"/>
+          </a:p>
+          <a:p>
+            <a:pPr marL="514350" indent="-514350">
+              <a:buAutoNum type="arabicPeriod"/>
+            </a:pPr>
+            <a:r>
+              <a:rPr lang="ja-JP" altLang="en-US" dirty="0"/>
+              <a:t>変数を見れば何を表しているかわかる</a:t>
+            </a:r>
+            <a:endParaRPr lang="en-US" altLang="ja-JP" dirty="0"/>
+          </a:p>
+          <a:p>
+            <a:pPr marL="514350" indent="-514350">
+              <a:buAutoNum type="arabicPeriod"/>
+            </a:pPr>
+            <a:r>
+              <a:rPr lang="ja-JP" altLang="en-US" dirty="0"/>
+              <a:t>変数の表記が統一されている</a:t>
+            </a:r>
+            <a:endParaRPr lang="en-US" altLang="ja-JP" dirty="0"/>
+          </a:p>
+          <a:p>
+            <a:pPr marL="514350" indent="-514350">
+              <a:buAutoNum type="arabicPeriod"/>
+            </a:pPr>
+            <a:r>
+              <a:rPr lang="ja-JP" altLang="en-US" dirty="0"/>
+              <a:t>データの型と名前のイメージが直観的に合っている</a:t>
+            </a:r>
+            <a:endParaRPr lang="en-US" altLang="ja-JP" dirty="0"/>
           </a:p>
         </p:txBody>
       </p:sp>
@@ -5042,7 +5984,7 @@
           <p:cNvPr id="5" name="スライド番号プレースホルダー 4">
             <a:extLst>
               <a:ext uri="{FF2B5EF4-FFF2-40B4-BE49-F238E27FC236}">
-                <a16:creationId xmlns:a16="http://schemas.microsoft.com/office/drawing/2014/main" id="{EF72F589-D9F4-40B5-BFD0-A9881E9136BC}"/>
+                <a16:creationId xmlns:a16="http://schemas.microsoft.com/office/drawing/2014/main" id="{98BECDDE-B0F3-4E94-98E7-3B7862DCC91E}"/>
               </a:ext>
             </a:extLst>
           </p:cNvPr>
@@ -5070,7 +6012,7 @@
     </p:spTree>
     <p:extLst>
       <p:ext uri="{BB962C8B-B14F-4D97-AF65-F5344CB8AC3E}">
-        <p14:creationId xmlns:p14="http://schemas.microsoft.com/office/powerpoint/2010/main" val="3274883772"/>
+        <p14:creationId xmlns:p14="http://schemas.microsoft.com/office/powerpoint/2010/main" val="2615326715"/>
       </p:ext>
     </p:extLst>
   </p:cSld>
@@ -5102,7 +6044,7 @@
           <p:cNvPr id="2" name="タイトル 1">
             <a:extLst>
               <a:ext uri="{FF2B5EF4-FFF2-40B4-BE49-F238E27FC236}">
-                <a16:creationId xmlns:a16="http://schemas.microsoft.com/office/drawing/2014/main" id="{1532B8A9-CC3C-4755-A0C2-83191887A59F}"/>
+                <a16:creationId xmlns:a16="http://schemas.microsoft.com/office/drawing/2014/main" id="{B5A512A7-A58C-4D08-84CB-45DBCE5FE4B3}"/>
               </a:ext>
             </a:extLst>
           </p:cNvPr>
@@ -5120,7 +6062,7 @@
           <a:p>
             <a:r>
               <a:rPr lang="en-US" dirty="0"/>
-              <a:t>References</a:t>
+              <a:t>Rule of variable name</a:t>
             </a:r>
           </a:p>
         </p:txBody>
@@ -5130,7 +6072,7 @@
           <p:cNvPr id="3" name="コンテンツ プレースホルダー 2">
             <a:extLst>
               <a:ext uri="{FF2B5EF4-FFF2-40B4-BE49-F238E27FC236}">
-                <a16:creationId xmlns:a16="http://schemas.microsoft.com/office/drawing/2014/main" id="{0CFB61A8-0A55-494F-96FA-020C659922F5}"/>
+                <a16:creationId xmlns:a16="http://schemas.microsoft.com/office/drawing/2014/main" id="{F2C69D69-CC93-476C-915C-B693A69400EA}"/>
               </a:ext>
             </a:extLst>
           </p:cNvPr>
@@ -5141,29 +6083,40 @@
             <p:ph idx="1"/>
           </p:nvPr>
         </p:nvSpPr>
-        <p:spPr/>
-        <p:txBody>
-          <a:bodyPr/>
-          <a:lstStyle/>
-          <a:p>
+        <p:spPr>
+          <a:xfrm>
+            <a:off x="628650" y="1825625"/>
+            <a:ext cx="7886700" cy="1739611"/>
+          </a:xfrm>
+        </p:spPr>
+        <p:txBody>
+          <a:bodyPr/>
+          <a:lstStyle/>
+          <a:p>
+            <a:pPr marL="514350" indent="-514350">
+              <a:buAutoNum type="arabicPeriod"/>
+            </a:pPr>
             <a:r>
               <a:rPr lang="ja-JP" altLang="en-US" dirty="0"/>
-              <a:t>演算子について</a:t>
+              <a:t>変数を見れば何を表しているかわかる</a:t>
             </a:r>
             <a:endParaRPr lang="en-US" altLang="ja-JP" dirty="0"/>
           </a:p>
           <a:p>
-            <a:pPr lvl="1"/>
-            <a:r>
-              <a:rPr lang="en-US" dirty="0">
-                <a:hlinkClick r:id="rId2"/>
-              </a:rPr>
-              <a:t>https://atmarkit.itmedia.co.jp/ait/articles/1907/23/news010.html</a:t>
-            </a:r>
-            <a:endParaRPr lang="en-US" dirty="0"/>
-          </a:p>
-          <a:p>
-            <a:endParaRPr lang="en-US" dirty="0"/>
+            <a:pPr marL="0" indent="0">
+              <a:buNone/>
+            </a:pPr>
+            <a:endParaRPr lang="en-US" altLang="ja-JP" dirty="0"/>
+          </a:p>
+          <a:p>
+            <a:pPr marL="0" indent="0">
+              <a:buNone/>
+            </a:pPr>
+            <a:r>
+              <a:rPr lang="ja-JP" altLang="en-US" dirty="0"/>
+              <a:t>英語で表記する</a:t>
+            </a:r>
+            <a:endParaRPr lang="en-US" altLang="ja-JP" dirty="0"/>
           </a:p>
         </p:txBody>
       </p:sp>
@@ -5172,7 +6125,7 @@
           <p:cNvPr id="5" name="スライド番号プレースホルダー 4">
             <a:extLst>
               <a:ext uri="{FF2B5EF4-FFF2-40B4-BE49-F238E27FC236}">
-                <a16:creationId xmlns:a16="http://schemas.microsoft.com/office/drawing/2014/main" id="{D1D09D41-F574-4AE8-B82D-35FD724EA6EA}"/>
+                <a16:creationId xmlns:a16="http://schemas.microsoft.com/office/drawing/2014/main" id="{98BECDDE-B0F3-4E94-98E7-3B7862DCC91E}"/>
               </a:ext>
             </a:extLst>
           </p:cNvPr>
@@ -5197,10 +6150,82 @@
           </a:p>
         </p:txBody>
       </p:sp>
+      <p:sp>
+        <p:nvSpPr>
+          <p:cNvPr id="4" name="テキスト ボックス 3">
+            <a:extLst>
+              <a:ext uri="{FF2B5EF4-FFF2-40B4-BE49-F238E27FC236}">
+                <a16:creationId xmlns:a16="http://schemas.microsoft.com/office/drawing/2014/main" id="{AB2CB0A3-176D-4778-BD6F-1233FBC5B707}"/>
+              </a:ext>
+            </a:extLst>
+          </p:cNvPr>
+          <p:cNvSpPr txBox="1"/>
+          <p:nvPr/>
+        </p:nvSpPr>
+        <p:spPr>
+          <a:xfrm>
+            <a:off x="1657351" y="3550023"/>
+            <a:ext cx="2161309" cy="523220"/>
+          </a:xfrm>
+          <a:prstGeom prst="rect">
+            <a:avLst/>
+          </a:prstGeom>
+          <a:noFill/>
+        </p:spPr>
+        <p:txBody>
+          <a:bodyPr wrap="square" rtlCol="0">
+            <a:spAutoFit/>
+          </a:bodyPr>
+          <a:lstStyle/>
+          <a:p>
+            <a:pPr algn="ctr"/>
+            <a:r>
+              <a:rPr lang="en-US" sz="2800" dirty="0"/>
+              <a:t>Good</a:t>
+            </a:r>
+          </a:p>
+        </p:txBody>
+      </p:sp>
+      <p:sp>
+        <p:nvSpPr>
+          <p:cNvPr id="6" name="テキスト ボックス 5">
+            <a:extLst>
+              <a:ext uri="{FF2B5EF4-FFF2-40B4-BE49-F238E27FC236}">
+                <a16:creationId xmlns:a16="http://schemas.microsoft.com/office/drawing/2014/main" id="{CA40C035-702F-4CFC-AB41-C4D9D60D9613}"/>
+              </a:ext>
+            </a:extLst>
+          </p:cNvPr>
+          <p:cNvSpPr txBox="1"/>
+          <p:nvPr/>
+        </p:nvSpPr>
+        <p:spPr>
+          <a:xfrm>
+            <a:off x="5325341" y="3548396"/>
+            <a:ext cx="2161309" cy="523220"/>
+          </a:xfrm>
+          <a:prstGeom prst="rect">
+            <a:avLst/>
+          </a:prstGeom>
+          <a:noFill/>
+        </p:spPr>
+        <p:txBody>
+          <a:bodyPr wrap="square" rtlCol="0">
+            <a:spAutoFit/>
+          </a:bodyPr>
+          <a:lstStyle/>
+          <a:p>
+            <a:pPr algn="ctr"/>
+            <a:r>
+              <a:rPr lang="en-US" sz="2800" dirty="0"/>
+              <a:t>Bad</a:t>
+            </a:r>
+          </a:p>
+        </p:txBody>
+      </p:sp>
     </p:spTree>
     <p:extLst>
       <p:ext uri="{BB962C8B-B14F-4D97-AF65-F5344CB8AC3E}">
-        <p14:creationId xmlns:p14="http://schemas.microsoft.com/office/powerpoint/2010/main" val="532900966"/>
+        <p14:creationId xmlns:p14="http://schemas.microsoft.com/office/powerpoint/2010/main" val="2377584265"/>
       </p:ext>
     </p:extLst>
   </p:cSld>
@@ -5232,7 +6257,7 @@
           <p:cNvPr id="2" name="タイトル 1">
             <a:extLst>
               <a:ext uri="{FF2B5EF4-FFF2-40B4-BE49-F238E27FC236}">
-                <a16:creationId xmlns:a16="http://schemas.microsoft.com/office/drawing/2014/main" id="{F841434E-D430-4496-8D5B-CE28B163C746}"/>
+                <a16:creationId xmlns:a16="http://schemas.microsoft.com/office/drawing/2014/main" id="{B5A512A7-A58C-4D08-84CB-45DBCE5FE4B3}"/>
               </a:ext>
             </a:extLst>
           </p:cNvPr>
@@ -5250,7 +6275,7 @@
           <a:p>
             <a:r>
               <a:rPr lang="en-US" dirty="0"/>
-              <a:t>Bonus Contents</a:t>
+              <a:t>Rule of variable name</a:t>
             </a:r>
           </a:p>
         </p:txBody>
@@ -5260,7 +6285,7 @@
           <p:cNvPr id="3" name="コンテンツ プレースホルダー 2">
             <a:extLst>
               <a:ext uri="{FF2B5EF4-FFF2-40B4-BE49-F238E27FC236}">
-                <a16:creationId xmlns:a16="http://schemas.microsoft.com/office/drawing/2014/main" id="{2551BBAA-5F75-41A1-852A-257BAF35910B}"/>
+                <a16:creationId xmlns:a16="http://schemas.microsoft.com/office/drawing/2014/main" id="{F2C69D69-CC93-476C-915C-B693A69400EA}"/>
               </a:ext>
             </a:extLst>
           </p:cNvPr>
@@ -5271,63 +6296,96 @@
             <p:ph idx="1"/>
           </p:nvPr>
         </p:nvSpPr>
-        <p:spPr/>
-        <p:txBody>
-          <a:bodyPr/>
-          <a:lstStyle/>
-          <a:p>
-            <a:r>
-              <a:rPr lang="en-US" dirty="0" err="1"/>
-              <a:t>AtCoder</a:t>
-            </a:r>
-            <a:endParaRPr lang="en-US" dirty="0"/>
-          </a:p>
-          <a:p>
-            <a:pPr lvl="1"/>
-            <a:r>
-              <a:rPr lang="en-US" dirty="0">
-                <a:hlinkClick r:id="rId2"/>
-              </a:rPr>
-              <a:t>https://atcoder.jp/?lang=ja</a:t>
-            </a:r>
-            <a:endParaRPr lang="en-US" dirty="0"/>
-          </a:p>
-          <a:p>
-            <a:r>
-              <a:rPr lang="en-US" dirty="0" err="1"/>
-              <a:t>CodinGame</a:t>
-            </a:r>
-            <a:endParaRPr lang="en-US" dirty="0"/>
-          </a:p>
-          <a:p>
-            <a:pPr lvl="1"/>
-            <a:r>
-              <a:rPr lang="en-US" dirty="0">
-                <a:hlinkClick r:id="rId3"/>
-              </a:rPr>
-              <a:t>https://www.codingame.com/start</a:t>
-            </a:r>
-            <a:endParaRPr lang="en-US" dirty="0"/>
-          </a:p>
-          <a:p>
-            <a:r>
-              <a:rPr lang="en-US" dirty="0" err="1"/>
-              <a:t>Codeforces</a:t>
-            </a:r>
-            <a:endParaRPr lang="en-US" dirty="0"/>
-          </a:p>
-          <a:p>
-            <a:pPr lvl="1"/>
-            <a:r>
-              <a:rPr lang="en-US" dirty="0">
-                <a:hlinkClick r:id="rId4"/>
-              </a:rPr>
-              <a:t>https://codeforces.com/</a:t>
-            </a:r>
-            <a:endParaRPr lang="en-US" dirty="0"/>
-          </a:p>
-          <a:p>
-            <a:endParaRPr lang="en-US" dirty="0"/>
+        <p:spPr>
+          <a:xfrm>
+            <a:off x="628650" y="1825625"/>
+            <a:ext cx="7886700" cy="4530726"/>
+          </a:xfrm>
+        </p:spPr>
+        <p:txBody>
+          <a:bodyPr/>
+          <a:lstStyle/>
+          <a:p>
+            <a:pPr marL="514350" indent="-514350">
+              <a:buFont typeface="+mj-lt"/>
+              <a:buAutoNum type="arabicPeriod" startAt="2"/>
+            </a:pPr>
+            <a:r>
+              <a:rPr lang="ja-JP" altLang="en-US" dirty="0"/>
+              <a:t>変数の表記が統一されている</a:t>
+            </a:r>
+            <a:endParaRPr lang="en-US" altLang="ja-JP" dirty="0"/>
+          </a:p>
+          <a:p>
+            <a:pPr marL="0" indent="0">
+              <a:buNone/>
+            </a:pPr>
+            <a:endParaRPr lang="en-US" altLang="ja-JP" dirty="0"/>
+          </a:p>
+          <a:p>
+            <a:pPr marL="0" indent="0">
+              <a:buNone/>
+            </a:pPr>
+            <a:r>
+              <a:rPr lang="ja-JP" altLang="en-US" dirty="0"/>
+              <a:t>表記の種類</a:t>
+            </a:r>
+            <a:endParaRPr lang="en-US" altLang="ja-JP" dirty="0"/>
+          </a:p>
+          <a:p>
+            <a:pPr>
+              <a:buFontTx/>
+              <a:buChar char="-"/>
+            </a:pPr>
+            <a:r>
+              <a:rPr lang="ja-JP" altLang="en-US" dirty="0"/>
+              <a:t>スネークケース</a:t>
+            </a:r>
+            <a:endParaRPr lang="en-US" altLang="ja-JP" dirty="0"/>
+          </a:p>
+          <a:p>
+            <a:pPr>
+              <a:buFontTx/>
+              <a:buChar char="-"/>
+            </a:pPr>
+            <a:r>
+              <a:rPr lang="ja-JP" altLang="en-US" dirty="0"/>
+              <a:t>キャメルケース</a:t>
+            </a:r>
+            <a:r>
+              <a:rPr lang="en-US" altLang="ja-JP" dirty="0"/>
+              <a:t>(</a:t>
+            </a:r>
+            <a:r>
+              <a:rPr lang="ja-JP" altLang="en-US" dirty="0"/>
+              <a:t>ローワーキャメル</a:t>
+            </a:r>
+            <a:r>
+              <a:rPr lang="en-US" altLang="ja-JP" dirty="0"/>
+              <a:t>)</a:t>
+            </a:r>
+          </a:p>
+          <a:p>
+            <a:pPr>
+              <a:buFontTx/>
+              <a:buChar char="-"/>
+            </a:pPr>
+            <a:r>
+              <a:rPr lang="ja-JP" altLang="en-US" dirty="0"/>
+              <a:t>パスカルケース</a:t>
+            </a:r>
+            <a:r>
+              <a:rPr lang="en-US" altLang="ja-JP" dirty="0"/>
+              <a:t>(</a:t>
+            </a:r>
+            <a:r>
+              <a:rPr lang="ja-JP" altLang="en-US" dirty="0"/>
+              <a:t>アッパーキャメル</a:t>
+            </a:r>
+            <a:r>
+              <a:rPr lang="en-US" altLang="ja-JP" dirty="0"/>
+              <a:t>)</a:t>
+            </a:r>
           </a:p>
         </p:txBody>
       </p:sp>
@@ -5336,7 +6394,7 @@
           <p:cNvPr id="5" name="スライド番号プレースホルダー 4">
             <a:extLst>
               <a:ext uri="{FF2B5EF4-FFF2-40B4-BE49-F238E27FC236}">
-                <a16:creationId xmlns:a16="http://schemas.microsoft.com/office/drawing/2014/main" id="{158938BA-66FF-472E-8C9A-66E7F1533947}"/>
+                <a16:creationId xmlns:a16="http://schemas.microsoft.com/office/drawing/2014/main" id="{98BECDDE-B0F3-4E94-98E7-3B7862DCC91E}"/>
               </a:ext>
             </a:extLst>
           </p:cNvPr>
@@ -5364,7 +6422,7 @@
     </p:spTree>
     <p:extLst>
       <p:ext uri="{BB962C8B-B14F-4D97-AF65-F5344CB8AC3E}">
-        <p14:creationId xmlns:p14="http://schemas.microsoft.com/office/powerpoint/2010/main" val="1464208581"/>
+        <p14:creationId xmlns:p14="http://schemas.microsoft.com/office/powerpoint/2010/main" val="3277742363"/>
       </p:ext>
     </p:extLst>
   </p:cSld>
@@ -5478,6 +6536,1261 @@
     <p:extLst>
       <p:ext uri="{BB962C8B-B14F-4D97-AF65-F5344CB8AC3E}">
         <p14:creationId xmlns:p14="http://schemas.microsoft.com/office/powerpoint/2010/main" val="1437990430"/>
+      </p:ext>
+    </p:extLst>
+  </p:cSld>
+  <p:clrMapOvr>
+    <a:masterClrMapping/>
+  </p:clrMapOvr>
+</p:sld>
+</file>
+
+<file path=ppt/slides/slide20.xml><?xml version="1.0" encoding="utf-8"?>
+<p:sld xmlns:a="http://schemas.openxmlformats.org/drawingml/2006/main" xmlns:r="http://schemas.openxmlformats.org/officeDocument/2006/relationships" xmlns:p="http://schemas.openxmlformats.org/presentationml/2006/main">
+  <p:cSld>
+    <p:spTree>
+      <p:nvGrpSpPr>
+        <p:cNvPr id="1" name=""/>
+        <p:cNvGrpSpPr/>
+        <p:nvPr/>
+      </p:nvGrpSpPr>
+      <p:grpSpPr>
+        <a:xfrm>
+          <a:off x="0" y="0"/>
+          <a:ext cx="0" cy="0"/>
+          <a:chOff x="0" y="0"/>
+          <a:chExt cx="0" cy="0"/>
+        </a:xfrm>
+      </p:grpSpPr>
+      <p:sp>
+        <p:nvSpPr>
+          <p:cNvPr id="2" name="タイトル 1">
+            <a:extLst>
+              <a:ext uri="{FF2B5EF4-FFF2-40B4-BE49-F238E27FC236}">
+                <a16:creationId xmlns:a16="http://schemas.microsoft.com/office/drawing/2014/main" id="{B5A512A7-A58C-4D08-84CB-45DBCE5FE4B3}"/>
+              </a:ext>
+            </a:extLst>
+          </p:cNvPr>
+          <p:cNvSpPr>
+            <a:spLocks noGrp="1"/>
+          </p:cNvSpPr>
+          <p:nvPr>
+            <p:ph type="title"/>
+          </p:nvPr>
+        </p:nvSpPr>
+        <p:spPr/>
+        <p:txBody>
+          <a:bodyPr/>
+          <a:lstStyle/>
+          <a:p>
+            <a:r>
+              <a:rPr lang="en-US" dirty="0"/>
+              <a:t>Rule of variable name</a:t>
+            </a:r>
+          </a:p>
+        </p:txBody>
+      </p:sp>
+      <p:sp>
+        <p:nvSpPr>
+          <p:cNvPr id="3" name="コンテンツ プレースホルダー 2">
+            <a:extLst>
+              <a:ext uri="{FF2B5EF4-FFF2-40B4-BE49-F238E27FC236}">
+                <a16:creationId xmlns:a16="http://schemas.microsoft.com/office/drawing/2014/main" id="{F2C69D69-CC93-476C-915C-B693A69400EA}"/>
+              </a:ext>
+            </a:extLst>
+          </p:cNvPr>
+          <p:cNvSpPr>
+            <a:spLocks noGrp="1"/>
+          </p:cNvSpPr>
+          <p:nvPr>
+            <p:ph idx="1"/>
+          </p:nvPr>
+        </p:nvSpPr>
+        <p:spPr>
+          <a:xfrm>
+            <a:off x="628650" y="1825625"/>
+            <a:ext cx="7886700" cy="1325563"/>
+          </a:xfrm>
+        </p:spPr>
+        <p:txBody>
+          <a:bodyPr/>
+          <a:lstStyle/>
+          <a:p>
+            <a:pPr marL="514350" indent="-514350">
+              <a:buFont typeface="+mj-lt"/>
+              <a:buAutoNum type="arabicPeriod" startAt="2"/>
+            </a:pPr>
+            <a:r>
+              <a:rPr lang="ja-JP" altLang="en-US" dirty="0"/>
+              <a:t>変数の表記が統一されている</a:t>
+            </a:r>
+            <a:endParaRPr lang="en-US" altLang="ja-JP" dirty="0"/>
+          </a:p>
+        </p:txBody>
+      </p:sp>
+      <p:sp>
+        <p:nvSpPr>
+          <p:cNvPr id="5" name="スライド番号プレースホルダー 4">
+            <a:extLst>
+              <a:ext uri="{FF2B5EF4-FFF2-40B4-BE49-F238E27FC236}">
+                <a16:creationId xmlns:a16="http://schemas.microsoft.com/office/drawing/2014/main" id="{98BECDDE-B0F3-4E94-98E7-3B7862DCC91E}"/>
+              </a:ext>
+            </a:extLst>
+          </p:cNvPr>
+          <p:cNvSpPr>
+            <a:spLocks noGrp="1"/>
+          </p:cNvSpPr>
+          <p:nvPr>
+            <p:ph type="sldNum" sz="quarter" idx="12"/>
+          </p:nvPr>
+        </p:nvSpPr>
+        <p:spPr/>
+        <p:txBody>
+          <a:bodyPr/>
+          <a:lstStyle/>
+          <a:p>
+            <a:fld id="{F9AE1A6C-155A-45B5-BF6F-8FA332E74381}" type="slidenum">
+              <a:rPr lang="en-US" smtClean="0"/>
+              <a:pPr/>
+              <a:t>19</a:t>
+            </a:fld>
+            <a:endParaRPr lang="en-US" dirty="0"/>
+          </a:p>
+        </p:txBody>
+      </p:sp>
+      <p:sp>
+        <p:nvSpPr>
+          <p:cNvPr id="6" name="テキスト ボックス 5">
+            <a:extLst>
+              <a:ext uri="{FF2B5EF4-FFF2-40B4-BE49-F238E27FC236}">
+                <a16:creationId xmlns:a16="http://schemas.microsoft.com/office/drawing/2014/main" id="{4F074C48-5ACB-43A9-97F3-B1DE8350E339}"/>
+              </a:ext>
+            </a:extLst>
+          </p:cNvPr>
+          <p:cNvSpPr txBox="1"/>
+          <p:nvPr/>
+        </p:nvSpPr>
+        <p:spPr>
+          <a:xfrm>
+            <a:off x="1657351" y="3550023"/>
+            <a:ext cx="2161309" cy="523220"/>
+          </a:xfrm>
+          <a:prstGeom prst="rect">
+            <a:avLst/>
+          </a:prstGeom>
+          <a:noFill/>
+        </p:spPr>
+        <p:txBody>
+          <a:bodyPr wrap="square" rtlCol="0">
+            <a:spAutoFit/>
+          </a:bodyPr>
+          <a:lstStyle/>
+          <a:p>
+            <a:pPr algn="ctr"/>
+            <a:r>
+              <a:rPr lang="en-US" sz="2800" dirty="0"/>
+              <a:t>Good</a:t>
+            </a:r>
+          </a:p>
+        </p:txBody>
+      </p:sp>
+      <p:sp>
+        <p:nvSpPr>
+          <p:cNvPr id="7" name="テキスト ボックス 6">
+            <a:extLst>
+              <a:ext uri="{FF2B5EF4-FFF2-40B4-BE49-F238E27FC236}">
+                <a16:creationId xmlns:a16="http://schemas.microsoft.com/office/drawing/2014/main" id="{49E33A4B-183F-4892-BEFC-E1E1DE37E8C2}"/>
+              </a:ext>
+            </a:extLst>
+          </p:cNvPr>
+          <p:cNvSpPr txBox="1"/>
+          <p:nvPr/>
+        </p:nvSpPr>
+        <p:spPr>
+          <a:xfrm>
+            <a:off x="5325341" y="3548396"/>
+            <a:ext cx="2161309" cy="523220"/>
+          </a:xfrm>
+          <a:prstGeom prst="rect">
+            <a:avLst/>
+          </a:prstGeom>
+          <a:noFill/>
+        </p:spPr>
+        <p:txBody>
+          <a:bodyPr wrap="square" rtlCol="0">
+            <a:spAutoFit/>
+          </a:bodyPr>
+          <a:lstStyle/>
+          <a:p>
+            <a:pPr algn="ctr"/>
+            <a:r>
+              <a:rPr lang="en-US" sz="2800" dirty="0"/>
+              <a:t>Bad</a:t>
+            </a:r>
+          </a:p>
+        </p:txBody>
+      </p:sp>
+    </p:spTree>
+    <p:extLst>
+      <p:ext uri="{BB962C8B-B14F-4D97-AF65-F5344CB8AC3E}">
+        <p14:creationId xmlns:p14="http://schemas.microsoft.com/office/powerpoint/2010/main" val="3587693506"/>
+      </p:ext>
+    </p:extLst>
+  </p:cSld>
+  <p:clrMapOvr>
+    <a:masterClrMapping/>
+  </p:clrMapOvr>
+</p:sld>
+</file>
+
+<file path=ppt/slides/slide21.xml><?xml version="1.0" encoding="utf-8"?>
+<p:sld xmlns:a="http://schemas.openxmlformats.org/drawingml/2006/main" xmlns:r="http://schemas.openxmlformats.org/officeDocument/2006/relationships" xmlns:p="http://schemas.openxmlformats.org/presentationml/2006/main">
+  <p:cSld>
+    <p:spTree>
+      <p:nvGrpSpPr>
+        <p:cNvPr id="1" name=""/>
+        <p:cNvGrpSpPr/>
+        <p:nvPr/>
+      </p:nvGrpSpPr>
+      <p:grpSpPr>
+        <a:xfrm>
+          <a:off x="0" y="0"/>
+          <a:ext cx="0" cy="0"/>
+          <a:chOff x="0" y="0"/>
+          <a:chExt cx="0" cy="0"/>
+        </a:xfrm>
+      </p:grpSpPr>
+      <p:sp>
+        <p:nvSpPr>
+          <p:cNvPr id="2" name="タイトル 1">
+            <a:extLst>
+              <a:ext uri="{FF2B5EF4-FFF2-40B4-BE49-F238E27FC236}">
+                <a16:creationId xmlns:a16="http://schemas.microsoft.com/office/drawing/2014/main" id="{B5A512A7-A58C-4D08-84CB-45DBCE5FE4B3}"/>
+              </a:ext>
+            </a:extLst>
+          </p:cNvPr>
+          <p:cNvSpPr>
+            <a:spLocks noGrp="1"/>
+          </p:cNvSpPr>
+          <p:nvPr>
+            <p:ph type="title"/>
+          </p:nvPr>
+        </p:nvSpPr>
+        <p:spPr/>
+        <p:txBody>
+          <a:bodyPr/>
+          <a:lstStyle/>
+          <a:p>
+            <a:r>
+              <a:rPr lang="en-US" dirty="0"/>
+              <a:t>Rule of variable name</a:t>
+            </a:r>
+          </a:p>
+        </p:txBody>
+      </p:sp>
+      <p:sp>
+        <p:nvSpPr>
+          <p:cNvPr id="3" name="コンテンツ プレースホルダー 2">
+            <a:extLst>
+              <a:ext uri="{FF2B5EF4-FFF2-40B4-BE49-F238E27FC236}">
+                <a16:creationId xmlns:a16="http://schemas.microsoft.com/office/drawing/2014/main" id="{F2C69D69-CC93-476C-915C-B693A69400EA}"/>
+              </a:ext>
+            </a:extLst>
+          </p:cNvPr>
+          <p:cNvSpPr>
+            <a:spLocks noGrp="1"/>
+          </p:cNvSpPr>
+          <p:nvPr>
+            <p:ph idx="1"/>
+          </p:nvPr>
+        </p:nvSpPr>
+        <p:spPr>
+          <a:xfrm>
+            <a:off x="628650" y="1825625"/>
+            <a:ext cx="7886700" cy="4351338"/>
+          </a:xfrm>
+        </p:spPr>
+        <p:txBody>
+          <a:bodyPr/>
+          <a:lstStyle/>
+          <a:p>
+            <a:pPr marL="514350" indent="-514350">
+              <a:buFont typeface="+mj-lt"/>
+              <a:buAutoNum type="arabicPeriod" startAt="3"/>
+            </a:pPr>
+            <a:r>
+              <a:rPr lang="ja-JP" altLang="en-US" dirty="0"/>
+              <a:t>データの型と名前のイメージが直観的に合っている</a:t>
+            </a:r>
+            <a:endParaRPr lang="en-US" altLang="ja-JP" dirty="0"/>
+          </a:p>
+        </p:txBody>
+      </p:sp>
+      <p:sp>
+        <p:nvSpPr>
+          <p:cNvPr id="5" name="スライド番号プレースホルダー 4">
+            <a:extLst>
+              <a:ext uri="{FF2B5EF4-FFF2-40B4-BE49-F238E27FC236}">
+                <a16:creationId xmlns:a16="http://schemas.microsoft.com/office/drawing/2014/main" id="{98BECDDE-B0F3-4E94-98E7-3B7862DCC91E}"/>
+              </a:ext>
+            </a:extLst>
+          </p:cNvPr>
+          <p:cNvSpPr>
+            <a:spLocks noGrp="1"/>
+          </p:cNvSpPr>
+          <p:nvPr>
+            <p:ph type="sldNum" sz="quarter" idx="12"/>
+          </p:nvPr>
+        </p:nvSpPr>
+        <p:spPr/>
+        <p:txBody>
+          <a:bodyPr/>
+          <a:lstStyle/>
+          <a:p>
+            <a:fld id="{F9AE1A6C-155A-45B5-BF6F-8FA332E74381}" type="slidenum">
+              <a:rPr lang="en-US" smtClean="0"/>
+              <a:pPr/>
+              <a:t>20</a:t>
+            </a:fld>
+            <a:endParaRPr lang="en-US" dirty="0"/>
+          </a:p>
+        </p:txBody>
+      </p:sp>
+      <p:sp>
+        <p:nvSpPr>
+          <p:cNvPr id="6" name="テキスト ボックス 5">
+            <a:extLst>
+              <a:ext uri="{FF2B5EF4-FFF2-40B4-BE49-F238E27FC236}">
+                <a16:creationId xmlns:a16="http://schemas.microsoft.com/office/drawing/2014/main" id="{718489C7-AFBE-441C-8E86-AB3292A4EDE7}"/>
+              </a:ext>
+            </a:extLst>
+          </p:cNvPr>
+          <p:cNvSpPr txBox="1"/>
+          <p:nvPr/>
+        </p:nvSpPr>
+        <p:spPr>
+          <a:xfrm>
+            <a:off x="1657351" y="3550023"/>
+            <a:ext cx="2161309" cy="523220"/>
+          </a:xfrm>
+          <a:prstGeom prst="rect">
+            <a:avLst/>
+          </a:prstGeom>
+          <a:noFill/>
+        </p:spPr>
+        <p:txBody>
+          <a:bodyPr wrap="square" rtlCol="0">
+            <a:spAutoFit/>
+          </a:bodyPr>
+          <a:lstStyle/>
+          <a:p>
+            <a:pPr algn="ctr"/>
+            <a:r>
+              <a:rPr lang="en-US" sz="2800" dirty="0"/>
+              <a:t>Good</a:t>
+            </a:r>
+          </a:p>
+        </p:txBody>
+      </p:sp>
+      <p:sp>
+        <p:nvSpPr>
+          <p:cNvPr id="7" name="テキスト ボックス 6">
+            <a:extLst>
+              <a:ext uri="{FF2B5EF4-FFF2-40B4-BE49-F238E27FC236}">
+                <a16:creationId xmlns:a16="http://schemas.microsoft.com/office/drawing/2014/main" id="{844C08F1-E621-4101-9EA3-1915FAA9B2EC}"/>
+              </a:ext>
+            </a:extLst>
+          </p:cNvPr>
+          <p:cNvSpPr txBox="1"/>
+          <p:nvPr/>
+        </p:nvSpPr>
+        <p:spPr>
+          <a:xfrm>
+            <a:off x="5325341" y="3548396"/>
+            <a:ext cx="2161309" cy="523220"/>
+          </a:xfrm>
+          <a:prstGeom prst="rect">
+            <a:avLst/>
+          </a:prstGeom>
+          <a:noFill/>
+        </p:spPr>
+        <p:txBody>
+          <a:bodyPr wrap="square" rtlCol="0">
+            <a:spAutoFit/>
+          </a:bodyPr>
+          <a:lstStyle/>
+          <a:p>
+            <a:pPr algn="ctr"/>
+            <a:r>
+              <a:rPr lang="en-US" sz="2800" dirty="0"/>
+              <a:t>Bad</a:t>
+            </a:r>
+          </a:p>
+        </p:txBody>
+      </p:sp>
+    </p:spTree>
+    <p:extLst>
+      <p:ext uri="{BB962C8B-B14F-4D97-AF65-F5344CB8AC3E}">
+        <p14:creationId xmlns:p14="http://schemas.microsoft.com/office/powerpoint/2010/main" val="986999001"/>
+      </p:ext>
+    </p:extLst>
+  </p:cSld>
+  <p:clrMapOvr>
+    <a:masterClrMapping/>
+  </p:clrMapOvr>
+</p:sld>
+</file>
+
+<file path=ppt/slides/slide22.xml><?xml version="1.0" encoding="utf-8"?>
+<p:sld xmlns:a="http://schemas.openxmlformats.org/drawingml/2006/main" xmlns:r="http://schemas.openxmlformats.org/officeDocument/2006/relationships" xmlns:p="http://schemas.openxmlformats.org/presentationml/2006/main">
+  <p:cSld>
+    <p:spTree>
+      <p:nvGrpSpPr>
+        <p:cNvPr id="1" name=""/>
+        <p:cNvGrpSpPr/>
+        <p:nvPr/>
+      </p:nvGrpSpPr>
+      <p:grpSpPr>
+        <a:xfrm>
+          <a:off x="0" y="0"/>
+          <a:ext cx="0" cy="0"/>
+          <a:chOff x="0" y="0"/>
+          <a:chExt cx="0" cy="0"/>
+        </a:xfrm>
+      </p:grpSpPr>
+      <p:sp>
+        <p:nvSpPr>
+          <p:cNvPr id="2" name="タイトル 1">
+            <a:extLst>
+              <a:ext uri="{FF2B5EF4-FFF2-40B4-BE49-F238E27FC236}">
+                <a16:creationId xmlns:a16="http://schemas.microsoft.com/office/drawing/2014/main" id="{9057BDD7-6E73-4210-B7F6-BF325E8CFBE5}"/>
+              </a:ext>
+            </a:extLst>
+          </p:cNvPr>
+          <p:cNvSpPr>
+            <a:spLocks noGrp="1"/>
+          </p:cNvSpPr>
+          <p:nvPr>
+            <p:ph type="title"/>
+          </p:nvPr>
+        </p:nvSpPr>
+        <p:spPr/>
+        <p:txBody>
+          <a:bodyPr/>
+          <a:lstStyle/>
+          <a:p>
+            <a:r>
+              <a:rPr lang="en-US" dirty="0"/>
+              <a:t>Conditional branch(if)</a:t>
+            </a:r>
+          </a:p>
+        </p:txBody>
+      </p:sp>
+      <p:sp>
+        <p:nvSpPr>
+          <p:cNvPr id="3" name="コンテンツ プレースホルダー 2">
+            <a:extLst>
+              <a:ext uri="{FF2B5EF4-FFF2-40B4-BE49-F238E27FC236}">
+                <a16:creationId xmlns:a16="http://schemas.microsoft.com/office/drawing/2014/main" id="{0D2DC0C9-A8B5-41C7-B965-B5D51D2A0B4B}"/>
+              </a:ext>
+            </a:extLst>
+          </p:cNvPr>
+          <p:cNvSpPr>
+            <a:spLocks noGrp="1"/>
+          </p:cNvSpPr>
+          <p:nvPr>
+            <p:ph idx="1"/>
+          </p:nvPr>
+        </p:nvSpPr>
+        <p:spPr/>
+        <p:txBody>
+          <a:bodyPr/>
+          <a:lstStyle/>
+          <a:p>
+            <a:endParaRPr lang="en-US" dirty="0"/>
+          </a:p>
+        </p:txBody>
+      </p:sp>
+      <p:sp>
+        <p:nvSpPr>
+          <p:cNvPr id="5" name="スライド番号プレースホルダー 4">
+            <a:extLst>
+              <a:ext uri="{FF2B5EF4-FFF2-40B4-BE49-F238E27FC236}">
+                <a16:creationId xmlns:a16="http://schemas.microsoft.com/office/drawing/2014/main" id="{0932FD42-5356-46B8-81DE-72A4A93CAA34}"/>
+              </a:ext>
+            </a:extLst>
+          </p:cNvPr>
+          <p:cNvSpPr>
+            <a:spLocks noGrp="1"/>
+          </p:cNvSpPr>
+          <p:nvPr>
+            <p:ph type="sldNum" sz="quarter" idx="12"/>
+          </p:nvPr>
+        </p:nvSpPr>
+        <p:spPr/>
+        <p:txBody>
+          <a:bodyPr/>
+          <a:lstStyle/>
+          <a:p>
+            <a:fld id="{F9AE1A6C-155A-45B5-BF6F-8FA332E74381}" type="slidenum">
+              <a:rPr lang="en-US" smtClean="0"/>
+              <a:pPr/>
+              <a:t>21</a:t>
+            </a:fld>
+            <a:endParaRPr lang="en-US" dirty="0"/>
+          </a:p>
+        </p:txBody>
+      </p:sp>
+    </p:spTree>
+    <p:extLst>
+      <p:ext uri="{BB962C8B-B14F-4D97-AF65-F5344CB8AC3E}">
+        <p14:creationId xmlns:p14="http://schemas.microsoft.com/office/powerpoint/2010/main" val="3452653827"/>
+      </p:ext>
+    </p:extLst>
+  </p:cSld>
+  <p:clrMapOvr>
+    <a:masterClrMapping/>
+  </p:clrMapOvr>
+</p:sld>
+</file>
+
+<file path=ppt/slides/slide23.xml><?xml version="1.0" encoding="utf-8"?>
+<p:sld xmlns:a="http://schemas.openxmlformats.org/drawingml/2006/main" xmlns:r="http://schemas.openxmlformats.org/officeDocument/2006/relationships" xmlns:p="http://schemas.openxmlformats.org/presentationml/2006/main">
+  <p:cSld>
+    <p:spTree>
+      <p:nvGrpSpPr>
+        <p:cNvPr id="1" name=""/>
+        <p:cNvGrpSpPr/>
+        <p:nvPr/>
+      </p:nvGrpSpPr>
+      <p:grpSpPr>
+        <a:xfrm>
+          <a:off x="0" y="0"/>
+          <a:ext cx="0" cy="0"/>
+          <a:chOff x="0" y="0"/>
+          <a:chExt cx="0" cy="0"/>
+        </a:xfrm>
+      </p:grpSpPr>
+      <p:sp>
+        <p:nvSpPr>
+          <p:cNvPr id="2" name="タイトル 1">
+            <a:extLst>
+              <a:ext uri="{FF2B5EF4-FFF2-40B4-BE49-F238E27FC236}">
+                <a16:creationId xmlns:a16="http://schemas.microsoft.com/office/drawing/2014/main" id="{A79A797C-41A1-4F8B-8105-C2ABA5D85AF2}"/>
+              </a:ext>
+            </a:extLst>
+          </p:cNvPr>
+          <p:cNvSpPr>
+            <a:spLocks noGrp="1"/>
+          </p:cNvSpPr>
+          <p:nvPr>
+            <p:ph type="title"/>
+          </p:nvPr>
+        </p:nvSpPr>
+        <p:spPr/>
+        <p:txBody>
+          <a:bodyPr/>
+          <a:lstStyle/>
+          <a:p>
+            <a:r>
+              <a:rPr lang="en-US" dirty="0"/>
+              <a:t>Repeat(for, while)</a:t>
+            </a:r>
+          </a:p>
+        </p:txBody>
+      </p:sp>
+      <p:sp>
+        <p:nvSpPr>
+          <p:cNvPr id="3" name="コンテンツ プレースホルダー 2">
+            <a:extLst>
+              <a:ext uri="{FF2B5EF4-FFF2-40B4-BE49-F238E27FC236}">
+                <a16:creationId xmlns:a16="http://schemas.microsoft.com/office/drawing/2014/main" id="{FE158364-C372-4B49-B871-864989973A92}"/>
+              </a:ext>
+            </a:extLst>
+          </p:cNvPr>
+          <p:cNvSpPr>
+            <a:spLocks noGrp="1"/>
+          </p:cNvSpPr>
+          <p:nvPr>
+            <p:ph idx="1"/>
+          </p:nvPr>
+        </p:nvSpPr>
+        <p:spPr/>
+        <p:txBody>
+          <a:bodyPr/>
+          <a:lstStyle/>
+          <a:p>
+            <a:endParaRPr lang="en-US"/>
+          </a:p>
+        </p:txBody>
+      </p:sp>
+      <p:sp>
+        <p:nvSpPr>
+          <p:cNvPr id="5" name="スライド番号プレースホルダー 4">
+            <a:extLst>
+              <a:ext uri="{FF2B5EF4-FFF2-40B4-BE49-F238E27FC236}">
+                <a16:creationId xmlns:a16="http://schemas.microsoft.com/office/drawing/2014/main" id="{AC27D5E8-9A83-4A09-B5EB-343C26C86426}"/>
+              </a:ext>
+            </a:extLst>
+          </p:cNvPr>
+          <p:cNvSpPr>
+            <a:spLocks noGrp="1"/>
+          </p:cNvSpPr>
+          <p:nvPr>
+            <p:ph type="sldNum" sz="quarter" idx="12"/>
+          </p:nvPr>
+        </p:nvSpPr>
+        <p:spPr/>
+        <p:txBody>
+          <a:bodyPr/>
+          <a:lstStyle/>
+          <a:p>
+            <a:fld id="{F9AE1A6C-155A-45B5-BF6F-8FA332E74381}" type="slidenum">
+              <a:rPr lang="en-US" smtClean="0"/>
+              <a:pPr/>
+              <a:t>22</a:t>
+            </a:fld>
+            <a:endParaRPr lang="en-US" dirty="0"/>
+          </a:p>
+        </p:txBody>
+      </p:sp>
+    </p:spTree>
+    <p:extLst>
+      <p:ext uri="{BB962C8B-B14F-4D97-AF65-F5344CB8AC3E}">
+        <p14:creationId xmlns:p14="http://schemas.microsoft.com/office/powerpoint/2010/main" val="2476710849"/>
+      </p:ext>
+    </p:extLst>
+  </p:cSld>
+  <p:clrMapOvr>
+    <a:masterClrMapping/>
+  </p:clrMapOvr>
+</p:sld>
+</file>
+
+<file path=ppt/slides/slide24.xml><?xml version="1.0" encoding="utf-8"?>
+<p:sld xmlns:a="http://schemas.openxmlformats.org/drawingml/2006/main" xmlns:r="http://schemas.openxmlformats.org/officeDocument/2006/relationships" xmlns:p="http://schemas.openxmlformats.org/presentationml/2006/main">
+  <p:cSld>
+    <p:spTree>
+      <p:nvGrpSpPr>
+        <p:cNvPr id="1" name=""/>
+        <p:cNvGrpSpPr/>
+        <p:nvPr/>
+      </p:nvGrpSpPr>
+      <p:grpSpPr>
+        <a:xfrm>
+          <a:off x="0" y="0"/>
+          <a:ext cx="0" cy="0"/>
+          <a:chOff x="0" y="0"/>
+          <a:chExt cx="0" cy="0"/>
+        </a:xfrm>
+      </p:grpSpPr>
+      <p:sp>
+        <p:nvSpPr>
+          <p:cNvPr id="2" name="タイトル 1">
+            <a:extLst>
+              <a:ext uri="{FF2B5EF4-FFF2-40B4-BE49-F238E27FC236}">
+                <a16:creationId xmlns:a16="http://schemas.microsoft.com/office/drawing/2014/main" id="{F6B36FFF-5648-4E54-83B1-95AB5C7DA3CB}"/>
+              </a:ext>
+            </a:extLst>
+          </p:cNvPr>
+          <p:cNvSpPr>
+            <a:spLocks noGrp="1"/>
+          </p:cNvSpPr>
+          <p:nvPr>
+            <p:ph type="title"/>
+          </p:nvPr>
+        </p:nvSpPr>
+        <p:spPr/>
+        <p:txBody>
+          <a:bodyPr/>
+          <a:lstStyle/>
+          <a:p>
+            <a:r>
+              <a:rPr lang="en-US" dirty="0"/>
+              <a:t>Function</a:t>
+            </a:r>
+          </a:p>
+        </p:txBody>
+      </p:sp>
+      <p:sp>
+        <p:nvSpPr>
+          <p:cNvPr id="3" name="コンテンツ プレースホルダー 2">
+            <a:extLst>
+              <a:ext uri="{FF2B5EF4-FFF2-40B4-BE49-F238E27FC236}">
+                <a16:creationId xmlns:a16="http://schemas.microsoft.com/office/drawing/2014/main" id="{3B3CCD9F-C8A0-4C66-A242-D9F826307A89}"/>
+              </a:ext>
+            </a:extLst>
+          </p:cNvPr>
+          <p:cNvSpPr>
+            <a:spLocks noGrp="1"/>
+          </p:cNvSpPr>
+          <p:nvPr>
+            <p:ph idx="1"/>
+          </p:nvPr>
+        </p:nvSpPr>
+        <p:spPr/>
+        <p:txBody>
+          <a:bodyPr/>
+          <a:lstStyle/>
+          <a:p>
+            <a:endParaRPr lang="en-US"/>
+          </a:p>
+        </p:txBody>
+      </p:sp>
+      <p:sp>
+        <p:nvSpPr>
+          <p:cNvPr id="5" name="スライド番号プレースホルダー 4">
+            <a:extLst>
+              <a:ext uri="{FF2B5EF4-FFF2-40B4-BE49-F238E27FC236}">
+                <a16:creationId xmlns:a16="http://schemas.microsoft.com/office/drawing/2014/main" id="{5AE19A5F-72FC-45C6-A95A-B0D52F671680}"/>
+              </a:ext>
+            </a:extLst>
+          </p:cNvPr>
+          <p:cNvSpPr>
+            <a:spLocks noGrp="1"/>
+          </p:cNvSpPr>
+          <p:nvPr>
+            <p:ph type="sldNum" sz="quarter" idx="12"/>
+          </p:nvPr>
+        </p:nvSpPr>
+        <p:spPr/>
+        <p:txBody>
+          <a:bodyPr/>
+          <a:lstStyle/>
+          <a:p>
+            <a:fld id="{F9AE1A6C-155A-45B5-BF6F-8FA332E74381}" type="slidenum">
+              <a:rPr lang="en-US" smtClean="0"/>
+              <a:pPr/>
+              <a:t>23</a:t>
+            </a:fld>
+            <a:endParaRPr lang="en-US" dirty="0"/>
+          </a:p>
+        </p:txBody>
+      </p:sp>
+    </p:spTree>
+    <p:extLst>
+      <p:ext uri="{BB962C8B-B14F-4D97-AF65-F5344CB8AC3E}">
+        <p14:creationId xmlns:p14="http://schemas.microsoft.com/office/powerpoint/2010/main" val="828934801"/>
+      </p:ext>
+    </p:extLst>
+  </p:cSld>
+  <p:clrMapOvr>
+    <a:masterClrMapping/>
+  </p:clrMapOvr>
+</p:sld>
+</file>
+
+<file path=ppt/slides/slide25.xml><?xml version="1.0" encoding="utf-8"?>
+<p:sld xmlns:a="http://schemas.openxmlformats.org/drawingml/2006/main" xmlns:r="http://schemas.openxmlformats.org/officeDocument/2006/relationships" xmlns:p="http://schemas.openxmlformats.org/presentationml/2006/main">
+  <p:cSld>
+    <p:spTree>
+      <p:nvGrpSpPr>
+        <p:cNvPr id="1" name=""/>
+        <p:cNvGrpSpPr/>
+        <p:nvPr/>
+      </p:nvGrpSpPr>
+      <p:grpSpPr>
+        <a:xfrm>
+          <a:off x="0" y="0"/>
+          <a:ext cx="0" cy="0"/>
+          <a:chOff x="0" y="0"/>
+          <a:chExt cx="0" cy="0"/>
+        </a:xfrm>
+      </p:grpSpPr>
+      <p:sp>
+        <p:nvSpPr>
+          <p:cNvPr id="2" name="タイトル 1">
+            <a:extLst>
+              <a:ext uri="{FF2B5EF4-FFF2-40B4-BE49-F238E27FC236}">
+                <a16:creationId xmlns:a16="http://schemas.microsoft.com/office/drawing/2014/main" id="{FAF5DC41-DAEF-44F8-BABF-BA1D49ACA002}"/>
+              </a:ext>
+            </a:extLst>
+          </p:cNvPr>
+          <p:cNvSpPr>
+            <a:spLocks noGrp="1"/>
+          </p:cNvSpPr>
+          <p:nvPr>
+            <p:ph type="title"/>
+          </p:nvPr>
+        </p:nvSpPr>
+        <p:spPr/>
+        <p:txBody>
+          <a:bodyPr/>
+          <a:lstStyle/>
+          <a:p>
+            <a:r>
+              <a:rPr lang="en-US" dirty="0"/>
+              <a:t>Error</a:t>
+            </a:r>
+          </a:p>
+        </p:txBody>
+      </p:sp>
+      <p:sp>
+        <p:nvSpPr>
+          <p:cNvPr id="3" name="コンテンツ プレースホルダー 2">
+            <a:extLst>
+              <a:ext uri="{FF2B5EF4-FFF2-40B4-BE49-F238E27FC236}">
+                <a16:creationId xmlns:a16="http://schemas.microsoft.com/office/drawing/2014/main" id="{E0FA2130-D6D3-4220-959F-C91BC53FAB78}"/>
+              </a:ext>
+            </a:extLst>
+          </p:cNvPr>
+          <p:cNvSpPr>
+            <a:spLocks noGrp="1"/>
+          </p:cNvSpPr>
+          <p:nvPr>
+            <p:ph idx="1"/>
+          </p:nvPr>
+        </p:nvSpPr>
+        <p:spPr/>
+        <p:txBody>
+          <a:bodyPr/>
+          <a:lstStyle/>
+          <a:p>
+            <a:endParaRPr lang="en-US"/>
+          </a:p>
+        </p:txBody>
+      </p:sp>
+      <p:sp>
+        <p:nvSpPr>
+          <p:cNvPr id="5" name="スライド番号プレースホルダー 4">
+            <a:extLst>
+              <a:ext uri="{FF2B5EF4-FFF2-40B4-BE49-F238E27FC236}">
+                <a16:creationId xmlns:a16="http://schemas.microsoft.com/office/drawing/2014/main" id="{4D897C1E-210D-40AA-B1A3-6D30B53F200F}"/>
+              </a:ext>
+            </a:extLst>
+          </p:cNvPr>
+          <p:cNvSpPr>
+            <a:spLocks noGrp="1"/>
+          </p:cNvSpPr>
+          <p:nvPr>
+            <p:ph type="sldNum" sz="quarter" idx="12"/>
+          </p:nvPr>
+        </p:nvSpPr>
+        <p:spPr/>
+        <p:txBody>
+          <a:bodyPr/>
+          <a:lstStyle/>
+          <a:p>
+            <a:fld id="{F9AE1A6C-155A-45B5-BF6F-8FA332E74381}" type="slidenum">
+              <a:rPr lang="en-US" smtClean="0"/>
+              <a:pPr/>
+              <a:t>24</a:t>
+            </a:fld>
+            <a:endParaRPr lang="en-US" dirty="0"/>
+          </a:p>
+        </p:txBody>
+      </p:sp>
+    </p:spTree>
+    <p:extLst>
+      <p:ext uri="{BB962C8B-B14F-4D97-AF65-F5344CB8AC3E}">
+        <p14:creationId xmlns:p14="http://schemas.microsoft.com/office/powerpoint/2010/main" val="107592700"/>
+      </p:ext>
+    </p:extLst>
+  </p:cSld>
+  <p:clrMapOvr>
+    <a:masterClrMapping/>
+  </p:clrMapOvr>
+</p:sld>
+</file>
+
+<file path=ppt/slides/slide26.xml><?xml version="1.0" encoding="utf-8"?>
+<p:sld xmlns:a="http://schemas.openxmlformats.org/drawingml/2006/main" xmlns:r="http://schemas.openxmlformats.org/officeDocument/2006/relationships" xmlns:p="http://schemas.openxmlformats.org/presentationml/2006/main">
+  <p:cSld>
+    <p:spTree>
+      <p:nvGrpSpPr>
+        <p:cNvPr id="1" name=""/>
+        <p:cNvGrpSpPr/>
+        <p:nvPr/>
+      </p:nvGrpSpPr>
+      <p:grpSpPr>
+        <a:xfrm>
+          <a:off x="0" y="0"/>
+          <a:ext cx="0" cy="0"/>
+          <a:chOff x="0" y="0"/>
+          <a:chExt cx="0" cy="0"/>
+        </a:xfrm>
+      </p:grpSpPr>
+      <p:sp>
+        <p:nvSpPr>
+          <p:cNvPr id="2" name="タイトル 1">
+            <a:extLst>
+              <a:ext uri="{FF2B5EF4-FFF2-40B4-BE49-F238E27FC236}">
+                <a16:creationId xmlns:a16="http://schemas.microsoft.com/office/drawing/2014/main" id="{8F0D12C3-4CDC-4F57-9D7E-A2DB95866AE8}"/>
+              </a:ext>
+            </a:extLst>
+          </p:cNvPr>
+          <p:cNvSpPr>
+            <a:spLocks noGrp="1"/>
+          </p:cNvSpPr>
+          <p:nvPr>
+            <p:ph type="title"/>
+          </p:nvPr>
+        </p:nvSpPr>
+        <p:spPr/>
+        <p:txBody>
+          <a:bodyPr/>
+          <a:lstStyle/>
+          <a:p>
+            <a:r>
+              <a:rPr lang="en-US" dirty="0"/>
+              <a:t>Summary</a:t>
+            </a:r>
+          </a:p>
+        </p:txBody>
+      </p:sp>
+      <p:sp>
+        <p:nvSpPr>
+          <p:cNvPr id="3" name="コンテンツ プレースホルダー 2">
+            <a:extLst>
+              <a:ext uri="{FF2B5EF4-FFF2-40B4-BE49-F238E27FC236}">
+                <a16:creationId xmlns:a16="http://schemas.microsoft.com/office/drawing/2014/main" id="{9CD5CAFA-55C1-4CBE-B983-ACB13AC199C5}"/>
+              </a:ext>
+            </a:extLst>
+          </p:cNvPr>
+          <p:cNvSpPr>
+            <a:spLocks noGrp="1"/>
+          </p:cNvSpPr>
+          <p:nvPr>
+            <p:ph idx="1"/>
+          </p:nvPr>
+        </p:nvSpPr>
+        <p:spPr/>
+        <p:txBody>
+          <a:bodyPr/>
+          <a:lstStyle/>
+          <a:p>
+            <a:endParaRPr lang="en-US"/>
+          </a:p>
+        </p:txBody>
+      </p:sp>
+      <p:sp>
+        <p:nvSpPr>
+          <p:cNvPr id="5" name="スライド番号プレースホルダー 4">
+            <a:extLst>
+              <a:ext uri="{FF2B5EF4-FFF2-40B4-BE49-F238E27FC236}">
+                <a16:creationId xmlns:a16="http://schemas.microsoft.com/office/drawing/2014/main" id="{EF72F589-D9F4-40B5-BFD0-A9881E9136BC}"/>
+              </a:ext>
+            </a:extLst>
+          </p:cNvPr>
+          <p:cNvSpPr>
+            <a:spLocks noGrp="1"/>
+          </p:cNvSpPr>
+          <p:nvPr>
+            <p:ph type="sldNum" sz="quarter" idx="12"/>
+          </p:nvPr>
+        </p:nvSpPr>
+        <p:spPr/>
+        <p:txBody>
+          <a:bodyPr/>
+          <a:lstStyle/>
+          <a:p>
+            <a:fld id="{F9AE1A6C-155A-45B5-BF6F-8FA332E74381}" type="slidenum">
+              <a:rPr lang="en-US" smtClean="0"/>
+              <a:pPr/>
+              <a:t>25</a:t>
+            </a:fld>
+            <a:endParaRPr lang="en-US" dirty="0"/>
+          </a:p>
+        </p:txBody>
+      </p:sp>
+    </p:spTree>
+    <p:extLst>
+      <p:ext uri="{BB962C8B-B14F-4D97-AF65-F5344CB8AC3E}">
+        <p14:creationId xmlns:p14="http://schemas.microsoft.com/office/powerpoint/2010/main" val="3274883772"/>
+      </p:ext>
+    </p:extLst>
+  </p:cSld>
+  <p:clrMapOvr>
+    <a:masterClrMapping/>
+  </p:clrMapOvr>
+</p:sld>
+</file>
+
+<file path=ppt/slides/slide27.xml><?xml version="1.0" encoding="utf-8"?>
+<p:sld xmlns:a="http://schemas.openxmlformats.org/drawingml/2006/main" xmlns:r="http://schemas.openxmlformats.org/officeDocument/2006/relationships" xmlns:p="http://schemas.openxmlformats.org/presentationml/2006/main">
+  <p:cSld>
+    <p:spTree>
+      <p:nvGrpSpPr>
+        <p:cNvPr id="1" name=""/>
+        <p:cNvGrpSpPr/>
+        <p:nvPr/>
+      </p:nvGrpSpPr>
+      <p:grpSpPr>
+        <a:xfrm>
+          <a:off x="0" y="0"/>
+          <a:ext cx="0" cy="0"/>
+          <a:chOff x="0" y="0"/>
+          <a:chExt cx="0" cy="0"/>
+        </a:xfrm>
+      </p:grpSpPr>
+      <p:sp>
+        <p:nvSpPr>
+          <p:cNvPr id="2" name="タイトル 1">
+            <a:extLst>
+              <a:ext uri="{FF2B5EF4-FFF2-40B4-BE49-F238E27FC236}">
+                <a16:creationId xmlns:a16="http://schemas.microsoft.com/office/drawing/2014/main" id="{1532B8A9-CC3C-4755-A0C2-83191887A59F}"/>
+              </a:ext>
+            </a:extLst>
+          </p:cNvPr>
+          <p:cNvSpPr>
+            <a:spLocks noGrp="1"/>
+          </p:cNvSpPr>
+          <p:nvPr>
+            <p:ph type="title"/>
+          </p:nvPr>
+        </p:nvSpPr>
+        <p:spPr/>
+        <p:txBody>
+          <a:bodyPr/>
+          <a:lstStyle/>
+          <a:p>
+            <a:r>
+              <a:rPr lang="en-US" dirty="0"/>
+              <a:t>References</a:t>
+            </a:r>
+          </a:p>
+        </p:txBody>
+      </p:sp>
+      <p:sp>
+        <p:nvSpPr>
+          <p:cNvPr id="3" name="コンテンツ プレースホルダー 2">
+            <a:extLst>
+              <a:ext uri="{FF2B5EF4-FFF2-40B4-BE49-F238E27FC236}">
+                <a16:creationId xmlns:a16="http://schemas.microsoft.com/office/drawing/2014/main" id="{0CFB61A8-0A55-494F-96FA-020C659922F5}"/>
+              </a:ext>
+            </a:extLst>
+          </p:cNvPr>
+          <p:cNvSpPr>
+            <a:spLocks noGrp="1"/>
+          </p:cNvSpPr>
+          <p:nvPr>
+            <p:ph idx="1"/>
+          </p:nvPr>
+        </p:nvSpPr>
+        <p:spPr/>
+        <p:txBody>
+          <a:bodyPr/>
+          <a:lstStyle/>
+          <a:p>
+            <a:r>
+              <a:rPr lang="ja-JP" altLang="en-US" dirty="0"/>
+              <a:t>演算子について</a:t>
+            </a:r>
+            <a:endParaRPr lang="en-US" altLang="ja-JP" dirty="0"/>
+          </a:p>
+          <a:p>
+            <a:pPr lvl="1"/>
+            <a:r>
+              <a:rPr lang="en-US" dirty="0">
+                <a:hlinkClick r:id="rId2"/>
+              </a:rPr>
+              <a:t>https://atmarkit.itmedia.co.jp/ait/articles/1907/23/news010.html</a:t>
+            </a:r>
+            <a:endParaRPr lang="en-US" dirty="0"/>
+          </a:p>
+          <a:p>
+            <a:endParaRPr lang="en-US" dirty="0"/>
+          </a:p>
+        </p:txBody>
+      </p:sp>
+      <p:sp>
+        <p:nvSpPr>
+          <p:cNvPr id="5" name="スライド番号プレースホルダー 4">
+            <a:extLst>
+              <a:ext uri="{FF2B5EF4-FFF2-40B4-BE49-F238E27FC236}">
+                <a16:creationId xmlns:a16="http://schemas.microsoft.com/office/drawing/2014/main" id="{D1D09D41-F574-4AE8-B82D-35FD724EA6EA}"/>
+              </a:ext>
+            </a:extLst>
+          </p:cNvPr>
+          <p:cNvSpPr>
+            <a:spLocks noGrp="1"/>
+          </p:cNvSpPr>
+          <p:nvPr>
+            <p:ph type="sldNum" sz="quarter" idx="12"/>
+          </p:nvPr>
+        </p:nvSpPr>
+        <p:spPr/>
+        <p:txBody>
+          <a:bodyPr/>
+          <a:lstStyle/>
+          <a:p>
+            <a:fld id="{F9AE1A6C-155A-45B5-BF6F-8FA332E74381}" type="slidenum">
+              <a:rPr lang="en-US" smtClean="0"/>
+              <a:pPr/>
+              <a:t>26</a:t>
+            </a:fld>
+            <a:endParaRPr lang="en-US" dirty="0"/>
+          </a:p>
+        </p:txBody>
+      </p:sp>
+    </p:spTree>
+    <p:extLst>
+      <p:ext uri="{BB962C8B-B14F-4D97-AF65-F5344CB8AC3E}">
+        <p14:creationId xmlns:p14="http://schemas.microsoft.com/office/powerpoint/2010/main" val="532900966"/>
+      </p:ext>
+    </p:extLst>
+  </p:cSld>
+  <p:clrMapOvr>
+    <a:masterClrMapping/>
+  </p:clrMapOvr>
+</p:sld>
+</file>
+
+<file path=ppt/slides/slide28.xml><?xml version="1.0" encoding="utf-8"?>
+<p:sld xmlns:a="http://schemas.openxmlformats.org/drawingml/2006/main" xmlns:r="http://schemas.openxmlformats.org/officeDocument/2006/relationships" xmlns:p="http://schemas.openxmlformats.org/presentationml/2006/main">
+  <p:cSld>
+    <p:spTree>
+      <p:nvGrpSpPr>
+        <p:cNvPr id="1" name=""/>
+        <p:cNvGrpSpPr/>
+        <p:nvPr/>
+      </p:nvGrpSpPr>
+      <p:grpSpPr>
+        <a:xfrm>
+          <a:off x="0" y="0"/>
+          <a:ext cx="0" cy="0"/>
+          <a:chOff x="0" y="0"/>
+          <a:chExt cx="0" cy="0"/>
+        </a:xfrm>
+      </p:grpSpPr>
+      <p:sp>
+        <p:nvSpPr>
+          <p:cNvPr id="2" name="タイトル 1">
+            <a:extLst>
+              <a:ext uri="{FF2B5EF4-FFF2-40B4-BE49-F238E27FC236}">
+                <a16:creationId xmlns:a16="http://schemas.microsoft.com/office/drawing/2014/main" id="{F841434E-D430-4496-8D5B-CE28B163C746}"/>
+              </a:ext>
+            </a:extLst>
+          </p:cNvPr>
+          <p:cNvSpPr>
+            <a:spLocks noGrp="1"/>
+          </p:cNvSpPr>
+          <p:nvPr>
+            <p:ph type="title"/>
+          </p:nvPr>
+        </p:nvSpPr>
+        <p:spPr/>
+        <p:txBody>
+          <a:bodyPr/>
+          <a:lstStyle/>
+          <a:p>
+            <a:r>
+              <a:rPr lang="en-US" dirty="0"/>
+              <a:t>Bonus Contents</a:t>
+            </a:r>
+          </a:p>
+        </p:txBody>
+      </p:sp>
+      <p:sp>
+        <p:nvSpPr>
+          <p:cNvPr id="3" name="コンテンツ プレースホルダー 2">
+            <a:extLst>
+              <a:ext uri="{FF2B5EF4-FFF2-40B4-BE49-F238E27FC236}">
+                <a16:creationId xmlns:a16="http://schemas.microsoft.com/office/drawing/2014/main" id="{2551BBAA-5F75-41A1-852A-257BAF35910B}"/>
+              </a:ext>
+            </a:extLst>
+          </p:cNvPr>
+          <p:cNvSpPr>
+            <a:spLocks noGrp="1"/>
+          </p:cNvSpPr>
+          <p:nvPr>
+            <p:ph idx="1"/>
+          </p:nvPr>
+        </p:nvSpPr>
+        <p:spPr/>
+        <p:txBody>
+          <a:bodyPr/>
+          <a:lstStyle/>
+          <a:p>
+            <a:r>
+              <a:rPr lang="en-US" dirty="0" err="1"/>
+              <a:t>AtCoder</a:t>
+            </a:r>
+            <a:endParaRPr lang="en-US" dirty="0"/>
+          </a:p>
+          <a:p>
+            <a:pPr lvl="1"/>
+            <a:r>
+              <a:rPr lang="en-US" dirty="0">
+                <a:hlinkClick r:id="rId2"/>
+              </a:rPr>
+              <a:t>https://atcoder.jp/?lang=ja</a:t>
+            </a:r>
+            <a:endParaRPr lang="en-US" dirty="0"/>
+          </a:p>
+          <a:p>
+            <a:r>
+              <a:rPr lang="en-US" dirty="0" err="1"/>
+              <a:t>CodinGame</a:t>
+            </a:r>
+            <a:endParaRPr lang="en-US" dirty="0"/>
+          </a:p>
+          <a:p>
+            <a:pPr lvl="1"/>
+            <a:r>
+              <a:rPr lang="en-US" dirty="0">
+                <a:hlinkClick r:id="rId3"/>
+              </a:rPr>
+              <a:t>https://www.codingame.com/start</a:t>
+            </a:r>
+            <a:endParaRPr lang="en-US" dirty="0"/>
+          </a:p>
+          <a:p>
+            <a:r>
+              <a:rPr lang="en-US" dirty="0" err="1"/>
+              <a:t>Codeforces</a:t>
+            </a:r>
+            <a:endParaRPr lang="en-US" dirty="0"/>
+          </a:p>
+          <a:p>
+            <a:pPr lvl="1"/>
+            <a:r>
+              <a:rPr lang="en-US" dirty="0">
+                <a:hlinkClick r:id="rId4"/>
+              </a:rPr>
+              <a:t>https://codeforces.com/</a:t>
+            </a:r>
+            <a:endParaRPr lang="en-US" dirty="0"/>
+          </a:p>
+          <a:p>
+            <a:endParaRPr lang="en-US" dirty="0"/>
+          </a:p>
+        </p:txBody>
+      </p:sp>
+      <p:sp>
+        <p:nvSpPr>
+          <p:cNvPr id="5" name="スライド番号プレースホルダー 4">
+            <a:extLst>
+              <a:ext uri="{FF2B5EF4-FFF2-40B4-BE49-F238E27FC236}">
+                <a16:creationId xmlns:a16="http://schemas.microsoft.com/office/drawing/2014/main" id="{158938BA-66FF-472E-8C9A-66E7F1533947}"/>
+              </a:ext>
+            </a:extLst>
+          </p:cNvPr>
+          <p:cNvSpPr>
+            <a:spLocks noGrp="1"/>
+          </p:cNvSpPr>
+          <p:nvPr>
+            <p:ph type="sldNum" sz="quarter" idx="12"/>
+          </p:nvPr>
+        </p:nvSpPr>
+        <p:spPr/>
+        <p:txBody>
+          <a:bodyPr/>
+          <a:lstStyle/>
+          <a:p>
+            <a:fld id="{F9AE1A6C-155A-45B5-BF6F-8FA332E74381}" type="slidenum">
+              <a:rPr lang="en-US" smtClean="0"/>
+              <a:pPr/>
+              <a:t>27</a:t>
+            </a:fld>
+            <a:endParaRPr lang="en-US" dirty="0"/>
+          </a:p>
+        </p:txBody>
+      </p:sp>
+    </p:spTree>
+    <p:extLst>
+      <p:ext uri="{BB962C8B-B14F-4D97-AF65-F5344CB8AC3E}">
+        <p14:creationId xmlns:p14="http://schemas.microsoft.com/office/powerpoint/2010/main" val="1464208581"/>
       </p:ext>
     </p:extLst>
   </p:cSld>
@@ -6522,14 +8835,14 @@
             <p:ph idx="1"/>
             <p:extLst>
               <p:ext uri="{D42A27DB-BD31-4B8C-83A1-F6EECF244321}">
-                <p14:modId xmlns:p14="http://schemas.microsoft.com/office/powerpoint/2010/main" val="2930572645"/>
+                <p14:modId xmlns:p14="http://schemas.microsoft.com/office/powerpoint/2010/main" val="2692119569"/>
               </p:ext>
             </p:extLst>
           </p:nvPr>
         </p:nvGraphicFramePr>
         <p:xfrm>
-          <a:off x="1157005" y="2681316"/>
-          <a:ext cx="6829990" cy="3017520"/>
+          <a:off x="372168" y="2653607"/>
+          <a:ext cx="6085782" cy="3017520"/>
         </p:xfrm>
         <a:graphic>
           <a:graphicData uri="http://schemas.openxmlformats.org/drawingml/2006/table">
@@ -6538,14 +8851,14 @@
                 <a:tableStyleId>{9D7B26C5-4107-4FEC-AEDC-1716B250A1EF}</a:tableStyleId>
               </a:tblPr>
               <a:tblGrid>
-                <a:gridCol w="1645990">
+                <a:gridCol w="967105">
                   <a:extLst>
                     <a:ext uri="{9D8B030D-6E8A-4147-A177-3AD203B41FA5}">
                       <a16:colId xmlns:a16="http://schemas.microsoft.com/office/drawing/2014/main" val="962391357"/>
                     </a:ext>
                   </a:extLst>
                 </a:gridCol>
-                <a:gridCol w="5184000">
+                <a:gridCol w="5118677">
                   <a:extLst>
                     <a:ext uri="{9D8B030D-6E8A-4147-A177-3AD203B41FA5}">
                       <a16:colId xmlns:a16="http://schemas.microsoft.com/office/drawing/2014/main" val="1208510133"/>
@@ -6553,7 +8866,7 @@
                   </a:extLst>
                 </a:gridCol>
               </a:tblGrid>
-              <a:tr h="404091">
+              <a:tr h="391160">
                 <a:tc>
                   <a:txBody>
                     <a:bodyPr/>
@@ -6699,14 +9012,7 @@
                       </a:r>
                       <a:r>
                         <a:rPr lang="ja-JP" altLang="en-US" sz="2800" dirty="0"/>
-                        <a:t>」で囲われた，</a:t>
-                      </a:r>
-                      <a:br>
-                        <a:rPr lang="en-US" altLang="ja-JP" sz="2800" dirty="0"/>
-                      </a:br>
-                      <a:r>
-                        <a:rPr lang="ja-JP" altLang="en-US" sz="2800" dirty="0"/>
-                        <a:t>文字列</a:t>
+                        <a:t>」で囲われた，文字列</a:t>
                       </a:r>
                       <a:endParaRPr lang="en-US" sz="2800" dirty="0"/>
                     </a:p>
@@ -7145,13 +9451,13 @@
           <p:nvPr>
             <p:extLst>
               <p:ext uri="{D42A27DB-BD31-4B8C-83A1-F6EECF244321}">
-                <p14:modId xmlns:p14="http://schemas.microsoft.com/office/powerpoint/2010/main" val="2703892032"/>
+                <p14:modId xmlns:p14="http://schemas.microsoft.com/office/powerpoint/2010/main" val="2198879390"/>
               </p:ext>
             </p:extLst>
           </p:nvPr>
         </p:nvGraphicFramePr>
         <p:xfrm>
-          <a:off x="2455402" y="2549236"/>
+          <a:off x="755911" y="2854036"/>
           <a:ext cx="4233195" cy="1828800"/>
         </p:xfrm>
         <a:graphic>
@@ -7523,14 +9829,14 @@
           <p:nvPr>
             <p:extLst>
               <p:ext uri="{D42A27DB-BD31-4B8C-83A1-F6EECF244321}">
-                <p14:modId xmlns:p14="http://schemas.microsoft.com/office/powerpoint/2010/main" val="3924463685"/>
+                <p14:modId xmlns:p14="http://schemas.microsoft.com/office/powerpoint/2010/main" val="1581758073"/>
               </p:ext>
             </p:extLst>
           </p:nvPr>
         </p:nvGraphicFramePr>
         <p:xfrm>
           <a:off x="212436" y="2241118"/>
-          <a:ext cx="8663709" cy="4053840"/>
+          <a:ext cx="8663709" cy="3535680"/>
         </p:xfrm>
         <a:graphic>
           <a:graphicData uri="http://schemas.openxmlformats.org/drawingml/2006/table">
@@ -7728,7 +10034,14 @@
                       <a:pPr algn="ctr"/>
                       <a:r>
                         <a:rPr lang="ja-JP" altLang="en-US" sz="2800" dirty="0"/>
-                        <a:t>値の比較や，リスト内要素の存在確認に使用</a:t>
+                        <a:t>値の比較や，リスト内要素の</a:t>
+                      </a:r>
+                      <a:br>
+                        <a:rPr lang="en-US" altLang="ja-JP" sz="2800" dirty="0"/>
+                      </a:br>
+                      <a:r>
+                        <a:rPr lang="ja-JP" altLang="en-US" sz="2800" dirty="0"/>
+                        <a:t>存在確認に使用</a:t>
                       </a:r>
                       <a:endParaRPr lang="en-US" sz="2800" dirty="0"/>
                     </a:p>
@@ -7775,43 +10088,6 @@
                 <a:extLst>
                   <a:ext uri="{0D108BD9-81ED-4DB2-BD59-A6C34878D82A}">
                     <a16:rowId xmlns:a16="http://schemas.microsoft.com/office/drawing/2014/main" val="3798942226"/>
-                  </a:ext>
-                </a:extLst>
-              </a:tr>
-              <a:tr h="370840">
-                <a:tc>
-                  <a:txBody>
-                    <a:bodyPr/>
-                    <a:lstStyle/>
-                    <a:p>
-                      <a:pPr algn="ctr"/>
-                      <a:r>
-                        <a:rPr lang="ja-JP" altLang="en-US" sz="2800" dirty="0"/>
-                        <a:t>ビット</a:t>
-                      </a:r>
-                      <a:endParaRPr lang="en-US" sz="2800" dirty="0"/>
-                    </a:p>
-                  </a:txBody>
-                  <a:tcPr anchor="ctr"/>
-                </a:tc>
-                <a:tc>
-                  <a:txBody>
-                    <a:bodyPr/>
-                    <a:lstStyle/>
-                    <a:p>
-                      <a:pPr algn="ctr"/>
-                      <a:r>
-                        <a:rPr lang="ja-JP" altLang="en-US" sz="2800" dirty="0"/>
-                        <a:t>ビットごとの演算</a:t>
-                      </a:r>
-                      <a:endParaRPr lang="en-US" sz="2800" dirty="0"/>
-                    </a:p>
-                  </a:txBody>
-                  <a:tcPr/>
-                </a:tc>
-                <a:extLst>
-                  <a:ext uri="{0D108BD9-81ED-4DB2-BD59-A6C34878D82A}">
-                    <a16:rowId xmlns:a16="http://schemas.microsoft.com/office/drawing/2014/main" val="562012678"/>
                   </a:ext>
                 </a:extLst>
               </a:tr>

</xml_diff>

<commit_message>
[add]:Added solution code of 'while'.
</commit_message>
<xml_diff>
--- a/ProgramSlide.pptx
+++ b/ProgramSlide.pptx
@@ -18320,7 +18320,7 @@
         <p:spPr>
           <a:xfrm>
             <a:off x="628650" y="1825625"/>
-            <a:ext cx="7886700" cy="2222119"/>
+            <a:ext cx="7886700" cy="2002663"/>
           </a:xfrm>
         </p:spPr>
         <p:txBody>
@@ -18335,6 +18335,35 @@
             <a:r>
               <a:rPr lang="ja-JP" altLang="en-US" dirty="0"/>
               <a:t>解法</a:t>
+            </a:r>
+            <a:endParaRPr lang="en-US" altLang="ja-JP" dirty="0"/>
+          </a:p>
+          <a:p>
+            <a:pPr marL="0" indent="0">
+              <a:buNone/>
+            </a:pPr>
+            <a:r>
+              <a:rPr lang="en-US" altLang="ja-JP" dirty="0"/>
+              <a:t>a</a:t>
+            </a:r>
+            <a:r>
+              <a:rPr lang="ja-JP" altLang="en-US" dirty="0"/>
+              <a:t>が</a:t>
+            </a:r>
+            <a:r>
+              <a:rPr lang="en-US" altLang="ja-JP" dirty="0"/>
+              <a:t>b</a:t>
+            </a:r>
+            <a:r>
+              <a:rPr lang="ja-JP" altLang="en-US" dirty="0"/>
+              <a:t>より大きくなるまで足し続ければ</a:t>
+            </a:r>
+            <a:br>
+              <a:rPr lang="en-US" altLang="ja-JP"/>
+            </a:br>
+            <a:r>
+              <a:rPr lang="ja-JP" altLang="en-US"/>
+              <a:t>よいので次のようになる</a:t>
             </a:r>
             <a:endParaRPr lang="en-US" altLang="ja-JP" dirty="0"/>
           </a:p>
@@ -18372,10 +18401,10 @@
       </p:sp>
       <p:sp>
         <p:nvSpPr>
-          <p:cNvPr id="7" name="テキスト ボックス 6">
+          <p:cNvPr id="6" name="テキスト ボックス 5">
             <a:extLst>
               <a:ext uri="{FF2B5EF4-FFF2-40B4-BE49-F238E27FC236}">
-                <a16:creationId xmlns:a16="http://schemas.microsoft.com/office/drawing/2014/main" id="{2E942896-C737-1E3D-A212-5DE6A6A5D6F5}"/>
+                <a16:creationId xmlns:a16="http://schemas.microsoft.com/office/drawing/2014/main" id="{A9BC52ED-AB03-9182-16B1-934AB69F99E9}"/>
               </a:ext>
             </a:extLst>
           </p:cNvPr>
@@ -18384,8 +18413,8 @@
         </p:nvSpPr>
         <p:spPr>
           <a:xfrm>
-            <a:off x="2176272" y="4370376"/>
-            <a:ext cx="4572000" cy="1200329"/>
+            <a:off x="2176272" y="3998950"/>
+            <a:ext cx="4572000" cy="1754326"/>
           </a:xfrm>
           <a:prstGeom prst="rect">
             <a:avLst/>
@@ -18408,11 +18437,31 @@
                 <a:effectLst/>
                 <a:latin typeface="Consolas" panose="020B0609020204030204" pitchFamily="49" charset="0"/>
               </a:rPr>
-              <a:t>a = </a:t>
+              <a:t>a, b = </a:t>
             </a:r>
             <a:r>
               <a:rPr lang="en-US" altLang="ja-JP" b="0" dirty="0">
                 <a:solidFill>
+                  <a:srgbClr val="74531F"/>
+                </a:solidFill>
+                <a:effectLst/>
+                <a:latin typeface="Consolas" panose="020B0609020204030204" pitchFamily="49" charset="0"/>
+              </a:rPr>
+              <a:t>map</a:t>
+            </a:r>
+            <a:r>
+              <a:rPr lang="en-US" altLang="ja-JP" b="0" dirty="0">
+                <a:solidFill>
+                  <a:srgbClr val="000000"/>
+                </a:solidFill>
+                <a:effectLst/>
+                <a:latin typeface="Consolas" panose="020B0609020204030204" pitchFamily="49" charset="0"/>
+              </a:rPr>
+              <a:t>(</a:t>
+            </a:r>
+            <a:r>
+              <a:rPr lang="en-US" altLang="ja-JP" b="0" dirty="0">
+                <a:solidFill>
                   <a:srgbClr val="2B91AF"/>
                 </a:solidFill>
                 <a:effectLst/>
@@ -18428,7 +18477,7 @@
                 <a:effectLst/>
                 <a:latin typeface="Consolas" panose="020B0609020204030204" pitchFamily="49" charset="0"/>
               </a:rPr>
-              <a:t>(</a:t>
+              <a:t>, </a:t>
             </a:r>
             <a:r>
               <a:rPr lang="en-US" altLang="ja-JP" b="0" dirty="0">
@@ -18448,7 +18497,7 @@
                 <a:effectLst/>
                 <a:latin typeface="Consolas" panose="020B0609020204030204" pitchFamily="49" charset="0"/>
               </a:rPr>
-              <a:t>())</a:t>
+              <a:t>().split())</a:t>
             </a:r>
           </a:p>
           <a:p>
@@ -18460,69 +18509,7 @@
                 <a:effectLst/>
                 <a:latin typeface="Consolas" panose="020B0609020204030204" pitchFamily="49" charset="0"/>
               </a:rPr>
-              <a:t>b = </a:t>
-            </a:r>
-            <a:r>
-              <a:rPr lang="en-US" altLang="ja-JP" b="0" dirty="0">
-                <a:solidFill>
-                  <a:srgbClr val="2B91AF"/>
-                </a:solidFill>
-                <a:effectLst/>
-                <a:latin typeface="Consolas" panose="020B0609020204030204" pitchFamily="49" charset="0"/>
-              </a:rPr>
-              <a:t>int</a:t>
-            </a:r>
-            <a:r>
-              <a:rPr lang="en-US" altLang="ja-JP" b="0" dirty="0">
-                <a:solidFill>
-                  <a:srgbClr val="000000"/>
-                </a:solidFill>
-                <a:effectLst/>
-                <a:latin typeface="Consolas" panose="020B0609020204030204" pitchFamily="49" charset="0"/>
-              </a:rPr>
-              <a:t>(</a:t>
-            </a:r>
-            <a:r>
-              <a:rPr lang="en-US" altLang="ja-JP" b="0" dirty="0">
-                <a:solidFill>
-                  <a:srgbClr val="74531F"/>
-                </a:solidFill>
-                <a:effectLst/>
-                <a:latin typeface="Consolas" panose="020B0609020204030204" pitchFamily="49" charset="0"/>
-              </a:rPr>
-              <a:t>input</a:t>
-            </a:r>
-            <a:r>
-              <a:rPr lang="en-US" altLang="ja-JP" b="0" dirty="0">
-                <a:solidFill>
-                  <a:srgbClr val="000000"/>
-                </a:solidFill>
-                <a:effectLst/>
-                <a:latin typeface="Consolas" panose="020B0609020204030204" pitchFamily="49" charset="0"/>
-              </a:rPr>
-              <a:t>())</a:t>
-            </a:r>
-          </a:p>
-          <a:p>
-            <a:r>
-              <a:rPr lang="en-US" altLang="ja-JP" b="0" dirty="0">
-                <a:solidFill>
-                  <a:srgbClr val="74531F"/>
-                </a:solidFill>
-                <a:effectLst/>
-                <a:latin typeface="Consolas" panose="020B0609020204030204" pitchFamily="49" charset="0"/>
-              </a:rPr>
-              <a:t>sum</a:t>
-            </a:r>
-            <a:r>
-              <a:rPr lang="en-US" altLang="ja-JP" b="0" dirty="0">
-                <a:solidFill>
-                  <a:srgbClr val="000000"/>
-                </a:solidFill>
-                <a:effectLst/>
-                <a:latin typeface="Consolas" panose="020B0609020204030204" pitchFamily="49" charset="0"/>
-              </a:rPr>
-              <a:t> = </a:t>
+              <a:t>total = </a:t>
             </a:r>
             <a:r>
               <a:rPr lang="en-US" altLang="ja-JP" b="0" dirty="0">
@@ -18543,6 +18530,60 @@
             </a:endParaRPr>
           </a:p>
           <a:p>
+            <a:r>
+              <a:rPr lang="en-US" altLang="ja-JP" b="0" dirty="0">
+                <a:solidFill>
+                  <a:srgbClr val="8F08C4"/>
+                </a:solidFill>
+                <a:effectLst/>
+                <a:latin typeface="Consolas" panose="020B0609020204030204" pitchFamily="49" charset="0"/>
+              </a:rPr>
+              <a:t>while</a:t>
+            </a:r>
+            <a:r>
+              <a:rPr lang="en-US" altLang="ja-JP" b="0" dirty="0">
+                <a:solidFill>
+                  <a:srgbClr val="000000"/>
+                </a:solidFill>
+                <a:effectLst/>
+                <a:latin typeface="Consolas" panose="020B0609020204030204" pitchFamily="49" charset="0"/>
+              </a:rPr>
+              <a:t> a &lt;= b:</a:t>
+            </a:r>
+          </a:p>
+          <a:p>
+            <a:r>
+              <a:rPr lang="en-US" altLang="ja-JP" b="0" dirty="0">
+                <a:solidFill>
+                  <a:srgbClr val="000000"/>
+                </a:solidFill>
+                <a:effectLst/>
+                <a:latin typeface="Consolas" panose="020B0609020204030204" pitchFamily="49" charset="0"/>
+              </a:rPr>
+              <a:t>    total += a</a:t>
+            </a:r>
+          </a:p>
+          <a:p>
+            <a:r>
+              <a:rPr lang="en-US" altLang="ja-JP" b="0" dirty="0">
+                <a:solidFill>
+                  <a:srgbClr val="000000"/>
+                </a:solidFill>
+                <a:effectLst/>
+                <a:latin typeface="Consolas" panose="020B0609020204030204" pitchFamily="49" charset="0"/>
+              </a:rPr>
+              <a:t>    a += </a:t>
+            </a:r>
+            <a:r>
+              <a:rPr lang="en-US" altLang="ja-JP" b="0" dirty="0">
+                <a:solidFill>
+                  <a:srgbClr val="098658"/>
+                </a:solidFill>
+                <a:effectLst/>
+                <a:latin typeface="Consolas" panose="020B0609020204030204" pitchFamily="49" charset="0"/>
+              </a:rPr>
+              <a:t>1</a:t>
+            </a:r>
             <a:endParaRPr lang="en-US" altLang="ja-JP" b="0" dirty="0">
               <a:solidFill>
                 <a:srgbClr val="000000"/>
@@ -18550,6 +18591,28 @@
               <a:effectLst/>
               <a:latin typeface="Consolas" panose="020B0609020204030204" pitchFamily="49" charset="0"/>
             </a:endParaRPr>
+          </a:p>
+          <a:p>
+            <a:r>
+              <a:rPr lang="en-US" altLang="ja-JP" b="0" dirty="0">
+                <a:solidFill>
+                  <a:srgbClr val="74531F"/>
+                </a:solidFill>
+                <a:effectLst/>
+                <a:latin typeface="Consolas" panose="020B0609020204030204" pitchFamily="49" charset="0"/>
+              </a:rPr>
+              <a:t>print</a:t>
+            </a:r>
+            <a:r>
+              <a:rPr lang="en-US" altLang="ja-JP" b="0" dirty="0">
+                <a:solidFill>
+                  <a:srgbClr val="000000"/>
+                </a:solidFill>
+                <a:effectLst/>
+                <a:latin typeface="Consolas" panose="020B0609020204030204" pitchFamily="49" charset="0"/>
+              </a:rPr>
+              <a:t>(total)</a:t>
+            </a:r>
           </a:p>
         </p:txBody>
       </p:sp>

</xml_diff>

<commit_message>
[add]:Wrote explanation of 'Function'.
</commit_message>
<xml_diff>
--- a/ProgramSlide.pptx
+++ b/ProgramSlide.pptx
@@ -5,7 +5,7 @@
     <p:sldMasterId id="2147483672" r:id="rId1"/>
   </p:sldMasterIdLst>
   <p:notesMasterIdLst>
-    <p:notesMasterId r:id="rId43"/>
+    <p:notesMasterId r:id="rId47"/>
   </p:notesMasterIdLst>
   <p:sldIdLst>
     <p:sldId id="256" r:id="rId2"/>
@@ -44,11 +44,15 @@
     <p:sldId id="296" r:id="rId35"/>
     <p:sldId id="297" r:id="rId36"/>
     <p:sldId id="261" r:id="rId37"/>
-    <p:sldId id="262" r:id="rId38"/>
-    <p:sldId id="263" r:id="rId39"/>
-    <p:sldId id="264" r:id="rId40"/>
-    <p:sldId id="265" r:id="rId41"/>
-    <p:sldId id="290" r:id="rId42"/>
+    <p:sldId id="298" r:id="rId38"/>
+    <p:sldId id="299" r:id="rId39"/>
+    <p:sldId id="300" r:id="rId40"/>
+    <p:sldId id="301" r:id="rId41"/>
+    <p:sldId id="262" r:id="rId42"/>
+    <p:sldId id="263" r:id="rId43"/>
+    <p:sldId id="264" r:id="rId44"/>
+    <p:sldId id="265" r:id="rId45"/>
+    <p:sldId id="290" r:id="rId46"/>
   </p:sldIdLst>
   <p:sldSz cx="9144000" cy="6858000" type="screen4x3"/>
   <p:notesSz cx="6858000" cy="9144000"/>
@@ -188,6 +192,10 @@
             <p14:sldId id="296"/>
             <p14:sldId id="297"/>
             <p14:sldId id="261"/>
+            <p14:sldId id="298"/>
+            <p14:sldId id="299"/>
+            <p14:sldId id="300"/>
+            <p14:sldId id="301"/>
             <p14:sldId id="262"/>
             <p14:sldId id="263"/>
           </p14:sldIdLst>
@@ -290,7 +298,7 @@
           <a:p>
             <a:fld id="{61F9A76B-08C7-4C1E-AD37-3452ECB1BEEB}" type="datetimeFigureOut">
               <a:rPr lang="en-US" smtClean="0"/>
-              <a:t>5/17/2023</a:t>
+              <a:t>5/18/2023</a:t>
             </a:fld>
             <a:endParaRPr lang="en-US"/>
           </a:p>
@@ -805,7 +813,7 @@
           <a:p>
             <a:fld id="{B4665B6F-9B20-4B37-B621-0B1C1F2C90FB}" type="datetime1">
               <a:rPr lang="en-US" smtClean="0"/>
-              <a:t>5/17/2023</a:t>
+              <a:t>5/18/2023</a:t>
             </a:fld>
             <a:endParaRPr lang="en-US"/>
           </a:p>
@@ -1007,7 +1015,7 @@
           <a:p>
             <a:fld id="{C27C9AA3-0D49-477A-834F-6AFF7FAFB863}" type="datetime1">
               <a:rPr lang="en-US" smtClean="0"/>
-              <a:t>5/17/2023</a:t>
+              <a:t>5/18/2023</a:t>
             </a:fld>
             <a:endParaRPr lang="en-US"/>
           </a:p>
@@ -1219,7 +1227,7 @@
           <a:p>
             <a:fld id="{A8351093-7B23-4B93-BF0D-2F7040DF3D21}" type="datetime1">
               <a:rPr lang="en-US" smtClean="0"/>
-              <a:t>5/17/2023</a:t>
+              <a:t>5/18/2023</a:t>
             </a:fld>
             <a:endParaRPr lang="en-US"/>
           </a:p>
@@ -1439,7 +1447,7 @@
           <a:p>
             <a:fld id="{BAE82DF5-EBE4-4A5F-9572-9683012F3869}" type="datetime1">
               <a:rPr lang="en-US" smtClean="0"/>
-              <a:t>5/17/2023</a:t>
+              <a:t>5/18/2023</a:t>
             </a:fld>
             <a:endParaRPr lang="en-US"/>
           </a:p>
@@ -1688,7 +1696,7 @@
           <a:p>
             <a:fld id="{A2243B7C-847E-41AE-8FD2-E22768D99A06}" type="datetime1">
               <a:rPr lang="en-US" smtClean="0"/>
-              <a:t>5/17/2023</a:t>
+              <a:t>5/18/2023</a:t>
             </a:fld>
             <a:endParaRPr lang="en-US"/>
           </a:p>
@@ -1984,7 +1992,7 @@
           <a:p>
             <a:fld id="{641B493E-BF0E-4591-A949-E568E69F4803}" type="datetime1">
               <a:rPr lang="en-US" smtClean="0"/>
-              <a:t>5/17/2023</a:t>
+              <a:t>5/18/2023</a:t>
             </a:fld>
             <a:endParaRPr lang="en-US"/>
           </a:p>
@@ -2415,7 +2423,7 @@
           <a:p>
             <a:fld id="{DD1C41FA-F867-485D-BB9E-4BB1C77BF6D2}" type="datetime1">
               <a:rPr lang="en-US" smtClean="0"/>
-              <a:t>5/17/2023</a:t>
+              <a:t>5/18/2023</a:t>
             </a:fld>
             <a:endParaRPr lang="en-US"/>
           </a:p>
@@ -2533,7 +2541,7 @@
           <a:p>
             <a:fld id="{BF2F607B-9AEB-4D6B-B787-CA31BF3221AF}" type="datetime1">
               <a:rPr lang="en-US" smtClean="0"/>
-              <a:t>5/17/2023</a:t>
+              <a:t>5/18/2023</a:t>
             </a:fld>
             <a:endParaRPr lang="en-US"/>
           </a:p>
@@ -2628,7 +2636,7 @@
           <a:p>
             <a:fld id="{6DD5D611-D82D-4557-A4B4-6CE561B5C83D}" type="datetime1">
               <a:rPr lang="en-US" smtClean="0"/>
-              <a:t>5/17/2023</a:t>
+              <a:t>5/18/2023</a:t>
             </a:fld>
             <a:endParaRPr lang="en-US"/>
           </a:p>
@@ -2937,7 +2945,7 @@
           <a:p>
             <a:fld id="{AE96AADA-F019-47DD-8151-E2581BF6D2CF}" type="datetime1">
               <a:rPr lang="en-US" smtClean="0"/>
-              <a:t>5/17/2023</a:t>
+              <a:t>5/18/2023</a:t>
             </a:fld>
             <a:endParaRPr lang="en-US"/>
           </a:p>
@@ -3194,7 +3202,7 @@
           <a:p>
             <a:fld id="{D938F34B-1050-4590-AF4B-F133D048AD45}" type="datetime1">
               <a:rPr lang="en-US" smtClean="0"/>
-              <a:t>5/17/2023</a:t>
+              <a:t>5/18/2023</a:t>
             </a:fld>
             <a:endParaRPr lang="en-US"/>
           </a:p>
@@ -3439,7 +3447,7 @@
           <a:p>
             <a:fld id="{EB277427-05A3-4D74-B825-34D4130E89D5}" type="datetime1">
               <a:rPr lang="en-US" smtClean="0"/>
-              <a:t>5/17/2023</a:t>
+              <a:t>5/18/2023</a:t>
             </a:fld>
             <a:endParaRPr lang="en-US"/>
           </a:p>
@@ -18674,31 +18682,172 @@
           </a:p>
         </p:txBody>
       </p:sp>
-      <p:sp>
-        <p:nvSpPr>
-          <p:cNvPr id="3" name="コンテンツ プレースホルダー 2">
-            <a:extLst>
-              <a:ext uri="{FF2B5EF4-FFF2-40B4-BE49-F238E27FC236}">
-                <a16:creationId xmlns:a16="http://schemas.microsoft.com/office/drawing/2014/main" id="{3B3CCD9F-C8A0-4C66-A242-D9F826307A89}"/>
-              </a:ext>
-            </a:extLst>
-          </p:cNvPr>
-          <p:cNvSpPr>
-            <a:spLocks noGrp="1"/>
-          </p:cNvSpPr>
-          <p:nvPr>
-            <p:ph idx="1"/>
-          </p:nvPr>
-        </p:nvSpPr>
-        <p:spPr/>
-        <p:txBody>
-          <a:bodyPr/>
-          <a:lstStyle/>
-          <a:p>
-            <a:endParaRPr lang="en-US"/>
-          </a:p>
-        </p:txBody>
-      </p:sp>
+      <mc:AlternateContent xmlns:mc="http://schemas.openxmlformats.org/markup-compatibility/2006">
+        <mc:Choice xmlns:a14="http://schemas.microsoft.com/office/drawing/2010/main" Requires="a14">
+          <p:sp>
+            <p:nvSpPr>
+              <p:cNvPr id="3" name="コンテンツ プレースホルダー 2">
+                <a:extLst>
+                  <a:ext uri="{FF2B5EF4-FFF2-40B4-BE49-F238E27FC236}">
+                    <a16:creationId xmlns:a16="http://schemas.microsoft.com/office/drawing/2014/main" id="{3B3CCD9F-C8A0-4C66-A242-D9F826307A89}"/>
+                  </a:ext>
+                </a:extLst>
+              </p:cNvPr>
+              <p:cNvSpPr>
+                <a:spLocks noGrp="1"/>
+              </p:cNvSpPr>
+              <p:nvPr>
+                <p:ph idx="1"/>
+              </p:nvPr>
+            </p:nvSpPr>
+            <p:spPr>
+              <a:xfrm>
+                <a:off x="628650" y="1825624"/>
+                <a:ext cx="7886700" cy="3282085"/>
+              </a:xfrm>
+            </p:spPr>
+            <p:txBody>
+              <a:bodyPr/>
+              <a:lstStyle/>
+              <a:p>
+                <a:pPr marL="0" indent="0">
+                  <a:buNone/>
+                </a:pPr>
+                <a:r>
+                  <a:rPr lang="ja-JP" altLang="en-US" dirty="0"/>
+                  <a:t>与えられた値を元に，処理を実行し，</a:t>
+                </a:r>
+                <a:br>
+                  <a:rPr lang="en-US" altLang="ja-JP" dirty="0"/>
+                </a:br>
+                <a:r>
+                  <a:rPr lang="ja-JP" altLang="en-US" dirty="0"/>
+                  <a:t>その結果を返す命令のこと</a:t>
+                </a:r>
+                <a:endParaRPr lang="en-US" altLang="ja-JP" dirty="0"/>
+              </a:p>
+              <a:p>
+                <a:pPr marL="0" indent="0">
+                  <a:buNone/>
+                </a:pPr>
+                <a:endParaRPr lang="en-US" dirty="0"/>
+              </a:p>
+              <a:p>
+                <a:pPr marL="0" indent="0">
+                  <a:buNone/>
+                </a:pPr>
+                <a:r>
+                  <a:rPr lang="ja-JP" altLang="en-US" dirty="0"/>
+                  <a:t>例</a:t>
+                </a:r>
+                <a:r>
+                  <a:rPr lang="en-US" altLang="ja-JP" dirty="0"/>
+                  <a:t>) </a:t>
+                </a:r>
+                <a:r>
+                  <a:rPr lang="ja-JP" altLang="en-US" dirty="0"/>
+                  <a:t>重量と加速度を与えると力を得る</a:t>
+                </a:r>
+                <a:endParaRPr lang="en-US" altLang="ja-JP" dirty="0"/>
+              </a:p>
+              <a:p>
+                <a:pPr marL="0" indent="0">
+                  <a:buNone/>
+                </a:pPr>
+                <a14:m>
+                  <m:oMathPara xmlns:m="http://schemas.openxmlformats.org/officeDocument/2006/math">
+                    <m:oMathParaPr>
+                      <m:jc m:val="centerGroup"/>
+                    </m:oMathParaPr>
+                    <m:oMath xmlns:m="http://schemas.openxmlformats.org/officeDocument/2006/math">
+                      <m:r>
+                        <a:rPr lang="en-US" i="1" dirty="0" smtClean="0">
+                          <a:latin typeface="Cambria Math" panose="02040503050406030204" pitchFamily="18" charset="0"/>
+                        </a:rPr>
+                        <m:t>𝐹</m:t>
+                      </m:r>
+                      <m:r>
+                        <a:rPr lang="en-US" i="1" dirty="0">
+                          <a:latin typeface="Cambria Math" panose="02040503050406030204" pitchFamily="18" charset="0"/>
+                        </a:rPr>
+                        <m:t> </m:t>
+                      </m:r>
+                      <m:r>
+                        <a:rPr lang="en-US" i="1" dirty="0" smtClean="0">
+                          <a:latin typeface="Cambria Math" panose="02040503050406030204" pitchFamily="18" charset="0"/>
+                        </a:rPr>
+                        <m:t>=</m:t>
+                      </m:r>
+                      <m:r>
+                        <a:rPr lang="en-US" i="1" dirty="0">
+                          <a:latin typeface="Cambria Math" panose="02040503050406030204" pitchFamily="18" charset="0"/>
+                        </a:rPr>
+                        <m:t> </m:t>
+                      </m:r>
+                      <m:r>
+                        <a:rPr lang="en-US" i="1" dirty="0" smtClean="0">
+                          <a:latin typeface="Cambria Math" panose="02040503050406030204" pitchFamily="18" charset="0"/>
+                        </a:rPr>
+                        <m:t>𝑚</m:t>
+                      </m:r>
+                      <m:r>
+                        <a:rPr lang="en-US" i="1" dirty="0">
+                          <a:latin typeface="Cambria Math" panose="02040503050406030204" pitchFamily="18" charset="0"/>
+                        </a:rPr>
+                        <m:t>𝑎</m:t>
+                      </m:r>
+                    </m:oMath>
+                  </m:oMathPara>
+                </a14:m>
+                <a:endParaRPr lang="en-US" dirty="0"/>
+              </a:p>
+            </p:txBody>
+          </p:sp>
+        </mc:Choice>
+        <mc:Fallback>
+          <p:sp>
+            <p:nvSpPr>
+              <p:cNvPr id="3" name="コンテンツ プレースホルダー 2">
+                <a:extLst>
+                  <a:ext uri="{FF2B5EF4-FFF2-40B4-BE49-F238E27FC236}">
+                    <a16:creationId xmlns:a16="http://schemas.microsoft.com/office/drawing/2014/main" id="{3B3CCD9F-C8A0-4C66-A242-D9F826307A89}"/>
+                  </a:ext>
+                </a:extLst>
+              </p:cNvPr>
+              <p:cNvSpPr>
+                <a:spLocks noGrp="1" noRot="1" noChangeAspect="1" noMove="1" noResize="1" noEditPoints="1" noAdjustHandles="1" noChangeArrowheads="1" noChangeShapeType="1" noTextEdit="1"/>
+              </p:cNvSpPr>
+              <p:nvPr>
+                <p:ph idx="1"/>
+              </p:nvPr>
+            </p:nvSpPr>
+            <p:spPr>
+              <a:xfrm>
+                <a:off x="628650" y="1825624"/>
+                <a:ext cx="7886700" cy="3282085"/>
+              </a:xfrm>
+              <a:blipFill>
+                <a:blip r:embed="rId2"/>
+                <a:stretch>
+                  <a:fillRect l="-1932" t="-3711"/>
+                </a:stretch>
+              </a:blipFill>
+            </p:spPr>
+            <p:txBody>
+              <a:bodyPr/>
+              <a:lstStyle/>
+              <a:p>
+                <a:r>
+                  <a:rPr lang="ja-JP" altLang="en-US">
+                    <a:noFill/>
+                  </a:rPr>
+                  <a:t> </a:t>
+                </a:r>
+              </a:p>
+            </p:txBody>
+          </p:sp>
+        </mc:Fallback>
+      </mc:AlternateContent>
       <p:sp>
         <p:nvSpPr>
           <p:cNvPr id="5" name="スライド番号プレースホルダー 4">
@@ -18764,7 +18913,7 @@
           <p:cNvPr id="2" name="タイトル 1">
             <a:extLst>
               <a:ext uri="{FF2B5EF4-FFF2-40B4-BE49-F238E27FC236}">
-                <a16:creationId xmlns:a16="http://schemas.microsoft.com/office/drawing/2014/main" id="{FAF5DC41-DAEF-44F8-BABF-BA1D49ACA002}"/>
+                <a16:creationId xmlns:a16="http://schemas.microsoft.com/office/drawing/2014/main" id="{F6B36FFF-5648-4E54-83B1-95AB5C7DA3CB}"/>
               </a:ext>
             </a:extLst>
           </p:cNvPr>
@@ -18782,7 +18931,7 @@
           <a:p>
             <a:r>
               <a:rPr lang="en-US" dirty="0"/>
-              <a:t>Error</a:t>
+              <a:t>Function</a:t>
             </a:r>
           </a:p>
         </p:txBody>
@@ -18792,7 +18941,7 @@
           <p:cNvPr id="3" name="コンテンツ プレースホルダー 2">
             <a:extLst>
               <a:ext uri="{FF2B5EF4-FFF2-40B4-BE49-F238E27FC236}">
-                <a16:creationId xmlns:a16="http://schemas.microsoft.com/office/drawing/2014/main" id="{E0FA2130-D6D3-4220-959F-C91BC53FAB78}"/>
+                <a16:creationId xmlns:a16="http://schemas.microsoft.com/office/drawing/2014/main" id="{3B3CCD9F-C8A0-4C66-A242-D9F826307A89}"/>
               </a:ext>
             </a:extLst>
           </p:cNvPr>
@@ -18803,11 +18952,56 @@
             <p:ph idx="1"/>
           </p:nvPr>
         </p:nvSpPr>
-        <p:spPr/>
+        <p:spPr>
+          <a:xfrm>
+            <a:off x="628650" y="1825624"/>
+            <a:ext cx="7886700" cy="4530727"/>
+          </a:xfrm>
+        </p:spPr>
         <p:txBody>
           <a:bodyPr/>
           <a:lstStyle/>
           <a:p>
+            <a:pPr marL="0" indent="0">
+              <a:buNone/>
+            </a:pPr>
+            <a:r>
+              <a:rPr lang="ja-JP" altLang="en-US" dirty="0"/>
+              <a:t>関数を利用するメリット</a:t>
+            </a:r>
+            <a:endParaRPr lang="en-US" altLang="ja-JP" dirty="0"/>
+          </a:p>
+          <a:p>
+            <a:pPr>
+              <a:buFontTx/>
+              <a:buChar char="-"/>
+            </a:pPr>
+            <a:r>
+              <a:rPr lang="ja-JP" altLang="en-US" dirty="0"/>
+              <a:t>処理に名前を付けれる</a:t>
+            </a:r>
+            <a:endParaRPr lang="en-US" altLang="ja-JP" dirty="0"/>
+          </a:p>
+          <a:p>
+            <a:pPr>
+              <a:buFontTx/>
+              <a:buChar char="-"/>
+            </a:pPr>
+            <a:r>
+              <a:rPr lang="ja-JP" altLang="en-US" dirty="0"/>
+              <a:t>処理の重複の回避</a:t>
+            </a:r>
+            <a:endParaRPr lang="en-US" altLang="ja-JP" dirty="0"/>
+          </a:p>
+          <a:p>
+            <a:pPr>
+              <a:buFontTx/>
+              <a:buChar char="-"/>
+            </a:pPr>
+            <a:r>
+              <a:rPr lang="ja-JP" altLang="en-US" dirty="0"/>
+              <a:t>修正ポイントを限定できる</a:t>
+            </a:r>
             <a:endParaRPr lang="en-US" dirty="0"/>
           </a:p>
         </p:txBody>
@@ -18817,7 +19011,7 @@
           <p:cNvPr id="5" name="スライド番号プレースホルダー 4">
             <a:extLst>
               <a:ext uri="{FF2B5EF4-FFF2-40B4-BE49-F238E27FC236}">
-                <a16:creationId xmlns:a16="http://schemas.microsoft.com/office/drawing/2014/main" id="{4D897C1E-210D-40AA-B1A3-6D30B53F200F}"/>
+                <a16:creationId xmlns:a16="http://schemas.microsoft.com/office/drawing/2014/main" id="{5AE19A5F-72FC-45C6-A95A-B0D52F671680}"/>
               </a:ext>
             </a:extLst>
           </p:cNvPr>
@@ -18845,7 +19039,7 @@
     </p:spTree>
     <p:extLst>
       <p:ext uri="{BB962C8B-B14F-4D97-AF65-F5344CB8AC3E}">
-        <p14:creationId xmlns:p14="http://schemas.microsoft.com/office/powerpoint/2010/main" val="107592700"/>
+        <p14:creationId xmlns:p14="http://schemas.microsoft.com/office/powerpoint/2010/main" val="1323514498"/>
       </p:ext>
     </p:extLst>
   </p:cSld>
@@ -18877,7 +19071,7 @@
           <p:cNvPr id="2" name="タイトル 1">
             <a:extLst>
               <a:ext uri="{FF2B5EF4-FFF2-40B4-BE49-F238E27FC236}">
-                <a16:creationId xmlns:a16="http://schemas.microsoft.com/office/drawing/2014/main" id="{8F0D12C3-4CDC-4F57-9D7E-A2DB95866AE8}"/>
+                <a16:creationId xmlns:a16="http://schemas.microsoft.com/office/drawing/2014/main" id="{F6B36FFF-5648-4E54-83B1-95AB5C7DA3CB}"/>
               </a:ext>
             </a:extLst>
           </p:cNvPr>
@@ -18895,7 +19089,7 @@
           <a:p>
             <a:r>
               <a:rPr lang="en-US" dirty="0"/>
-              <a:t>Summary</a:t>
+              <a:t>Function</a:t>
             </a:r>
           </a:p>
         </p:txBody>
@@ -18905,7 +19099,7 @@
           <p:cNvPr id="3" name="コンテンツ プレースホルダー 2">
             <a:extLst>
               <a:ext uri="{FF2B5EF4-FFF2-40B4-BE49-F238E27FC236}">
-                <a16:creationId xmlns:a16="http://schemas.microsoft.com/office/drawing/2014/main" id="{9CD5CAFA-55C1-4CBE-B983-ACB13AC199C5}"/>
+                <a16:creationId xmlns:a16="http://schemas.microsoft.com/office/drawing/2014/main" id="{3B3CCD9F-C8A0-4C66-A242-D9F826307A89}"/>
               </a:ext>
             </a:extLst>
           </p:cNvPr>
@@ -18916,12 +19110,24 @@
             <p:ph idx="1"/>
           </p:nvPr>
         </p:nvSpPr>
-        <p:spPr/>
+        <p:spPr>
+          <a:xfrm>
+            <a:off x="628650" y="1825625"/>
+            <a:ext cx="7886700" cy="612776"/>
+          </a:xfrm>
+        </p:spPr>
         <p:txBody>
           <a:bodyPr/>
           <a:lstStyle/>
           <a:p>
-            <a:endParaRPr lang="en-US"/>
+            <a:pPr marL="0" indent="0">
+              <a:buNone/>
+            </a:pPr>
+            <a:r>
+              <a:rPr lang="ja-JP" altLang="en-US" dirty="0"/>
+              <a:t>関数を使わなかった場合</a:t>
+            </a:r>
+            <a:endParaRPr lang="en-US" dirty="0"/>
           </a:p>
         </p:txBody>
       </p:sp>
@@ -18930,7 +19136,7 @@
           <p:cNvPr id="5" name="スライド番号プレースホルダー 4">
             <a:extLst>
               <a:ext uri="{FF2B5EF4-FFF2-40B4-BE49-F238E27FC236}">
-                <a16:creationId xmlns:a16="http://schemas.microsoft.com/office/drawing/2014/main" id="{EF72F589-D9F4-40B5-BFD0-A9881E9136BC}"/>
+                <a16:creationId xmlns:a16="http://schemas.microsoft.com/office/drawing/2014/main" id="{5AE19A5F-72FC-45C6-A95A-B0D52F671680}"/>
               </a:ext>
             </a:extLst>
           </p:cNvPr>
@@ -18955,10 +19161,214 @@
           </a:p>
         </p:txBody>
       </p:sp>
+      <p:sp>
+        <p:nvSpPr>
+          <p:cNvPr id="4" name="コンテンツ プレースホルダー 2">
+            <a:extLst>
+              <a:ext uri="{FF2B5EF4-FFF2-40B4-BE49-F238E27FC236}">
+                <a16:creationId xmlns:a16="http://schemas.microsoft.com/office/drawing/2014/main" id="{1A45E8E9-6789-A0D0-4AA7-1790B779D239}"/>
+              </a:ext>
+            </a:extLst>
+          </p:cNvPr>
+          <p:cNvSpPr txBox="1">
+            <a:spLocks/>
+          </p:cNvSpPr>
+          <p:nvPr/>
+        </p:nvSpPr>
+        <p:spPr>
+          <a:xfrm>
+            <a:off x="628650" y="4096616"/>
+            <a:ext cx="7886700" cy="612776"/>
+          </a:xfrm>
+          <a:prstGeom prst="rect">
+            <a:avLst/>
+          </a:prstGeom>
+        </p:spPr>
+        <p:txBody>
+          <a:bodyPr vert="horz" lIns="91440" tIns="45720" rIns="91440" bIns="45720" rtlCol="0">
+            <a:normAutofit/>
+          </a:bodyPr>
+          <a:lstStyle>
+            <a:lvl1pPr marL="228600" indent="-228600" algn="l" defTabSz="914400" rtl="0" eaLnBrk="1" latinLnBrk="0" hangingPunct="1">
+              <a:lnSpc>
+                <a:spcPct val="90000"/>
+              </a:lnSpc>
+              <a:spcBef>
+                <a:spcPts val="1000"/>
+              </a:spcBef>
+              <a:buFont typeface="Arial" panose="020B0604020202020204" pitchFamily="34" charset="0"/>
+              <a:buChar char="•"/>
+              <a:defRPr sz="3200" kern="1200">
+                <a:solidFill>
+                  <a:schemeClr val="tx1"/>
+                </a:solidFill>
+                <a:latin typeface="+mn-lt"/>
+                <a:ea typeface="+mn-ea"/>
+                <a:cs typeface="+mn-cs"/>
+              </a:defRPr>
+            </a:lvl1pPr>
+            <a:lvl2pPr marL="685800" indent="-228600" algn="l" defTabSz="914400" rtl="0" eaLnBrk="1" latinLnBrk="0" hangingPunct="1">
+              <a:lnSpc>
+                <a:spcPct val="90000"/>
+              </a:lnSpc>
+              <a:spcBef>
+                <a:spcPts val="500"/>
+              </a:spcBef>
+              <a:buFont typeface="Arial" panose="020B0604020202020204" pitchFamily="34" charset="0"/>
+              <a:buChar char="•"/>
+              <a:defRPr sz="2800" kern="1200">
+                <a:solidFill>
+                  <a:schemeClr val="tx1"/>
+                </a:solidFill>
+                <a:latin typeface="+mn-lt"/>
+                <a:ea typeface="+mn-ea"/>
+                <a:cs typeface="+mn-cs"/>
+              </a:defRPr>
+            </a:lvl2pPr>
+            <a:lvl3pPr marL="1143000" indent="-228600" algn="l" defTabSz="914400" rtl="0" eaLnBrk="1" latinLnBrk="0" hangingPunct="1">
+              <a:lnSpc>
+                <a:spcPct val="90000"/>
+              </a:lnSpc>
+              <a:spcBef>
+                <a:spcPts val="500"/>
+              </a:spcBef>
+              <a:buFont typeface="Arial" panose="020B0604020202020204" pitchFamily="34" charset="0"/>
+              <a:buChar char="•"/>
+              <a:defRPr sz="2400" kern="1200">
+                <a:solidFill>
+                  <a:schemeClr val="tx1"/>
+                </a:solidFill>
+                <a:latin typeface="+mn-lt"/>
+                <a:ea typeface="+mn-ea"/>
+                <a:cs typeface="+mn-cs"/>
+              </a:defRPr>
+            </a:lvl3pPr>
+            <a:lvl4pPr marL="1600200" indent="-228600" algn="l" defTabSz="914400" rtl="0" eaLnBrk="1" latinLnBrk="0" hangingPunct="1">
+              <a:lnSpc>
+                <a:spcPct val="90000"/>
+              </a:lnSpc>
+              <a:spcBef>
+                <a:spcPts val="500"/>
+              </a:spcBef>
+              <a:buFont typeface="Arial" panose="020B0604020202020204" pitchFamily="34" charset="0"/>
+              <a:buChar char="•"/>
+              <a:defRPr sz="2000" kern="1200">
+                <a:solidFill>
+                  <a:schemeClr val="tx1"/>
+                </a:solidFill>
+                <a:latin typeface="+mn-lt"/>
+                <a:ea typeface="+mn-ea"/>
+                <a:cs typeface="+mn-cs"/>
+              </a:defRPr>
+            </a:lvl4pPr>
+            <a:lvl5pPr marL="2057400" indent="-228600" algn="l" defTabSz="914400" rtl="0" eaLnBrk="1" latinLnBrk="0" hangingPunct="1">
+              <a:lnSpc>
+                <a:spcPct val="90000"/>
+              </a:lnSpc>
+              <a:spcBef>
+                <a:spcPts val="500"/>
+              </a:spcBef>
+              <a:buFont typeface="Arial" panose="020B0604020202020204" pitchFamily="34" charset="0"/>
+              <a:buChar char="•"/>
+              <a:defRPr sz="2000" kern="1200">
+                <a:solidFill>
+                  <a:schemeClr val="tx1"/>
+                </a:solidFill>
+                <a:latin typeface="+mn-lt"/>
+                <a:ea typeface="+mn-ea"/>
+                <a:cs typeface="+mn-cs"/>
+              </a:defRPr>
+            </a:lvl5pPr>
+            <a:lvl6pPr marL="2514600" indent="-228600" algn="l" defTabSz="914400" rtl="0" eaLnBrk="1" latinLnBrk="0" hangingPunct="1">
+              <a:lnSpc>
+                <a:spcPct val="90000"/>
+              </a:lnSpc>
+              <a:spcBef>
+                <a:spcPts val="500"/>
+              </a:spcBef>
+              <a:buFont typeface="Arial" panose="020B0604020202020204" pitchFamily="34" charset="0"/>
+              <a:buChar char="•"/>
+              <a:defRPr sz="1800" kern="1200">
+                <a:solidFill>
+                  <a:schemeClr val="tx1"/>
+                </a:solidFill>
+                <a:latin typeface="+mn-lt"/>
+                <a:ea typeface="+mn-ea"/>
+                <a:cs typeface="+mn-cs"/>
+              </a:defRPr>
+            </a:lvl6pPr>
+            <a:lvl7pPr marL="2971800" indent="-228600" algn="l" defTabSz="914400" rtl="0" eaLnBrk="1" latinLnBrk="0" hangingPunct="1">
+              <a:lnSpc>
+                <a:spcPct val="90000"/>
+              </a:lnSpc>
+              <a:spcBef>
+                <a:spcPts val="500"/>
+              </a:spcBef>
+              <a:buFont typeface="Arial" panose="020B0604020202020204" pitchFamily="34" charset="0"/>
+              <a:buChar char="•"/>
+              <a:defRPr sz="1800" kern="1200">
+                <a:solidFill>
+                  <a:schemeClr val="tx1"/>
+                </a:solidFill>
+                <a:latin typeface="+mn-lt"/>
+                <a:ea typeface="+mn-ea"/>
+                <a:cs typeface="+mn-cs"/>
+              </a:defRPr>
+            </a:lvl7pPr>
+            <a:lvl8pPr marL="3429000" indent="-228600" algn="l" defTabSz="914400" rtl="0" eaLnBrk="1" latinLnBrk="0" hangingPunct="1">
+              <a:lnSpc>
+                <a:spcPct val="90000"/>
+              </a:lnSpc>
+              <a:spcBef>
+                <a:spcPts val="500"/>
+              </a:spcBef>
+              <a:buFont typeface="Arial" panose="020B0604020202020204" pitchFamily="34" charset="0"/>
+              <a:buChar char="•"/>
+              <a:defRPr sz="1800" kern="1200">
+                <a:solidFill>
+                  <a:schemeClr val="tx1"/>
+                </a:solidFill>
+                <a:latin typeface="+mn-lt"/>
+                <a:ea typeface="+mn-ea"/>
+                <a:cs typeface="+mn-cs"/>
+              </a:defRPr>
+            </a:lvl8pPr>
+            <a:lvl9pPr marL="3886200" indent="-228600" algn="l" defTabSz="914400" rtl="0" eaLnBrk="1" latinLnBrk="0" hangingPunct="1">
+              <a:lnSpc>
+                <a:spcPct val="90000"/>
+              </a:lnSpc>
+              <a:spcBef>
+                <a:spcPts val="500"/>
+              </a:spcBef>
+              <a:buFont typeface="Arial" panose="020B0604020202020204" pitchFamily="34" charset="0"/>
+              <a:buChar char="•"/>
+              <a:defRPr sz="1800" kern="1200">
+                <a:solidFill>
+                  <a:schemeClr val="tx1"/>
+                </a:solidFill>
+                <a:latin typeface="+mn-lt"/>
+                <a:ea typeface="+mn-ea"/>
+                <a:cs typeface="+mn-cs"/>
+              </a:defRPr>
+            </a:lvl9pPr>
+          </a:lstStyle>
+          <a:p>
+            <a:pPr marL="0" indent="0">
+              <a:buFont typeface="Arial" panose="020B0604020202020204" pitchFamily="34" charset="0"/>
+              <a:buNone/>
+            </a:pPr>
+            <a:r>
+              <a:rPr lang="ja-JP" altLang="en-US" dirty="0"/>
+              <a:t>関数を使った場合</a:t>
+            </a:r>
+            <a:endParaRPr lang="en-US" dirty="0"/>
+          </a:p>
+        </p:txBody>
+      </p:sp>
     </p:spTree>
     <p:extLst>
       <p:ext uri="{BB962C8B-B14F-4D97-AF65-F5344CB8AC3E}">
-        <p14:creationId xmlns:p14="http://schemas.microsoft.com/office/powerpoint/2010/main" val="3274883772"/>
+        <p14:creationId xmlns:p14="http://schemas.microsoft.com/office/powerpoint/2010/main" val="1346212990"/>
       </p:ext>
     </p:extLst>
   </p:cSld>
@@ -18990,7 +19400,7 @@
           <p:cNvPr id="2" name="タイトル 1">
             <a:extLst>
               <a:ext uri="{FF2B5EF4-FFF2-40B4-BE49-F238E27FC236}">
-                <a16:creationId xmlns:a16="http://schemas.microsoft.com/office/drawing/2014/main" id="{1532B8A9-CC3C-4755-A0C2-83191887A59F}"/>
+                <a16:creationId xmlns:a16="http://schemas.microsoft.com/office/drawing/2014/main" id="{F6B36FFF-5648-4E54-83B1-95AB5C7DA3CB}"/>
               </a:ext>
             </a:extLst>
           </p:cNvPr>
@@ -19008,7 +19418,7 @@
           <a:p>
             <a:r>
               <a:rPr lang="en-US" dirty="0"/>
-              <a:t>References</a:t>
+              <a:t>Problem(Function)</a:t>
             </a:r>
           </a:p>
         </p:txBody>
@@ -19018,7 +19428,7 @@
           <p:cNvPr id="3" name="コンテンツ プレースホルダー 2">
             <a:extLst>
               <a:ext uri="{FF2B5EF4-FFF2-40B4-BE49-F238E27FC236}">
-                <a16:creationId xmlns:a16="http://schemas.microsoft.com/office/drawing/2014/main" id="{0CFB61A8-0A55-494F-96FA-020C659922F5}"/>
+                <a16:creationId xmlns:a16="http://schemas.microsoft.com/office/drawing/2014/main" id="{3B3CCD9F-C8A0-4C66-A242-D9F826307A89}"/>
               </a:ext>
             </a:extLst>
           </p:cNvPr>
@@ -19029,24 +19439,22 @@
             <p:ph idx="1"/>
           </p:nvPr>
         </p:nvSpPr>
-        <p:spPr/>
+        <p:spPr>
+          <a:xfrm>
+            <a:off x="628650" y="2625869"/>
+            <a:ext cx="7886700" cy="612776"/>
+          </a:xfrm>
+        </p:spPr>
         <p:txBody>
           <a:bodyPr/>
           <a:lstStyle/>
           <a:p>
+            <a:pPr marL="0" indent="0">
+              <a:buNone/>
+            </a:pPr>
             <a:r>
               <a:rPr lang="ja-JP" altLang="en-US" dirty="0"/>
-              <a:t>演算子について</a:t>
-            </a:r>
-            <a:endParaRPr lang="en-US" altLang="ja-JP" dirty="0"/>
-          </a:p>
-          <a:p>
-            <a:pPr lvl="1"/>
-            <a:r>
-              <a:rPr lang="en-US" dirty="0">
-                <a:hlinkClick r:id="rId2"/>
-              </a:rPr>
-              <a:t>https://atmarkit.itmedia.co.jp/ait/articles/1907/23/news010.html</a:t>
+              <a:t>入力例</a:t>
             </a:r>
             <a:endParaRPr lang="en-US" dirty="0"/>
           </a:p>
@@ -19057,7 +19465,7 @@
           <p:cNvPr id="5" name="スライド番号プレースホルダー 4">
             <a:extLst>
               <a:ext uri="{FF2B5EF4-FFF2-40B4-BE49-F238E27FC236}">
-                <a16:creationId xmlns:a16="http://schemas.microsoft.com/office/drawing/2014/main" id="{D1D09D41-F574-4AE8-B82D-35FD724EA6EA}"/>
+                <a16:creationId xmlns:a16="http://schemas.microsoft.com/office/drawing/2014/main" id="{5AE19A5F-72FC-45C6-A95A-B0D52F671680}"/>
               </a:ext>
             </a:extLst>
           </p:cNvPr>
@@ -19082,10 +19490,214 @@
           </a:p>
         </p:txBody>
       </p:sp>
+      <p:sp>
+        <p:nvSpPr>
+          <p:cNvPr id="6" name="コンテンツ プレースホルダー 2">
+            <a:extLst>
+              <a:ext uri="{FF2B5EF4-FFF2-40B4-BE49-F238E27FC236}">
+                <a16:creationId xmlns:a16="http://schemas.microsoft.com/office/drawing/2014/main" id="{34602202-A725-509D-F5F1-DCFE32F16F36}"/>
+              </a:ext>
+            </a:extLst>
+          </p:cNvPr>
+          <p:cNvSpPr txBox="1">
+            <a:spLocks/>
+          </p:cNvSpPr>
+          <p:nvPr/>
+        </p:nvSpPr>
+        <p:spPr>
+          <a:xfrm>
+            <a:off x="628650" y="4379480"/>
+            <a:ext cx="7886700" cy="612776"/>
+          </a:xfrm>
+          <a:prstGeom prst="rect">
+            <a:avLst/>
+          </a:prstGeom>
+        </p:spPr>
+        <p:txBody>
+          <a:bodyPr vert="horz" lIns="91440" tIns="45720" rIns="91440" bIns="45720" rtlCol="0">
+            <a:normAutofit/>
+          </a:bodyPr>
+          <a:lstStyle>
+            <a:lvl1pPr marL="228600" indent="-228600" algn="l" defTabSz="914400" rtl="0" eaLnBrk="1" latinLnBrk="0" hangingPunct="1">
+              <a:lnSpc>
+                <a:spcPct val="90000"/>
+              </a:lnSpc>
+              <a:spcBef>
+                <a:spcPts val="1000"/>
+              </a:spcBef>
+              <a:buFont typeface="Arial" panose="020B0604020202020204" pitchFamily="34" charset="0"/>
+              <a:buChar char="•"/>
+              <a:defRPr sz="3200" kern="1200">
+                <a:solidFill>
+                  <a:schemeClr val="tx1"/>
+                </a:solidFill>
+                <a:latin typeface="+mn-lt"/>
+                <a:ea typeface="+mn-ea"/>
+                <a:cs typeface="+mn-cs"/>
+              </a:defRPr>
+            </a:lvl1pPr>
+            <a:lvl2pPr marL="685800" indent="-228600" algn="l" defTabSz="914400" rtl="0" eaLnBrk="1" latinLnBrk="0" hangingPunct="1">
+              <a:lnSpc>
+                <a:spcPct val="90000"/>
+              </a:lnSpc>
+              <a:spcBef>
+                <a:spcPts val="500"/>
+              </a:spcBef>
+              <a:buFont typeface="Arial" panose="020B0604020202020204" pitchFamily="34" charset="0"/>
+              <a:buChar char="•"/>
+              <a:defRPr sz="2800" kern="1200">
+                <a:solidFill>
+                  <a:schemeClr val="tx1"/>
+                </a:solidFill>
+                <a:latin typeface="+mn-lt"/>
+                <a:ea typeface="+mn-ea"/>
+                <a:cs typeface="+mn-cs"/>
+              </a:defRPr>
+            </a:lvl2pPr>
+            <a:lvl3pPr marL="1143000" indent="-228600" algn="l" defTabSz="914400" rtl="0" eaLnBrk="1" latinLnBrk="0" hangingPunct="1">
+              <a:lnSpc>
+                <a:spcPct val="90000"/>
+              </a:lnSpc>
+              <a:spcBef>
+                <a:spcPts val="500"/>
+              </a:spcBef>
+              <a:buFont typeface="Arial" panose="020B0604020202020204" pitchFamily="34" charset="0"/>
+              <a:buChar char="•"/>
+              <a:defRPr sz="2400" kern="1200">
+                <a:solidFill>
+                  <a:schemeClr val="tx1"/>
+                </a:solidFill>
+                <a:latin typeface="+mn-lt"/>
+                <a:ea typeface="+mn-ea"/>
+                <a:cs typeface="+mn-cs"/>
+              </a:defRPr>
+            </a:lvl3pPr>
+            <a:lvl4pPr marL="1600200" indent="-228600" algn="l" defTabSz="914400" rtl="0" eaLnBrk="1" latinLnBrk="0" hangingPunct="1">
+              <a:lnSpc>
+                <a:spcPct val="90000"/>
+              </a:lnSpc>
+              <a:spcBef>
+                <a:spcPts val="500"/>
+              </a:spcBef>
+              <a:buFont typeface="Arial" panose="020B0604020202020204" pitchFamily="34" charset="0"/>
+              <a:buChar char="•"/>
+              <a:defRPr sz="2000" kern="1200">
+                <a:solidFill>
+                  <a:schemeClr val="tx1"/>
+                </a:solidFill>
+                <a:latin typeface="+mn-lt"/>
+                <a:ea typeface="+mn-ea"/>
+                <a:cs typeface="+mn-cs"/>
+              </a:defRPr>
+            </a:lvl4pPr>
+            <a:lvl5pPr marL="2057400" indent="-228600" algn="l" defTabSz="914400" rtl="0" eaLnBrk="1" latinLnBrk="0" hangingPunct="1">
+              <a:lnSpc>
+                <a:spcPct val="90000"/>
+              </a:lnSpc>
+              <a:spcBef>
+                <a:spcPts val="500"/>
+              </a:spcBef>
+              <a:buFont typeface="Arial" panose="020B0604020202020204" pitchFamily="34" charset="0"/>
+              <a:buChar char="•"/>
+              <a:defRPr sz="2000" kern="1200">
+                <a:solidFill>
+                  <a:schemeClr val="tx1"/>
+                </a:solidFill>
+                <a:latin typeface="+mn-lt"/>
+                <a:ea typeface="+mn-ea"/>
+                <a:cs typeface="+mn-cs"/>
+              </a:defRPr>
+            </a:lvl5pPr>
+            <a:lvl6pPr marL="2514600" indent="-228600" algn="l" defTabSz="914400" rtl="0" eaLnBrk="1" latinLnBrk="0" hangingPunct="1">
+              <a:lnSpc>
+                <a:spcPct val="90000"/>
+              </a:lnSpc>
+              <a:spcBef>
+                <a:spcPts val="500"/>
+              </a:spcBef>
+              <a:buFont typeface="Arial" panose="020B0604020202020204" pitchFamily="34" charset="0"/>
+              <a:buChar char="•"/>
+              <a:defRPr sz="1800" kern="1200">
+                <a:solidFill>
+                  <a:schemeClr val="tx1"/>
+                </a:solidFill>
+                <a:latin typeface="+mn-lt"/>
+                <a:ea typeface="+mn-ea"/>
+                <a:cs typeface="+mn-cs"/>
+              </a:defRPr>
+            </a:lvl6pPr>
+            <a:lvl7pPr marL="2971800" indent="-228600" algn="l" defTabSz="914400" rtl="0" eaLnBrk="1" latinLnBrk="0" hangingPunct="1">
+              <a:lnSpc>
+                <a:spcPct val="90000"/>
+              </a:lnSpc>
+              <a:spcBef>
+                <a:spcPts val="500"/>
+              </a:spcBef>
+              <a:buFont typeface="Arial" panose="020B0604020202020204" pitchFamily="34" charset="0"/>
+              <a:buChar char="•"/>
+              <a:defRPr sz="1800" kern="1200">
+                <a:solidFill>
+                  <a:schemeClr val="tx1"/>
+                </a:solidFill>
+                <a:latin typeface="+mn-lt"/>
+                <a:ea typeface="+mn-ea"/>
+                <a:cs typeface="+mn-cs"/>
+              </a:defRPr>
+            </a:lvl7pPr>
+            <a:lvl8pPr marL="3429000" indent="-228600" algn="l" defTabSz="914400" rtl="0" eaLnBrk="1" latinLnBrk="0" hangingPunct="1">
+              <a:lnSpc>
+                <a:spcPct val="90000"/>
+              </a:lnSpc>
+              <a:spcBef>
+                <a:spcPts val="500"/>
+              </a:spcBef>
+              <a:buFont typeface="Arial" panose="020B0604020202020204" pitchFamily="34" charset="0"/>
+              <a:buChar char="•"/>
+              <a:defRPr sz="1800" kern="1200">
+                <a:solidFill>
+                  <a:schemeClr val="tx1"/>
+                </a:solidFill>
+                <a:latin typeface="+mn-lt"/>
+                <a:ea typeface="+mn-ea"/>
+                <a:cs typeface="+mn-cs"/>
+              </a:defRPr>
+            </a:lvl8pPr>
+            <a:lvl9pPr marL="3886200" indent="-228600" algn="l" defTabSz="914400" rtl="0" eaLnBrk="1" latinLnBrk="0" hangingPunct="1">
+              <a:lnSpc>
+                <a:spcPct val="90000"/>
+              </a:lnSpc>
+              <a:spcBef>
+                <a:spcPts val="500"/>
+              </a:spcBef>
+              <a:buFont typeface="Arial" panose="020B0604020202020204" pitchFamily="34" charset="0"/>
+              <a:buChar char="•"/>
+              <a:defRPr sz="1800" kern="1200">
+                <a:solidFill>
+                  <a:schemeClr val="tx1"/>
+                </a:solidFill>
+                <a:latin typeface="+mn-lt"/>
+                <a:ea typeface="+mn-ea"/>
+                <a:cs typeface="+mn-cs"/>
+              </a:defRPr>
+            </a:lvl9pPr>
+          </a:lstStyle>
+          <a:p>
+            <a:pPr marL="0" indent="0">
+              <a:buFont typeface="Arial" panose="020B0604020202020204" pitchFamily="34" charset="0"/>
+              <a:buNone/>
+            </a:pPr>
+            <a:r>
+              <a:rPr lang="ja-JP" altLang="en-US" dirty="0"/>
+              <a:t>出力例</a:t>
+            </a:r>
+            <a:endParaRPr lang="en-US" dirty="0"/>
+          </a:p>
+        </p:txBody>
+      </p:sp>
     </p:spTree>
     <p:extLst>
       <p:ext uri="{BB962C8B-B14F-4D97-AF65-F5344CB8AC3E}">
-        <p14:creationId xmlns:p14="http://schemas.microsoft.com/office/powerpoint/2010/main" val="532900966"/>
+        <p14:creationId xmlns:p14="http://schemas.microsoft.com/office/powerpoint/2010/main" val="2985362723"/>
       </p:ext>
     </p:extLst>
   </p:cSld>
@@ -19251,7 +19863,7 @@
           <p:cNvPr id="2" name="タイトル 1">
             <a:extLst>
               <a:ext uri="{FF2B5EF4-FFF2-40B4-BE49-F238E27FC236}">
-                <a16:creationId xmlns:a16="http://schemas.microsoft.com/office/drawing/2014/main" id="{F841434E-D430-4496-8D5B-CE28B163C746}"/>
+                <a16:creationId xmlns:a16="http://schemas.microsoft.com/office/drawing/2014/main" id="{F6B36FFF-5648-4E54-83B1-95AB5C7DA3CB}"/>
               </a:ext>
             </a:extLst>
           </p:cNvPr>
@@ -19269,7 +19881,7 @@
           <a:p>
             <a:r>
               <a:rPr lang="en-US" dirty="0"/>
-              <a:t>Bonus Contents</a:t>
+              <a:t>Problem(Function)</a:t>
             </a:r>
           </a:p>
         </p:txBody>
@@ -19279,7 +19891,7 @@
           <p:cNvPr id="3" name="コンテンツ プレースホルダー 2">
             <a:extLst>
               <a:ext uri="{FF2B5EF4-FFF2-40B4-BE49-F238E27FC236}">
-                <a16:creationId xmlns:a16="http://schemas.microsoft.com/office/drawing/2014/main" id="{2551BBAA-5F75-41A1-852A-257BAF35910B}"/>
+                <a16:creationId xmlns:a16="http://schemas.microsoft.com/office/drawing/2014/main" id="{3B3CCD9F-C8A0-4C66-A242-D9F826307A89}"/>
               </a:ext>
             </a:extLst>
           </p:cNvPr>
@@ -19290,62 +19902,23 @@
             <p:ph idx="1"/>
           </p:nvPr>
         </p:nvSpPr>
-        <p:spPr/>
+        <p:spPr>
+          <a:xfrm>
+            <a:off x="628650" y="1825625"/>
+            <a:ext cx="7886700" cy="612776"/>
+          </a:xfrm>
+        </p:spPr>
         <p:txBody>
           <a:bodyPr/>
           <a:lstStyle/>
           <a:p>
-            <a:r>
-              <a:rPr lang="en-US" dirty="0" err="1"/>
-              <a:t>AtCoder</a:t>
-            </a:r>
-            <a:endParaRPr lang="en-US" dirty="0"/>
-          </a:p>
-          <a:p>
-            <a:pPr lvl="1"/>
-            <a:r>
-              <a:rPr lang="en-US" dirty="0">
-                <a:hlinkClick r:id="rId2"/>
-              </a:rPr>
-              <a:t>https://atcoder.jp/?lang=ja</a:t>
-            </a:r>
-            <a:endParaRPr lang="en-US" dirty="0"/>
-          </a:p>
-          <a:p>
-            <a:r>
-              <a:rPr lang="en-US" dirty="0" err="1"/>
-              <a:t>CodinGame</a:t>
-            </a:r>
-            <a:endParaRPr lang="en-US" dirty="0"/>
-          </a:p>
-          <a:p>
-            <a:pPr lvl="1"/>
-            <a:r>
-              <a:rPr lang="en-US" dirty="0">
-                <a:hlinkClick r:id="rId3"/>
-              </a:rPr>
-              <a:t>https://www.codingame.com/start</a:t>
-            </a:r>
-            <a:endParaRPr lang="en-US" dirty="0"/>
-          </a:p>
-          <a:p>
-            <a:r>
-              <a:rPr lang="en-US" dirty="0" err="1"/>
-              <a:t>Codeforces</a:t>
-            </a:r>
-            <a:endParaRPr lang="en-US" dirty="0"/>
-          </a:p>
-          <a:p>
-            <a:pPr lvl="1"/>
-            <a:r>
-              <a:rPr lang="en-US" dirty="0">
-                <a:hlinkClick r:id="rId4"/>
-              </a:rPr>
-              <a:t>https://codeforces.com/</a:t>
-            </a:r>
-            <a:endParaRPr lang="en-US" dirty="0"/>
-          </a:p>
-          <a:p>
+            <a:pPr marL="0" indent="0">
+              <a:buNone/>
+            </a:pPr>
+            <a:r>
+              <a:rPr lang="ja-JP" altLang="en-US" dirty="0"/>
+              <a:t>解法</a:t>
+            </a:r>
             <a:endParaRPr lang="en-US" dirty="0"/>
           </a:p>
         </p:txBody>
@@ -19355,7 +19928,7 @@
           <p:cNvPr id="5" name="スライド番号プレースホルダー 4">
             <a:extLst>
               <a:ext uri="{FF2B5EF4-FFF2-40B4-BE49-F238E27FC236}">
-                <a16:creationId xmlns:a16="http://schemas.microsoft.com/office/drawing/2014/main" id="{158938BA-66FF-472E-8C9A-66E7F1533947}"/>
+                <a16:creationId xmlns:a16="http://schemas.microsoft.com/office/drawing/2014/main" id="{5AE19A5F-72FC-45C6-A95A-B0D52F671680}"/>
               </a:ext>
             </a:extLst>
           </p:cNvPr>
@@ -19383,7 +19956,7 @@
     </p:spTree>
     <p:extLst>
       <p:ext uri="{BB962C8B-B14F-4D97-AF65-F5344CB8AC3E}">
-        <p14:creationId xmlns:p14="http://schemas.microsoft.com/office/powerpoint/2010/main" val="1464208581"/>
+        <p14:creationId xmlns:p14="http://schemas.microsoft.com/office/powerpoint/2010/main" val="2832549530"/>
       </p:ext>
     </p:extLst>
   </p:cSld>
@@ -19415,6 +19988,523 @@
           <p:cNvPr id="2" name="タイトル 1">
             <a:extLst>
               <a:ext uri="{FF2B5EF4-FFF2-40B4-BE49-F238E27FC236}">
+                <a16:creationId xmlns:a16="http://schemas.microsoft.com/office/drawing/2014/main" id="{FAF5DC41-DAEF-44F8-BABF-BA1D49ACA002}"/>
+              </a:ext>
+            </a:extLst>
+          </p:cNvPr>
+          <p:cNvSpPr>
+            <a:spLocks noGrp="1"/>
+          </p:cNvSpPr>
+          <p:nvPr>
+            <p:ph type="title"/>
+          </p:nvPr>
+        </p:nvSpPr>
+        <p:spPr/>
+        <p:txBody>
+          <a:bodyPr/>
+          <a:lstStyle/>
+          <a:p>
+            <a:r>
+              <a:rPr lang="en-US" dirty="0"/>
+              <a:t>Error</a:t>
+            </a:r>
+          </a:p>
+        </p:txBody>
+      </p:sp>
+      <p:sp>
+        <p:nvSpPr>
+          <p:cNvPr id="3" name="コンテンツ プレースホルダー 2">
+            <a:extLst>
+              <a:ext uri="{FF2B5EF4-FFF2-40B4-BE49-F238E27FC236}">
+                <a16:creationId xmlns:a16="http://schemas.microsoft.com/office/drawing/2014/main" id="{E0FA2130-D6D3-4220-959F-C91BC53FAB78}"/>
+              </a:ext>
+            </a:extLst>
+          </p:cNvPr>
+          <p:cNvSpPr>
+            <a:spLocks noGrp="1"/>
+          </p:cNvSpPr>
+          <p:nvPr>
+            <p:ph idx="1"/>
+          </p:nvPr>
+        </p:nvSpPr>
+        <p:spPr/>
+        <p:txBody>
+          <a:bodyPr/>
+          <a:lstStyle/>
+          <a:p>
+            <a:endParaRPr lang="en-US" dirty="0"/>
+          </a:p>
+        </p:txBody>
+      </p:sp>
+      <p:sp>
+        <p:nvSpPr>
+          <p:cNvPr id="5" name="スライド番号プレースホルダー 4">
+            <a:extLst>
+              <a:ext uri="{FF2B5EF4-FFF2-40B4-BE49-F238E27FC236}">
+                <a16:creationId xmlns:a16="http://schemas.microsoft.com/office/drawing/2014/main" id="{4D897C1E-210D-40AA-B1A3-6D30B53F200F}"/>
+              </a:ext>
+            </a:extLst>
+          </p:cNvPr>
+          <p:cNvSpPr>
+            <a:spLocks noGrp="1"/>
+          </p:cNvSpPr>
+          <p:nvPr>
+            <p:ph type="sldNum" sz="quarter" idx="12"/>
+          </p:nvPr>
+        </p:nvSpPr>
+        <p:spPr/>
+        <p:txBody>
+          <a:bodyPr/>
+          <a:lstStyle/>
+          <a:p>
+            <a:fld id="{F9AE1A6C-155A-45B5-BF6F-8FA332E74381}" type="slidenum">
+              <a:rPr lang="en-US" smtClean="0"/>
+              <a:pPr/>
+              <a:t>40</a:t>
+            </a:fld>
+            <a:endParaRPr lang="en-US" dirty="0"/>
+          </a:p>
+        </p:txBody>
+      </p:sp>
+    </p:spTree>
+    <p:extLst>
+      <p:ext uri="{BB962C8B-B14F-4D97-AF65-F5344CB8AC3E}">
+        <p14:creationId xmlns:p14="http://schemas.microsoft.com/office/powerpoint/2010/main" val="107592700"/>
+      </p:ext>
+    </p:extLst>
+  </p:cSld>
+  <p:clrMapOvr>
+    <a:masterClrMapping/>
+  </p:clrMapOvr>
+</p:sld>
+</file>
+
+<file path=ppt/slides/slide42.xml><?xml version="1.0" encoding="utf-8"?>
+<p:sld xmlns:a="http://schemas.openxmlformats.org/drawingml/2006/main" xmlns:r="http://schemas.openxmlformats.org/officeDocument/2006/relationships" xmlns:p="http://schemas.openxmlformats.org/presentationml/2006/main">
+  <p:cSld>
+    <p:spTree>
+      <p:nvGrpSpPr>
+        <p:cNvPr id="1" name=""/>
+        <p:cNvGrpSpPr/>
+        <p:nvPr/>
+      </p:nvGrpSpPr>
+      <p:grpSpPr>
+        <a:xfrm>
+          <a:off x="0" y="0"/>
+          <a:ext cx="0" cy="0"/>
+          <a:chOff x="0" y="0"/>
+          <a:chExt cx="0" cy="0"/>
+        </a:xfrm>
+      </p:grpSpPr>
+      <p:sp>
+        <p:nvSpPr>
+          <p:cNvPr id="2" name="タイトル 1">
+            <a:extLst>
+              <a:ext uri="{FF2B5EF4-FFF2-40B4-BE49-F238E27FC236}">
+                <a16:creationId xmlns:a16="http://schemas.microsoft.com/office/drawing/2014/main" id="{8F0D12C3-4CDC-4F57-9D7E-A2DB95866AE8}"/>
+              </a:ext>
+            </a:extLst>
+          </p:cNvPr>
+          <p:cNvSpPr>
+            <a:spLocks noGrp="1"/>
+          </p:cNvSpPr>
+          <p:nvPr>
+            <p:ph type="title"/>
+          </p:nvPr>
+        </p:nvSpPr>
+        <p:spPr/>
+        <p:txBody>
+          <a:bodyPr/>
+          <a:lstStyle/>
+          <a:p>
+            <a:r>
+              <a:rPr lang="en-US" dirty="0"/>
+              <a:t>Summary</a:t>
+            </a:r>
+          </a:p>
+        </p:txBody>
+      </p:sp>
+      <p:sp>
+        <p:nvSpPr>
+          <p:cNvPr id="3" name="コンテンツ プレースホルダー 2">
+            <a:extLst>
+              <a:ext uri="{FF2B5EF4-FFF2-40B4-BE49-F238E27FC236}">
+                <a16:creationId xmlns:a16="http://schemas.microsoft.com/office/drawing/2014/main" id="{9CD5CAFA-55C1-4CBE-B983-ACB13AC199C5}"/>
+              </a:ext>
+            </a:extLst>
+          </p:cNvPr>
+          <p:cNvSpPr>
+            <a:spLocks noGrp="1"/>
+          </p:cNvSpPr>
+          <p:nvPr>
+            <p:ph idx="1"/>
+          </p:nvPr>
+        </p:nvSpPr>
+        <p:spPr/>
+        <p:txBody>
+          <a:bodyPr/>
+          <a:lstStyle/>
+          <a:p>
+            <a:endParaRPr lang="en-US"/>
+          </a:p>
+        </p:txBody>
+      </p:sp>
+      <p:sp>
+        <p:nvSpPr>
+          <p:cNvPr id="5" name="スライド番号プレースホルダー 4">
+            <a:extLst>
+              <a:ext uri="{FF2B5EF4-FFF2-40B4-BE49-F238E27FC236}">
+                <a16:creationId xmlns:a16="http://schemas.microsoft.com/office/drawing/2014/main" id="{EF72F589-D9F4-40B5-BFD0-A9881E9136BC}"/>
+              </a:ext>
+            </a:extLst>
+          </p:cNvPr>
+          <p:cNvSpPr>
+            <a:spLocks noGrp="1"/>
+          </p:cNvSpPr>
+          <p:nvPr>
+            <p:ph type="sldNum" sz="quarter" idx="12"/>
+          </p:nvPr>
+        </p:nvSpPr>
+        <p:spPr/>
+        <p:txBody>
+          <a:bodyPr/>
+          <a:lstStyle/>
+          <a:p>
+            <a:fld id="{F9AE1A6C-155A-45B5-BF6F-8FA332E74381}" type="slidenum">
+              <a:rPr lang="en-US" smtClean="0"/>
+              <a:pPr/>
+              <a:t>41</a:t>
+            </a:fld>
+            <a:endParaRPr lang="en-US" dirty="0"/>
+          </a:p>
+        </p:txBody>
+      </p:sp>
+    </p:spTree>
+    <p:extLst>
+      <p:ext uri="{BB962C8B-B14F-4D97-AF65-F5344CB8AC3E}">
+        <p14:creationId xmlns:p14="http://schemas.microsoft.com/office/powerpoint/2010/main" val="3274883772"/>
+      </p:ext>
+    </p:extLst>
+  </p:cSld>
+  <p:clrMapOvr>
+    <a:masterClrMapping/>
+  </p:clrMapOvr>
+</p:sld>
+</file>
+
+<file path=ppt/slides/slide43.xml><?xml version="1.0" encoding="utf-8"?>
+<p:sld xmlns:a="http://schemas.openxmlformats.org/drawingml/2006/main" xmlns:r="http://schemas.openxmlformats.org/officeDocument/2006/relationships" xmlns:p="http://schemas.openxmlformats.org/presentationml/2006/main">
+  <p:cSld>
+    <p:spTree>
+      <p:nvGrpSpPr>
+        <p:cNvPr id="1" name=""/>
+        <p:cNvGrpSpPr/>
+        <p:nvPr/>
+      </p:nvGrpSpPr>
+      <p:grpSpPr>
+        <a:xfrm>
+          <a:off x="0" y="0"/>
+          <a:ext cx="0" cy="0"/>
+          <a:chOff x="0" y="0"/>
+          <a:chExt cx="0" cy="0"/>
+        </a:xfrm>
+      </p:grpSpPr>
+      <p:sp>
+        <p:nvSpPr>
+          <p:cNvPr id="2" name="タイトル 1">
+            <a:extLst>
+              <a:ext uri="{FF2B5EF4-FFF2-40B4-BE49-F238E27FC236}">
+                <a16:creationId xmlns:a16="http://schemas.microsoft.com/office/drawing/2014/main" id="{1532B8A9-CC3C-4755-A0C2-83191887A59F}"/>
+              </a:ext>
+            </a:extLst>
+          </p:cNvPr>
+          <p:cNvSpPr>
+            <a:spLocks noGrp="1"/>
+          </p:cNvSpPr>
+          <p:nvPr>
+            <p:ph type="title"/>
+          </p:nvPr>
+        </p:nvSpPr>
+        <p:spPr/>
+        <p:txBody>
+          <a:bodyPr/>
+          <a:lstStyle/>
+          <a:p>
+            <a:r>
+              <a:rPr lang="en-US" dirty="0"/>
+              <a:t>References</a:t>
+            </a:r>
+          </a:p>
+        </p:txBody>
+      </p:sp>
+      <p:sp>
+        <p:nvSpPr>
+          <p:cNvPr id="3" name="コンテンツ プレースホルダー 2">
+            <a:extLst>
+              <a:ext uri="{FF2B5EF4-FFF2-40B4-BE49-F238E27FC236}">
+                <a16:creationId xmlns:a16="http://schemas.microsoft.com/office/drawing/2014/main" id="{0CFB61A8-0A55-494F-96FA-020C659922F5}"/>
+              </a:ext>
+            </a:extLst>
+          </p:cNvPr>
+          <p:cNvSpPr>
+            <a:spLocks noGrp="1"/>
+          </p:cNvSpPr>
+          <p:nvPr>
+            <p:ph idx="1"/>
+          </p:nvPr>
+        </p:nvSpPr>
+        <p:spPr/>
+        <p:txBody>
+          <a:bodyPr/>
+          <a:lstStyle/>
+          <a:p>
+            <a:r>
+              <a:rPr lang="ja-JP" altLang="en-US" dirty="0"/>
+              <a:t>演算子について</a:t>
+            </a:r>
+            <a:endParaRPr lang="en-US" altLang="ja-JP" dirty="0"/>
+          </a:p>
+          <a:p>
+            <a:pPr lvl="1"/>
+            <a:r>
+              <a:rPr lang="en-US" dirty="0">
+                <a:hlinkClick r:id="rId2"/>
+              </a:rPr>
+              <a:t>https://atmarkit.itmedia.co.jp/ait/articles/1907/23/news010.html</a:t>
+            </a:r>
+            <a:endParaRPr lang="en-US" dirty="0"/>
+          </a:p>
+        </p:txBody>
+      </p:sp>
+      <p:sp>
+        <p:nvSpPr>
+          <p:cNvPr id="5" name="スライド番号プレースホルダー 4">
+            <a:extLst>
+              <a:ext uri="{FF2B5EF4-FFF2-40B4-BE49-F238E27FC236}">
+                <a16:creationId xmlns:a16="http://schemas.microsoft.com/office/drawing/2014/main" id="{D1D09D41-F574-4AE8-B82D-35FD724EA6EA}"/>
+              </a:ext>
+            </a:extLst>
+          </p:cNvPr>
+          <p:cNvSpPr>
+            <a:spLocks noGrp="1"/>
+          </p:cNvSpPr>
+          <p:nvPr>
+            <p:ph type="sldNum" sz="quarter" idx="12"/>
+          </p:nvPr>
+        </p:nvSpPr>
+        <p:spPr/>
+        <p:txBody>
+          <a:bodyPr/>
+          <a:lstStyle/>
+          <a:p>
+            <a:fld id="{F9AE1A6C-155A-45B5-BF6F-8FA332E74381}" type="slidenum">
+              <a:rPr lang="en-US" smtClean="0"/>
+              <a:pPr/>
+              <a:t>42</a:t>
+            </a:fld>
+            <a:endParaRPr lang="en-US" dirty="0"/>
+          </a:p>
+        </p:txBody>
+      </p:sp>
+    </p:spTree>
+    <p:extLst>
+      <p:ext uri="{BB962C8B-B14F-4D97-AF65-F5344CB8AC3E}">
+        <p14:creationId xmlns:p14="http://schemas.microsoft.com/office/powerpoint/2010/main" val="532900966"/>
+      </p:ext>
+    </p:extLst>
+  </p:cSld>
+  <p:clrMapOvr>
+    <a:masterClrMapping/>
+  </p:clrMapOvr>
+</p:sld>
+</file>
+
+<file path=ppt/slides/slide44.xml><?xml version="1.0" encoding="utf-8"?>
+<p:sld xmlns:a="http://schemas.openxmlformats.org/drawingml/2006/main" xmlns:r="http://schemas.openxmlformats.org/officeDocument/2006/relationships" xmlns:p="http://schemas.openxmlformats.org/presentationml/2006/main">
+  <p:cSld>
+    <p:spTree>
+      <p:nvGrpSpPr>
+        <p:cNvPr id="1" name=""/>
+        <p:cNvGrpSpPr/>
+        <p:nvPr/>
+      </p:nvGrpSpPr>
+      <p:grpSpPr>
+        <a:xfrm>
+          <a:off x="0" y="0"/>
+          <a:ext cx="0" cy="0"/>
+          <a:chOff x="0" y="0"/>
+          <a:chExt cx="0" cy="0"/>
+        </a:xfrm>
+      </p:grpSpPr>
+      <p:sp>
+        <p:nvSpPr>
+          <p:cNvPr id="2" name="タイトル 1">
+            <a:extLst>
+              <a:ext uri="{FF2B5EF4-FFF2-40B4-BE49-F238E27FC236}">
+                <a16:creationId xmlns:a16="http://schemas.microsoft.com/office/drawing/2014/main" id="{F841434E-D430-4496-8D5B-CE28B163C746}"/>
+              </a:ext>
+            </a:extLst>
+          </p:cNvPr>
+          <p:cNvSpPr>
+            <a:spLocks noGrp="1"/>
+          </p:cNvSpPr>
+          <p:nvPr>
+            <p:ph type="title"/>
+          </p:nvPr>
+        </p:nvSpPr>
+        <p:spPr/>
+        <p:txBody>
+          <a:bodyPr/>
+          <a:lstStyle/>
+          <a:p>
+            <a:r>
+              <a:rPr lang="en-US" dirty="0"/>
+              <a:t>Bonus Contents</a:t>
+            </a:r>
+          </a:p>
+        </p:txBody>
+      </p:sp>
+      <p:sp>
+        <p:nvSpPr>
+          <p:cNvPr id="3" name="コンテンツ プレースホルダー 2">
+            <a:extLst>
+              <a:ext uri="{FF2B5EF4-FFF2-40B4-BE49-F238E27FC236}">
+                <a16:creationId xmlns:a16="http://schemas.microsoft.com/office/drawing/2014/main" id="{2551BBAA-5F75-41A1-852A-257BAF35910B}"/>
+              </a:ext>
+            </a:extLst>
+          </p:cNvPr>
+          <p:cNvSpPr>
+            <a:spLocks noGrp="1"/>
+          </p:cNvSpPr>
+          <p:nvPr>
+            <p:ph idx="1"/>
+          </p:nvPr>
+        </p:nvSpPr>
+        <p:spPr/>
+        <p:txBody>
+          <a:bodyPr/>
+          <a:lstStyle/>
+          <a:p>
+            <a:r>
+              <a:rPr lang="en-US" dirty="0" err="1"/>
+              <a:t>AtCoder</a:t>
+            </a:r>
+            <a:endParaRPr lang="en-US" dirty="0"/>
+          </a:p>
+          <a:p>
+            <a:pPr lvl="1"/>
+            <a:r>
+              <a:rPr lang="en-US" dirty="0">
+                <a:hlinkClick r:id="rId2"/>
+              </a:rPr>
+              <a:t>https://atcoder.jp/?lang=ja</a:t>
+            </a:r>
+            <a:endParaRPr lang="en-US" dirty="0"/>
+          </a:p>
+          <a:p>
+            <a:r>
+              <a:rPr lang="en-US" dirty="0" err="1"/>
+              <a:t>CodinGame</a:t>
+            </a:r>
+            <a:endParaRPr lang="en-US" dirty="0"/>
+          </a:p>
+          <a:p>
+            <a:pPr lvl="1"/>
+            <a:r>
+              <a:rPr lang="en-US" dirty="0">
+                <a:hlinkClick r:id="rId3"/>
+              </a:rPr>
+              <a:t>https://www.codingame.com/start</a:t>
+            </a:r>
+            <a:endParaRPr lang="en-US" dirty="0"/>
+          </a:p>
+          <a:p>
+            <a:r>
+              <a:rPr lang="en-US" dirty="0" err="1"/>
+              <a:t>Codeforces</a:t>
+            </a:r>
+            <a:endParaRPr lang="en-US" dirty="0"/>
+          </a:p>
+          <a:p>
+            <a:pPr lvl="1"/>
+            <a:r>
+              <a:rPr lang="en-US" dirty="0">
+                <a:hlinkClick r:id="rId4"/>
+              </a:rPr>
+              <a:t>https://codeforces.com/</a:t>
+            </a:r>
+            <a:endParaRPr lang="en-US" dirty="0"/>
+          </a:p>
+          <a:p>
+            <a:endParaRPr lang="en-US" dirty="0"/>
+          </a:p>
+        </p:txBody>
+      </p:sp>
+      <p:sp>
+        <p:nvSpPr>
+          <p:cNvPr id="5" name="スライド番号プレースホルダー 4">
+            <a:extLst>
+              <a:ext uri="{FF2B5EF4-FFF2-40B4-BE49-F238E27FC236}">
+                <a16:creationId xmlns:a16="http://schemas.microsoft.com/office/drawing/2014/main" id="{158938BA-66FF-472E-8C9A-66E7F1533947}"/>
+              </a:ext>
+            </a:extLst>
+          </p:cNvPr>
+          <p:cNvSpPr>
+            <a:spLocks noGrp="1"/>
+          </p:cNvSpPr>
+          <p:nvPr>
+            <p:ph type="sldNum" sz="quarter" idx="12"/>
+          </p:nvPr>
+        </p:nvSpPr>
+        <p:spPr/>
+        <p:txBody>
+          <a:bodyPr/>
+          <a:lstStyle/>
+          <a:p>
+            <a:fld id="{F9AE1A6C-155A-45B5-BF6F-8FA332E74381}" type="slidenum">
+              <a:rPr lang="en-US" smtClean="0"/>
+              <a:pPr/>
+              <a:t>43</a:t>
+            </a:fld>
+            <a:endParaRPr lang="en-US" dirty="0"/>
+          </a:p>
+        </p:txBody>
+      </p:sp>
+    </p:spTree>
+    <p:extLst>
+      <p:ext uri="{BB962C8B-B14F-4D97-AF65-F5344CB8AC3E}">
+        <p14:creationId xmlns:p14="http://schemas.microsoft.com/office/powerpoint/2010/main" val="1464208581"/>
+      </p:ext>
+    </p:extLst>
+  </p:cSld>
+  <p:clrMapOvr>
+    <a:masterClrMapping/>
+  </p:clrMapOvr>
+</p:sld>
+</file>
+
+<file path=ppt/slides/slide45.xml><?xml version="1.0" encoding="utf-8"?>
+<p:sld xmlns:a="http://schemas.openxmlformats.org/drawingml/2006/main" xmlns:r="http://schemas.openxmlformats.org/officeDocument/2006/relationships" xmlns:p="http://schemas.openxmlformats.org/presentationml/2006/main">
+  <p:cSld>
+    <p:spTree>
+      <p:nvGrpSpPr>
+        <p:cNvPr id="1" name=""/>
+        <p:cNvGrpSpPr/>
+        <p:nvPr/>
+      </p:nvGrpSpPr>
+      <p:grpSpPr>
+        <a:xfrm>
+          <a:off x="0" y="0"/>
+          <a:ext cx="0" cy="0"/>
+          <a:chOff x="0" y="0"/>
+          <a:chExt cx="0" cy="0"/>
+        </a:xfrm>
+      </p:grpSpPr>
+      <p:sp>
+        <p:nvSpPr>
+          <p:cNvPr id="2" name="タイトル 1">
+            <a:extLst>
+              <a:ext uri="{FF2B5EF4-FFF2-40B4-BE49-F238E27FC236}">
                 <a16:creationId xmlns:a16="http://schemas.microsoft.com/office/drawing/2014/main" id="{856EBBD5-E278-4973-A910-5734873CA39E}"/>
               </a:ext>
             </a:extLst>
@@ -19508,7 +20598,7 @@
             <a:fld id="{F9AE1A6C-155A-45B5-BF6F-8FA332E74381}" type="slidenum">
               <a:rPr lang="en-US" smtClean="0"/>
               <a:pPr/>
-              <a:t>40</a:t>
+              <a:t>44</a:t>
             </a:fld>
             <a:endParaRPr lang="en-US" dirty="0"/>
           </a:p>

</xml_diff>

<commit_message>
[add]:Wrote the summary section.
</commit_message>
<xml_diff>
--- a/ProgramSlide.pptx
+++ b/ProgramSlide.pptx
@@ -5,7 +5,7 @@
     <p:sldMasterId id="2147483672" r:id="rId1"/>
   </p:sldMasterIdLst>
   <p:notesMasterIdLst>
-    <p:notesMasterId r:id="rId51"/>
+    <p:notesMasterId r:id="rId54"/>
   </p:notesMasterIdLst>
   <p:sldIdLst>
     <p:sldId id="256" r:id="rId2"/>
@@ -54,9 +54,12 @@
     <p:sldId id="304" r:id="rId45"/>
     <p:sldId id="305" r:id="rId46"/>
     <p:sldId id="263" r:id="rId47"/>
-    <p:sldId id="264" r:id="rId48"/>
-    <p:sldId id="265" r:id="rId49"/>
-    <p:sldId id="290" r:id="rId50"/>
+    <p:sldId id="306" r:id="rId48"/>
+    <p:sldId id="307" r:id="rId49"/>
+    <p:sldId id="308" r:id="rId50"/>
+    <p:sldId id="264" r:id="rId51"/>
+    <p:sldId id="265" r:id="rId52"/>
+    <p:sldId id="290" r:id="rId53"/>
   </p:sldIdLst>
   <p:sldSz cx="9144000" cy="6858000" type="screen4x3"/>
   <p:notesSz cx="6858000" cy="9144000"/>
@@ -206,6 +209,9 @@
             <p14:sldId id="304"/>
             <p14:sldId id="305"/>
             <p14:sldId id="263"/>
+            <p14:sldId id="306"/>
+            <p14:sldId id="307"/>
+            <p14:sldId id="308"/>
           </p14:sldIdLst>
         </p14:section>
         <p14:section name="After" id="{0DE5CF78-CFD0-40C3-9E8F-BC47F44A3ABA}">
@@ -306,7 +312,7 @@
           <a:p>
             <a:fld id="{61F9A76B-08C7-4C1E-AD37-3452ECB1BEEB}" type="datetimeFigureOut">
               <a:rPr lang="en-US" smtClean="0"/>
-              <a:t>5/19/2023</a:t>
+              <a:t>5/22/2023</a:t>
             </a:fld>
             <a:endParaRPr lang="en-US"/>
           </a:p>
@@ -821,7 +827,7 @@
           <a:p>
             <a:fld id="{B4665B6F-9B20-4B37-B621-0B1C1F2C90FB}" type="datetime1">
               <a:rPr lang="en-US" smtClean="0"/>
-              <a:t>5/19/2023</a:t>
+              <a:t>5/22/2023</a:t>
             </a:fld>
             <a:endParaRPr lang="en-US"/>
           </a:p>
@@ -1023,7 +1029,7 @@
           <a:p>
             <a:fld id="{C27C9AA3-0D49-477A-834F-6AFF7FAFB863}" type="datetime1">
               <a:rPr lang="en-US" smtClean="0"/>
-              <a:t>5/19/2023</a:t>
+              <a:t>5/22/2023</a:t>
             </a:fld>
             <a:endParaRPr lang="en-US"/>
           </a:p>
@@ -1235,7 +1241,7 @@
           <a:p>
             <a:fld id="{A8351093-7B23-4B93-BF0D-2F7040DF3D21}" type="datetime1">
               <a:rPr lang="en-US" smtClean="0"/>
-              <a:t>5/19/2023</a:t>
+              <a:t>5/22/2023</a:t>
             </a:fld>
             <a:endParaRPr lang="en-US"/>
           </a:p>
@@ -1455,7 +1461,7 @@
           <a:p>
             <a:fld id="{BAE82DF5-EBE4-4A5F-9572-9683012F3869}" type="datetime1">
               <a:rPr lang="en-US" smtClean="0"/>
-              <a:t>5/19/2023</a:t>
+              <a:t>5/22/2023</a:t>
             </a:fld>
             <a:endParaRPr lang="en-US"/>
           </a:p>
@@ -1704,7 +1710,7 @@
           <a:p>
             <a:fld id="{A2243B7C-847E-41AE-8FD2-E22768D99A06}" type="datetime1">
               <a:rPr lang="en-US" smtClean="0"/>
-              <a:t>5/19/2023</a:t>
+              <a:t>5/22/2023</a:t>
             </a:fld>
             <a:endParaRPr lang="en-US"/>
           </a:p>
@@ -2000,7 +2006,7 @@
           <a:p>
             <a:fld id="{641B493E-BF0E-4591-A949-E568E69F4803}" type="datetime1">
               <a:rPr lang="en-US" smtClean="0"/>
-              <a:t>5/19/2023</a:t>
+              <a:t>5/22/2023</a:t>
             </a:fld>
             <a:endParaRPr lang="en-US"/>
           </a:p>
@@ -2431,7 +2437,7 @@
           <a:p>
             <a:fld id="{DD1C41FA-F867-485D-BB9E-4BB1C77BF6D2}" type="datetime1">
               <a:rPr lang="en-US" smtClean="0"/>
-              <a:t>5/19/2023</a:t>
+              <a:t>5/22/2023</a:t>
             </a:fld>
             <a:endParaRPr lang="en-US"/>
           </a:p>
@@ -2549,7 +2555,7 @@
           <a:p>
             <a:fld id="{BF2F607B-9AEB-4D6B-B787-CA31BF3221AF}" type="datetime1">
               <a:rPr lang="en-US" smtClean="0"/>
-              <a:t>5/19/2023</a:t>
+              <a:t>5/22/2023</a:t>
             </a:fld>
             <a:endParaRPr lang="en-US"/>
           </a:p>
@@ -2644,7 +2650,7 @@
           <a:p>
             <a:fld id="{6DD5D611-D82D-4557-A4B4-6CE561B5C83D}" type="datetime1">
               <a:rPr lang="en-US" smtClean="0"/>
-              <a:t>5/19/2023</a:t>
+              <a:t>5/22/2023</a:t>
             </a:fld>
             <a:endParaRPr lang="en-US"/>
           </a:p>
@@ -2953,7 +2959,7 @@
           <a:p>
             <a:fld id="{AE96AADA-F019-47DD-8151-E2581BF6D2CF}" type="datetime1">
               <a:rPr lang="en-US" smtClean="0"/>
-              <a:t>5/19/2023</a:t>
+              <a:t>5/22/2023</a:t>
             </a:fld>
             <a:endParaRPr lang="en-US"/>
           </a:p>
@@ -3210,7 +3216,7 @@
           <a:p>
             <a:fld id="{D938F34B-1050-4590-AF4B-F133D048AD45}" type="datetime1">
               <a:rPr lang="en-US" smtClean="0"/>
-              <a:t>5/19/2023</a:t>
+              <a:t>5/22/2023</a:t>
             </a:fld>
             <a:endParaRPr lang="en-US"/>
           </a:p>
@@ -3455,7 +3461,7 @@
           <a:p>
             <a:fld id="{EB277427-05A3-4D74-B825-34D4130E89D5}" type="datetime1">
               <a:rPr lang="en-US" smtClean="0"/>
-              <a:t>5/19/2023</a:t>
+              <a:t>5/22/2023</a:t>
             </a:fld>
             <a:endParaRPr lang="en-US"/>
           </a:p>
@@ -5417,7 +5423,7 @@
             <a:pPr lvl="1"/>
             <a:r>
               <a:rPr kumimoji="1" lang="ja-JP" altLang="en-US" dirty="0"/>
-              <a:t>ほかの演算子には各自</a:t>
+              <a:t>他の演算子は各自</a:t>
             </a:r>
             <a:r>
               <a:rPr kumimoji="1" lang="en-US" altLang="ja-JP" dirty="0"/>
@@ -5425,7 +5431,14 @@
             </a:r>
             <a:r>
               <a:rPr kumimoji="1" lang="ja-JP" altLang="en-US" dirty="0"/>
-              <a:t>から飛んでみてください．</a:t>
+              <a:t>から</a:t>
+            </a:r>
+            <a:br>
+              <a:rPr kumimoji="1" lang="en-US" altLang="ja-JP" dirty="0"/>
+            </a:br>
+            <a:r>
+              <a:rPr kumimoji="1" lang="ja-JP" altLang="en-US" dirty="0"/>
+              <a:t>飛んでみてください．</a:t>
             </a:r>
           </a:p>
         </p:txBody>
@@ -20795,7 +20808,27 @@
           <a:bodyPr/>
           <a:lstStyle/>
           <a:p>
-            <a:endParaRPr lang="en-US"/>
+            <a:r>
+              <a:rPr lang="ja-JP" altLang="en-US" dirty="0"/>
+              <a:t>プログラムは実際に書くのが一番慣れる</a:t>
+            </a:r>
+            <a:endParaRPr lang="en-US" altLang="ja-JP" dirty="0"/>
+          </a:p>
+          <a:p>
+            <a:endParaRPr lang="en-US" altLang="ja-JP" dirty="0"/>
+          </a:p>
+          <a:p>
+            <a:r>
+              <a:rPr lang="ja-JP" altLang="en-US" dirty="0"/>
+              <a:t>エラーは実行不可の原因を教えてくれる</a:t>
+            </a:r>
+            <a:endParaRPr lang="en-US" altLang="ja-JP" dirty="0"/>
+          </a:p>
+          <a:p>
+            <a:endParaRPr lang="en-US" dirty="0"/>
+          </a:p>
+          <a:p>
+            <a:endParaRPr lang="en-US" dirty="0"/>
           </a:p>
         </p:txBody>
       </p:sp>
@@ -20864,7 +20897,7 @@
           <p:cNvPr id="2" name="タイトル 1">
             <a:extLst>
               <a:ext uri="{FF2B5EF4-FFF2-40B4-BE49-F238E27FC236}">
-                <a16:creationId xmlns:a16="http://schemas.microsoft.com/office/drawing/2014/main" id="{1532B8A9-CC3C-4755-A0C2-83191887A59F}"/>
+                <a16:creationId xmlns:a16="http://schemas.microsoft.com/office/drawing/2014/main" id="{8F0D12C3-4CDC-4F57-9D7E-A2DB95866AE8}"/>
               </a:ext>
             </a:extLst>
           </p:cNvPr>
@@ -20882,7 +20915,7 @@
           <a:p>
             <a:r>
               <a:rPr lang="en-US" dirty="0"/>
-              <a:t>References</a:t>
+              <a:t>Summary</a:t>
             </a:r>
           </a:p>
         </p:txBody>
@@ -20892,7 +20925,7 @@
           <p:cNvPr id="3" name="コンテンツ プレースホルダー 2">
             <a:extLst>
               <a:ext uri="{FF2B5EF4-FFF2-40B4-BE49-F238E27FC236}">
-                <a16:creationId xmlns:a16="http://schemas.microsoft.com/office/drawing/2014/main" id="{0CFB61A8-0A55-494F-96FA-020C659922F5}"/>
+                <a16:creationId xmlns:a16="http://schemas.microsoft.com/office/drawing/2014/main" id="{9CD5CAFA-55C1-4CBE-B983-ACB13AC199C5}"/>
               </a:ext>
             </a:extLst>
           </p:cNvPr>
@@ -20905,24 +20938,115 @@
         </p:nvSpPr>
         <p:spPr/>
         <p:txBody>
-          <a:bodyPr/>
+          <a:bodyPr>
+            <a:normAutofit/>
+          </a:bodyPr>
           <a:lstStyle/>
           <a:p>
             <a:r>
-              <a:rPr lang="ja-JP" altLang="en-US" dirty="0"/>
-              <a:t>演算子について</a:t>
-            </a:r>
-            <a:endParaRPr lang="en-US" altLang="ja-JP" dirty="0"/>
+              <a:rPr lang="ja-JP" altLang="en-US" sz="2800" dirty="0"/>
+              <a:t>プログラムは実際に書くのが一番慣れる</a:t>
+            </a:r>
+            <a:endParaRPr lang="en-US" altLang="ja-JP" sz="2800" dirty="0"/>
+          </a:p>
+          <a:p>
+            <a:r>
+              <a:rPr lang="ja-JP" altLang="en-US" sz="2800" dirty="0"/>
+              <a:t>とりあえずプログラムを書いてみたい人向け</a:t>
+            </a:r>
+            <a:endParaRPr lang="en-US" altLang="ja-JP" sz="2800" dirty="0"/>
           </a:p>
           <a:p>
             <a:pPr lvl="1"/>
             <a:r>
-              <a:rPr lang="en-US" dirty="0">
+              <a:rPr lang="en-US" sz="2400" dirty="0" err="1">
                 <a:hlinkClick r:id="rId2"/>
               </a:rPr>
-              <a:t>https://atmarkit.itmedia.co.jp/ait/articles/1907/23/news010.html</a:t>
-            </a:r>
-            <a:endParaRPr lang="en-US" dirty="0"/>
+              <a:t>AtCoder</a:t>
+            </a:r>
+            <a:r>
+              <a:rPr lang="en-US" sz="2400" dirty="0"/>
+              <a:t>(</a:t>
+            </a:r>
+            <a:r>
+              <a:rPr lang="ja-JP" altLang="en-US" sz="2400" dirty="0"/>
+              <a:t>競技プログラミングコンテスト</a:t>
+            </a:r>
+            <a:r>
+              <a:rPr lang="en-US" sz="2400" dirty="0"/>
+              <a:t>)</a:t>
+            </a:r>
+          </a:p>
+          <a:p>
+            <a:pPr lvl="1"/>
+            <a:r>
+              <a:rPr lang="en-US" sz="2400" dirty="0" err="1">
+                <a:hlinkClick r:id="rId2"/>
+              </a:rPr>
+              <a:t>CodinGame</a:t>
+            </a:r>
+            <a:r>
+              <a:rPr lang="en-US" sz="2400" dirty="0"/>
+              <a:t>(</a:t>
+            </a:r>
+            <a:r>
+              <a:rPr lang="ja-JP" altLang="en-US" sz="2400" dirty="0"/>
+              <a:t>ゲーム</a:t>
+            </a:r>
+            <a:r>
+              <a:rPr lang="en-US" altLang="ja-JP" sz="2400" dirty="0"/>
+              <a:t>AI</a:t>
+            </a:r>
+            <a:r>
+              <a:rPr lang="ja-JP" altLang="en-US" sz="2400" dirty="0"/>
+              <a:t>プログラミングコンテスト</a:t>
+            </a:r>
+            <a:r>
+              <a:rPr lang="en-US" sz="2400" dirty="0"/>
+              <a:t>)</a:t>
+            </a:r>
+          </a:p>
+          <a:p>
+            <a:pPr lvl="1"/>
+            <a:r>
+              <a:rPr lang="en-US" sz="2400" dirty="0" err="1">
+                <a:hlinkClick r:id="rId2"/>
+              </a:rPr>
+              <a:t>Progate</a:t>
+            </a:r>
+            <a:r>
+              <a:rPr lang="en-US" sz="2400" dirty="0"/>
+              <a:t>(</a:t>
+            </a:r>
+            <a:r>
+              <a:rPr lang="ja-JP" altLang="en-US" sz="2400" dirty="0"/>
+              <a:t>環境いらずの学習サイト</a:t>
+            </a:r>
+            <a:r>
+              <a:rPr lang="en-US" sz="2400" dirty="0"/>
+              <a:t>)</a:t>
+            </a:r>
+          </a:p>
+          <a:p>
+            <a:pPr lvl="1"/>
+            <a:r>
+              <a:rPr lang="en-US" sz="2400" dirty="0" err="1">
+                <a:hlinkClick r:id="rId2"/>
+              </a:rPr>
+              <a:t>Codelearen</a:t>
+            </a:r>
+            <a:r>
+              <a:rPr lang="en-US" sz="2400" dirty="0"/>
+              <a:t>(</a:t>
+            </a:r>
+            <a:r>
+              <a:rPr lang="ja-JP" altLang="en-US" sz="2400" dirty="0"/>
+              <a:t>環境いらずの学習サイト，よくて英語</a:t>
+            </a:r>
+            <a:r>
+              <a:rPr lang="en-US" sz="2400" dirty="0"/>
+              <a:t>)</a:t>
+            </a:r>
           </a:p>
         </p:txBody>
       </p:sp>
@@ -20931,7 +21055,7 @@
           <p:cNvPr id="5" name="スライド番号プレースホルダー 4">
             <a:extLst>
               <a:ext uri="{FF2B5EF4-FFF2-40B4-BE49-F238E27FC236}">
-                <a16:creationId xmlns:a16="http://schemas.microsoft.com/office/drawing/2014/main" id="{D1D09D41-F574-4AE8-B82D-35FD724EA6EA}"/>
+                <a16:creationId xmlns:a16="http://schemas.microsoft.com/office/drawing/2014/main" id="{EF72F589-D9F4-40B5-BFD0-A9881E9136BC}"/>
               </a:ext>
             </a:extLst>
           </p:cNvPr>
@@ -20959,7 +21083,7 @@
     </p:spTree>
     <p:extLst>
       <p:ext uri="{BB962C8B-B14F-4D97-AF65-F5344CB8AC3E}">
-        <p14:creationId xmlns:p14="http://schemas.microsoft.com/office/powerpoint/2010/main" val="532900966"/>
+        <p14:creationId xmlns:p14="http://schemas.microsoft.com/office/powerpoint/2010/main" val="3561680142"/>
       </p:ext>
     </p:extLst>
   </p:cSld>
@@ -20991,7 +21115,7 @@
           <p:cNvPr id="2" name="タイトル 1">
             <a:extLst>
               <a:ext uri="{FF2B5EF4-FFF2-40B4-BE49-F238E27FC236}">
-                <a16:creationId xmlns:a16="http://schemas.microsoft.com/office/drawing/2014/main" id="{F841434E-D430-4496-8D5B-CE28B163C746}"/>
+                <a16:creationId xmlns:a16="http://schemas.microsoft.com/office/drawing/2014/main" id="{8F0D12C3-4CDC-4F57-9D7E-A2DB95866AE8}"/>
               </a:ext>
             </a:extLst>
           </p:cNvPr>
@@ -21009,7 +21133,15 @@
           <a:p>
             <a:r>
               <a:rPr lang="en-US" dirty="0"/>
-              <a:t>Bonus Contents</a:t>
+              <a:t>Summary(</a:t>
+            </a:r>
+            <a:r>
+              <a:rPr lang="en-US" dirty="0" err="1"/>
+              <a:t>AtCoder</a:t>
+            </a:r>
+            <a:r>
+              <a:rPr lang="en-US" dirty="0"/>
+              <a:t>)</a:t>
             </a:r>
           </a:p>
         </p:txBody>
@@ -21019,7 +21151,7 @@
           <p:cNvPr id="3" name="コンテンツ プレースホルダー 2">
             <a:extLst>
               <a:ext uri="{FF2B5EF4-FFF2-40B4-BE49-F238E27FC236}">
-                <a16:creationId xmlns:a16="http://schemas.microsoft.com/office/drawing/2014/main" id="{2551BBAA-5F75-41A1-852A-257BAF35910B}"/>
+                <a16:creationId xmlns:a16="http://schemas.microsoft.com/office/drawing/2014/main" id="{9CD5CAFA-55C1-4CBE-B983-ACB13AC199C5}"/>
               </a:ext>
             </a:extLst>
           </p:cNvPr>
@@ -21030,63 +21162,67 @@
             <p:ph idx="1"/>
           </p:nvPr>
         </p:nvSpPr>
-        <p:spPr/>
-        <p:txBody>
-          <a:bodyPr/>
+        <p:spPr>
+          <a:xfrm>
+            <a:off x="628650" y="1780383"/>
+            <a:ext cx="7886700" cy="4351338"/>
+          </a:xfrm>
+        </p:spPr>
+        <p:txBody>
+          <a:bodyPr>
+            <a:normAutofit/>
+          </a:bodyPr>
           <a:lstStyle/>
           <a:p>
             <a:r>
-              <a:rPr lang="en-US" dirty="0" err="1"/>
-              <a:t>AtCoder</a:t>
-            </a:r>
-            <a:endParaRPr lang="en-US" dirty="0"/>
-          </a:p>
-          <a:p>
-            <a:pPr lvl="1"/>
-            <a:r>
-              <a:rPr lang="en-US" dirty="0">
-                <a:hlinkClick r:id="rId2"/>
-              </a:rPr>
-              <a:t>https://atcoder.jp/?lang=ja</a:t>
-            </a:r>
-            <a:endParaRPr lang="en-US" dirty="0"/>
-          </a:p>
-          <a:p>
-            <a:r>
-              <a:rPr lang="en-US" dirty="0" err="1"/>
-              <a:t>CodinGame</a:t>
-            </a:r>
-            <a:endParaRPr lang="en-US" dirty="0"/>
-          </a:p>
-          <a:p>
-            <a:pPr lvl="1"/>
-            <a:r>
-              <a:rPr lang="en-US" dirty="0">
-                <a:hlinkClick r:id="rId3"/>
-              </a:rPr>
-              <a:t>https://www.codingame.com/start</a:t>
-            </a:r>
-            <a:endParaRPr lang="en-US" dirty="0"/>
-          </a:p>
-          <a:p>
-            <a:r>
-              <a:rPr lang="en-US" dirty="0" err="1"/>
-              <a:t>Codeforces</a:t>
-            </a:r>
-            <a:endParaRPr lang="en-US" dirty="0"/>
-          </a:p>
-          <a:p>
-            <a:pPr lvl="1"/>
-            <a:r>
-              <a:rPr lang="en-US" dirty="0">
-                <a:hlinkClick r:id="rId4"/>
-              </a:rPr>
-              <a:t>https://codeforces.com/</a:t>
-            </a:r>
-            <a:endParaRPr lang="en-US" dirty="0"/>
-          </a:p>
-          <a:p>
-            <a:endParaRPr lang="en-US" dirty="0"/>
+              <a:rPr lang="ja-JP" altLang="en-US" sz="2000" dirty="0"/>
+              <a:t>毎週土日の</a:t>
+            </a:r>
+            <a:r>
+              <a:rPr lang="en-US" altLang="ja-JP" sz="2000" dirty="0"/>
+              <a:t>21</a:t>
+            </a:r>
+            <a:r>
+              <a:rPr lang="ja-JP" altLang="en-US" sz="2000" dirty="0"/>
+              <a:t>時からコンテスト開催</a:t>
+            </a:r>
+            <a:endParaRPr lang="en-US" altLang="ja-JP" sz="2000" dirty="0"/>
+          </a:p>
+          <a:p>
+            <a:r>
+              <a:rPr lang="en-US" altLang="ja-JP" sz="2000" dirty="0"/>
+              <a:t>3000</a:t>
+            </a:r>
+            <a:r>
+              <a:rPr lang="ja-JP" altLang="en-US" sz="2000" dirty="0"/>
+              <a:t>以上の過去問が常に挑戦可能</a:t>
+            </a:r>
+            <a:endParaRPr lang="en-US" altLang="ja-JP" sz="2000" dirty="0"/>
+          </a:p>
+          <a:p>
+            <a:r>
+              <a:rPr lang="ja-JP" altLang="en-US" sz="2000" dirty="0"/>
+              <a:t>簡単な問題から難しい問題まである</a:t>
+            </a:r>
+            <a:r>
+              <a:rPr lang="en-US" altLang="ja-JP" sz="2000" dirty="0"/>
+              <a:t>(</a:t>
+            </a:r>
+            <a:r>
+              <a:rPr lang="ja-JP" altLang="en-US" sz="2000" dirty="0"/>
+              <a:t>この資料でも問題を引用</a:t>
+            </a:r>
+            <a:r>
+              <a:rPr lang="en-US" altLang="ja-JP" sz="2000" dirty="0"/>
+              <a:t>)</a:t>
+            </a:r>
+          </a:p>
+          <a:p>
+            <a:r>
+              <a:rPr lang="ja-JP" altLang="en-US" sz="2000" dirty="0"/>
+              <a:t>レートがあるので競い合える</a:t>
+            </a:r>
+            <a:endParaRPr lang="en-US" altLang="ja-JP" sz="2000" dirty="0"/>
           </a:p>
         </p:txBody>
       </p:sp>
@@ -21095,7 +21231,7 @@
           <p:cNvPr id="5" name="スライド番号プレースホルダー 4">
             <a:extLst>
               <a:ext uri="{FF2B5EF4-FFF2-40B4-BE49-F238E27FC236}">
-                <a16:creationId xmlns:a16="http://schemas.microsoft.com/office/drawing/2014/main" id="{158938BA-66FF-472E-8C9A-66E7F1533947}"/>
+                <a16:creationId xmlns:a16="http://schemas.microsoft.com/office/drawing/2014/main" id="{EF72F589-D9F4-40B5-BFD0-A9881E9136BC}"/>
               </a:ext>
             </a:extLst>
           </p:cNvPr>
@@ -21120,10 +21256,175 @@
           </a:p>
         </p:txBody>
       </p:sp>
+      <p:sp>
+        <p:nvSpPr>
+          <p:cNvPr id="4" name="正方形/長方形 3">
+            <a:extLst>
+              <a:ext uri="{FF2B5EF4-FFF2-40B4-BE49-F238E27FC236}">
+                <a16:creationId xmlns:a16="http://schemas.microsoft.com/office/drawing/2014/main" id="{D45927E1-86DA-4280-A4E1-9CFCDD0661FE}"/>
+              </a:ext>
+            </a:extLst>
+          </p:cNvPr>
+          <p:cNvSpPr/>
+          <p:nvPr/>
+        </p:nvSpPr>
+        <p:spPr>
+          <a:xfrm>
+            <a:off x="588530" y="3479871"/>
+            <a:ext cx="4073236" cy="2786785"/>
+          </a:xfrm>
+          <a:prstGeom prst="rect">
+            <a:avLst/>
+          </a:prstGeom>
+          <a:blipFill dpi="0" rotWithShape="1">
+            <a:blip r:embed="rId2">
+              <a:extLst>
+                <a:ext uri="{28A0092B-C50C-407E-A947-70E740481C1C}">
+                  <a14:useLocalDpi xmlns:a14="http://schemas.microsoft.com/office/drawing/2010/main" val="0"/>
+                </a:ext>
+              </a:extLst>
+            </a:blip>
+            <a:srcRect/>
+            <a:stretch>
+              <a:fillRect/>
+            </a:stretch>
+          </a:blipFill>
+          <a:ln>
+            <a:noFill/>
+          </a:ln>
+        </p:spPr>
+        <p:style>
+          <a:lnRef idx="2">
+            <a:schemeClr val="accent1">
+              <a:shade val="50000"/>
+            </a:schemeClr>
+          </a:lnRef>
+          <a:fillRef idx="1">
+            <a:schemeClr val="accent1"/>
+          </a:fillRef>
+          <a:effectRef idx="0">
+            <a:schemeClr val="accent1"/>
+          </a:effectRef>
+          <a:fontRef idx="minor">
+            <a:schemeClr val="lt1"/>
+          </a:fontRef>
+        </p:style>
+        <p:txBody>
+          <a:bodyPr rtlCol="0" anchor="ctr"/>
+          <a:lstStyle/>
+          <a:p>
+            <a:pPr algn="ctr"/>
+            <a:endParaRPr lang="en-US"/>
+          </a:p>
+        </p:txBody>
+      </p:sp>
+      <p:sp>
+        <p:nvSpPr>
+          <p:cNvPr id="6" name="正方形/長方形 5">
+            <a:extLst>
+              <a:ext uri="{FF2B5EF4-FFF2-40B4-BE49-F238E27FC236}">
+                <a16:creationId xmlns:a16="http://schemas.microsoft.com/office/drawing/2014/main" id="{CA750593-35DD-43D9-AB55-28EC303EC118}"/>
+              </a:ext>
+            </a:extLst>
+          </p:cNvPr>
+          <p:cNvSpPr/>
+          <p:nvPr/>
+        </p:nvSpPr>
+        <p:spPr>
+          <a:xfrm>
+            <a:off x="4661766" y="3479872"/>
+            <a:ext cx="3592368" cy="2786785"/>
+          </a:xfrm>
+          <a:prstGeom prst="rect">
+            <a:avLst/>
+          </a:prstGeom>
+          <a:blipFill dpi="0" rotWithShape="1">
+            <a:blip r:embed="rId3">
+              <a:extLst>
+                <a:ext uri="{28A0092B-C50C-407E-A947-70E740481C1C}">
+                  <a14:useLocalDpi xmlns:a14="http://schemas.microsoft.com/office/drawing/2010/main" val="0"/>
+                </a:ext>
+              </a:extLst>
+            </a:blip>
+            <a:srcRect/>
+            <a:stretch>
+              <a:fillRect/>
+            </a:stretch>
+          </a:blipFill>
+          <a:ln>
+            <a:noFill/>
+          </a:ln>
+        </p:spPr>
+        <p:style>
+          <a:lnRef idx="2">
+            <a:schemeClr val="accent1">
+              <a:shade val="50000"/>
+            </a:schemeClr>
+          </a:lnRef>
+          <a:fillRef idx="1">
+            <a:schemeClr val="accent1"/>
+          </a:fillRef>
+          <a:effectRef idx="0">
+            <a:schemeClr val="accent1"/>
+          </a:effectRef>
+          <a:fontRef idx="minor">
+            <a:schemeClr val="lt1"/>
+          </a:fontRef>
+        </p:style>
+        <p:txBody>
+          <a:bodyPr rtlCol="0" anchor="ctr"/>
+          <a:lstStyle/>
+          <a:p>
+            <a:pPr algn="ctr"/>
+            <a:endParaRPr lang="en-US"/>
+          </a:p>
+        </p:txBody>
+      </p:sp>
+      <p:sp>
+        <p:nvSpPr>
+          <p:cNvPr id="7" name="正方形/長方形 6">
+            <a:extLst>
+              <a:ext uri="{FF2B5EF4-FFF2-40B4-BE49-F238E27FC236}">
+                <a16:creationId xmlns:a16="http://schemas.microsoft.com/office/drawing/2014/main" id="{D5B37476-6929-41EA-8D57-D7CF24843FB8}"/>
+              </a:ext>
+            </a:extLst>
+          </p:cNvPr>
+          <p:cNvSpPr/>
+          <p:nvPr/>
+        </p:nvSpPr>
+        <p:spPr>
+          <a:xfrm>
+            <a:off x="511385" y="6356351"/>
+            <a:ext cx="5503494" cy="369332"/>
+          </a:xfrm>
+          <a:prstGeom prst="rect">
+            <a:avLst/>
+          </a:prstGeom>
+        </p:spPr>
+        <p:txBody>
+          <a:bodyPr wrap="none">
+            <a:spAutoFit/>
+          </a:bodyPr>
+          <a:lstStyle/>
+          <a:p>
+            <a:r>
+              <a:rPr lang="en-US" dirty="0">
+                <a:hlinkClick r:id="rId4"/>
+              </a:rPr>
+              <a:t>https://findy-code.io/engineer-lab/redcoder</a:t>
+            </a:r>
+            <a:r>
+              <a:rPr lang="ja-JP" altLang="en-US" dirty="0"/>
+              <a:t>　より引用</a:t>
+            </a:r>
+            <a:endParaRPr lang="en-US" dirty="0"/>
+          </a:p>
+        </p:txBody>
+      </p:sp>
     </p:spTree>
     <p:extLst>
       <p:ext uri="{BB962C8B-B14F-4D97-AF65-F5344CB8AC3E}">
-        <p14:creationId xmlns:p14="http://schemas.microsoft.com/office/powerpoint/2010/main" val="1464208581"/>
+        <p14:creationId xmlns:p14="http://schemas.microsoft.com/office/powerpoint/2010/main" val="4010493323"/>
       </p:ext>
     </p:extLst>
   </p:cSld>
@@ -21155,7 +21456,7 @@
           <p:cNvPr id="2" name="タイトル 1">
             <a:extLst>
               <a:ext uri="{FF2B5EF4-FFF2-40B4-BE49-F238E27FC236}">
-                <a16:creationId xmlns:a16="http://schemas.microsoft.com/office/drawing/2014/main" id="{856EBBD5-E278-4973-A910-5734873CA39E}"/>
+                <a16:creationId xmlns:a16="http://schemas.microsoft.com/office/drawing/2014/main" id="{8F0D12C3-4CDC-4F57-9D7E-A2DB95866AE8}"/>
               </a:ext>
             </a:extLst>
           </p:cNvPr>
@@ -21172,9 +21473,18 @@
           <a:lstStyle/>
           <a:p>
             <a:r>
-              <a:rPr lang="en-US" dirty="0"/>
-              <a:t>Today’s material</a:t>
-            </a:r>
+              <a:rPr lang="en-US"/>
+              <a:t>Summary(</a:t>
+            </a:r>
+            <a:r>
+              <a:rPr lang="en-US" altLang="ja-JP"/>
+              <a:t>CodingGame</a:t>
+            </a:r>
+            <a:r>
+              <a:rPr lang="en-US"/>
+              <a:t>)</a:t>
+            </a:r>
+            <a:endParaRPr lang="en-US" dirty="0"/>
           </a:p>
         </p:txBody>
       </p:sp>
@@ -21183,7 +21493,7 @@
           <p:cNvPr id="3" name="コンテンツ プレースホルダー 2">
             <a:extLst>
               <a:ext uri="{FF2B5EF4-FFF2-40B4-BE49-F238E27FC236}">
-                <a16:creationId xmlns:a16="http://schemas.microsoft.com/office/drawing/2014/main" id="{EAE84FBF-7979-4E2C-A26C-69259950FC0F}"/>
+                <a16:creationId xmlns:a16="http://schemas.microsoft.com/office/drawing/2014/main" id="{9CD5CAFA-55C1-4CBE-B983-ACB13AC199C5}"/>
               </a:ext>
             </a:extLst>
           </p:cNvPr>
@@ -21194,42 +21504,88 @@
             <p:ph idx="1"/>
           </p:nvPr>
         </p:nvSpPr>
-        <p:spPr/>
-        <p:txBody>
-          <a:bodyPr/>
+        <p:spPr>
+          <a:xfrm>
+            <a:off x="628650" y="1780383"/>
+            <a:ext cx="7886700" cy="4351338"/>
+          </a:xfrm>
+        </p:spPr>
+        <p:txBody>
+          <a:bodyPr>
+            <a:normAutofit/>
+          </a:bodyPr>
           <a:lstStyle/>
           <a:p>
             <a:r>
-              <a:rPr lang="en-US" dirty="0" err="1"/>
-              <a:t>Github</a:t>
-            </a:r>
-            <a:endParaRPr lang="en-US" dirty="0"/>
-          </a:p>
-          <a:p>
-            <a:pPr lvl="1"/>
-            <a:r>
-              <a:rPr lang="en-US" dirty="0">
-                <a:hlinkClick r:id="rId2"/>
-              </a:rPr>
-              <a:t>https://github.com/Melbeck777/program_seminar</a:t>
-            </a:r>
-            <a:endParaRPr lang="en-US" dirty="0"/>
-          </a:p>
-          <a:p>
-            <a:r>
-              <a:rPr lang="ja-JP" altLang="en-US" dirty="0"/>
-              <a:t> </a:t>
-            </a:r>
-            <a:endParaRPr lang="en-US" dirty="0"/>
-          </a:p>
-        </p:txBody>
-      </p:sp>
-      <p:sp>
-        <p:nvSpPr>
-          <p:cNvPr id="4" name="スライド番号プレースホルダー 3">
+              <a:rPr lang="ja-JP" altLang="en-US" sz="2000" dirty="0"/>
+              <a:t>ゲーム</a:t>
+            </a:r>
+            <a:r>
+              <a:rPr lang="en-US" altLang="ja-JP" sz="2000" dirty="0"/>
+              <a:t>AI</a:t>
+            </a:r>
+            <a:r>
+              <a:rPr lang="ja-JP" altLang="en-US" sz="2000" dirty="0"/>
+              <a:t>を作成するコンテスト</a:t>
+            </a:r>
+            <a:endParaRPr lang="en-US" altLang="ja-JP" sz="2000" dirty="0"/>
+          </a:p>
+          <a:p>
+            <a:r>
+              <a:rPr lang="en-US" altLang="ja-JP" sz="2000" dirty="0"/>
+              <a:t>1</a:t>
+            </a:r>
+            <a:r>
+              <a:rPr lang="ja-JP" altLang="en-US" sz="2000" dirty="0"/>
+              <a:t>年に</a:t>
+            </a:r>
+            <a:r>
+              <a:rPr lang="en-US" altLang="ja-JP" sz="2000" dirty="0"/>
+              <a:t>4</a:t>
+            </a:r>
+            <a:r>
+              <a:rPr lang="ja-JP" altLang="en-US" sz="2000" dirty="0"/>
+              <a:t>回程度</a:t>
+            </a:r>
+            <a:r>
+              <a:rPr lang="en-US" altLang="ja-JP" sz="2000" dirty="0"/>
+              <a:t>1</a:t>
+            </a:r>
+            <a:r>
+              <a:rPr lang="ja-JP" altLang="en-US" sz="2000" dirty="0"/>
+              <a:t>週間のコンテストが開かれる</a:t>
+            </a:r>
+            <a:endParaRPr lang="en-US" altLang="ja-JP" sz="2000" dirty="0"/>
+          </a:p>
+          <a:p>
+            <a:r>
+              <a:rPr lang="ja-JP" altLang="en-US" sz="2000" dirty="0"/>
+              <a:t>過去のコンテストも挑戦可能</a:t>
+            </a:r>
+            <a:endParaRPr lang="en-US" altLang="ja-JP" sz="2000" dirty="0"/>
+          </a:p>
+          <a:p>
+            <a:r>
+              <a:rPr lang="ja-JP" altLang="en-US" sz="2000" dirty="0"/>
+              <a:t>リーグに分かれているので戦うのは同レベルの人たち</a:t>
+            </a:r>
+            <a:endParaRPr lang="en-US" altLang="ja-JP" sz="2000" dirty="0"/>
+          </a:p>
+          <a:p>
+            <a:r>
+              <a:rPr lang="ja-JP" altLang="en-US" sz="2000" dirty="0"/>
+              <a:t>リーグが上がると機能が追加される</a:t>
+            </a:r>
+            <a:endParaRPr lang="en-US" altLang="ja-JP" sz="2000" dirty="0"/>
+          </a:p>
+        </p:txBody>
+      </p:sp>
+      <p:sp>
+        <p:nvSpPr>
+          <p:cNvPr id="5" name="スライド番号プレースホルダー 4">
             <a:extLst>
               <a:ext uri="{FF2B5EF4-FFF2-40B4-BE49-F238E27FC236}">
-                <a16:creationId xmlns:a16="http://schemas.microsoft.com/office/drawing/2014/main" id="{023AA724-AF62-49F7-AD76-8DCAB3007A7D}"/>
+                <a16:creationId xmlns:a16="http://schemas.microsoft.com/office/drawing/2014/main" id="{EF72F589-D9F4-40B5-BFD0-A9881E9136BC}"/>
               </a:ext>
             </a:extLst>
           </p:cNvPr>
@@ -21254,10 +21610,117 @@
           </a:p>
         </p:txBody>
       </p:sp>
+      <p:sp>
+        <p:nvSpPr>
+          <p:cNvPr id="8" name="正方形/長方形 7">
+            <a:extLst>
+              <a:ext uri="{FF2B5EF4-FFF2-40B4-BE49-F238E27FC236}">
+                <a16:creationId xmlns:a16="http://schemas.microsoft.com/office/drawing/2014/main" id="{3FB78354-B698-4218-A4B3-410521B90BF3}"/>
+              </a:ext>
+            </a:extLst>
+          </p:cNvPr>
+          <p:cNvSpPr/>
+          <p:nvPr/>
+        </p:nvSpPr>
+        <p:spPr>
+          <a:xfrm>
+            <a:off x="2174409" y="3740504"/>
+            <a:ext cx="4795182" cy="2659783"/>
+          </a:xfrm>
+          <a:prstGeom prst="rect">
+            <a:avLst/>
+          </a:prstGeom>
+          <a:blipFill dpi="0" rotWithShape="1">
+            <a:blip r:embed="rId2">
+              <a:extLst>
+                <a:ext uri="{28A0092B-C50C-407E-A947-70E740481C1C}">
+                  <a14:useLocalDpi xmlns:a14="http://schemas.microsoft.com/office/drawing/2010/main" val="0"/>
+                </a:ext>
+              </a:extLst>
+            </a:blip>
+            <a:srcRect/>
+            <a:stretch>
+              <a:fillRect/>
+            </a:stretch>
+          </a:blipFill>
+          <a:ln>
+            <a:noFill/>
+          </a:ln>
+        </p:spPr>
+        <p:style>
+          <a:lnRef idx="2">
+            <a:schemeClr val="accent1">
+              <a:shade val="50000"/>
+            </a:schemeClr>
+          </a:lnRef>
+          <a:fillRef idx="1">
+            <a:schemeClr val="accent1"/>
+          </a:fillRef>
+          <a:effectRef idx="0">
+            <a:schemeClr val="accent1"/>
+          </a:effectRef>
+          <a:fontRef idx="minor">
+            <a:schemeClr val="lt1"/>
+          </a:fontRef>
+        </p:style>
+        <p:txBody>
+          <a:bodyPr rtlCol="0" anchor="ctr"/>
+          <a:lstStyle/>
+          <a:p>
+            <a:pPr algn="ctr"/>
+            <a:endParaRPr lang="en-US"/>
+          </a:p>
+        </p:txBody>
+      </p:sp>
+      <p:sp>
+        <p:nvSpPr>
+          <p:cNvPr id="9" name="正方形/長方形 8">
+            <a:extLst>
+              <a:ext uri="{FF2B5EF4-FFF2-40B4-BE49-F238E27FC236}">
+                <a16:creationId xmlns:a16="http://schemas.microsoft.com/office/drawing/2014/main" id="{5A136FDC-BE81-44FC-A3DE-ECD62693B756}"/>
+              </a:ext>
+            </a:extLst>
+          </p:cNvPr>
+          <p:cNvSpPr/>
+          <p:nvPr/>
+        </p:nvSpPr>
+        <p:spPr>
+          <a:xfrm>
+            <a:off x="2358381" y="6352144"/>
+            <a:ext cx="4427238" cy="369332"/>
+          </a:xfrm>
+          <a:prstGeom prst="rect">
+            <a:avLst/>
+          </a:prstGeom>
+        </p:spPr>
+        <p:txBody>
+          <a:bodyPr wrap="none">
+            <a:spAutoFit/>
+          </a:bodyPr>
+          <a:lstStyle/>
+          <a:p>
+            <a:r>
+              <a:rPr lang="en-US" dirty="0">
+                <a:hlinkClick r:id="rId3"/>
+              </a:rPr>
+              <a:t>https://www.codingame.com/start</a:t>
+            </a:r>
+            <a:r>
+              <a:rPr lang="en-US" dirty="0"/>
+              <a:t> </a:t>
+            </a:r>
+            <a:r>
+              <a:rPr lang="ja-JP" altLang="en-US" dirty="0"/>
+              <a:t>より引用</a:t>
+            </a:r>
+            <a:endParaRPr lang="en-US" dirty="0"/>
+          </a:p>
+        </p:txBody>
+      </p:sp>
     </p:spTree>
     <p:extLst>
       <p:ext uri="{BB962C8B-B14F-4D97-AF65-F5344CB8AC3E}">
-        <p14:creationId xmlns:p14="http://schemas.microsoft.com/office/powerpoint/2010/main" val="201264436"/>
+        <p14:creationId xmlns:p14="http://schemas.microsoft.com/office/powerpoint/2010/main" val="3112559326"/>
       </p:ext>
     </p:extLst>
   </p:cSld>
@@ -21808,6 +22271,431 @@
     <p:extLst>
       <p:ext uri="{BB962C8B-B14F-4D97-AF65-F5344CB8AC3E}">
         <p14:creationId xmlns:p14="http://schemas.microsoft.com/office/powerpoint/2010/main" val="2500654060"/>
+      </p:ext>
+    </p:extLst>
+  </p:cSld>
+  <p:clrMapOvr>
+    <a:masterClrMapping/>
+  </p:clrMapOvr>
+</p:sld>
+</file>
+
+<file path=ppt/slides/slide50.xml><?xml version="1.0" encoding="utf-8"?>
+<p:sld xmlns:a="http://schemas.openxmlformats.org/drawingml/2006/main" xmlns:r="http://schemas.openxmlformats.org/officeDocument/2006/relationships" xmlns:p="http://schemas.openxmlformats.org/presentationml/2006/main">
+  <p:cSld>
+    <p:spTree>
+      <p:nvGrpSpPr>
+        <p:cNvPr id="1" name=""/>
+        <p:cNvGrpSpPr/>
+        <p:nvPr/>
+      </p:nvGrpSpPr>
+      <p:grpSpPr>
+        <a:xfrm>
+          <a:off x="0" y="0"/>
+          <a:ext cx="0" cy="0"/>
+          <a:chOff x="0" y="0"/>
+          <a:chExt cx="0" cy="0"/>
+        </a:xfrm>
+      </p:grpSpPr>
+      <p:sp>
+        <p:nvSpPr>
+          <p:cNvPr id="2" name="タイトル 1">
+            <a:extLst>
+              <a:ext uri="{FF2B5EF4-FFF2-40B4-BE49-F238E27FC236}">
+                <a16:creationId xmlns:a16="http://schemas.microsoft.com/office/drawing/2014/main" id="{1532B8A9-CC3C-4755-A0C2-83191887A59F}"/>
+              </a:ext>
+            </a:extLst>
+          </p:cNvPr>
+          <p:cNvSpPr>
+            <a:spLocks noGrp="1"/>
+          </p:cNvSpPr>
+          <p:nvPr>
+            <p:ph type="title"/>
+          </p:nvPr>
+        </p:nvSpPr>
+        <p:spPr/>
+        <p:txBody>
+          <a:bodyPr/>
+          <a:lstStyle/>
+          <a:p>
+            <a:r>
+              <a:rPr lang="en-US" dirty="0"/>
+              <a:t>References</a:t>
+            </a:r>
+          </a:p>
+        </p:txBody>
+      </p:sp>
+      <p:sp>
+        <p:nvSpPr>
+          <p:cNvPr id="3" name="コンテンツ プレースホルダー 2">
+            <a:extLst>
+              <a:ext uri="{FF2B5EF4-FFF2-40B4-BE49-F238E27FC236}">
+                <a16:creationId xmlns:a16="http://schemas.microsoft.com/office/drawing/2014/main" id="{0CFB61A8-0A55-494F-96FA-020C659922F5}"/>
+              </a:ext>
+            </a:extLst>
+          </p:cNvPr>
+          <p:cNvSpPr>
+            <a:spLocks noGrp="1"/>
+          </p:cNvSpPr>
+          <p:nvPr>
+            <p:ph idx="1"/>
+          </p:nvPr>
+        </p:nvSpPr>
+        <p:spPr/>
+        <p:txBody>
+          <a:bodyPr/>
+          <a:lstStyle/>
+          <a:p>
+            <a:r>
+              <a:rPr lang="ja-JP" altLang="en-US" dirty="0"/>
+              <a:t>演算子について</a:t>
+            </a:r>
+            <a:endParaRPr lang="en-US" altLang="ja-JP" dirty="0"/>
+          </a:p>
+          <a:p>
+            <a:pPr lvl="1"/>
+            <a:r>
+              <a:rPr lang="en-US" dirty="0">
+                <a:hlinkClick r:id="rId2"/>
+              </a:rPr>
+              <a:t>https://atmarkit.itmedia.co.jp/ait/articles/1907/23/news010.html</a:t>
+            </a:r>
+            <a:endParaRPr lang="en-US" dirty="0"/>
+          </a:p>
+        </p:txBody>
+      </p:sp>
+      <p:sp>
+        <p:nvSpPr>
+          <p:cNvPr id="5" name="スライド番号プレースホルダー 4">
+            <a:extLst>
+              <a:ext uri="{FF2B5EF4-FFF2-40B4-BE49-F238E27FC236}">
+                <a16:creationId xmlns:a16="http://schemas.microsoft.com/office/drawing/2014/main" id="{D1D09D41-F574-4AE8-B82D-35FD724EA6EA}"/>
+              </a:ext>
+            </a:extLst>
+          </p:cNvPr>
+          <p:cNvSpPr>
+            <a:spLocks noGrp="1"/>
+          </p:cNvSpPr>
+          <p:nvPr>
+            <p:ph type="sldNum" sz="quarter" idx="12"/>
+          </p:nvPr>
+        </p:nvSpPr>
+        <p:spPr/>
+        <p:txBody>
+          <a:bodyPr/>
+          <a:lstStyle/>
+          <a:p>
+            <a:fld id="{F9AE1A6C-155A-45B5-BF6F-8FA332E74381}" type="slidenum">
+              <a:rPr lang="en-US" smtClean="0"/>
+              <a:pPr/>
+              <a:t>49</a:t>
+            </a:fld>
+            <a:endParaRPr lang="en-US" dirty="0"/>
+          </a:p>
+        </p:txBody>
+      </p:sp>
+    </p:spTree>
+    <p:extLst>
+      <p:ext uri="{BB962C8B-B14F-4D97-AF65-F5344CB8AC3E}">
+        <p14:creationId xmlns:p14="http://schemas.microsoft.com/office/powerpoint/2010/main" val="532900966"/>
+      </p:ext>
+    </p:extLst>
+  </p:cSld>
+  <p:clrMapOvr>
+    <a:masterClrMapping/>
+  </p:clrMapOvr>
+</p:sld>
+</file>
+
+<file path=ppt/slides/slide51.xml><?xml version="1.0" encoding="utf-8"?>
+<p:sld xmlns:a="http://schemas.openxmlformats.org/drawingml/2006/main" xmlns:r="http://schemas.openxmlformats.org/officeDocument/2006/relationships" xmlns:p="http://schemas.openxmlformats.org/presentationml/2006/main">
+  <p:cSld>
+    <p:spTree>
+      <p:nvGrpSpPr>
+        <p:cNvPr id="1" name=""/>
+        <p:cNvGrpSpPr/>
+        <p:nvPr/>
+      </p:nvGrpSpPr>
+      <p:grpSpPr>
+        <a:xfrm>
+          <a:off x="0" y="0"/>
+          <a:ext cx="0" cy="0"/>
+          <a:chOff x="0" y="0"/>
+          <a:chExt cx="0" cy="0"/>
+        </a:xfrm>
+      </p:grpSpPr>
+      <p:sp>
+        <p:nvSpPr>
+          <p:cNvPr id="2" name="タイトル 1">
+            <a:extLst>
+              <a:ext uri="{FF2B5EF4-FFF2-40B4-BE49-F238E27FC236}">
+                <a16:creationId xmlns:a16="http://schemas.microsoft.com/office/drawing/2014/main" id="{F841434E-D430-4496-8D5B-CE28B163C746}"/>
+              </a:ext>
+            </a:extLst>
+          </p:cNvPr>
+          <p:cNvSpPr>
+            <a:spLocks noGrp="1"/>
+          </p:cNvSpPr>
+          <p:nvPr>
+            <p:ph type="title"/>
+          </p:nvPr>
+        </p:nvSpPr>
+        <p:spPr/>
+        <p:txBody>
+          <a:bodyPr/>
+          <a:lstStyle/>
+          <a:p>
+            <a:r>
+              <a:rPr lang="en-US" dirty="0"/>
+              <a:t>Bonus Contents</a:t>
+            </a:r>
+          </a:p>
+        </p:txBody>
+      </p:sp>
+      <p:sp>
+        <p:nvSpPr>
+          <p:cNvPr id="3" name="コンテンツ プレースホルダー 2">
+            <a:extLst>
+              <a:ext uri="{FF2B5EF4-FFF2-40B4-BE49-F238E27FC236}">
+                <a16:creationId xmlns:a16="http://schemas.microsoft.com/office/drawing/2014/main" id="{2551BBAA-5F75-41A1-852A-257BAF35910B}"/>
+              </a:ext>
+            </a:extLst>
+          </p:cNvPr>
+          <p:cNvSpPr>
+            <a:spLocks noGrp="1"/>
+          </p:cNvSpPr>
+          <p:nvPr>
+            <p:ph idx="1"/>
+          </p:nvPr>
+        </p:nvSpPr>
+        <p:spPr/>
+        <p:txBody>
+          <a:bodyPr/>
+          <a:lstStyle/>
+          <a:p>
+            <a:r>
+              <a:rPr lang="en-US" dirty="0" err="1"/>
+              <a:t>AtCoder</a:t>
+            </a:r>
+            <a:endParaRPr lang="en-US" dirty="0"/>
+          </a:p>
+          <a:p>
+            <a:pPr lvl="1"/>
+            <a:r>
+              <a:rPr lang="en-US" dirty="0">
+                <a:hlinkClick r:id="rId2"/>
+              </a:rPr>
+              <a:t>https://atcoder.jp/?lang=ja</a:t>
+            </a:r>
+            <a:endParaRPr lang="en-US" dirty="0"/>
+          </a:p>
+          <a:p>
+            <a:r>
+              <a:rPr lang="en-US" dirty="0" err="1"/>
+              <a:t>CodinGame</a:t>
+            </a:r>
+            <a:endParaRPr lang="en-US" dirty="0"/>
+          </a:p>
+          <a:p>
+            <a:pPr lvl="1"/>
+            <a:r>
+              <a:rPr lang="en-US" dirty="0">
+                <a:hlinkClick r:id="rId3"/>
+              </a:rPr>
+              <a:t>https://www.codingame.com/start</a:t>
+            </a:r>
+            <a:endParaRPr lang="en-US" dirty="0"/>
+          </a:p>
+          <a:p>
+            <a:r>
+              <a:rPr lang="en-US" dirty="0" err="1"/>
+              <a:t>Codeforces</a:t>
+            </a:r>
+            <a:endParaRPr lang="en-US" dirty="0"/>
+          </a:p>
+          <a:p>
+            <a:pPr lvl="1"/>
+            <a:r>
+              <a:rPr lang="en-US" dirty="0">
+                <a:hlinkClick r:id="rId4"/>
+              </a:rPr>
+              <a:t>https://codeforces.com/</a:t>
+            </a:r>
+            <a:endParaRPr lang="en-US" dirty="0"/>
+          </a:p>
+          <a:p>
+            <a:endParaRPr lang="en-US" dirty="0"/>
+          </a:p>
+        </p:txBody>
+      </p:sp>
+      <p:sp>
+        <p:nvSpPr>
+          <p:cNvPr id="5" name="スライド番号プレースホルダー 4">
+            <a:extLst>
+              <a:ext uri="{FF2B5EF4-FFF2-40B4-BE49-F238E27FC236}">
+                <a16:creationId xmlns:a16="http://schemas.microsoft.com/office/drawing/2014/main" id="{158938BA-66FF-472E-8C9A-66E7F1533947}"/>
+              </a:ext>
+            </a:extLst>
+          </p:cNvPr>
+          <p:cNvSpPr>
+            <a:spLocks noGrp="1"/>
+          </p:cNvSpPr>
+          <p:nvPr>
+            <p:ph type="sldNum" sz="quarter" idx="12"/>
+          </p:nvPr>
+        </p:nvSpPr>
+        <p:spPr/>
+        <p:txBody>
+          <a:bodyPr/>
+          <a:lstStyle/>
+          <a:p>
+            <a:fld id="{F9AE1A6C-155A-45B5-BF6F-8FA332E74381}" type="slidenum">
+              <a:rPr lang="en-US" smtClean="0"/>
+              <a:pPr/>
+              <a:t>50</a:t>
+            </a:fld>
+            <a:endParaRPr lang="en-US" dirty="0"/>
+          </a:p>
+        </p:txBody>
+      </p:sp>
+    </p:spTree>
+    <p:extLst>
+      <p:ext uri="{BB962C8B-B14F-4D97-AF65-F5344CB8AC3E}">
+        <p14:creationId xmlns:p14="http://schemas.microsoft.com/office/powerpoint/2010/main" val="1464208581"/>
+      </p:ext>
+    </p:extLst>
+  </p:cSld>
+  <p:clrMapOvr>
+    <a:masterClrMapping/>
+  </p:clrMapOvr>
+</p:sld>
+</file>
+
+<file path=ppt/slides/slide52.xml><?xml version="1.0" encoding="utf-8"?>
+<p:sld xmlns:a="http://schemas.openxmlformats.org/drawingml/2006/main" xmlns:r="http://schemas.openxmlformats.org/officeDocument/2006/relationships" xmlns:p="http://schemas.openxmlformats.org/presentationml/2006/main">
+  <p:cSld>
+    <p:spTree>
+      <p:nvGrpSpPr>
+        <p:cNvPr id="1" name=""/>
+        <p:cNvGrpSpPr/>
+        <p:nvPr/>
+      </p:nvGrpSpPr>
+      <p:grpSpPr>
+        <a:xfrm>
+          <a:off x="0" y="0"/>
+          <a:ext cx="0" cy="0"/>
+          <a:chOff x="0" y="0"/>
+          <a:chExt cx="0" cy="0"/>
+        </a:xfrm>
+      </p:grpSpPr>
+      <p:sp>
+        <p:nvSpPr>
+          <p:cNvPr id="2" name="タイトル 1">
+            <a:extLst>
+              <a:ext uri="{FF2B5EF4-FFF2-40B4-BE49-F238E27FC236}">
+                <a16:creationId xmlns:a16="http://schemas.microsoft.com/office/drawing/2014/main" id="{856EBBD5-E278-4973-A910-5734873CA39E}"/>
+              </a:ext>
+            </a:extLst>
+          </p:cNvPr>
+          <p:cNvSpPr>
+            <a:spLocks noGrp="1"/>
+          </p:cNvSpPr>
+          <p:nvPr>
+            <p:ph type="title"/>
+          </p:nvPr>
+        </p:nvSpPr>
+        <p:spPr/>
+        <p:txBody>
+          <a:bodyPr/>
+          <a:lstStyle/>
+          <a:p>
+            <a:r>
+              <a:rPr lang="en-US" dirty="0"/>
+              <a:t>Today’s material</a:t>
+            </a:r>
+          </a:p>
+        </p:txBody>
+      </p:sp>
+      <p:sp>
+        <p:nvSpPr>
+          <p:cNvPr id="3" name="コンテンツ プレースホルダー 2">
+            <a:extLst>
+              <a:ext uri="{FF2B5EF4-FFF2-40B4-BE49-F238E27FC236}">
+                <a16:creationId xmlns:a16="http://schemas.microsoft.com/office/drawing/2014/main" id="{EAE84FBF-7979-4E2C-A26C-69259950FC0F}"/>
+              </a:ext>
+            </a:extLst>
+          </p:cNvPr>
+          <p:cNvSpPr>
+            <a:spLocks noGrp="1"/>
+          </p:cNvSpPr>
+          <p:nvPr>
+            <p:ph idx="1"/>
+          </p:nvPr>
+        </p:nvSpPr>
+        <p:spPr/>
+        <p:txBody>
+          <a:bodyPr/>
+          <a:lstStyle/>
+          <a:p>
+            <a:r>
+              <a:rPr lang="en-US" dirty="0" err="1"/>
+              <a:t>Github</a:t>
+            </a:r>
+            <a:endParaRPr lang="en-US" dirty="0"/>
+          </a:p>
+          <a:p>
+            <a:pPr lvl="1"/>
+            <a:r>
+              <a:rPr lang="en-US" dirty="0">
+                <a:hlinkClick r:id="rId2"/>
+              </a:rPr>
+              <a:t>https://github.com/Melbeck777/program_seminar</a:t>
+            </a:r>
+            <a:endParaRPr lang="en-US" dirty="0"/>
+          </a:p>
+          <a:p>
+            <a:r>
+              <a:rPr lang="ja-JP" altLang="en-US" dirty="0"/>
+              <a:t> </a:t>
+            </a:r>
+            <a:endParaRPr lang="en-US" dirty="0"/>
+          </a:p>
+        </p:txBody>
+      </p:sp>
+      <p:sp>
+        <p:nvSpPr>
+          <p:cNvPr id="4" name="スライド番号プレースホルダー 3">
+            <a:extLst>
+              <a:ext uri="{FF2B5EF4-FFF2-40B4-BE49-F238E27FC236}">
+                <a16:creationId xmlns:a16="http://schemas.microsoft.com/office/drawing/2014/main" id="{023AA724-AF62-49F7-AD76-8DCAB3007A7D}"/>
+              </a:ext>
+            </a:extLst>
+          </p:cNvPr>
+          <p:cNvSpPr>
+            <a:spLocks noGrp="1"/>
+          </p:cNvSpPr>
+          <p:nvPr>
+            <p:ph type="sldNum" sz="quarter" idx="12"/>
+          </p:nvPr>
+        </p:nvSpPr>
+        <p:spPr/>
+        <p:txBody>
+          <a:bodyPr/>
+          <a:lstStyle/>
+          <a:p>
+            <a:fld id="{F9AE1A6C-155A-45B5-BF6F-8FA332E74381}" type="slidenum">
+              <a:rPr lang="en-US" smtClean="0"/>
+              <a:pPr/>
+              <a:t>51</a:t>
+            </a:fld>
+            <a:endParaRPr lang="en-US" dirty="0"/>
+          </a:p>
+        </p:txBody>
+      </p:sp>
+    </p:spTree>
+    <p:extLst>
+      <p:ext uri="{BB962C8B-B14F-4D97-AF65-F5344CB8AC3E}">
+        <p14:creationId xmlns:p14="http://schemas.microsoft.com/office/powerpoint/2010/main" val="201264436"/>
       </p:ext>
     </p:extLst>
   </p:cSld>

</xml_diff>

<commit_message>
[add]:Add code to function.
</commit_message>
<xml_diff>
--- a/ProgramSlide.pptx
+++ b/ProgramSlide.pptx
@@ -13814,7 +13814,7 @@
             <a:r>
               <a:rPr lang="en-US" altLang="ja-JP" sz="2400" b="0" dirty="0">
                 <a:solidFill>
-                  <a:srgbClr val="098658"/>
+                  <a:srgbClr val="000000"/>
                 </a:solidFill>
                 <a:effectLst/>
                 <a:latin typeface="Consolas" panose="020B0609020204030204" pitchFamily="49" charset="0"/>
@@ -18185,7 +18185,7 @@
             <a:r>
               <a:rPr lang="en-US" altLang="ja-JP" sz="2400" b="0" dirty="0">
                 <a:solidFill>
-                  <a:srgbClr val="098658"/>
+                  <a:srgbClr val="000000"/>
                 </a:solidFill>
                 <a:effectLst/>
                 <a:latin typeface="Consolas" panose="020B0609020204030204" pitchFamily="49" charset="0"/>
@@ -18205,7 +18205,7 @@
             <a:r>
               <a:rPr lang="en-US" altLang="ja-JP" sz="2400" b="0" dirty="0">
                 <a:solidFill>
-                  <a:srgbClr val="098658"/>
+                  <a:srgbClr val="000000"/>
                 </a:solidFill>
                 <a:effectLst/>
                 <a:latin typeface="Consolas" panose="020B0609020204030204" pitchFamily="49" charset="0"/>
@@ -18255,7 +18255,7 @@
             <a:r>
               <a:rPr lang="en-US" altLang="ja-JP" sz="2400" b="0" dirty="0">
                 <a:solidFill>
-                  <a:srgbClr val="098658"/>
+                  <a:srgbClr val="000000"/>
                 </a:solidFill>
                 <a:effectLst/>
                 <a:latin typeface="Consolas" panose="020B0609020204030204" pitchFamily="49" charset="0"/>
@@ -18442,7 +18442,7 @@
         </p:nvSpPr>
         <p:spPr>
           <a:xfrm>
-            <a:off x="2176272" y="3998950"/>
+            <a:off x="2286000" y="3828288"/>
             <a:ext cx="4572000" cy="1754326"/>
           </a:xfrm>
           <a:prstGeom prst="rect">
@@ -18899,6 +18899,351 @@
           </a:p>
         </p:txBody>
       </p:sp>
+      <p:sp>
+        <p:nvSpPr>
+          <p:cNvPr id="4" name="正方形/長方形 3">
+            <a:extLst>
+              <a:ext uri="{FF2B5EF4-FFF2-40B4-BE49-F238E27FC236}">
+                <a16:creationId xmlns:a16="http://schemas.microsoft.com/office/drawing/2014/main" id="{C5913E45-4597-4E6D-93A2-BB246ED0167B}"/>
+              </a:ext>
+            </a:extLst>
+          </p:cNvPr>
+          <p:cNvSpPr/>
+          <p:nvPr/>
+        </p:nvSpPr>
+        <p:spPr>
+          <a:xfrm>
+            <a:off x="684068" y="5242644"/>
+            <a:ext cx="7831282" cy="646331"/>
+          </a:xfrm>
+          <a:prstGeom prst="rect">
+            <a:avLst/>
+          </a:prstGeom>
+          <a:solidFill>
+            <a:srgbClr val="FFFFFF"/>
+          </a:solidFill>
+        </p:spPr>
+        <p:txBody>
+          <a:bodyPr wrap="square">
+            <a:spAutoFit/>
+          </a:bodyPr>
+          <a:lstStyle/>
+          <a:p>
+            <a:r>
+              <a:rPr lang="en-US" dirty="0">
+                <a:solidFill>
+                  <a:srgbClr val="0000FF"/>
+                </a:solidFill>
+                <a:latin typeface="Consolas" panose="020B0609020204030204" pitchFamily="49" charset="0"/>
+              </a:rPr>
+              <a:t>def</a:t>
+            </a:r>
+            <a:r>
+              <a:rPr lang="en-US" dirty="0">
+                <a:solidFill>
+                  <a:srgbClr val="000000"/>
+                </a:solidFill>
+                <a:latin typeface="Consolas" panose="020B0609020204030204" pitchFamily="49" charset="0"/>
+              </a:rPr>
+              <a:t> </a:t>
+            </a:r>
+            <a:r>
+              <a:rPr lang="en-US" dirty="0">
+                <a:solidFill>
+                  <a:srgbClr val="74531F"/>
+                </a:solidFill>
+                <a:latin typeface="Consolas" panose="020B0609020204030204" pitchFamily="49" charset="0"/>
+              </a:rPr>
+              <a:t>gravity</a:t>
+            </a:r>
+            <a:r>
+              <a:rPr lang="en-US" dirty="0">
+                <a:solidFill>
+                  <a:srgbClr val="000000"/>
+                </a:solidFill>
+                <a:latin typeface="Consolas" panose="020B0609020204030204" pitchFamily="49" charset="0"/>
+              </a:rPr>
+              <a:t>(</a:t>
+            </a:r>
+            <a:r>
+              <a:rPr lang="en-US" dirty="0">
+                <a:solidFill>
+                  <a:srgbClr val="808080"/>
+                </a:solidFill>
+                <a:latin typeface="Consolas" panose="020B0609020204030204" pitchFamily="49" charset="0"/>
+              </a:rPr>
+              <a:t>mass</a:t>
+            </a:r>
+            <a:r>
+              <a:rPr lang="en-US" dirty="0">
+                <a:solidFill>
+                  <a:srgbClr val="000000"/>
+                </a:solidFill>
+                <a:latin typeface="Consolas" panose="020B0609020204030204" pitchFamily="49" charset="0"/>
+              </a:rPr>
+              <a:t>, </a:t>
+            </a:r>
+            <a:r>
+              <a:rPr lang="en-US" dirty="0">
+                <a:solidFill>
+                  <a:srgbClr val="808080"/>
+                </a:solidFill>
+                <a:latin typeface="Consolas" panose="020B0609020204030204" pitchFamily="49" charset="0"/>
+              </a:rPr>
+              <a:t>acceleration</a:t>
+            </a:r>
+            <a:r>
+              <a:rPr lang="en-US" dirty="0">
+                <a:solidFill>
+                  <a:srgbClr val="000000"/>
+                </a:solidFill>
+                <a:latin typeface="Consolas" panose="020B0609020204030204" pitchFamily="49" charset="0"/>
+              </a:rPr>
+              <a:t>):</a:t>
+            </a:r>
+          </a:p>
+          <a:p>
+            <a:r>
+              <a:rPr lang="en-US" dirty="0">
+                <a:solidFill>
+                  <a:srgbClr val="000000"/>
+                </a:solidFill>
+                <a:latin typeface="Consolas" panose="020B0609020204030204" pitchFamily="49" charset="0"/>
+              </a:rPr>
+              <a:t>    </a:t>
+            </a:r>
+            <a:r>
+              <a:rPr lang="en-US" dirty="0">
+                <a:solidFill>
+                  <a:srgbClr val="8F08C4"/>
+                </a:solidFill>
+                <a:latin typeface="Consolas" panose="020B0609020204030204" pitchFamily="49" charset="0"/>
+              </a:rPr>
+              <a:t>return</a:t>
+            </a:r>
+            <a:r>
+              <a:rPr lang="en-US" dirty="0">
+                <a:solidFill>
+                  <a:srgbClr val="000000"/>
+                </a:solidFill>
+                <a:latin typeface="Consolas" panose="020B0609020204030204" pitchFamily="49" charset="0"/>
+              </a:rPr>
+              <a:t> mass*acceleration</a:t>
+            </a:r>
+            <a:endParaRPr lang="en-US" b="0" dirty="0">
+              <a:solidFill>
+                <a:srgbClr val="000000"/>
+              </a:solidFill>
+              <a:effectLst/>
+              <a:latin typeface="Consolas" panose="020B0609020204030204" pitchFamily="49" charset="0"/>
+            </a:endParaRPr>
+          </a:p>
+        </p:txBody>
+      </p:sp>
+      <p:sp>
+        <p:nvSpPr>
+          <p:cNvPr id="6" name="コンテンツ プレースホルダー 2">
+            <a:extLst>
+              <a:ext uri="{FF2B5EF4-FFF2-40B4-BE49-F238E27FC236}">
+                <a16:creationId xmlns:a16="http://schemas.microsoft.com/office/drawing/2014/main" id="{61C8639F-BDDF-4C3A-B25D-532D1A8EBEC8}"/>
+              </a:ext>
+            </a:extLst>
+          </p:cNvPr>
+          <p:cNvSpPr txBox="1">
+            <a:spLocks/>
+          </p:cNvSpPr>
+          <p:nvPr/>
+        </p:nvSpPr>
+        <p:spPr>
+          <a:xfrm>
+            <a:off x="628650" y="4629868"/>
+            <a:ext cx="7886700" cy="612776"/>
+          </a:xfrm>
+          <a:prstGeom prst="rect">
+            <a:avLst/>
+          </a:prstGeom>
+        </p:spPr>
+        <p:txBody>
+          <a:bodyPr vert="horz" lIns="91440" tIns="45720" rIns="91440" bIns="45720" rtlCol="0">
+            <a:normAutofit/>
+          </a:bodyPr>
+          <a:lstStyle>
+            <a:lvl1pPr marL="228600" indent="-228600" algn="l" defTabSz="914400" rtl="0" eaLnBrk="1" latinLnBrk="0" hangingPunct="1">
+              <a:lnSpc>
+                <a:spcPct val="90000"/>
+              </a:lnSpc>
+              <a:spcBef>
+                <a:spcPts val="1000"/>
+              </a:spcBef>
+              <a:buFont typeface="Arial" panose="020B0604020202020204" pitchFamily="34" charset="0"/>
+              <a:buChar char="•"/>
+              <a:defRPr sz="3200" kern="1200">
+                <a:solidFill>
+                  <a:schemeClr val="tx1"/>
+                </a:solidFill>
+                <a:latin typeface="+mn-lt"/>
+                <a:ea typeface="+mn-ea"/>
+                <a:cs typeface="+mn-cs"/>
+              </a:defRPr>
+            </a:lvl1pPr>
+            <a:lvl2pPr marL="685800" indent="-228600" algn="l" defTabSz="914400" rtl="0" eaLnBrk="1" latinLnBrk="0" hangingPunct="1">
+              <a:lnSpc>
+                <a:spcPct val="90000"/>
+              </a:lnSpc>
+              <a:spcBef>
+                <a:spcPts val="500"/>
+              </a:spcBef>
+              <a:buFont typeface="Arial" panose="020B0604020202020204" pitchFamily="34" charset="0"/>
+              <a:buChar char="•"/>
+              <a:defRPr sz="2800" kern="1200">
+                <a:solidFill>
+                  <a:schemeClr val="tx1"/>
+                </a:solidFill>
+                <a:latin typeface="+mn-lt"/>
+                <a:ea typeface="+mn-ea"/>
+                <a:cs typeface="+mn-cs"/>
+              </a:defRPr>
+            </a:lvl2pPr>
+            <a:lvl3pPr marL="1143000" indent="-228600" algn="l" defTabSz="914400" rtl="0" eaLnBrk="1" latinLnBrk="0" hangingPunct="1">
+              <a:lnSpc>
+                <a:spcPct val="90000"/>
+              </a:lnSpc>
+              <a:spcBef>
+                <a:spcPts val="500"/>
+              </a:spcBef>
+              <a:buFont typeface="Arial" panose="020B0604020202020204" pitchFamily="34" charset="0"/>
+              <a:buChar char="•"/>
+              <a:defRPr sz="2400" kern="1200">
+                <a:solidFill>
+                  <a:schemeClr val="tx1"/>
+                </a:solidFill>
+                <a:latin typeface="+mn-lt"/>
+                <a:ea typeface="+mn-ea"/>
+                <a:cs typeface="+mn-cs"/>
+              </a:defRPr>
+            </a:lvl3pPr>
+            <a:lvl4pPr marL="1600200" indent="-228600" algn="l" defTabSz="914400" rtl="0" eaLnBrk="1" latinLnBrk="0" hangingPunct="1">
+              <a:lnSpc>
+                <a:spcPct val="90000"/>
+              </a:lnSpc>
+              <a:spcBef>
+                <a:spcPts val="500"/>
+              </a:spcBef>
+              <a:buFont typeface="Arial" panose="020B0604020202020204" pitchFamily="34" charset="0"/>
+              <a:buChar char="•"/>
+              <a:defRPr sz="2000" kern="1200">
+                <a:solidFill>
+                  <a:schemeClr val="tx1"/>
+                </a:solidFill>
+                <a:latin typeface="+mn-lt"/>
+                <a:ea typeface="+mn-ea"/>
+                <a:cs typeface="+mn-cs"/>
+              </a:defRPr>
+            </a:lvl4pPr>
+            <a:lvl5pPr marL="2057400" indent="-228600" algn="l" defTabSz="914400" rtl="0" eaLnBrk="1" latinLnBrk="0" hangingPunct="1">
+              <a:lnSpc>
+                <a:spcPct val="90000"/>
+              </a:lnSpc>
+              <a:spcBef>
+                <a:spcPts val="500"/>
+              </a:spcBef>
+              <a:buFont typeface="Arial" panose="020B0604020202020204" pitchFamily="34" charset="0"/>
+              <a:buChar char="•"/>
+              <a:defRPr sz="2000" kern="1200">
+                <a:solidFill>
+                  <a:schemeClr val="tx1"/>
+                </a:solidFill>
+                <a:latin typeface="+mn-lt"/>
+                <a:ea typeface="+mn-ea"/>
+                <a:cs typeface="+mn-cs"/>
+              </a:defRPr>
+            </a:lvl5pPr>
+            <a:lvl6pPr marL="2514600" indent="-228600" algn="l" defTabSz="914400" rtl="0" eaLnBrk="1" latinLnBrk="0" hangingPunct="1">
+              <a:lnSpc>
+                <a:spcPct val="90000"/>
+              </a:lnSpc>
+              <a:spcBef>
+                <a:spcPts val="500"/>
+              </a:spcBef>
+              <a:buFont typeface="Arial" panose="020B0604020202020204" pitchFamily="34" charset="0"/>
+              <a:buChar char="•"/>
+              <a:defRPr sz="1800" kern="1200">
+                <a:solidFill>
+                  <a:schemeClr val="tx1"/>
+                </a:solidFill>
+                <a:latin typeface="+mn-lt"/>
+                <a:ea typeface="+mn-ea"/>
+                <a:cs typeface="+mn-cs"/>
+              </a:defRPr>
+            </a:lvl6pPr>
+            <a:lvl7pPr marL="2971800" indent="-228600" algn="l" defTabSz="914400" rtl="0" eaLnBrk="1" latinLnBrk="0" hangingPunct="1">
+              <a:lnSpc>
+                <a:spcPct val="90000"/>
+              </a:lnSpc>
+              <a:spcBef>
+                <a:spcPts val="500"/>
+              </a:spcBef>
+              <a:buFont typeface="Arial" panose="020B0604020202020204" pitchFamily="34" charset="0"/>
+              <a:buChar char="•"/>
+              <a:defRPr sz="1800" kern="1200">
+                <a:solidFill>
+                  <a:schemeClr val="tx1"/>
+                </a:solidFill>
+                <a:latin typeface="+mn-lt"/>
+                <a:ea typeface="+mn-ea"/>
+                <a:cs typeface="+mn-cs"/>
+              </a:defRPr>
+            </a:lvl7pPr>
+            <a:lvl8pPr marL="3429000" indent="-228600" algn="l" defTabSz="914400" rtl="0" eaLnBrk="1" latinLnBrk="0" hangingPunct="1">
+              <a:lnSpc>
+                <a:spcPct val="90000"/>
+              </a:lnSpc>
+              <a:spcBef>
+                <a:spcPts val="500"/>
+              </a:spcBef>
+              <a:buFont typeface="Arial" panose="020B0604020202020204" pitchFamily="34" charset="0"/>
+              <a:buChar char="•"/>
+              <a:defRPr sz="1800" kern="1200">
+                <a:solidFill>
+                  <a:schemeClr val="tx1"/>
+                </a:solidFill>
+                <a:latin typeface="+mn-lt"/>
+                <a:ea typeface="+mn-ea"/>
+                <a:cs typeface="+mn-cs"/>
+              </a:defRPr>
+            </a:lvl8pPr>
+            <a:lvl9pPr marL="3886200" indent="-228600" algn="l" defTabSz="914400" rtl="0" eaLnBrk="1" latinLnBrk="0" hangingPunct="1">
+              <a:lnSpc>
+                <a:spcPct val="90000"/>
+              </a:lnSpc>
+              <a:spcBef>
+                <a:spcPts val="500"/>
+              </a:spcBef>
+              <a:buFont typeface="Arial" panose="020B0604020202020204" pitchFamily="34" charset="0"/>
+              <a:buChar char="•"/>
+              <a:defRPr sz="1800" kern="1200">
+                <a:solidFill>
+                  <a:schemeClr val="tx1"/>
+                </a:solidFill>
+                <a:latin typeface="+mn-lt"/>
+                <a:ea typeface="+mn-ea"/>
+                <a:cs typeface="+mn-cs"/>
+              </a:defRPr>
+            </a:lvl9pPr>
+          </a:lstStyle>
+          <a:p>
+            <a:pPr marL="0" indent="0">
+              <a:buFont typeface="Arial" panose="020B0604020202020204" pitchFamily="34" charset="0"/>
+              <a:buNone/>
+            </a:pPr>
+            <a:r>
+              <a:rPr lang="ja-JP" altLang="en-US" dirty="0"/>
+              <a:t>関数で力を得る計算を定義</a:t>
+            </a:r>
+            <a:endParaRPr lang="en-US" dirty="0"/>
+          </a:p>
+        </p:txBody>
+      </p:sp>
     </p:spTree>
     <p:extLst>
       <p:ext uri="{BB962C8B-B14F-4D97-AF65-F5344CB8AC3E}">
@@ -19133,7 +19478,7 @@
         </p:nvSpPr>
         <p:spPr>
           <a:xfrm>
-            <a:off x="628650" y="1825625"/>
+            <a:off x="628650" y="2816224"/>
             <a:ext cx="7886700" cy="612776"/>
           </a:xfrm>
         </p:spPr>
@@ -19198,7 +19543,7 @@
         </p:nvSpPr>
         <p:spPr>
           <a:xfrm>
-            <a:off x="628650" y="4096616"/>
+            <a:off x="628650" y="4419600"/>
             <a:ext cx="7886700" cy="612776"/>
           </a:xfrm>
           <a:prstGeom prst="rect">
@@ -19383,6 +19728,789 @@
               <a:t>関数を使った場合</a:t>
             </a:r>
             <a:endParaRPr lang="en-US" dirty="0"/>
+          </a:p>
+        </p:txBody>
+      </p:sp>
+      <p:sp>
+        <p:nvSpPr>
+          <p:cNvPr id="6" name="正方形/長方形 5">
+            <a:extLst>
+              <a:ext uri="{FF2B5EF4-FFF2-40B4-BE49-F238E27FC236}">
+                <a16:creationId xmlns:a16="http://schemas.microsoft.com/office/drawing/2014/main" id="{C6FFFC19-8313-4272-96A6-333727B9D8C5}"/>
+              </a:ext>
+            </a:extLst>
+          </p:cNvPr>
+          <p:cNvSpPr/>
+          <p:nvPr/>
+        </p:nvSpPr>
+        <p:spPr>
+          <a:xfrm>
+            <a:off x="628649" y="3440256"/>
+            <a:ext cx="6723495" cy="646331"/>
+          </a:xfrm>
+          <a:prstGeom prst="rect">
+            <a:avLst/>
+          </a:prstGeom>
+          <a:solidFill>
+            <a:srgbClr val="FFFFFF"/>
+          </a:solidFill>
+        </p:spPr>
+        <p:txBody>
+          <a:bodyPr wrap="square">
+            <a:spAutoFit/>
+          </a:bodyPr>
+          <a:lstStyle/>
+          <a:p>
+            <a:r>
+              <a:rPr lang="en-US" dirty="0">
+                <a:solidFill>
+                  <a:srgbClr val="8F08C4"/>
+                </a:solidFill>
+                <a:latin typeface="Consolas" panose="020B0609020204030204" pitchFamily="49" charset="0"/>
+              </a:rPr>
+              <a:t>if</a:t>
+            </a:r>
+            <a:r>
+              <a:rPr lang="en-US" dirty="0">
+                <a:solidFill>
+                  <a:srgbClr val="000000"/>
+                </a:solidFill>
+                <a:latin typeface="Consolas" panose="020B0609020204030204" pitchFamily="49" charset="0"/>
+              </a:rPr>
+              <a:t> </a:t>
+            </a:r>
+            <a:r>
+              <a:rPr lang="en-US" dirty="0">
+                <a:solidFill>
+                  <a:srgbClr val="0070C0"/>
+                </a:solidFill>
+                <a:latin typeface="Consolas" panose="020B0609020204030204" pitchFamily="49" charset="0"/>
+              </a:rPr>
+              <a:t>(</a:t>
+            </a:r>
+            <a:r>
+              <a:rPr lang="en-US" dirty="0">
+                <a:solidFill>
+                  <a:srgbClr val="000000"/>
+                </a:solidFill>
+                <a:latin typeface="Consolas" panose="020B0609020204030204" pitchFamily="49" charset="0"/>
+              </a:rPr>
+              <a:t>year%</a:t>
+            </a:r>
+            <a:r>
+              <a:rPr lang="en-US" dirty="0">
+                <a:solidFill>
+                  <a:srgbClr val="098658"/>
+                </a:solidFill>
+                <a:latin typeface="Consolas" panose="020B0609020204030204" pitchFamily="49" charset="0"/>
+              </a:rPr>
+              <a:t>4</a:t>
+            </a:r>
+            <a:r>
+              <a:rPr lang="en-US" dirty="0">
+                <a:solidFill>
+                  <a:srgbClr val="000000"/>
+                </a:solidFill>
+                <a:latin typeface="Consolas" panose="020B0609020204030204" pitchFamily="49" charset="0"/>
+              </a:rPr>
+              <a:t> == </a:t>
+            </a:r>
+            <a:r>
+              <a:rPr lang="en-US" dirty="0">
+                <a:solidFill>
+                  <a:srgbClr val="098658"/>
+                </a:solidFill>
+                <a:latin typeface="Consolas" panose="020B0609020204030204" pitchFamily="49" charset="0"/>
+              </a:rPr>
+              <a:t>0</a:t>
+            </a:r>
+            <a:r>
+              <a:rPr lang="en-US" dirty="0">
+                <a:solidFill>
+                  <a:srgbClr val="000000"/>
+                </a:solidFill>
+                <a:latin typeface="Consolas" panose="020B0609020204030204" pitchFamily="49" charset="0"/>
+              </a:rPr>
+              <a:t> </a:t>
+            </a:r>
+            <a:r>
+              <a:rPr lang="en-US" dirty="0">
+                <a:solidFill>
+                  <a:srgbClr val="0000FF"/>
+                </a:solidFill>
+                <a:latin typeface="Consolas" panose="020B0609020204030204" pitchFamily="49" charset="0"/>
+              </a:rPr>
+              <a:t>and</a:t>
+            </a:r>
+            <a:r>
+              <a:rPr lang="en-US" dirty="0">
+                <a:solidFill>
+                  <a:srgbClr val="000000"/>
+                </a:solidFill>
+                <a:latin typeface="Consolas" panose="020B0609020204030204" pitchFamily="49" charset="0"/>
+              </a:rPr>
+              <a:t> year%</a:t>
+            </a:r>
+            <a:r>
+              <a:rPr lang="en-US" dirty="0">
+                <a:solidFill>
+                  <a:srgbClr val="098658"/>
+                </a:solidFill>
+                <a:latin typeface="Consolas" panose="020B0609020204030204" pitchFamily="49" charset="0"/>
+              </a:rPr>
+              <a:t>100</a:t>
+            </a:r>
+            <a:r>
+              <a:rPr lang="en-US" dirty="0">
+                <a:solidFill>
+                  <a:srgbClr val="000000"/>
+                </a:solidFill>
+                <a:latin typeface="Consolas" panose="020B0609020204030204" pitchFamily="49" charset="0"/>
+              </a:rPr>
+              <a:t> != </a:t>
+            </a:r>
+            <a:r>
+              <a:rPr lang="en-US" dirty="0">
+                <a:solidFill>
+                  <a:srgbClr val="098658"/>
+                </a:solidFill>
+                <a:latin typeface="Consolas" panose="020B0609020204030204" pitchFamily="49" charset="0"/>
+              </a:rPr>
+              <a:t>0</a:t>
+            </a:r>
+            <a:r>
+              <a:rPr lang="en-US" dirty="0">
+                <a:solidFill>
+                  <a:srgbClr val="0070C0"/>
+                </a:solidFill>
+                <a:latin typeface="Consolas" panose="020B0609020204030204" pitchFamily="49" charset="0"/>
+              </a:rPr>
+              <a:t>)</a:t>
+            </a:r>
+            <a:r>
+              <a:rPr lang="en-US" dirty="0">
+                <a:solidFill>
+                  <a:srgbClr val="000000"/>
+                </a:solidFill>
+                <a:latin typeface="Consolas" panose="020B0609020204030204" pitchFamily="49" charset="0"/>
+              </a:rPr>
+              <a:t> </a:t>
+            </a:r>
+            <a:r>
+              <a:rPr lang="en-US" dirty="0">
+                <a:solidFill>
+                  <a:srgbClr val="0000FF"/>
+                </a:solidFill>
+                <a:latin typeface="Consolas" panose="020B0609020204030204" pitchFamily="49" charset="0"/>
+              </a:rPr>
+              <a:t>or</a:t>
+            </a:r>
+            <a:r>
+              <a:rPr lang="en-US" dirty="0">
+                <a:solidFill>
+                  <a:srgbClr val="000000"/>
+                </a:solidFill>
+                <a:latin typeface="Consolas" panose="020B0609020204030204" pitchFamily="49" charset="0"/>
+              </a:rPr>
+              <a:t> year%</a:t>
+            </a:r>
+            <a:r>
+              <a:rPr lang="en-US" dirty="0">
+                <a:solidFill>
+                  <a:srgbClr val="098658"/>
+                </a:solidFill>
+                <a:latin typeface="Consolas" panose="020B0609020204030204" pitchFamily="49" charset="0"/>
+              </a:rPr>
+              <a:t>400</a:t>
+            </a:r>
+            <a:r>
+              <a:rPr lang="en-US" dirty="0">
+                <a:solidFill>
+                  <a:srgbClr val="000000"/>
+                </a:solidFill>
+                <a:latin typeface="Consolas" panose="020B0609020204030204" pitchFamily="49" charset="0"/>
+              </a:rPr>
+              <a:t> == </a:t>
+            </a:r>
+            <a:r>
+              <a:rPr lang="en-US" dirty="0">
+                <a:solidFill>
+                  <a:srgbClr val="098658"/>
+                </a:solidFill>
+                <a:latin typeface="Consolas" panose="020B0609020204030204" pitchFamily="49" charset="0"/>
+              </a:rPr>
+              <a:t>0</a:t>
+            </a:r>
+            <a:r>
+              <a:rPr lang="en-US" dirty="0">
+                <a:solidFill>
+                  <a:srgbClr val="000000"/>
+                </a:solidFill>
+                <a:latin typeface="Consolas" panose="020B0609020204030204" pitchFamily="49" charset="0"/>
+              </a:rPr>
+              <a:t>:</a:t>
+            </a:r>
+          </a:p>
+          <a:p>
+            <a:r>
+              <a:rPr lang="en-US" dirty="0">
+                <a:solidFill>
+                  <a:srgbClr val="000000"/>
+                </a:solidFill>
+                <a:latin typeface="Consolas" panose="020B0609020204030204" pitchFamily="49" charset="0"/>
+              </a:rPr>
+              <a:t>    </a:t>
+            </a:r>
+            <a:r>
+              <a:rPr lang="en-US" dirty="0">
+                <a:solidFill>
+                  <a:srgbClr val="008000"/>
+                </a:solidFill>
+                <a:latin typeface="Consolas" panose="020B0609020204030204" pitchFamily="49" charset="0"/>
+              </a:rPr>
+              <a:t># do something</a:t>
+            </a:r>
+            <a:endParaRPr lang="en-US" b="0" dirty="0">
+              <a:solidFill>
+                <a:srgbClr val="000000"/>
+              </a:solidFill>
+              <a:effectLst/>
+              <a:latin typeface="Consolas" panose="020B0609020204030204" pitchFamily="49" charset="0"/>
+            </a:endParaRPr>
+          </a:p>
+        </p:txBody>
+      </p:sp>
+      <p:sp>
+        <p:nvSpPr>
+          <p:cNvPr id="7" name="正方形/長方形 6">
+            <a:extLst>
+              <a:ext uri="{FF2B5EF4-FFF2-40B4-BE49-F238E27FC236}">
+                <a16:creationId xmlns:a16="http://schemas.microsoft.com/office/drawing/2014/main" id="{0458678F-2FAD-44D6-8E1C-FB210B8B9D52}"/>
+              </a:ext>
+            </a:extLst>
+          </p:cNvPr>
+          <p:cNvSpPr/>
+          <p:nvPr/>
+        </p:nvSpPr>
+        <p:spPr>
+          <a:xfrm>
+            <a:off x="628650" y="4879023"/>
+            <a:ext cx="7600950" cy="1200329"/>
+          </a:xfrm>
+          <a:prstGeom prst="rect">
+            <a:avLst/>
+          </a:prstGeom>
+          <a:solidFill>
+            <a:srgbClr val="FFFFFF"/>
+          </a:solidFill>
+        </p:spPr>
+        <p:txBody>
+          <a:bodyPr wrap="square">
+            <a:spAutoFit/>
+          </a:bodyPr>
+          <a:lstStyle/>
+          <a:p>
+            <a:r>
+              <a:rPr lang="en-US" dirty="0">
+                <a:solidFill>
+                  <a:srgbClr val="0000FF"/>
+                </a:solidFill>
+                <a:latin typeface="Consolas" panose="020B0609020204030204" pitchFamily="49" charset="0"/>
+              </a:rPr>
+              <a:t>def</a:t>
+            </a:r>
+            <a:r>
+              <a:rPr lang="en-US" dirty="0">
+                <a:solidFill>
+                  <a:srgbClr val="000000"/>
+                </a:solidFill>
+                <a:latin typeface="Consolas" panose="020B0609020204030204" pitchFamily="49" charset="0"/>
+              </a:rPr>
+              <a:t> </a:t>
+            </a:r>
+            <a:r>
+              <a:rPr lang="en-US" dirty="0" err="1">
+                <a:solidFill>
+                  <a:srgbClr val="74531F"/>
+                </a:solidFill>
+                <a:latin typeface="Consolas" panose="020B0609020204030204" pitchFamily="49" charset="0"/>
+              </a:rPr>
+              <a:t>isLeapYear</a:t>
+            </a:r>
+            <a:r>
+              <a:rPr lang="en-US" dirty="0">
+                <a:solidFill>
+                  <a:srgbClr val="000000"/>
+                </a:solidFill>
+                <a:latin typeface="Consolas" panose="020B0609020204030204" pitchFamily="49" charset="0"/>
+              </a:rPr>
+              <a:t>(</a:t>
+            </a:r>
+            <a:r>
+              <a:rPr lang="en-US" dirty="0">
+                <a:solidFill>
+                  <a:srgbClr val="808080"/>
+                </a:solidFill>
+                <a:latin typeface="Consolas" panose="020B0609020204030204" pitchFamily="49" charset="0"/>
+              </a:rPr>
+              <a:t>year</a:t>
+            </a:r>
+            <a:r>
+              <a:rPr lang="en-US" dirty="0">
+                <a:solidFill>
+                  <a:srgbClr val="000000"/>
+                </a:solidFill>
+                <a:latin typeface="Consolas" panose="020B0609020204030204" pitchFamily="49" charset="0"/>
+              </a:rPr>
+              <a:t>):</a:t>
+            </a:r>
+          </a:p>
+          <a:p>
+            <a:r>
+              <a:rPr lang="en-US" dirty="0">
+                <a:solidFill>
+                  <a:srgbClr val="000000"/>
+                </a:solidFill>
+                <a:latin typeface="Consolas" panose="020B0609020204030204" pitchFamily="49" charset="0"/>
+              </a:rPr>
+              <a:t>    </a:t>
+            </a:r>
+            <a:r>
+              <a:rPr lang="en-US" dirty="0">
+                <a:solidFill>
+                  <a:srgbClr val="8F08C4"/>
+                </a:solidFill>
+                <a:latin typeface="Consolas" panose="020B0609020204030204" pitchFamily="49" charset="0"/>
+              </a:rPr>
+              <a:t>return</a:t>
+            </a:r>
+            <a:r>
+              <a:rPr lang="en-US" dirty="0">
+                <a:solidFill>
+                  <a:srgbClr val="000000"/>
+                </a:solidFill>
+                <a:latin typeface="Consolas" panose="020B0609020204030204" pitchFamily="49" charset="0"/>
+              </a:rPr>
+              <a:t> year%</a:t>
+            </a:r>
+            <a:r>
+              <a:rPr lang="en-US" dirty="0">
+                <a:solidFill>
+                  <a:srgbClr val="098658"/>
+                </a:solidFill>
+                <a:latin typeface="Consolas" panose="020B0609020204030204" pitchFamily="49" charset="0"/>
+              </a:rPr>
+              <a:t>4</a:t>
+            </a:r>
+            <a:r>
+              <a:rPr lang="en-US" dirty="0">
+                <a:solidFill>
+                  <a:srgbClr val="000000"/>
+                </a:solidFill>
+                <a:latin typeface="Consolas" panose="020B0609020204030204" pitchFamily="49" charset="0"/>
+              </a:rPr>
+              <a:t> == </a:t>
+            </a:r>
+            <a:r>
+              <a:rPr lang="en-US" dirty="0">
+                <a:solidFill>
+                  <a:srgbClr val="098658"/>
+                </a:solidFill>
+                <a:latin typeface="Consolas" panose="020B0609020204030204" pitchFamily="49" charset="0"/>
+              </a:rPr>
+              <a:t>0</a:t>
+            </a:r>
+            <a:r>
+              <a:rPr lang="en-US" dirty="0">
+                <a:solidFill>
+                  <a:srgbClr val="000000"/>
+                </a:solidFill>
+                <a:latin typeface="Consolas" panose="020B0609020204030204" pitchFamily="49" charset="0"/>
+              </a:rPr>
+              <a:t> </a:t>
+            </a:r>
+            <a:r>
+              <a:rPr lang="en-US" dirty="0">
+                <a:solidFill>
+                  <a:srgbClr val="0000FF"/>
+                </a:solidFill>
+                <a:latin typeface="Consolas" panose="020B0609020204030204" pitchFamily="49" charset="0"/>
+              </a:rPr>
+              <a:t>and</a:t>
+            </a:r>
+            <a:r>
+              <a:rPr lang="en-US" dirty="0">
+                <a:solidFill>
+                  <a:srgbClr val="000000"/>
+                </a:solidFill>
+                <a:latin typeface="Consolas" panose="020B0609020204030204" pitchFamily="49" charset="0"/>
+              </a:rPr>
+              <a:t> year%</a:t>
+            </a:r>
+            <a:r>
+              <a:rPr lang="en-US" dirty="0">
+                <a:solidFill>
+                  <a:srgbClr val="098658"/>
+                </a:solidFill>
+                <a:latin typeface="Consolas" panose="020B0609020204030204" pitchFamily="49" charset="0"/>
+              </a:rPr>
+              <a:t>100</a:t>
+            </a:r>
+            <a:r>
+              <a:rPr lang="en-US" dirty="0">
+                <a:solidFill>
+                  <a:srgbClr val="000000"/>
+                </a:solidFill>
+                <a:latin typeface="Consolas" panose="020B0609020204030204" pitchFamily="49" charset="0"/>
+              </a:rPr>
+              <a:t> != </a:t>
+            </a:r>
+            <a:r>
+              <a:rPr lang="en-US" dirty="0">
+                <a:solidFill>
+                  <a:srgbClr val="098658"/>
+                </a:solidFill>
+                <a:latin typeface="Consolas" panose="020B0609020204030204" pitchFamily="49" charset="0"/>
+              </a:rPr>
+              <a:t>0</a:t>
+            </a:r>
+            <a:r>
+              <a:rPr lang="en-US" dirty="0">
+                <a:solidFill>
+                  <a:srgbClr val="000000"/>
+                </a:solidFill>
+                <a:latin typeface="Consolas" panose="020B0609020204030204" pitchFamily="49" charset="0"/>
+              </a:rPr>
+              <a:t> </a:t>
+            </a:r>
+            <a:r>
+              <a:rPr lang="en-US" dirty="0">
+                <a:solidFill>
+                  <a:srgbClr val="0000FF"/>
+                </a:solidFill>
+                <a:latin typeface="Consolas" panose="020B0609020204030204" pitchFamily="49" charset="0"/>
+              </a:rPr>
+              <a:t>or</a:t>
+            </a:r>
+            <a:r>
+              <a:rPr lang="en-US" dirty="0">
+                <a:solidFill>
+                  <a:srgbClr val="000000"/>
+                </a:solidFill>
+                <a:latin typeface="Consolas" panose="020B0609020204030204" pitchFamily="49" charset="0"/>
+              </a:rPr>
+              <a:t> year%</a:t>
+            </a:r>
+            <a:r>
+              <a:rPr lang="en-US" dirty="0">
+                <a:solidFill>
+                  <a:srgbClr val="098658"/>
+                </a:solidFill>
+                <a:latin typeface="Consolas" panose="020B0609020204030204" pitchFamily="49" charset="0"/>
+              </a:rPr>
+              <a:t>400</a:t>
+            </a:r>
+            <a:r>
+              <a:rPr lang="en-US" dirty="0">
+                <a:solidFill>
+                  <a:srgbClr val="000000"/>
+                </a:solidFill>
+                <a:latin typeface="Consolas" panose="020B0609020204030204" pitchFamily="49" charset="0"/>
+              </a:rPr>
+              <a:t> == </a:t>
+            </a:r>
+            <a:r>
+              <a:rPr lang="en-US" dirty="0">
+                <a:solidFill>
+                  <a:srgbClr val="098658"/>
+                </a:solidFill>
+                <a:latin typeface="Consolas" panose="020B0609020204030204" pitchFamily="49" charset="0"/>
+              </a:rPr>
+              <a:t>0</a:t>
+            </a:r>
+            <a:endParaRPr lang="en-US" dirty="0">
+              <a:solidFill>
+                <a:srgbClr val="000000"/>
+              </a:solidFill>
+              <a:latin typeface="Consolas" panose="020B0609020204030204" pitchFamily="49" charset="0"/>
+            </a:endParaRPr>
+          </a:p>
+          <a:p>
+            <a:r>
+              <a:rPr lang="en-US" dirty="0">
+                <a:solidFill>
+                  <a:srgbClr val="8F08C4"/>
+                </a:solidFill>
+                <a:latin typeface="Consolas" panose="020B0609020204030204" pitchFamily="49" charset="0"/>
+              </a:rPr>
+              <a:t>if</a:t>
+            </a:r>
+            <a:r>
+              <a:rPr lang="en-US" dirty="0">
+                <a:solidFill>
+                  <a:srgbClr val="000000"/>
+                </a:solidFill>
+                <a:latin typeface="Consolas" panose="020B0609020204030204" pitchFamily="49" charset="0"/>
+              </a:rPr>
+              <a:t> </a:t>
+            </a:r>
+            <a:r>
+              <a:rPr lang="en-US" dirty="0" err="1">
+                <a:solidFill>
+                  <a:srgbClr val="000000"/>
+                </a:solidFill>
+                <a:latin typeface="Consolas" panose="020B0609020204030204" pitchFamily="49" charset="0"/>
+              </a:rPr>
+              <a:t>isLeapYear</a:t>
+            </a:r>
+            <a:r>
+              <a:rPr lang="en-US" dirty="0">
+                <a:solidFill>
+                  <a:srgbClr val="000000"/>
+                </a:solidFill>
+                <a:latin typeface="Consolas" panose="020B0609020204030204" pitchFamily="49" charset="0"/>
+              </a:rPr>
+              <a:t>(year):</a:t>
+            </a:r>
+          </a:p>
+          <a:p>
+            <a:r>
+              <a:rPr lang="en-US" dirty="0">
+                <a:solidFill>
+                  <a:srgbClr val="000000"/>
+                </a:solidFill>
+                <a:latin typeface="Consolas" panose="020B0609020204030204" pitchFamily="49" charset="0"/>
+              </a:rPr>
+              <a:t>    </a:t>
+            </a:r>
+            <a:r>
+              <a:rPr lang="en-US" dirty="0">
+                <a:solidFill>
+                  <a:srgbClr val="008000"/>
+                </a:solidFill>
+                <a:latin typeface="Consolas" panose="020B0609020204030204" pitchFamily="49" charset="0"/>
+              </a:rPr>
+              <a:t># do something</a:t>
+            </a:r>
+            <a:endParaRPr lang="en-US" b="0" dirty="0">
+              <a:solidFill>
+                <a:srgbClr val="000000"/>
+              </a:solidFill>
+              <a:effectLst/>
+              <a:latin typeface="Consolas" panose="020B0609020204030204" pitchFamily="49" charset="0"/>
+            </a:endParaRPr>
+          </a:p>
+        </p:txBody>
+      </p:sp>
+      <p:sp>
+        <p:nvSpPr>
+          <p:cNvPr id="8" name="コンテンツ プレースホルダー 2">
+            <a:extLst>
+              <a:ext uri="{FF2B5EF4-FFF2-40B4-BE49-F238E27FC236}">
+                <a16:creationId xmlns:a16="http://schemas.microsoft.com/office/drawing/2014/main" id="{128471EB-2083-48CC-B3CB-08D4EAB28F84}"/>
+              </a:ext>
+            </a:extLst>
+          </p:cNvPr>
+          <p:cNvSpPr txBox="1">
+            <a:spLocks/>
+          </p:cNvSpPr>
+          <p:nvPr/>
+        </p:nvSpPr>
+        <p:spPr>
+          <a:xfrm>
+            <a:off x="628650" y="2046288"/>
+            <a:ext cx="7886700" cy="612776"/>
+          </a:xfrm>
+          <a:prstGeom prst="rect">
+            <a:avLst/>
+          </a:prstGeom>
+        </p:spPr>
+        <p:txBody>
+          <a:bodyPr vert="horz" lIns="91440" tIns="45720" rIns="91440" bIns="45720" rtlCol="0">
+            <a:normAutofit/>
+          </a:bodyPr>
+          <a:lstStyle>
+            <a:lvl1pPr marL="228600" indent="-228600" algn="l" defTabSz="914400" rtl="0" eaLnBrk="1" latinLnBrk="0" hangingPunct="1">
+              <a:lnSpc>
+                <a:spcPct val="90000"/>
+              </a:lnSpc>
+              <a:spcBef>
+                <a:spcPts val="1000"/>
+              </a:spcBef>
+              <a:buFont typeface="Arial" panose="020B0604020202020204" pitchFamily="34" charset="0"/>
+              <a:buChar char="•"/>
+              <a:defRPr sz="3200" kern="1200">
+                <a:solidFill>
+                  <a:schemeClr val="tx1"/>
+                </a:solidFill>
+                <a:latin typeface="+mn-lt"/>
+                <a:ea typeface="+mn-ea"/>
+                <a:cs typeface="+mn-cs"/>
+              </a:defRPr>
+            </a:lvl1pPr>
+            <a:lvl2pPr marL="685800" indent="-228600" algn="l" defTabSz="914400" rtl="0" eaLnBrk="1" latinLnBrk="0" hangingPunct="1">
+              <a:lnSpc>
+                <a:spcPct val="90000"/>
+              </a:lnSpc>
+              <a:spcBef>
+                <a:spcPts val="500"/>
+              </a:spcBef>
+              <a:buFont typeface="Arial" panose="020B0604020202020204" pitchFamily="34" charset="0"/>
+              <a:buChar char="•"/>
+              <a:defRPr sz="2800" kern="1200">
+                <a:solidFill>
+                  <a:schemeClr val="tx1"/>
+                </a:solidFill>
+                <a:latin typeface="+mn-lt"/>
+                <a:ea typeface="+mn-ea"/>
+                <a:cs typeface="+mn-cs"/>
+              </a:defRPr>
+            </a:lvl2pPr>
+            <a:lvl3pPr marL="1143000" indent="-228600" algn="l" defTabSz="914400" rtl="0" eaLnBrk="1" latinLnBrk="0" hangingPunct="1">
+              <a:lnSpc>
+                <a:spcPct val="90000"/>
+              </a:lnSpc>
+              <a:spcBef>
+                <a:spcPts val="500"/>
+              </a:spcBef>
+              <a:buFont typeface="Arial" panose="020B0604020202020204" pitchFamily="34" charset="0"/>
+              <a:buChar char="•"/>
+              <a:defRPr sz="2400" kern="1200">
+                <a:solidFill>
+                  <a:schemeClr val="tx1"/>
+                </a:solidFill>
+                <a:latin typeface="+mn-lt"/>
+                <a:ea typeface="+mn-ea"/>
+                <a:cs typeface="+mn-cs"/>
+              </a:defRPr>
+            </a:lvl3pPr>
+            <a:lvl4pPr marL="1600200" indent="-228600" algn="l" defTabSz="914400" rtl="0" eaLnBrk="1" latinLnBrk="0" hangingPunct="1">
+              <a:lnSpc>
+                <a:spcPct val="90000"/>
+              </a:lnSpc>
+              <a:spcBef>
+                <a:spcPts val="500"/>
+              </a:spcBef>
+              <a:buFont typeface="Arial" panose="020B0604020202020204" pitchFamily="34" charset="0"/>
+              <a:buChar char="•"/>
+              <a:defRPr sz="2000" kern="1200">
+                <a:solidFill>
+                  <a:schemeClr val="tx1"/>
+                </a:solidFill>
+                <a:latin typeface="+mn-lt"/>
+                <a:ea typeface="+mn-ea"/>
+                <a:cs typeface="+mn-cs"/>
+              </a:defRPr>
+            </a:lvl4pPr>
+            <a:lvl5pPr marL="2057400" indent="-228600" algn="l" defTabSz="914400" rtl="0" eaLnBrk="1" latinLnBrk="0" hangingPunct="1">
+              <a:lnSpc>
+                <a:spcPct val="90000"/>
+              </a:lnSpc>
+              <a:spcBef>
+                <a:spcPts val="500"/>
+              </a:spcBef>
+              <a:buFont typeface="Arial" panose="020B0604020202020204" pitchFamily="34" charset="0"/>
+              <a:buChar char="•"/>
+              <a:defRPr sz="2000" kern="1200">
+                <a:solidFill>
+                  <a:schemeClr val="tx1"/>
+                </a:solidFill>
+                <a:latin typeface="+mn-lt"/>
+                <a:ea typeface="+mn-ea"/>
+                <a:cs typeface="+mn-cs"/>
+              </a:defRPr>
+            </a:lvl5pPr>
+            <a:lvl6pPr marL="2514600" indent="-228600" algn="l" defTabSz="914400" rtl="0" eaLnBrk="1" latinLnBrk="0" hangingPunct="1">
+              <a:lnSpc>
+                <a:spcPct val="90000"/>
+              </a:lnSpc>
+              <a:spcBef>
+                <a:spcPts val="500"/>
+              </a:spcBef>
+              <a:buFont typeface="Arial" panose="020B0604020202020204" pitchFamily="34" charset="0"/>
+              <a:buChar char="•"/>
+              <a:defRPr sz="1800" kern="1200">
+                <a:solidFill>
+                  <a:schemeClr val="tx1"/>
+                </a:solidFill>
+                <a:latin typeface="+mn-lt"/>
+                <a:ea typeface="+mn-ea"/>
+                <a:cs typeface="+mn-cs"/>
+              </a:defRPr>
+            </a:lvl6pPr>
+            <a:lvl7pPr marL="2971800" indent="-228600" algn="l" defTabSz="914400" rtl="0" eaLnBrk="1" latinLnBrk="0" hangingPunct="1">
+              <a:lnSpc>
+                <a:spcPct val="90000"/>
+              </a:lnSpc>
+              <a:spcBef>
+                <a:spcPts val="500"/>
+              </a:spcBef>
+              <a:buFont typeface="Arial" panose="020B0604020202020204" pitchFamily="34" charset="0"/>
+              <a:buChar char="•"/>
+              <a:defRPr sz="1800" kern="1200">
+                <a:solidFill>
+                  <a:schemeClr val="tx1"/>
+                </a:solidFill>
+                <a:latin typeface="+mn-lt"/>
+                <a:ea typeface="+mn-ea"/>
+                <a:cs typeface="+mn-cs"/>
+              </a:defRPr>
+            </a:lvl7pPr>
+            <a:lvl8pPr marL="3429000" indent="-228600" algn="l" defTabSz="914400" rtl="0" eaLnBrk="1" latinLnBrk="0" hangingPunct="1">
+              <a:lnSpc>
+                <a:spcPct val="90000"/>
+              </a:lnSpc>
+              <a:spcBef>
+                <a:spcPts val="500"/>
+              </a:spcBef>
+              <a:buFont typeface="Arial" panose="020B0604020202020204" pitchFamily="34" charset="0"/>
+              <a:buChar char="•"/>
+              <a:defRPr sz="1800" kern="1200">
+                <a:solidFill>
+                  <a:schemeClr val="tx1"/>
+                </a:solidFill>
+                <a:latin typeface="+mn-lt"/>
+                <a:ea typeface="+mn-ea"/>
+                <a:cs typeface="+mn-cs"/>
+              </a:defRPr>
+            </a:lvl8pPr>
+            <a:lvl9pPr marL="3886200" indent="-228600" algn="l" defTabSz="914400" rtl="0" eaLnBrk="1" latinLnBrk="0" hangingPunct="1">
+              <a:lnSpc>
+                <a:spcPct val="90000"/>
+              </a:lnSpc>
+              <a:spcBef>
+                <a:spcPts val="500"/>
+              </a:spcBef>
+              <a:buFont typeface="Arial" panose="020B0604020202020204" pitchFamily="34" charset="0"/>
+              <a:buChar char="•"/>
+              <a:defRPr sz="1800" kern="1200">
+                <a:solidFill>
+                  <a:schemeClr val="tx1"/>
+                </a:solidFill>
+                <a:latin typeface="+mn-lt"/>
+                <a:ea typeface="+mn-ea"/>
+                <a:cs typeface="+mn-cs"/>
+              </a:defRPr>
+            </a:lvl9pPr>
+          </a:lstStyle>
+          <a:p>
+            <a:pPr marL="0" indent="0">
+              <a:buFont typeface="Arial" panose="020B0604020202020204" pitchFamily="34" charset="0"/>
+              <a:buNone/>
+            </a:pPr>
+            <a:r>
+              <a:rPr lang="ja-JP" altLang="en-US" dirty="0"/>
+              <a:t>閏年を判定して</a:t>
+            </a:r>
+            <a:r>
+              <a:rPr lang="en-US" altLang="ja-JP" dirty="0"/>
+              <a:t>”Leap Year!”</a:t>
+            </a:r>
+            <a:r>
+              <a:rPr lang="ja-JP" altLang="en-US" dirty="0"/>
+              <a:t>と出力する</a:t>
+            </a:r>
+            <a:endParaRPr lang="en-US" altLang="ja-JP" dirty="0"/>
           </a:p>
         </p:txBody>
       </p:sp>
@@ -19527,7 +20655,7 @@
         </p:nvSpPr>
         <p:spPr>
           <a:xfrm>
-            <a:off x="628650" y="4379480"/>
+            <a:off x="628650" y="3966358"/>
             <a:ext cx="7886700" cy="612776"/>
           </a:xfrm>
           <a:prstGeom prst="rect">
@@ -19712,6 +20840,312 @@
               <a:t>出力例</a:t>
             </a:r>
             <a:endParaRPr lang="en-US" dirty="0"/>
+          </a:p>
+        </p:txBody>
+      </p:sp>
+      <p:sp>
+        <p:nvSpPr>
+          <p:cNvPr id="7" name="コンテンツ プレースホルダー 2">
+            <a:extLst>
+              <a:ext uri="{FF2B5EF4-FFF2-40B4-BE49-F238E27FC236}">
+                <a16:creationId xmlns:a16="http://schemas.microsoft.com/office/drawing/2014/main" id="{EF5056F4-A5EF-4311-9F26-40C9998C5757}"/>
+              </a:ext>
+            </a:extLst>
+          </p:cNvPr>
+          <p:cNvSpPr txBox="1">
+            <a:spLocks/>
+          </p:cNvSpPr>
+          <p:nvPr/>
+        </p:nvSpPr>
+        <p:spPr>
+          <a:xfrm>
+            <a:off x="628650" y="1851891"/>
+            <a:ext cx="7886700" cy="612776"/>
+          </a:xfrm>
+          <a:prstGeom prst="rect">
+            <a:avLst/>
+          </a:prstGeom>
+        </p:spPr>
+        <p:txBody>
+          <a:bodyPr vert="horz" lIns="91440" tIns="45720" rIns="91440" bIns="45720" rtlCol="0">
+            <a:normAutofit/>
+          </a:bodyPr>
+          <a:lstStyle>
+            <a:lvl1pPr marL="228600" indent="-228600" algn="l" defTabSz="914400" rtl="0" eaLnBrk="1" latinLnBrk="0" hangingPunct="1">
+              <a:lnSpc>
+                <a:spcPct val="90000"/>
+              </a:lnSpc>
+              <a:spcBef>
+                <a:spcPts val="1000"/>
+              </a:spcBef>
+              <a:buFont typeface="Arial" panose="020B0604020202020204" pitchFamily="34" charset="0"/>
+              <a:buChar char="•"/>
+              <a:defRPr sz="3200" kern="1200">
+                <a:solidFill>
+                  <a:schemeClr val="tx1"/>
+                </a:solidFill>
+                <a:latin typeface="+mn-lt"/>
+                <a:ea typeface="+mn-ea"/>
+                <a:cs typeface="+mn-cs"/>
+              </a:defRPr>
+            </a:lvl1pPr>
+            <a:lvl2pPr marL="685800" indent="-228600" algn="l" defTabSz="914400" rtl="0" eaLnBrk="1" latinLnBrk="0" hangingPunct="1">
+              <a:lnSpc>
+                <a:spcPct val="90000"/>
+              </a:lnSpc>
+              <a:spcBef>
+                <a:spcPts val="500"/>
+              </a:spcBef>
+              <a:buFont typeface="Arial" panose="020B0604020202020204" pitchFamily="34" charset="0"/>
+              <a:buChar char="•"/>
+              <a:defRPr sz="2800" kern="1200">
+                <a:solidFill>
+                  <a:schemeClr val="tx1"/>
+                </a:solidFill>
+                <a:latin typeface="+mn-lt"/>
+                <a:ea typeface="+mn-ea"/>
+                <a:cs typeface="+mn-cs"/>
+              </a:defRPr>
+            </a:lvl2pPr>
+            <a:lvl3pPr marL="1143000" indent="-228600" algn="l" defTabSz="914400" rtl="0" eaLnBrk="1" latinLnBrk="0" hangingPunct="1">
+              <a:lnSpc>
+                <a:spcPct val="90000"/>
+              </a:lnSpc>
+              <a:spcBef>
+                <a:spcPts val="500"/>
+              </a:spcBef>
+              <a:buFont typeface="Arial" panose="020B0604020202020204" pitchFamily="34" charset="0"/>
+              <a:buChar char="•"/>
+              <a:defRPr sz="2400" kern="1200">
+                <a:solidFill>
+                  <a:schemeClr val="tx1"/>
+                </a:solidFill>
+                <a:latin typeface="+mn-lt"/>
+                <a:ea typeface="+mn-ea"/>
+                <a:cs typeface="+mn-cs"/>
+              </a:defRPr>
+            </a:lvl3pPr>
+            <a:lvl4pPr marL="1600200" indent="-228600" algn="l" defTabSz="914400" rtl="0" eaLnBrk="1" latinLnBrk="0" hangingPunct="1">
+              <a:lnSpc>
+                <a:spcPct val="90000"/>
+              </a:lnSpc>
+              <a:spcBef>
+                <a:spcPts val="500"/>
+              </a:spcBef>
+              <a:buFont typeface="Arial" panose="020B0604020202020204" pitchFamily="34" charset="0"/>
+              <a:buChar char="•"/>
+              <a:defRPr sz="2000" kern="1200">
+                <a:solidFill>
+                  <a:schemeClr val="tx1"/>
+                </a:solidFill>
+                <a:latin typeface="+mn-lt"/>
+                <a:ea typeface="+mn-ea"/>
+                <a:cs typeface="+mn-cs"/>
+              </a:defRPr>
+            </a:lvl4pPr>
+            <a:lvl5pPr marL="2057400" indent="-228600" algn="l" defTabSz="914400" rtl="0" eaLnBrk="1" latinLnBrk="0" hangingPunct="1">
+              <a:lnSpc>
+                <a:spcPct val="90000"/>
+              </a:lnSpc>
+              <a:spcBef>
+                <a:spcPts val="500"/>
+              </a:spcBef>
+              <a:buFont typeface="Arial" panose="020B0604020202020204" pitchFamily="34" charset="0"/>
+              <a:buChar char="•"/>
+              <a:defRPr sz="2000" kern="1200">
+                <a:solidFill>
+                  <a:schemeClr val="tx1"/>
+                </a:solidFill>
+                <a:latin typeface="+mn-lt"/>
+                <a:ea typeface="+mn-ea"/>
+                <a:cs typeface="+mn-cs"/>
+              </a:defRPr>
+            </a:lvl5pPr>
+            <a:lvl6pPr marL="2514600" indent="-228600" algn="l" defTabSz="914400" rtl="0" eaLnBrk="1" latinLnBrk="0" hangingPunct="1">
+              <a:lnSpc>
+                <a:spcPct val="90000"/>
+              </a:lnSpc>
+              <a:spcBef>
+                <a:spcPts val="500"/>
+              </a:spcBef>
+              <a:buFont typeface="Arial" panose="020B0604020202020204" pitchFamily="34" charset="0"/>
+              <a:buChar char="•"/>
+              <a:defRPr sz="1800" kern="1200">
+                <a:solidFill>
+                  <a:schemeClr val="tx1"/>
+                </a:solidFill>
+                <a:latin typeface="+mn-lt"/>
+                <a:ea typeface="+mn-ea"/>
+                <a:cs typeface="+mn-cs"/>
+              </a:defRPr>
+            </a:lvl6pPr>
+            <a:lvl7pPr marL="2971800" indent="-228600" algn="l" defTabSz="914400" rtl="0" eaLnBrk="1" latinLnBrk="0" hangingPunct="1">
+              <a:lnSpc>
+                <a:spcPct val="90000"/>
+              </a:lnSpc>
+              <a:spcBef>
+                <a:spcPts val="500"/>
+              </a:spcBef>
+              <a:buFont typeface="Arial" panose="020B0604020202020204" pitchFamily="34" charset="0"/>
+              <a:buChar char="•"/>
+              <a:defRPr sz="1800" kern="1200">
+                <a:solidFill>
+                  <a:schemeClr val="tx1"/>
+                </a:solidFill>
+                <a:latin typeface="+mn-lt"/>
+                <a:ea typeface="+mn-ea"/>
+                <a:cs typeface="+mn-cs"/>
+              </a:defRPr>
+            </a:lvl7pPr>
+            <a:lvl8pPr marL="3429000" indent="-228600" algn="l" defTabSz="914400" rtl="0" eaLnBrk="1" latinLnBrk="0" hangingPunct="1">
+              <a:lnSpc>
+                <a:spcPct val="90000"/>
+              </a:lnSpc>
+              <a:spcBef>
+                <a:spcPts val="500"/>
+              </a:spcBef>
+              <a:buFont typeface="Arial" panose="020B0604020202020204" pitchFamily="34" charset="0"/>
+              <a:buChar char="•"/>
+              <a:defRPr sz="1800" kern="1200">
+                <a:solidFill>
+                  <a:schemeClr val="tx1"/>
+                </a:solidFill>
+                <a:latin typeface="+mn-lt"/>
+                <a:ea typeface="+mn-ea"/>
+                <a:cs typeface="+mn-cs"/>
+              </a:defRPr>
+            </a:lvl8pPr>
+            <a:lvl9pPr marL="3886200" indent="-228600" algn="l" defTabSz="914400" rtl="0" eaLnBrk="1" latinLnBrk="0" hangingPunct="1">
+              <a:lnSpc>
+                <a:spcPct val="90000"/>
+              </a:lnSpc>
+              <a:spcBef>
+                <a:spcPts val="500"/>
+              </a:spcBef>
+              <a:buFont typeface="Arial" panose="020B0604020202020204" pitchFamily="34" charset="0"/>
+              <a:buChar char="•"/>
+              <a:defRPr sz="1800" kern="1200">
+                <a:solidFill>
+                  <a:schemeClr val="tx1"/>
+                </a:solidFill>
+                <a:latin typeface="+mn-lt"/>
+                <a:ea typeface="+mn-ea"/>
+                <a:cs typeface="+mn-cs"/>
+              </a:defRPr>
+            </a:lvl9pPr>
+          </a:lstStyle>
+          <a:p>
+            <a:pPr marL="0" indent="0">
+              <a:buFont typeface="Arial" panose="020B0604020202020204" pitchFamily="34" charset="0"/>
+              <a:buNone/>
+            </a:pPr>
+            <a:r>
+              <a:rPr lang="en-US" altLang="ja-JP" dirty="0" err="1"/>
+              <a:t>a,b,c</a:t>
+            </a:r>
+            <a:r>
+              <a:rPr lang="ja-JP" altLang="en-US" dirty="0"/>
+              <a:t>の最大値を求める関数を作成せよ．</a:t>
+            </a:r>
+            <a:endParaRPr lang="en-US" altLang="ja-JP" dirty="0"/>
+          </a:p>
+        </p:txBody>
+      </p:sp>
+      <p:sp>
+        <p:nvSpPr>
+          <p:cNvPr id="8" name="正方形/長方形 7">
+            <a:extLst>
+              <a:ext uri="{FF2B5EF4-FFF2-40B4-BE49-F238E27FC236}">
+                <a16:creationId xmlns:a16="http://schemas.microsoft.com/office/drawing/2014/main" id="{953B9F85-EAE5-4FE9-9283-B913C3B8221E}"/>
+              </a:ext>
+            </a:extLst>
+          </p:cNvPr>
+          <p:cNvSpPr/>
+          <p:nvPr/>
+        </p:nvSpPr>
+        <p:spPr>
+          <a:xfrm>
+            <a:off x="628650" y="3238645"/>
+            <a:ext cx="7886700" cy="369332"/>
+          </a:xfrm>
+          <a:prstGeom prst="rect">
+            <a:avLst/>
+          </a:prstGeom>
+          <a:solidFill>
+            <a:srgbClr val="FFFFFF"/>
+          </a:solidFill>
+        </p:spPr>
+        <p:txBody>
+          <a:bodyPr wrap="square">
+            <a:spAutoFit/>
+          </a:bodyPr>
+          <a:lstStyle/>
+          <a:p>
+            <a:r>
+              <a:rPr lang="en-US" dirty="0">
+                <a:solidFill>
+                  <a:srgbClr val="000000"/>
+                </a:solidFill>
+                <a:latin typeface="Consolas" panose="020B0609020204030204" pitchFamily="49" charset="0"/>
+              </a:rPr>
+              <a:t>15 34 7</a:t>
+            </a:r>
+            <a:endParaRPr lang="en-US" b="0" dirty="0">
+              <a:solidFill>
+                <a:srgbClr val="000000"/>
+              </a:solidFill>
+              <a:effectLst/>
+              <a:latin typeface="Consolas" panose="020B0609020204030204" pitchFamily="49" charset="0"/>
+            </a:endParaRPr>
+          </a:p>
+        </p:txBody>
+      </p:sp>
+      <p:sp>
+        <p:nvSpPr>
+          <p:cNvPr id="9" name="正方形/長方形 8">
+            <a:extLst>
+              <a:ext uri="{FF2B5EF4-FFF2-40B4-BE49-F238E27FC236}">
+                <a16:creationId xmlns:a16="http://schemas.microsoft.com/office/drawing/2014/main" id="{0AF818B4-50BC-4990-A9E6-ADC52900A40E}"/>
+              </a:ext>
+            </a:extLst>
+          </p:cNvPr>
+          <p:cNvSpPr/>
+          <p:nvPr/>
+        </p:nvSpPr>
+        <p:spPr>
+          <a:xfrm>
+            <a:off x="628650" y="4591953"/>
+            <a:ext cx="7886700" cy="369332"/>
+          </a:xfrm>
+          <a:prstGeom prst="rect">
+            <a:avLst/>
+          </a:prstGeom>
+          <a:solidFill>
+            <a:srgbClr val="FFFFFF"/>
+          </a:solidFill>
+        </p:spPr>
+        <p:txBody>
+          <a:bodyPr wrap="square">
+            <a:spAutoFit/>
+          </a:bodyPr>
+          <a:lstStyle/>
+          <a:p>
+            <a:r>
+              <a:rPr lang="en-US" dirty="0">
+                <a:solidFill>
+                  <a:srgbClr val="000000"/>
+                </a:solidFill>
+                <a:latin typeface="Consolas" panose="020B0609020204030204" pitchFamily="49" charset="0"/>
+              </a:rPr>
+              <a:t>34</a:t>
+            </a:r>
+            <a:endParaRPr lang="en-US" b="0" dirty="0">
+              <a:solidFill>
+                <a:srgbClr val="000000"/>
+              </a:solidFill>
+              <a:effectLst/>
+              <a:latin typeface="Consolas" panose="020B0609020204030204" pitchFamily="49" charset="0"/>
+            </a:endParaRPr>
           </a:p>
         </p:txBody>
       </p:sp>
@@ -19925,7 +21359,7 @@
         </p:nvSpPr>
         <p:spPr>
           <a:xfrm>
-            <a:off x="628650" y="1825625"/>
+            <a:off x="628650" y="1760756"/>
             <a:ext cx="7886700" cy="612776"/>
           </a:xfrm>
         </p:spPr>
@@ -19974,6 +21408,851 @@
           </a:p>
         </p:txBody>
       </p:sp>
+      <p:sp>
+        <p:nvSpPr>
+          <p:cNvPr id="4" name="正方形/長方形 3">
+            <a:extLst>
+              <a:ext uri="{FF2B5EF4-FFF2-40B4-BE49-F238E27FC236}">
+                <a16:creationId xmlns:a16="http://schemas.microsoft.com/office/drawing/2014/main" id="{32BDEF20-9F41-4F75-B6DA-20905990E84A}"/>
+              </a:ext>
+            </a:extLst>
+          </p:cNvPr>
+          <p:cNvSpPr/>
+          <p:nvPr/>
+        </p:nvSpPr>
+        <p:spPr>
+          <a:xfrm>
+            <a:off x="2286000" y="1764209"/>
+            <a:ext cx="4572000" cy="2585323"/>
+          </a:xfrm>
+          <a:prstGeom prst="rect">
+            <a:avLst/>
+          </a:prstGeom>
+          <a:solidFill>
+            <a:srgbClr val="FFFFFF"/>
+          </a:solidFill>
+        </p:spPr>
+        <p:txBody>
+          <a:bodyPr>
+            <a:spAutoFit/>
+          </a:bodyPr>
+          <a:lstStyle/>
+          <a:p>
+            <a:r>
+              <a:rPr lang="en-US" dirty="0">
+                <a:solidFill>
+                  <a:srgbClr val="0000FF"/>
+                </a:solidFill>
+                <a:latin typeface="Consolas" panose="020B0609020204030204" pitchFamily="49" charset="0"/>
+              </a:rPr>
+              <a:t>def</a:t>
+            </a:r>
+            <a:r>
+              <a:rPr lang="en-US" dirty="0">
+                <a:solidFill>
+                  <a:srgbClr val="000000"/>
+                </a:solidFill>
+                <a:latin typeface="Consolas" panose="020B0609020204030204" pitchFamily="49" charset="0"/>
+              </a:rPr>
+              <a:t> </a:t>
+            </a:r>
+            <a:r>
+              <a:rPr lang="en-US" dirty="0">
+                <a:solidFill>
+                  <a:srgbClr val="74531F"/>
+                </a:solidFill>
+                <a:latin typeface="Consolas" panose="020B0609020204030204" pitchFamily="49" charset="0"/>
+              </a:rPr>
+              <a:t>getMax3</a:t>
+            </a:r>
+            <a:r>
+              <a:rPr lang="en-US" dirty="0">
+                <a:solidFill>
+                  <a:srgbClr val="000000"/>
+                </a:solidFill>
+                <a:latin typeface="Consolas" panose="020B0609020204030204" pitchFamily="49" charset="0"/>
+              </a:rPr>
+              <a:t>(</a:t>
+            </a:r>
+            <a:r>
+              <a:rPr lang="en-US" dirty="0">
+                <a:solidFill>
+                  <a:srgbClr val="808080"/>
+                </a:solidFill>
+                <a:latin typeface="Consolas" panose="020B0609020204030204" pitchFamily="49" charset="0"/>
+              </a:rPr>
+              <a:t>a</a:t>
+            </a:r>
+            <a:r>
+              <a:rPr lang="en-US" dirty="0">
+                <a:solidFill>
+                  <a:srgbClr val="000000"/>
+                </a:solidFill>
+                <a:latin typeface="Consolas" panose="020B0609020204030204" pitchFamily="49" charset="0"/>
+              </a:rPr>
+              <a:t>, </a:t>
+            </a:r>
+            <a:r>
+              <a:rPr lang="en-US" dirty="0">
+                <a:solidFill>
+                  <a:srgbClr val="808080"/>
+                </a:solidFill>
+                <a:latin typeface="Consolas" panose="020B0609020204030204" pitchFamily="49" charset="0"/>
+              </a:rPr>
+              <a:t>b</a:t>
+            </a:r>
+            <a:r>
+              <a:rPr lang="en-US" dirty="0">
+                <a:solidFill>
+                  <a:srgbClr val="000000"/>
+                </a:solidFill>
+                <a:latin typeface="Consolas" panose="020B0609020204030204" pitchFamily="49" charset="0"/>
+              </a:rPr>
+              <a:t>, </a:t>
+            </a:r>
+            <a:r>
+              <a:rPr lang="en-US" dirty="0">
+                <a:solidFill>
+                  <a:srgbClr val="808080"/>
+                </a:solidFill>
+                <a:latin typeface="Consolas" panose="020B0609020204030204" pitchFamily="49" charset="0"/>
+              </a:rPr>
+              <a:t>c</a:t>
+            </a:r>
+            <a:r>
+              <a:rPr lang="en-US" dirty="0">
+                <a:solidFill>
+                  <a:srgbClr val="000000"/>
+                </a:solidFill>
+                <a:latin typeface="Consolas" panose="020B0609020204030204" pitchFamily="49" charset="0"/>
+              </a:rPr>
+              <a:t>):</a:t>
+            </a:r>
+          </a:p>
+          <a:p>
+            <a:r>
+              <a:rPr lang="en-US" dirty="0">
+                <a:solidFill>
+                  <a:srgbClr val="000000"/>
+                </a:solidFill>
+                <a:latin typeface="Consolas" panose="020B0609020204030204" pitchFamily="49" charset="0"/>
+              </a:rPr>
+              <a:t>    </a:t>
+            </a:r>
+            <a:r>
+              <a:rPr lang="en-US" dirty="0">
+                <a:solidFill>
+                  <a:srgbClr val="8F08C4"/>
+                </a:solidFill>
+                <a:latin typeface="Consolas" panose="020B0609020204030204" pitchFamily="49" charset="0"/>
+              </a:rPr>
+              <a:t>if</a:t>
+            </a:r>
+            <a:r>
+              <a:rPr lang="en-US" dirty="0">
+                <a:solidFill>
+                  <a:srgbClr val="000000"/>
+                </a:solidFill>
+                <a:latin typeface="Consolas" panose="020B0609020204030204" pitchFamily="49" charset="0"/>
+              </a:rPr>
+              <a:t> b &lt;= a </a:t>
+            </a:r>
+            <a:r>
+              <a:rPr lang="en-US" dirty="0">
+                <a:solidFill>
+                  <a:srgbClr val="0000FF"/>
+                </a:solidFill>
+                <a:latin typeface="Consolas" panose="020B0609020204030204" pitchFamily="49" charset="0"/>
+              </a:rPr>
+              <a:t>and</a:t>
+            </a:r>
+            <a:r>
+              <a:rPr lang="en-US" dirty="0">
+                <a:solidFill>
+                  <a:srgbClr val="000000"/>
+                </a:solidFill>
+                <a:latin typeface="Consolas" panose="020B0609020204030204" pitchFamily="49" charset="0"/>
+              </a:rPr>
+              <a:t> c &lt;= a:</a:t>
+            </a:r>
+          </a:p>
+          <a:p>
+            <a:r>
+              <a:rPr lang="en-US" dirty="0">
+                <a:solidFill>
+                  <a:srgbClr val="000000"/>
+                </a:solidFill>
+                <a:latin typeface="Consolas" panose="020B0609020204030204" pitchFamily="49" charset="0"/>
+              </a:rPr>
+              <a:t>        </a:t>
+            </a:r>
+            <a:r>
+              <a:rPr lang="en-US" dirty="0">
+                <a:solidFill>
+                  <a:srgbClr val="8F08C4"/>
+                </a:solidFill>
+                <a:latin typeface="Consolas" panose="020B0609020204030204" pitchFamily="49" charset="0"/>
+              </a:rPr>
+              <a:t>return</a:t>
+            </a:r>
+            <a:r>
+              <a:rPr lang="en-US" dirty="0">
+                <a:solidFill>
+                  <a:srgbClr val="000000"/>
+                </a:solidFill>
+                <a:latin typeface="Consolas" panose="020B0609020204030204" pitchFamily="49" charset="0"/>
+              </a:rPr>
+              <a:t> a</a:t>
+            </a:r>
+          </a:p>
+          <a:p>
+            <a:r>
+              <a:rPr lang="en-US" dirty="0">
+                <a:solidFill>
+                  <a:srgbClr val="000000"/>
+                </a:solidFill>
+                <a:latin typeface="Consolas" panose="020B0609020204030204" pitchFamily="49" charset="0"/>
+              </a:rPr>
+              <a:t>    </a:t>
+            </a:r>
+            <a:r>
+              <a:rPr lang="en-US" dirty="0">
+                <a:solidFill>
+                  <a:srgbClr val="8F08C4"/>
+                </a:solidFill>
+                <a:latin typeface="Consolas" panose="020B0609020204030204" pitchFamily="49" charset="0"/>
+              </a:rPr>
+              <a:t>if</a:t>
+            </a:r>
+            <a:r>
+              <a:rPr lang="en-US" dirty="0">
+                <a:solidFill>
+                  <a:srgbClr val="000000"/>
+                </a:solidFill>
+                <a:latin typeface="Consolas" panose="020B0609020204030204" pitchFamily="49" charset="0"/>
+              </a:rPr>
+              <a:t> c &lt;= b:</a:t>
+            </a:r>
+          </a:p>
+          <a:p>
+            <a:r>
+              <a:rPr lang="en-US" dirty="0">
+                <a:solidFill>
+                  <a:srgbClr val="000000"/>
+                </a:solidFill>
+                <a:latin typeface="Consolas" panose="020B0609020204030204" pitchFamily="49" charset="0"/>
+              </a:rPr>
+              <a:t>        </a:t>
+            </a:r>
+            <a:r>
+              <a:rPr lang="en-US" dirty="0">
+                <a:solidFill>
+                  <a:srgbClr val="8F08C4"/>
+                </a:solidFill>
+                <a:latin typeface="Consolas" panose="020B0609020204030204" pitchFamily="49" charset="0"/>
+              </a:rPr>
+              <a:t>return</a:t>
+            </a:r>
+            <a:r>
+              <a:rPr lang="en-US" dirty="0">
+                <a:solidFill>
+                  <a:srgbClr val="000000"/>
+                </a:solidFill>
+                <a:latin typeface="Consolas" panose="020B0609020204030204" pitchFamily="49" charset="0"/>
+              </a:rPr>
+              <a:t> b</a:t>
+            </a:r>
+          </a:p>
+          <a:p>
+            <a:r>
+              <a:rPr lang="en-US" dirty="0">
+                <a:solidFill>
+                  <a:srgbClr val="000000"/>
+                </a:solidFill>
+                <a:latin typeface="Consolas" panose="020B0609020204030204" pitchFamily="49" charset="0"/>
+              </a:rPr>
+              <a:t>    </a:t>
+            </a:r>
+            <a:r>
+              <a:rPr lang="en-US" dirty="0">
+                <a:solidFill>
+                  <a:srgbClr val="8F08C4"/>
+                </a:solidFill>
+                <a:latin typeface="Consolas" panose="020B0609020204030204" pitchFamily="49" charset="0"/>
+              </a:rPr>
+              <a:t>return</a:t>
+            </a:r>
+            <a:r>
+              <a:rPr lang="en-US" dirty="0">
+                <a:solidFill>
+                  <a:srgbClr val="000000"/>
+                </a:solidFill>
+                <a:latin typeface="Consolas" panose="020B0609020204030204" pitchFamily="49" charset="0"/>
+              </a:rPr>
+              <a:t> c</a:t>
+            </a:r>
+          </a:p>
+          <a:p>
+            <a:r>
+              <a:rPr lang="en-US" dirty="0">
+                <a:solidFill>
+                  <a:srgbClr val="000000"/>
+                </a:solidFill>
+                <a:latin typeface="Consolas" panose="020B0609020204030204" pitchFamily="49" charset="0"/>
+              </a:rPr>
+              <a:t>a = </a:t>
+            </a:r>
+            <a:r>
+              <a:rPr lang="en-US" dirty="0">
+                <a:solidFill>
+                  <a:srgbClr val="2B91AF"/>
+                </a:solidFill>
+                <a:latin typeface="Consolas" panose="020B0609020204030204" pitchFamily="49" charset="0"/>
+              </a:rPr>
+              <a:t>int</a:t>
+            </a:r>
+            <a:r>
+              <a:rPr lang="en-US" dirty="0">
+                <a:solidFill>
+                  <a:srgbClr val="000000"/>
+                </a:solidFill>
+                <a:latin typeface="Consolas" panose="020B0609020204030204" pitchFamily="49" charset="0"/>
+              </a:rPr>
+              <a:t>(</a:t>
+            </a:r>
+            <a:r>
+              <a:rPr lang="en-US" dirty="0">
+                <a:solidFill>
+                  <a:srgbClr val="74531F"/>
+                </a:solidFill>
+                <a:latin typeface="Consolas" panose="020B0609020204030204" pitchFamily="49" charset="0"/>
+              </a:rPr>
+              <a:t>input</a:t>
+            </a:r>
+            <a:r>
+              <a:rPr lang="en-US" dirty="0">
+                <a:solidFill>
+                  <a:srgbClr val="000000"/>
+                </a:solidFill>
+                <a:latin typeface="Consolas" panose="020B0609020204030204" pitchFamily="49" charset="0"/>
+              </a:rPr>
+              <a:t>())</a:t>
+            </a:r>
+          </a:p>
+          <a:p>
+            <a:r>
+              <a:rPr lang="en-US" dirty="0">
+                <a:solidFill>
+                  <a:srgbClr val="000000"/>
+                </a:solidFill>
+                <a:latin typeface="Consolas" panose="020B0609020204030204" pitchFamily="49" charset="0"/>
+              </a:rPr>
+              <a:t>b = </a:t>
+            </a:r>
+            <a:r>
+              <a:rPr lang="en-US" dirty="0">
+                <a:solidFill>
+                  <a:srgbClr val="2B91AF"/>
+                </a:solidFill>
+                <a:latin typeface="Consolas" panose="020B0609020204030204" pitchFamily="49" charset="0"/>
+              </a:rPr>
+              <a:t>int</a:t>
+            </a:r>
+            <a:r>
+              <a:rPr lang="en-US" dirty="0">
+                <a:solidFill>
+                  <a:srgbClr val="000000"/>
+                </a:solidFill>
+                <a:latin typeface="Consolas" panose="020B0609020204030204" pitchFamily="49" charset="0"/>
+              </a:rPr>
+              <a:t>(</a:t>
+            </a:r>
+            <a:r>
+              <a:rPr lang="en-US" dirty="0">
+                <a:solidFill>
+                  <a:srgbClr val="74531F"/>
+                </a:solidFill>
+                <a:latin typeface="Consolas" panose="020B0609020204030204" pitchFamily="49" charset="0"/>
+              </a:rPr>
+              <a:t>input</a:t>
+            </a:r>
+            <a:r>
+              <a:rPr lang="en-US" dirty="0">
+                <a:solidFill>
+                  <a:srgbClr val="000000"/>
+                </a:solidFill>
+                <a:latin typeface="Consolas" panose="020B0609020204030204" pitchFamily="49" charset="0"/>
+              </a:rPr>
+              <a:t>())</a:t>
+            </a:r>
+          </a:p>
+          <a:p>
+            <a:r>
+              <a:rPr lang="en-US" dirty="0">
+                <a:solidFill>
+                  <a:srgbClr val="000000"/>
+                </a:solidFill>
+                <a:latin typeface="Consolas" panose="020B0609020204030204" pitchFamily="49" charset="0"/>
+              </a:rPr>
+              <a:t>c = </a:t>
+            </a:r>
+            <a:r>
+              <a:rPr lang="en-US" dirty="0">
+                <a:solidFill>
+                  <a:srgbClr val="2B91AF"/>
+                </a:solidFill>
+                <a:latin typeface="Consolas" panose="020B0609020204030204" pitchFamily="49" charset="0"/>
+              </a:rPr>
+              <a:t>int</a:t>
+            </a:r>
+            <a:r>
+              <a:rPr lang="en-US" dirty="0">
+                <a:solidFill>
+                  <a:srgbClr val="000000"/>
+                </a:solidFill>
+                <a:latin typeface="Consolas" panose="020B0609020204030204" pitchFamily="49" charset="0"/>
+              </a:rPr>
+              <a:t>(</a:t>
+            </a:r>
+            <a:r>
+              <a:rPr lang="en-US" dirty="0">
+                <a:solidFill>
+                  <a:srgbClr val="74531F"/>
+                </a:solidFill>
+                <a:latin typeface="Consolas" panose="020B0609020204030204" pitchFamily="49" charset="0"/>
+              </a:rPr>
+              <a:t>input</a:t>
+            </a:r>
+            <a:r>
+              <a:rPr lang="en-US" dirty="0">
+                <a:solidFill>
+                  <a:srgbClr val="000000"/>
+                </a:solidFill>
+                <a:latin typeface="Consolas" panose="020B0609020204030204" pitchFamily="49" charset="0"/>
+              </a:rPr>
+              <a:t>())</a:t>
+            </a:r>
+            <a:endParaRPr lang="en-US" b="0" dirty="0">
+              <a:solidFill>
+                <a:srgbClr val="000000"/>
+              </a:solidFill>
+              <a:effectLst/>
+              <a:latin typeface="Consolas" panose="020B0609020204030204" pitchFamily="49" charset="0"/>
+            </a:endParaRPr>
+          </a:p>
+        </p:txBody>
+      </p:sp>
+      <p:sp>
+        <p:nvSpPr>
+          <p:cNvPr id="6" name="コンテンツ プレースホルダー 2">
+            <a:extLst>
+              <a:ext uri="{FF2B5EF4-FFF2-40B4-BE49-F238E27FC236}">
+                <a16:creationId xmlns:a16="http://schemas.microsoft.com/office/drawing/2014/main" id="{841BD0EE-262B-418C-8B92-CBBA50792CC0}"/>
+              </a:ext>
+            </a:extLst>
+          </p:cNvPr>
+          <p:cNvSpPr txBox="1">
+            <a:spLocks/>
+          </p:cNvSpPr>
+          <p:nvPr/>
+        </p:nvSpPr>
+        <p:spPr>
+          <a:xfrm>
+            <a:off x="628650" y="4638596"/>
+            <a:ext cx="7886700" cy="612776"/>
+          </a:xfrm>
+          <a:prstGeom prst="rect">
+            <a:avLst/>
+          </a:prstGeom>
+        </p:spPr>
+        <p:txBody>
+          <a:bodyPr vert="horz" lIns="91440" tIns="45720" rIns="91440" bIns="45720" rtlCol="0">
+            <a:normAutofit/>
+          </a:bodyPr>
+          <a:lstStyle>
+            <a:lvl1pPr marL="228600" indent="-228600" algn="l" defTabSz="914400" rtl="0" eaLnBrk="1" latinLnBrk="0" hangingPunct="1">
+              <a:lnSpc>
+                <a:spcPct val="90000"/>
+              </a:lnSpc>
+              <a:spcBef>
+                <a:spcPts val="1000"/>
+              </a:spcBef>
+              <a:buFont typeface="Arial" panose="020B0604020202020204" pitchFamily="34" charset="0"/>
+              <a:buChar char="•"/>
+              <a:defRPr sz="3200" kern="1200">
+                <a:solidFill>
+                  <a:schemeClr val="tx1"/>
+                </a:solidFill>
+                <a:latin typeface="+mn-lt"/>
+                <a:ea typeface="+mn-ea"/>
+                <a:cs typeface="+mn-cs"/>
+              </a:defRPr>
+            </a:lvl1pPr>
+            <a:lvl2pPr marL="685800" indent="-228600" algn="l" defTabSz="914400" rtl="0" eaLnBrk="1" latinLnBrk="0" hangingPunct="1">
+              <a:lnSpc>
+                <a:spcPct val="90000"/>
+              </a:lnSpc>
+              <a:spcBef>
+                <a:spcPts val="500"/>
+              </a:spcBef>
+              <a:buFont typeface="Arial" panose="020B0604020202020204" pitchFamily="34" charset="0"/>
+              <a:buChar char="•"/>
+              <a:defRPr sz="2800" kern="1200">
+                <a:solidFill>
+                  <a:schemeClr val="tx1"/>
+                </a:solidFill>
+                <a:latin typeface="+mn-lt"/>
+                <a:ea typeface="+mn-ea"/>
+                <a:cs typeface="+mn-cs"/>
+              </a:defRPr>
+            </a:lvl2pPr>
+            <a:lvl3pPr marL="1143000" indent="-228600" algn="l" defTabSz="914400" rtl="0" eaLnBrk="1" latinLnBrk="0" hangingPunct="1">
+              <a:lnSpc>
+                <a:spcPct val="90000"/>
+              </a:lnSpc>
+              <a:spcBef>
+                <a:spcPts val="500"/>
+              </a:spcBef>
+              <a:buFont typeface="Arial" panose="020B0604020202020204" pitchFamily="34" charset="0"/>
+              <a:buChar char="•"/>
+              <a:defRPr sz="2400" kern="1200">
+                <a:solidFill>
+                  <a:schemeClr val="tx1"/>
+                </a:solidFill>
+                <a:latin typeface="+mn-lt"/>
+                <a:ea typeface="+mn-ea"/>
+                <a:cs typeface="+mn-cs"/>
+              </a:defRPr>
+            </a:lvl3pPr>
+            <a:lvl4pPr marL="1600200" indent="-228600" algn="l" defTabSz="914400" rtl="0" eaLnBrk="1" latinLnBrk="0" hangingPunct="1">
+              <a:lnSpc>
+                <a:spcPct val="90000"/>
+              </a:lnSpc>
+              <a:spcBef>
+                <a:spcPts val="500"/>
+              </a:spcBef>
+              <a:buFont typeface="Arial" panose="020B0604020202020204" pitchFamily="34" charset="0"/>
+              <a:buChar char="•"/>
+              <a:defRPr sz="2000" kern="1200">
+                <a:solidFill>
+                  <a:schemeClr val="tx1"/>
+                </a:solidFill>
+                <a:latin typeface="+mn-lt"/>
+                <a:ea typeface="+mn-ea"/>
+                <a:cs typeface="+mn-cs"/>
+              </a:defRPr>
+            </a:lvl4pPr>
+            <a:lvl5pPr marL="2057400" indent="-228600" algn="l" defTabSz="914400" rtl="0" eaLnBrk="1" latinLnBrk="0" hangingPunct="1">
+              <a:lnSpc>
+                <a:spcPct val="90000"/>
+              </a:lnSpc>
+              <a:spcBef>
+                <a:spcPts val="500"/>
+              </a:spcBef>
+              <a:buFont typeface="Arial" panose="020B0604020202020204" pitchFamily="34" charset="0"/>
+              <a:buChar char="•"/>
+              <a:defRPr sz="2000" kern="1200">
+                <a:solidFill>
+                  <a:schemeClr val="tx1"/>
+                </a:solidFill>
+                <a:latin typeface="+mn-lt"/>
+                <a:ea typeface="+mn-ea"/>
+                <a:cs typeface="+mn-cs"/>
+              </a:defRPr>
+            </a:lvl5pPr>
+            <a:lvl6pPr marL="2514600" indent="-228600" algn="l" defTabSz="914400" rtl="0" eaLnBrk="1" latinLnBrk="0" hangingPunct="1">
+              <a:lnSpc>
+                <a:spcPct val="90000"/>
+              </a:lnSpc>
+              <a:spcBef>
+                <a:spcPts val="500"/>
+              </a:spcBef>
+              <a:buFont typeface="Arial" panose="020B0604020202020204" pitchFamily="34" charset="0"/>
+              <a:buChar char="•"/>
+              <a:defRPr sz="1800" kern="1200">
+                <a:solidFill>
+                  <a:schemeClr val="tx1"/>
+                </a:solidFill>
+                <a:latin typeface="+mn-lt"/>
+                <a:ea typeface="+mn-ea"/>
+                <a:cs typeface="+mn-cs"/>
+              </a:defRPr>
+            </a:lvl6pPr>
+            <a:lvl7pPr marL="2971800" indent="-228600" algn="l" defTabSz="914400" rtl="0" eaLnBrk="1" latinLnBrk="0" hangingPunct="1">
+              <a:lnSpc>
+                <a:spcPct val="90000"/>
+              </a:lnSpc>
+              <a:spcBef>
+                <a:spcPts val="500"/>
+              </a:spcBef>
+              <a:buFont typeface="Arial" panose="020B0604020202020204" pitchFamily="34" charset="0"/>
+              <a:buChar char="•"/>
+              <a:defRPr sz="1800" kern="1200">
+                <a:solidFill>
+                  <a:schemeClr val="tx1"/>
+                </a:solidFill>
+                <a:latin typeface="+mn-lt"/>
+                <a:ea typeface="+mn-ea"/>
+                <a:cs typeface="+mn-cs"/>
+              </a:defRPr>
+            </a:lvl7pPr>
+            <a:lvl8pPr marL="3429000" indent="-228600" algn="l" defTabSz="914400" rtl="0" eaLnBrk="1" latinLnBrk="0" hangingPunct="1">
+              <a:lnSpc>
+                <a:spcPct val="90000"/>
+              </a:lnSpc>
+              <a:spcBef>
+                <a:spcPts val="500"/>
+              </a:spcBef>
+              <a:buFont typeface="Arial" panose="020B0604020202020204" pitchFamily="34" charset="0"/>
+              <a:buChar char="•"/>
+              <a:defRPr sz="1800" kern="1200">
+                <a:solidFill>
+                  <a:schemeClr val="tx1"/>
+                </a:solidFill>
+                <a:latin typeface="+mn-lt"/>
+                <a:ea typeface="+mn-ea"/>
+                <a:cs typeface="+mn-cs"/>
+              </a:defRPr>
+            </a:lvl8pPr>
+            <a:lvl9pPr marL="3886200" indent="-228600" algn="l" defTabSz="914400" rtl="0" eaLnBrk="1" latinLnBrk="0" hangingPunct="1">
+              <a:lnSpc>
+                <a:spcPct val="90000"/>
+              </a:lnSpc>
+              <a:spcBef>
+                <a:spcPts val="500"/>
+              </a:spcBef>
+              <a:buFont typeface="Arial" panose="020B0604020202020204" pitchFamily="34" charset="0"/>
+              <a:buChar char="•"/>
+              <a:defRPr sz="1800" kern="1200">
+                <a:solidFill>
+                  <a:schemeClr val="tx1"/>
+                </a:solidFill>
+                <a:latin typeface="+mn-lt"/>
+                <a:ea typeface="+mn-ea"/>
+                <a:cs typeface="+mn-cs"/>
+              </a:defRPr>
+            </a:lvl9pPr>
+          </a:lstStyle>
+          <a:p>
+            <a:pPr marL="0" indent="0">
+              <a:buFont typeface="Arial" panose="020B0604020202020204" pitchFamily="34" charset="0"/>
+              <a:buNone/>
+            </a:pPr>
+            <a:r>
+              <a:rPr lang="ja-JP" altLang="en-US" dirty="0"/>
+              <a:t>別解</a:t>
+            </a:r>
+            <a:r>
+              <a:rPr lang="en-US" altLang="ja-JP" dirty="0"/>
+              <a:t>(</a:t>
+            </a:r>
+            <a:r>
+              <a:rPr lang="ja-JP" altLang="en-US" dirty="0"/>
+              <a:t>関数のみ変更</a:t>
+            </a:r>
+            <a:r>
+              <a:rPr lang="en-US" altLang="ja-JP" dirty="0"/>
+              <a:t>)</a:t>
+            </a:r>
+            <a:endParaRPr lang="en-US" dirty="0"/>
+          </a:p>
+        </p:txBody>
+      </p:sp>
+      <p:sp>
+        <p:nvSpPr>
+          <p:cNvPr id="7" name="正方形/長方形 6">
+            <a:extLst>
+              <a:ext uri="{FF2B5EF4-FFF2-40B4-BE49-F238E27FC236}">
+                <a16:creationId xmlns:a16="http://schemas.microsoft.com/office/drawing/2014/main" id="{F0477FA4-0AFA-4DA4-8DCF-9E09D7FC46F2}"/>
+              </a:ext>
+            </a:extLst>
+          </p:cNvPr>
+          <p:cNvSpPr/>
+          <p:nvPr/>
+        </p:nvSpPr>
+        <p:spPr>
+          <a:xfrm>
+            <a:off x="2286000" y="5217270"/>
+            <a:ext cx="4572000" cy="646331"/>
+          </a:xfrm>
+          <a:prstGeom prst="rect">
+            <a:avLst/>
+          </a:prstGeom>
+          <a:solidFill>
+            <a:srgbClr val="FFFFFF"/>
+          </a:solidFill>
+        </p:spPr>
+        <p:txBody>
+          <a:bodyPr>
+            <a:spAutoFit/>
+          </a:bodyPr>
+          <a:lstStyle/>
+          <a:p>
+            <a:r>
+              <a:rPr lang="en-US" dirty="0">
+                <a:solidFill>
+                  <a:srgbClr val="0000FF"/>
+                </a:solidFill>
+                <a:latin typeface="Consolas" panose="020B0609020204030204" pitchFamily="49" charset="0"/>
+              </a:rPr>
+              <a:t>def</a:t>
+            </a:r>
+            <a:r>
+              <a:rPr lang="en-US" dirty="0">
+                <a:solidFill>
+                  <a:srgbClr val="000000"/>
+                </a:solidFill>
+                <a:latin typeface="Consolas" panose="020B0609020204030204" pitchFamily="49" charset="0"/>
+              </a:rPr>
+              <a:t> </a:t>
+            </a:r>
+            <a:r>
+              <a:rPr lang="en-US" dirty="0">
+                <a:solidFill>
+                  <a:srgbClr val="74531F"/>
+                </a:solidFill>
+                <a:latin typeface="Consolas" panose="020B0609020204030204" pitchFamily="49" charset="0"/>
+              </a:rPr>
+              <a:t>getMax3</a:t>
+            </a:r>
+            <a:r>
+              <a:rPr lang="en-US" dirty="0">
+                <a:solidFill>
+                  <a:srgbClr val="000000"/>
+                </a:solidFill>
+                <a:latin typeface="Consolas" panose="020B0609020204030204" pitchFamily="49" charset="0"/>
+              </a:rPr>
+              <a:t>(</a:t>
+            </a:r>
+            <a:r>
+              <a:rPr lang="en-US" dirty="0">
+                <a:solidFill>
+                  <a:srgbClr val="808080"/>
+                </a:solidFill>
+                <a:latin typeface="Consolas" panose="020B0609020204030204" pitchFamily="49" charset="0"/>
+              </a:rPr>
+              <a:t>a</a:t>
+            </a:r>
+            <a:r>
+              <a:rPr lang="en-US" dirty="0">
+                <a:solidFill>
+                  <a:srgbClr val="000000"/>
+                </a:solidFill>
+                <a:latin typeface="Consolas" panose="020B0609020204030204" pitchFamily="49" charset="0"/>
+              </a:rPr>
+              <a:t>, </a:t>
+            </a:r>
+            <a:r>
+              <a:rPr lang="en-US" dirty="0">
+                <a:solidFill>
+                  <a:srgbClr val="808080"/>
+                </a:solidFill>
+                <a:latin typeface="Consolas" panose="020B0609020204030204" pitchFamily="49" charset="0"/>
+              </a:rPr>
+              <a:t>b</a:t>
+            </a:r>
+            <a:r>
+              <a:rPr lang="en-US" dirty="0">
+                <a:solidFill>
+                  <a:srgbClr val="000000"/>
+                </a:solidFill>
+                <a:latin typeface="Consolas" panose="020B0609020204030204" pitchFamily="49" charset="0"/>
+              </a:rPr>
+              <a:t>, </a:t>
+            </a:r>
+            <a:r>
+              <a:rPr lang="en-US" dirty="0">
+                <a:solidFill>
+                  <a:srgbClr val="808080"/>
+                </a:solidFill>
+                <a:latin typeface="Consolas" panose="020B0609020204030204" pitchFamily="49" charset="0"/>
+              </a:rPr>
+              <a:t>c</a:t>
+            </a:r>
+            <a:r>
+              <a:rPr lang="en-US" dirty="0">
+                <a:solidFill>
+                  <a:srgbClr val="000000"/>
+                </a:solidFill>
+                <a:latin typeface="Consolas" panose="020B0609020204030204" pitchFamily="49" charset="0"/>
+              </a:rPr>
+              <a:t>):</a:t>
+            </a:r>
+          </a:p>
+          <a:p>
+            <a:r>
+              <a:rPr lang="en-US" dirty="0">
+                <a:solidFill>
+                  <a:srgbClr val="000000"/>
+                </a:solidFill>
+                <a:latin typeface="Consolas" panose="020B0609020204030204" pitchFamily="49" charset="0"/>
+              </a:rPr>
+              <a:t>    </a:t>
+            </a:r>
+            <a:r>
+              <a:rPr lang="en-US" dirty="0">
+                <a:solidFill>
+                  <a:srgbClr val="8F08C4"/>
+                </a:solidFill>
+                <a:latin typeface="Consolas" panose="020B0609020204030204" pitchFamily="49" charset="0"/>
+              </a:rPr>
+              <a:t>return</a:t>
+            </a:r>
+            <a:r>
+              <a:rPr lang="en-US" dirty="0">
+                <a:solidFill>
+                  <a:srgbClr val="000000"/>
+                </a:solidFill>
+                <a:latin typeface="Consolas" panose="020B0609020204030204" pitchFamily="49" charset="0"/>
+              </a:rPr>
+              <a:t> </a:t>
+            </a:r>
+            <a:r>
+              <a:rPr lang="en-US" dirty="0">
+                <a:solidFill>
+                  <a:srgbClr val="74531F"/>
+                </a:solidFill>
+                <a:latin typeface="Consolas" panose="020B0609020204030204" pitchFamily="49" charset="0"/>
+              </a:rPr>
+              <a:t>max</a:t>
+            </a:r>
+            <a:r>
+              <a:rPr lang="en-US" dirty="0">
+                <a:solidFill>
+                  <a:srgbClr val="000000"/>
+                </a:solidFill>
+                <a:latin typeface="Consolas" panose="020B0609020204030204" pitchFamily="49" charset="0"/>
+              </a:rPr>
+              <a:t>(a, </a:t>
+            </a:r>
+            <a:r>
+              <a:rPr lang="en-US" dirty="0">
+                <a:solidFill>
+                  <a:srgbClr val="74531F"/>
+                </a:solidFill>
+                <a:latin typeface="Consolas" panose="020B0609020204030204" pitchFamily="49" charset="0"/>
+              </a:rPr>
+              <a:t>max</a:t>
+            </a:r>
+            <a:r>
+              <a:rPr lang="en-US" dirty="0">
+                <a:solidFill>
+                  <a:srgbClr val="000000"/>
+                </a:solidFill>
+                <a:latin typeface="Consolas" panose="020B0609020204030204" pitchFamily="49" charset="0"/>
+              </a:rPr>
+              <a:t>(b, c))</a:t>
+            </a:r>
+            <a:endParaRPr lang="en-US" b="0" dirty="0">
+              <a:solidFill>
+                <a:srgbClr val="000000"/>
+              </a:solidFill>
+              <a:effectLst/>
+              <a:latin typeface="Consolas" panose="020B0609020204030204" pitchFamily="49" charset="0"/>
+            </a:endParaRPr>
+          </a:p>
+        </p:txBody>
+      </p:sp>
     </p:spTree>
     <p:extLst>
       <p:ext uri="{BB962C8B-B14F-4D97-AF65-F5344CB8AC3E}">
@@ -19984,6 +22263,128 @@
   <p:clrMapOvr>
     <a:masterClrMapping/>
   </p:clrMapOvr>
+  <p:timing>
+    <p:tnLst>
+      <p:par>
+        <p:cTn id="1" dur="indefinite" restart="never" nodeType="tmRoot">
+          <p:childTnLst>
+            <p:seq concurrent="1" nextAc="seek">
+              <p:cTn id="2" dur="indefinite" nodeType="mainSeq">
+                <p:childTnLst>
+                  <p:par>
+                    <p:cTn id="3" fill="hold">
+                      <p:stCondLst>
+                        <p:cond delay="indefinite"/>
+                      </p:stCondLst>
+                      <p:childTnLst>
+                        <p:par>
+                          <p:cTn id="4" fill="hold">
+                            <p:stCondLst>
+                              <p:cond delay="0"/>
+                            </p:stCondLst>
+                            <p:childTnLst>
+                              <p:par>
+                                <p:cTn id="5" presetID="10" presetClass="entr" presetSubtype="0" fill="hold" grpId="0" nodeType="clickEffect">
+                                  <p:stCondLst>
+                                    <p:cond delay="0"/>
+                                  </p:stCondLst>
+                                  <p:childTnLst>
+                                    <p:set>
+                                      <p:cBhvr>
+                                        <p:cTn id="6" dur="1" fill="hold">
+                                          <p:stCondLst>
+                                            <p:cond delay="0"/>
+                                          </p:stCondLst>
+                                        </p:cTn>
+                                        <p:tgtEl>
+                                          <p:spTgt spid="6"/>
+                                        </p:tgtEl>
+                                        <p:attrNameLst>
+                                          <p:attrName>style.visibility</p:attrName>
+                                        </p:attrNameLst>
+                                      </p:cBhvr>
+                                      <p:to>
+                                        <p:strVal val="visible"/>
+                                      </p:to>
+                                    </p:set>
+                                    <p:animEffect transition="in" filter="fade">
+                                      <p:cBhvr>
+                                        <p:cTn id="7" dur="500"/>
+                                        <p:tgtEl>
+                                          <p:spTgt spid="6"/>
+                                        </p:tgtEl>
+                                      </p:cBhvr>
+                                    </p:animEffect>
+                                  </p:childTnLst>
+                                </p:cTn>
+                              </p:par>
+                              <p:par>
+                                <p:cTn id="8" presetID="10" presetClass="entr" presetSubtype="0" fill="hold" grpId="0" nodeType="withEffect">
+                                  <p:stCondLst>
+                                    <p:cond delay="0"/>
+                                  </p:stCondLst>
+                                  <p:childTnLst>
+                                    <p:set>
+                                      <p:cBhvr>
+                                        <p:cTn id="9" dur="1" fill="hold">
+                                          <p:stCondLst>
+                                            <p:cond delay="0"/>
+                                          </p:stCondLst>
+                                        </p:cTn>
+                                        <p:tgtEl>
+                                          <p:spTgt spid="7"/>
+                                        </p:tgtEl>
+                                        <p:attrNameLst>
+                                          <p:attrName>style.visibility</p:attrName>
+                                        </p:attrNameLst>
+                                      </p:cBhvr>
+                                      <p:to>
+                                        <p:strVal val="visible"/>
+                                      </p:to>
+                                    </p:set>
+                                    <p:animEffect transition="in" filter="fade">
+                                      <p:cBhvr>
+                                        <p:cTn id="10" dur="500"/>
+                                        <p:tgtEl>
+                                          <p:spTgt spid="7"/>
+                                        </p:tgtEl>
+                                      </p:cBhvr>
+                                    </p:animEffect>
+                                  </p:childTnLst>
+                                </p:cTn>
+                              </p:par>
+                            </p:childTnLst>
+                          </p:cTn>
+                        </p:par>
+                      </p:childTnLst>
+                    </p:cTn>
+                  </p:par>
+                </p:childTnLst>
+              </p:cTn>
+              <p:prevCondLst>
+                <p:cond evt="onPrev" delay="0">
+                  <p:tgtEl>
+                    <p:sldTgt/>
+                  </p:tgtEl>
+                </p:cond>
+              </p:prevCondLst>
+              <p:nextCondLst>
+                <p:cond evt="onNext" delay="0">
+                  <p:tgtEl>
+                    <p:sldTgt/>
+                  </p:tgtEl>
+                </p:cond>
+              </p:nextCondLst>
+            </p:seq>
+          </p:childTnLst>
+        </p:cTn>
+      </p:par>
+    </p:tnLst>
+    <p:bldLst>
+      <p:bldP spid="6" grpId="0"/>
+      <p:bldP spid="7" grpId="0" animBg="1"/>
+    </p:bldLst>
+  </p:timing>
 </p:sld>
 </file>
 

</xml_diff>

<commit_message>
[add]:Added the code of error
</commit_message>
<xml_diff>
--- a/ProgramSlide.pptx
+++ b/ProgramSlide.pptx
@@ -15957,7 +15957,7 @@
             <a:r>
               <a:rPr lang="en-US" altLang="ja-JP" sz="2400" b="0" dirty="0">
                 <a:solidFill>
-                  <a:srgbClr val="098658"/>
+                  <a:srgbClr val="000000"/>
                 </a:solidFill>
                 <a:effectLst/>
                 <a:latin typeface="Consolas" panose="020B0609020204030204" pitchFamily="49" charset="0"/>
@@ -15977,7 +15977,7 @@
             <a:r>
               <a:rPr lang="en-US" altLang="ja-JP" sz="2400" b="0" dirty="0">
                 <a:solidFill>
-                  <a:srgbClr val="098658"/>
+                  <a:srgbClr val="000000"/>
                 </a:solidFill>
                 <a:effectLst/>
                 <a:latin typeface="Consolas" panose="020B0609020204030204" pitchFamily="49" charset="0"/>
@@ -16027,7 +16027,7 @@
             <a:r>
               <a:rPr lang="en-US" altLang="ja-JP" sz="2400" b="0" dirty="0">
                 <a:solidFill>
-                  <a:srgbClr val="098658"/>
+                  <a:srgbClr val="000000"/>
                 </a:solidFill>
                 <a:effectLst/>
                 <a:latin typeface="Consolas" panose="020B0609020204030204" pitchFamily="49" charset="0"/>
@@ -22658,7 +22658,12 @@
             <p:ph idx="1"/>
           </p:nvPr>
         </p:nvSpPr>
-        <p:spPr/>
+        <p:spPr>
+          <a:xfrm>
+            <a:off x="628650" y="1825625"/>
+            <a:ext cx="7886700" cy="1693430"/>
+          </a:xfrm>
+        </p:spPr>
         <p:txBody>
           <a:bodyPr/>
           <a:lstStyle/>
@@ -22693,6 +22698,407 @@
             <a:r>
               <a:rPr lang="ja-JP" altLang="en-US" dirty="0"/>
               <a:t>エラー文</a:t>
+            </a:r>
+            <a:endParaRPr lang="en-US" altLang="ja-JP" dirty="0"/>
+          </a:p>
+        </p:txBody>
+      </p:sp>
+      <p:sp>
+        <p:nvSpPr>
+          <p:cNvPr id="3" name="正方形/長方形 2">
+            <a:extLst>
+              <a:ext uri="{FF2B5EF4-FFF2-40B4-BE49-F238E27FC236}">
+                <a16:creationId xmlns:a16="http://schemas.microsoft.com/office/drawing/2014/main" id="{B008E1FA-E7FD-4DE5-B2FA-88C513B376E4}"/>
+              </a:ext>
+            </a:extLst>
+          </p:cNvPr>
+          <p:cNvSpPr/>
+          <p:nvPr/>
+        </p:nvSpPr>
+        <p:spPr>
+          <a:xfrm>
+            <a:off x="628650" y="2376116"/>
+            <a:ext cx="7886700" cy="369332"/>
+          </a:xfrm>
+          <a:prstGeom prst="rect">
+            <a:avLst/>
+          </a:prstGeom>
+          <a:solidFill>
+            <a:srgbClr val="FFFFFF"/>
+          </a:solidFill>
+        </p:spPr>
+        <p:txBody>
+          <a:bodyPr wrap="square">
+            <a:spAutoFit/>
+          </a:bodyPr>
+          <a:lstStyle/>
+          <a:p>
+            <a:r>
+              <a:rPr lang="en-US" dirty="0">
+                <a:solidFill>
+                  <a:srgbClr val="74531F"/>
+                </a:solidFill>
+                <a:latin typeface="Consolas" panose="020B0609020204030204" pitchFamily="49" charset="0"/>
+              </a:rPr>
+              <a:t>print</a:t>
+            </a:r>
+            <a:r>
+              <a:rPr lang="en-US" dirty="0">
+                <a:solidFill>
+                  <a:srgbClr val="000000"/>
+                </a:solidFill>
+                <a:latin typeface="Consolas" panose="020B0609020204030204" pitchFamily="49" charset="0"/>
+              </a:rPr>
+              <a:t>(</a:t>
+            </a:r>
+            <a:r>
+              <a:rPr lang="en-US" dirty="0">
+                <a:solidFill>
+                  <a:srgbClr val="E21F1F"/>
+                </a:solidFill>
+                <a:latin typeface="Consolas" panose="020B0609020204030204" pitchFamily="49" charset="0"/>
+              </a:rPr>
+              <a:t>"</a:t>
+            </a:r>
+            <a:r>
+              <a:rPr lang="en-US" dirty="0">
+                <a:solidFill>
+                  <a:srgbClr val="A31515"/>
+                </a:solidFill>
+                <a:latin typeface="Consolas" panose="020B0609020204030204" pitchFamily="49" charset="0"/>
+              </a:rPr>
+              <a:t>hello</a:t>
+            </a:r>
+            <a:r>
+              <a:rPr lang="en-US" dirty="0">
+                <a:solidFill>
+                  <a:srgbClr val="E21F1F"/>
+                </a:solidFill>
+                <a:latin typeface="Consolas" panose="020B0609020204030204" pitchFamily="49" charset="0"/>
+              </a:rPr>
+              <a:t>"</a:t>
+            </a:r>
+            <a:r>
+              <a:rPr lang="en-US" dirty="0">
+                <a:solidFill>
+                  <a:srgbClr val="000000"/>
+                </a:solidFill>
+                <a:latin typeface="Consolas" panose="020B0609020204030204" pitchFamily="49" charset="0"/>
+              </a:rPr>
+              <a:t>)　</a:t>
+            </a:r>
+            <a:endParaRPr lang="en-US" b="0" dirty="0">
+              <a:solidFill>
+                <a:srgbClr val="000000"/>
+              </a:solidFill>
+              <a:effectLst/>
+              <a:latin typeface="Consolas" panose="020B0609020204030204" pitchFamily="49" charset="0"/>
+            </a:endParaRPr>
+          </a:p>
+        </p:txBody>
+      </p:sp>
+      <p:sp>
+        <p:nvSpPr>
+          <p:cNvPr id="4" name="正方形/長方形 3">
+            <a:extLst>
+              <a:ext uri="{FF2B5EF4-FFF2-40B4-BE49-F238E27FC236}">
+                <a16:creationId xmlns:a16="http://schemas.microsoft.com/office/drawing/2014/main" id="{175E8993-2945-43AB-9087-C99F7C33FBBC}"/>
+              </a:ext>
+            </a:extLst>
+          </p:cNvPr>
+          <p:cNvSpPr/>
+          <p:nvPr/>
+        </p:nvSpPr>
+        <p:spPr>
+          <a:xfrm>
+            <a:off x="628650" y="3632538"/>
+            <a:ext cx="4572000" cy="1477328"/>
+          </a:xfrm>
+          <a:prstGeom prst="rect">
+            <a:avLst/>
+          </a:prstGeom>
+          <a:solidFill>
+            <a:srgbClr val="FFFFFF"/>
+          </a:solidFill>
+        </p:spPr>
+        <p:txBody>
+          <a:bodyPr>
+            <a:spAutoFit/>
+          </a:bodyPr>
+          <a:lstStyle/>
+          <a:p>
+            <a:r>
+              <a:rPr lang="en-US" dirty="0">
+                <a:solidFill>
+                  <a:srgbClr val="000000"/>
+                </a:solidFill>
+                <a:latin typeface="Consolas" panose="020B0609020204030204" pitchFamily="49" charset="0"/>
+              </a:rPr>
+              <a:t>  File "./error.py", line 1</a:t>
+            </a:r>
+          </a:p>
+          <a:p>
+            <a:r>
+              <a:rPr lang="en-US" dirty="0">
+                <a:solidFill>
+                  <a:srgbClr val="000000"/>
+                </a:solidFill>
+                <a:latin typeface="Consolas" panose="020B0609020204030204" pitchFamily="49" charset="0"/>
+              </a:rPr>
+              <a:t>    print("hello")　</a:t>
+            </a:r>
+          </a:p>
+          <a:p>
+            <a:r>
+              <a:rPr lang="en-US" dirty="0">
+                <a:solidFill>
+                  <a:srgbClr val="000000"/>
+                </a:solidFill>
+                <a:latin typeface="Consolas" panose="020B0609020204030204" pitchFamily="49" charset="0"/>
+              </a:rPr>
+              <a:t>                  ^</a:t>
+            </a:r>
+          </a:p>
+          <a:p>
+            <a:r>
+              <a:rPr lang="en-US" dirty="0" err="1">
+                <a:solidFill>
+                  <a:srgbClr val="000000"/>
+                </a:solidFill>
+                <a:latin typeface="Consolas" panose="020B0609020204030204" pitchFamily="49" charset="0"/>
+              </a:rPr>
+              <a:t>SyntaxError</a:t>
+            </a:r>
+            <a:r>
+              <a:rPr lang="en-US" dirty="0">
+                <a:solidFill>
+                  <a:srgbClr val="000000"/>
+                </a:solidFill>
+                <a:latin typeface="Consolas" panose="020B0609020204030204" pitchFamily="49" charset="0"/>
+              </a:rPr>
+              <a:t>: invalid non-printable character U+3000</a:t>
+            </a:r>
+          </a:p>
+        </p:txBody>
+      </p:sp>
+      <p:sp>
+        <p:nvSpPr>
+          <p:cNvPr id="7" name="コンテンツ プレースホルダー 7">
+            <a:extLst>
+              <a:ext uri="{FF2B5EF4-FFF2-40B4-BE49-F238E27FC236}">
+                <a16:creationId xmlns:a16="http://schemas.microsoft.com/office/drawing/2014/main" id="{864144C4-4884-4EEE-9E83-4D9F692627A0}"/>
+              </a:ext>
+            </a:extLst>
+          </p:cNvPr>
+          <p:cNvSpPr txBox="1">
+            <a:spLocks/>
+          </p:cNvSpPr>
+          <p:nvPr/>
+        </p:nvSpPr>
+        <p:spPr>
+          <a:xfrm>
+            <a:off x="628650" y="5234029"/>
+            <a:ext cx="7886700" cy="963571"/>
+          </a:xfrm>
+          <a:prstGeom prst="rect">
+            <a:avLst/>
+          </a:prstGeom>
+        </p:spPr>
+        <p:txBody>
+          <a:bodyPr vert="horz" lIns="91440" tIns="45720" rIns="91440" bIns="45720" rtlCol="0">
+            <a:normAutofit lnSpcReduction="10000"/>
+          </a:bodyPr>
+          <a:lstStyle>
+            <a:lvl1pPr marL="228600" indent="-228600" algn="l" defTabSz="914400" rtl="0" eaLnBrk="1" latinLnBrk="0" hangingPunct="1">
+              <a:lnSpc>
+                <a:spcPct val="90000"/>
+              </a:lnSpc>
+              <a:spcBef>
+                <a:spcPts val="1000"/>
+              </a:spcBef>
+              <a:buFont typeface="Arial" panose="020B0604020202020204" pitchFamily="34" charset="0"/>
+              <a:buChar char="•"/>
+              <a:defRPr sz="3200" kern="1200">
+                <a:solidFill>
+                  <a:schemeClr val="tx1"/>
+                </a:solidFill>
+                <a:latin typeface="+mn-lt"/>
+                <a:ea typeface="+mn-ea"/>
+                <a:cs typeface="+mn-cs"/>
+              </a:defRPr>
+            </a:lvl1pPr>
+            <a:lvl2pPr marL="685800" indent="-228600" algn="l" defTabSz="914400" rtl="0" eaLnBrk="1" latinLnBrk="0" hangingPunct="1">
+              <a:lnSpc>
+                <a:spcPct val="90000"/>
+              </a:lnSpc>
+              <a:spcBef>
+                <a:spcPts val="500"/>
+              </a:spcBef>
+              <a:buFont typeface="Arial" panose="020B0604020202020204" pitchFamily="34" charset="0"/>
+              <a:buChar char="•"/>
+              <a:defRPr sz="2800" kern="1200">
+                <a:solidFill>
+                  <a:schemeClr val="tx1"/>
+                </a:solidFill>
+                <a:latin typeface="+mn-lt"/>
+                <a:ea typeface="+mn-ea"/>
+                <a:cs typeface="+mn-cs"/>
+              </a:defRPr>
+            </a:lvl2pPr>
+            <a:lvl3pPr marL="1143000" indent="-228600" algn="l" defTabSz="914400" rtl="0" eaLnBrk="1" latinLnBrk="0" hangingPunct="1">
+              <a:lnSpc>
+                <a:spcPct val="90000"/>
+              </a:lnSpc>
+              <a:spcBef>
+                <a:spcPts val="500"/>
+              </a:spcBef>
+              <a:buFont typeface="Arial" panose="020B0604020202020204" pitchFamily="34" charset="0"/>
+              <a:buChar char="•"/>
+              <a:defRPr sz="2400" kern="1200">
+                <a:solidFill>
+                  <a:schemeClr val="tx1"/>
+                </a:solidFill>
+                <a:latin typeface="+mn-lt"/>
+                <a:ea typeface="+mn-ea"/>
+                <a:cs typeface="+mn-cs"/>
+              </a:defRPr>
+            </a:lvl3pPr>
+            <a:lvl4pPr marL="1600200" indent="-228600" algn="l" defTabSz="914400" rtl="0" eaLnBrk="1" latinLnBrk="0" hangingPunct="1">
+              <a:lnSpc>
+                <a:spcPct val="90000"/>
+              </a:lnSpc>
+              <a:spcBef>
+                <a:spcPts val="500"/>
+              </a:spcBef>
+              <a:buFont typeface="Arial" panose="020B0604020202020204" pitchFamily="34" charset="0"/>
+              <a:buChar char="•"/>
+              <a:defRPr sz="2000" kern="1200">
+                <a:solidFill>
+                  <a:schemeClr val="tx1"/>
+                </a:solidFill>
+                <a:latin typeface="+mn-lt"/>
+                <a:ea typeface="+mn-ea"/>
+                <a:cs typeface="+mn-cs"/>
+              </a:defRPr>
+            </a:lvl4pPr>
+            <a:lvl5pPr marL="2057400" indent="-228600" algn="l" defTabSz="914400" rtl="0" eaLnBrk="1" latinLnBrk="0" hangingPunct="1">
+              <a:lnSpc>
+                <a:spcPct val="90000"/>
+              </a:lnSpc>
+              <a:spcBef>
+                <a:spcPts val="500"/>
+              </a:spcBef>
+              <a:buFont typeface="Arial" panose="020B0604020202020204" pitchFamily="34" charset="0"/>
+              <a:buChar char="•"/>
+              <a:defRPr sz="2000" kern="1200">
+                <a:solidFill>
+                  <a:schemeClr val="tx1"/>
+                </a:solidFill>
+                <a:latin typeface="+mn-lt"/>
+                <a:ea typeface="+mn-ea"/>
+                <a:cs typeface="+mn-cs"/>
+              </a:defRPr>
+            </a:lvl5pPr>
+            <a:lvl6pPr marL="2514600" indent="-228600" algn="l" defTabSz="914400" rtl="0" eaLnBrk="1" latinLnBrk="0" hangingPunct="1">
+              <a:lnSpc>
+                <a:spcPct val="90000"/>
+              </a:lnSpc>
+              <a:spcBef>
+                <a:spcPts val="500"/>
+              </a:spcBef>
+              <a:buFont typeface="Arial" panose="020B0604020202020204" pitchFamily="34" charset="0"/>
+              <a:buChar char="•"/>
+              <a:defRPr sz="1800" kern="1200">
+                <a:solidFill>
+                  <a:schemeClr val="tx1"/>
+                </a:solidFill>
+                <a:latin typeface="+mn-lt"/>
+                <a:ea typeface="+mn-ea"/>
+                <a:cs typeface="+mn-cs"/>
+              </a:defRPr>
+            </a:lvl6pPr>
+            <a:lvl7pPr marL="2971800" indent="-228600" algn="l" defTabSz="914400" rtl="0" eaLnBrk="1" latinLnBrk="0" hangingPunct="1">
+              <a:lnSpc>
+                <a:spcPct val="90000"/>
+              </a:lnSpc>
+              <a:spcBef>
+                <a:spcPts val="500"/>
+              </a:spcBef>
+              <a:buFont typeface="Arial" panose="020B0604020202020204" pitchFamily="34" charset="0"/>
+              <a:buChar char="•"/>
+              <a:defRPr sz="1800" kern="1200">
+                <a:solidFill>
+                  <a:schemeClr val="tx1"/>
+                </a:solidFill>
+                <a:latin typeface="+mn-lt"/>
+                <a:ea typeface="+mn-ea"/>
+                <a:cs typeface="+mn-cs"/>
+              </a:defRPr>
+            </a:lvl7pPr>
+            <a:lvl8pPr marL="3429000" indent="-228600" algn="l" defTabSz="914400" rtl="0" eaLnBrk="1" latinLnBrk="0" hangingPunct="1">
+              <a:lnSpc>
+                <a:spcPct val="90000"/>
+              </a:lnSpc>
+              <a:spcBef>
+                <a:spcPts val="500"/>
+              </a:spcBef>
+              <a:buFont typeface="Arial" panose="020B0604020202020204" pitchFamily="34" charset="0"/>
+              <a:buChar char="•"/>
+              <a:defRPr sz="1800" kern="1200">
+                <a:solidFill>
+                  <a:schemeClr val="tx1"/>
+                </a:solidFill>
+                <a:latin typeface="+mn-lt"/>
+                <a:ea typeface="+mn-ea"/>
+                <a:cs typeface="+mn-cs"/>
+              </a:defRPr>
+            </a:lvl8pPr>
+            <a:lvl9pPr marL="3886200" indent="-228600" algn="l" defTabSz="914400" rtl="0" eaLnBrk="1" latinLnBrk="0" hangingPunct="1">
+              <a:lnSpc>
+                <a:spcPct val="90000"/>
+              </a:lnSpc>
+              <a:spcBef>
+                <a:spcPts val="500"/>
+              </a:spcBef>
+              <a:buFont typeface="Arial" panose="020B0604020202020204" pitchFamily="34" charset="0"/>
+              <a:buChar char="•"/>
+              <a:defRPr sz="1800" kern="1200">
+                <a:solidFill>
+                  <a:schemeClr val="tx1"/>
+                </a:solidFill>
+                <a:latin typeface="+mn-lt"/>
+                <a:ea typeface="+mn-ea"/>
+                <a:cs typeface="+mn-cs"/>
+              </a:defRPr>
+            </a:lvl9pPr>
+          </a:lstStyle>
+          <a:p>
+            <a:pPr marL="0" indent="0">
+              <a:buFont typeface="Arial" panose="020B0604020202020204" pitchFamily="34" charset="0"/>
+              <a:buNone/>
+            </a:pPr>
+            <a:r>
+              <a:rPr lang="ja-JP" altLang="en-US" dirty="0"/>
+              <a:t>全角スペースが「</a:t>
+            </a:r>
+            <a:r>
+              <a:rPr lang="en-US" altLang="ja-JP" dirty="0">
+                <a:solidFill>
+                  <a:srgbClr val="FFFFFF"/>
+                </a:solidFill>
+              </a:rPr>
+              <a:t>^</a:t>
+            </a:r>
+            <a:r>
+              <a:rPr lang="ja-JP" altLang="en-US" dirty="0"/>
+              <a:t>」示す場所にある</a:t>
+            </a:r>
+            <a:br>
+              <a:rPr lang="en-US" altLang="ja-JP" dirty="0"/>
+            </a:br>
+            <a:r>
+              <a:rPr lang="ja-JP" altLang="en-US" dirty="0"/>
+              <a:t>というエラー</a:t>
             </a:r>
             <a:endParaRPr lang="en-US" altLang="ja-JP" dirty="0"/>
           </a:p>
@@ -22802,9 +23208,16 @@
             <p:ph idx="1"/>
           </p:nvPr>
         </p:nvSpPr>
-        <p:spPr/>
-        <p:txBody>
-          <a:bodyPr/>
+        <p:spPr>
+          <a:xfrm>
+            <a:off x="628650" y="1825625"/>
+            <a:ext cx="7886700" cy="485883"/>
+          </a:xfrm>
+        </p:spPr>
+        <p:txBody>
+          <a:bodyPr>
+            <a:normAutofit lnSpcReduction="10000"/>
+          </a:bodyPr>
           <a:lstStyle/>
           <a:p>
             <a:pPr marL="0" indent="0">
@@ -22830,13 +23243,583 @@
             </a:pPr>
             <a:endParaRPr lang="en-US" altLang="ja-JP" dirty="0"/>
           </a:p>
+        </p:txBody>
+      </p:sp>
+      <p:sp>
+        <p:nvSpPr>
+          <p:cNvPr id="3" name="正方形/長方形 2">
+            <a:extLst>
+              <a:ext uri="{FF2B5EF4-FFF2-40B4-BE49-F238E27FC236}">
+                <a16:creationId xmlns:a16="http://schemas.microsoft.com/office/drawing/2014/main" id="{236B5469-F129-4E8E-A8B7-05562B3430EF}"/>
+              </a:ext>
+            </a:extLst>
+          </p:cNvPr>
+          <p:cNvSpPr/>
+          <p:nvPr/>
+        </p:nvSpPr>
+        <p:spPr>
+          <a:xfrm>
+            <a:off x="628650" y="2311508"/>
+            <a:ext cx="7886700" cy="646331"/>
+          </a:xfrm>
+          <a:prstGeom prst="rect">
+            <a:avLst/>
+          </a:prstGeom>
+          <a:solidFill>
+            <a:srgbClr val="FFFFFF"/>
+          </a:solidFill>
+        </p:spPr>
+        <p:txBody>
+          <a:bodyPr wrap="square">
+            <a:spAutoFit/>
+          </a:bodyPr>
+          <a:lstStyle/>
+          <a:p>
+            <a:r>
+              <a:rPr lang="pt-BR" dirty="0">
+                <a:solidFill>
+                  <a:srgbClr val="000000"/>
+                </a:solidFill>
+                <a:latin typeface="Consolas" panose="020B0609020204030204" pitchFamily="49" charset="0"/>
+              </a:rPr>
+              <a:t>a = </a:t>
+            </a:r>
+            <a:r>
+              <a:rPr lang="pt-BR" dirty="0">
+                <a:solidFill>
+                  <a:srgbClr val="098658"/>
+                </a:solidFill>
+                <a:latin typeface="Consolas" panose="020B0609020204030204" pitchFamily="49" charset="0"/>
+              </a:rPr>
+              <a:t>2</a:t>
+            </a:r>
+            <a:endParaRPr lang="pt-BR" dirty="0">
+              <a:solidFill>
+                <a:srgbClr val="000000"/>
+              </a:solidFill>
+              <a:latin typeface="Consolas" panose="020B0609020204030204" pitchFamily="49" charset="0"/>
+            </a:endParaRPr>
+          </a:p>
+          <a:p>
+            <a:r>
+              <a:rPr lang="pt-BR" dirty="0">
+                <a:solidFill>
+                  <a:srgbClr val="000000"/>
+                </a:solidFill>
+                <a:latin typeface="Consolas" panose="020B0609020204030204" pitchFamily="49" charset="0"/>
+              </a:rPr>
+              <a:t>b = c+</a:t>
+            </a:r>
+            <a:r>
+              <a:rPr lang="pt-BR" dirty="0">
+                <a:solidFill>
+                  <a:srgbClr val="098658"/>
+                </a:solidFill>
+                <a:latin typeface="Consolas" panose="020B0609020204030204" pitchFamily="49" charset="0"/>
+              </a:rPr>
+              <a:t>1</a:t>
+            </a:r>
+            <a:endParaRPr lang="pt-BR" b="0" dirty="0">
+              <a:solidFill>
+                <a:srgbClr val="000000"/>
+              </a:solidFill>
+              <a:effectLst/>
+              <a:latin typeface="Consolas" panose="020B0609020204030204" pitchFamily="49" charset="0"/>
+            </a:endParaRPr>
+          </a:p>
+        </p:txBody>
+      </p:sp>
+      <p:sp>
+        <p:nvSpPr>
+          <p:cNvPr id="6" name="正方形/長方形 5">
+            <a:extLst>
+              <a:ext uri="{FF2B5EF4-FFF2-40B4-BE49-F238E27FC236}">
+                <a16:creationId xmlns:a16="http://schemas.microsoft.com/office/drawing/2014/main" id="{76C79270-66F5-4B07-9DCC-320782CB58B9}"/>
+              </a:ext>
+            </a:extLst>
+          </p:cNvPr>
+          <p:cNvSpPr/>
+          <p:nvPr/>
+        </p:nvSpPr>
+        <p:spPr>
+          <a:xfrm>
+            <a:off x="628650" y="3673006"/>
+            <a:ext cx="7886700" cy="923330"/>
+          </a:xfrm>
+          <a:prstGeom prst="rect">
+            <a:avLst/>
+          </a:prstGeom>
+          <a:solidFill>
+            <a:srgbClr val="FFFFFF"/>
+          </a:solidFill>
+        </p:spPr>
+        <p:txBody>
+          <a:bodyPr wrap="square">
+            <a:spAutoFit/>
+          </a:bodyPr>
+          <a:lstStyle/>
+          <a:p>
+            <a:r>
+              <a:rPr lang="en-US" dirty="0">
+                <a:solidFill>
+                  <a:srgbClr val="000000"/>
+                </a:solidFill>
+                <a:latin typeface="Consolas" panose="020B0609020204030204" pitchFamily="49" charset="0"/>
+              </a:rPr>
+              <a:t>  File "./error2.py", line 2, in &lt;module&gt;</a:t>
+            </a:r>
+          </a:p>
+          <a:p>
+            <a:r>
+              <a:rPr lang="en-US" dirty="0">
+                <a:solidFill>
+                  <a:srgbClr val="000000"/>
+                </a:solidFill>
+                <a:latin typeface="Consolas" panose="020B0609020204030204" pitchFamily="49" charset="0"/>
+              </a:rPr>
+              <a:t>    b = c + 1</a:t>
+            </a:r>
+          </a:p>
+          <a:p>
+            <a:r>
+              <a:rPr lang="en-US" dirty="0" err="1">
+                <a:solidFill>
+                  <a:srgbClr val="000000"/>
+                </a:solidFill>
+                <a:latin typeface="Consolas" panose="020B0609020204030204" pitchFamily="49" charset="0"/>
+              </a:rPr>
+              <a:t>NameError</a:t>
+            </a:r>
+            <a:r>
+              <a:rPr lang="en-US" dirty="0">
+                <a:solidFill>
+                  <a:srgbClr val="000000"/>
+                </a:solidFill>
+                <a:latin typeface="Consolas" panose="020B0609020204030204" pitchFamily="49" charset="0"/>
+              </a:rPr>
+              <a:t>: name 'c' is not defined</a:t>
+            </a:r>
+            <a:endParaRPr lang="en-US" b="0" dirty="0">
+              <a:solidFill>
+                <a:srgbClr val="000000"/>
+              </a:solidFill>
+              <a:effectLst/>
+              <a:latin typeface="Consolas" panose="020B0609020204030204" pitchFamily="49" charset="0"/>
+            </a:endParaRPr>
+          </a:p>
+        </p:txBody>
+      </p:sp>
+      <p:sp>
+        <p:nvSpPr>
+          <p:cNvPr id="9" name="コンテンツ プレースホルダー 7">
+            <a:extLst>
+              <a:ext uri="{FF2B5EF4-FFF2-40B4-BE49-F238E27FC236}">
+                <a16:creationId xmlns:a16="http://schemas.microsoft.com/office/drawing/2014/main" id="{137A7C64-8D9F-4A50-B490-AA0B910944B8}"/>
+              </a:ext>
+            </a:extLst>
+          </p:cNvPr>
+          <p:cNvSpPr txBox="1">
+            <a:spLocks/>
+          </p:cNvSpPr>
+          <p:nvPr/>
+        </p:nvSpPr>
+        <p:spPr>
+          <a:xfrm>
+            <a:off x="628650" y="3208601"/>
+            <a:ext cx="7886700" cy="485883"/>
+          </a:xfrm>
+          <a:prstGeom prst="rect">
+            <a:avLst/>
+          </a:prstGeom>
+        </p:spPr>
+        <p:txBody>
+          <a:bodyPr vert="horz" lIns="91440" tIns="45720" rIns="91440" bIns="45720" rtlCol="0">
+            <a:normAutofit fontScale="92500" lnSpcReduction="10000"/>
+          </a:bodyPr>
+          <a:lstStyle>
+            <a:lvl1pPr marL="228600" indent="-228600" algn="l" defTabSz="914400" rtl="0" eaLnBrk="1" latinLnBrk="0" hangingPunct="1">
+              <a:lnSpc>
+                <a:spcPct val="90000"/>
+              </a:lnSpc>
+              <a:spcBef>
+                <a:spcPts val="1000"/>
+              </a:spcBef>
+              <a:buFont typeface="Arial" panose="020B0604020202020204" pitchFamily="34" charset="0"/>
+              <a:buChar char="•"/>
+              <a:defRPr sz="3200" kern="1200">
+                <a:solidFill>
+                  <a:schemeClr val="tx1"/>
+                </a:solidFill>
+                <a:latin typeface="+mn-lt"/>
+                <a:ea typeface="+mn-ea"/>
+                <a:cs typeface="+mn-cs"/>
+              </a:defRPr>
+            </a:lvl1pPr>
+            <a:lvl2pPr marL="685800" indent="-228600" algn="l" defTabSz="914400" rtl="0" eaLnBrk="1" latinLnBrk="0" hangingPunct="1">
+              <a:lnSpc>
+                <a:spcPct val="90000"/>
+              </a:lnSpc>
+              <a:spcBef>
+                <a:spcPts val="500"/>
+              </a:spcBef>
+              <a:buFont typeface="Arial" panose="020B0604020202020204" pitchFamily="34" charset="0"/>
+              <a:buChar char="•"/>
+              <a:defRPr sz="2800" kern="1200">
+                <a:solidFill>
+                  <a:schemeClr val="tx1"/>
+                </a:solidFill>
+                <a:latin typeface="+mn-lt"/>
+                <a:ea typeface="+mn-ea"/>
+                <a:cs typeface="+mn-cs"/>
+              </a:defRPr>
+            </a:lvl2pPr>
+            <a:lvl3pPr marL="1143000" indent="-228600" algn="l" defTabSz="914400" rtl="0" eaLnBrk="1" latinLnBrk="0" hangingPunct="1">
+              <a:lnSpc>
+                <a:spcPct val="90000"/>
+              </a:lnSpc>
+              <a:spcBef>
+                <a:spcPts val="500"/>
+              </a:spcBef>
+              <a:buFont typeface="Arial" panose="020B0604020202020204" pitchFamily="34" charset="0"/>
+              <a:buChar char="•"/>
+              <a:defRPr sz="2400" kern="1200">
+                <a:solidFill>
+                  <a:schemeClr val="tx1"/>
+                </a:solidFill>
+                <a:latin typeface="+mn-lt"/>
+                <a:ea typeface="+mn-ea"/>
+                <a:cs typeface="+mn-cs"/>
+              </a:defRPr>
+            </a:lvl3pPr>
+            <a:lvl4pPr marL="1600200" indent="-228600" algn="l" defTabSz="914400" rtl="0" eaLnBrk="1" latinLnBrk="0" hangingPunct="1">
+              <a:lnSpc>
+                <a:spcPct val="90000"/>
+              </a:lnSpc>
+              <a:spcBef>
+                <a:spcPts val="500"/>
+              </a:spcBef>
+              <a:buFont typeface="Arial" panose="020B0604020202020204" pitchFamily="34" charset="0"/>
+              <a:buChar char="•"/>
+              <a:defRPr sz="2000" kern="1200">
+                <a:solidFill>
+                  <a:schemeClr val="tx1"/>
+                </a:solidFill>
+                <a:latin typeface="+mn-lt"/>
+                <a:ea typeface="+mn-ea"/>
+                <a:cs typeface="+mn-cs"/>
+              </a:defRPr>
+            </a:lvl4pPr>
+            <a:lvl5pPr marL="2057400" indent="-228600" algn="l" defTabSz="914400" rtl="0" eaLnBrk="1" latinLnBrk="0" hangingPunct="1">
+              <a:lnSpc>
+                <a:spcPct val="90000"/>
+              </a:lnSpc>
+              <a:spcBef>
+                <a:spcPts val="500"/>
+              </a:spcBef>
+              <a:buFont typeface="Arial" panose="020B0604020202020204" pitchFamily="34" charset="0"/>
+              <a:buChar char="•"/>
+              <a:defRPr sz="2000" kern="1200">
+                <a:solidFill>
+                  <a:schemeClr val="tx1"/>
+                </a:solidFill>
+                <a:latin typeface="+mn-lt"/>
+                <a:ea typeface="+mn-ea"/>
+                <a:cs typeface="+mn-cs"/>
+              </a:defRPr>
+            </a:lvl5pPr>
+            <a:lvl6pPr marL="2514600" indent="-228600" algn="l" defTabSz="914400" rtl="0" eaLnBrk="1" latinLnBrk="0" hangingPunct="1">
+              <a:lnSpc>
+                <a:spcPct val="90000"/>
+              </a:lnSpc>
+              <a:spcBef>
+                <a:spcPts val="500"/>
+              </a:spcBef>
+              <a:buFont typeface="Arial" panose="020B0604020202020204" pitchFamily="34" charset="0"/>
+              <a:buChar char="•"/>
+              <a:defRPr sz="1800" kern="1200">
+                <a:solidFill>
+                  <a:schemeClr val="tx1"/>
+                </a:solidFill>
+                <a:latin typeface="+mn-lt"/>
+                <a:ea typeface="+mn-ea"/>
+                <a:cs typeface="+mn-cs"/>
+              </a:defRPr>
+            </a:lvl6pPr>
+            <a:lvl7pPr marL="2971800" indent="-228600" algn="l" defTabSz="914400" rtl="0" eaLnBrk="1" latinLnBrk="0" hangingPunct="1">
+              <a:lnSpc>
+                <a:spcPct val="90000"/>
+              </a:lnSpc>
+              <a:spcBef>
+                <a:spcPts val="500"/>
+              </a:spcBef>
+              <a:buFont typeface="Arial" panose="020B0604020202020204" pitchFamily="34" charset="0"/>
+              <a:buChar char="•"/>
+              <a:defRPr sz="1800" kern="1200">
+                <a:solidFill>
+                  <a:schemeClr val="tx1"/>
+                </a:solidFill>
+                <a:latin typeface="+mn-lt"/>
+                <a:ea typeface="+mn-ea"/>
+                <a:cs typeface="+mn-cs"/>
+              </a:defRPr>
+            </a:lvl7pPr>
+            <a:lvl8pPr marL="3429000" indent="-228600" algn="l" defTabSz="914400" rtl="0" eaLnBrk="1" latinLnBrk="0" hangingPunct="1">
+              <a:lnSpc>
+                <a:spcPct val="90000"/>
+              </a:lnSpc>
+              <a:spcBef>
+                <a:spcPts val="500"/>
+              </a:spcBef>
+              <a:buFont typeface="Arial" panose="020B0604020202020204" pitchFamily="34" charset="0"/>
+              <a:buChar char="•"/>
+              <a:defRPr sz="1800" kern="1200">
+                <a:solidFill>
+                  <a:schemeClr val="tx1"/>
+                </a:solidFill>
+                <a:latin typeface="+mn-lt"/>
+                <a:ea typeface="+mn-ea"/>
+                <a:cs typeface="+mn-cs"/>
+              </a:defRPr>
+            </a:lvl8pPr>
+            <a:lvl9pPr marL="3886200" indent="-228600" algn="l" defTabSz="914400" rtl="0" eaLnBrk="1" latinLnBrk="0" hangingPunct="1">
+              <a:lnSpc>
+                <a:spcPct val="90000"/>
+              </a:lnSpc>
+              <a:spcBef>
+                <a:spcPts val="500"/>
+              </a:spcBef>
+              <a:buFont typeface="Arial" panose="020B0604020202020204" pitchFamily="34" charset="0"/>
+              <a:buChar char="•"/>
+              <a:defRPr sz="1800" kern="1200">
+                <a:solidFill>
+                  <a:schemeClr val="tx1"/>
+                </a:solidFill>
+                <a:latin typeface="+mn-lt"/>
+                <a:ea typeface="+mn-ea"/>
+                <a:cs typeface="+mn-cs"/>
+              </a:defRPr>
+            </a:lvl9pPr>
+          </a:lstStyle>
           <a:p>
             <a:pPr marL="0" indent="0">
+              <a:buFont typeface="Arial" panose="020B0604020202020204" pitchFamily="34" charset="0"/>
               <a:buNone/>
             </a:pPr>
             <a:r>
               <a:rPr lang="ja-JP" altLang="en-US" dirty="0"/>
               <a:t>エラー文</a:t>
+            </a:r>
+            <a:endParaRPr lang="en-US" altLang="ja-JP" dirty="0"/>
+          </a:p>
+        </p:txBody>
+      </p:sp>
+      <p:sp>
+        <p:nvSpPr>
+          <p:cNvPr id="10" name="コンテンツ プレースホルダー 7">
+            <a:extLst>
+              <a:ext uri="{FF2B5EF4-FFF2-40B4-BE49-F238E27FC236}">
+                <a16:creationId xmlns:a16="http://schemas.microsoft.com/office/drawing/2014/main" id="{C2E76EFF-207C-448D-AA88-587949A175F1}"/>
+              </a:ext>
+            </a:extLst>
+          </p:cNvPr>
+          <p:cNvSpPr txBox="1">
+            <a:spLocks/>
+          </p:cNvSpPr>
+          <p:nvPr/>
+        </p:nvSpPr>
+        <p:spPr>
+          <a:xfrm>
+            <a:off x="540904" y="5103697"/>
+            <a:ext cx="7886700" cy="485883"/>
+          </a:xfrm>
+          <a:prstGeom prst="rect">
+            <a:avLst/>
+          </a:prstGeom>
+        </p:spPr>
+        <p:txBody>
+          <a:bodyPr vert="horz" lIns="91440" tIns="45720" rIns="91440" bIns="45720" rtlCol="0">
+            <a:normAutofit fontScale="92500" lnSpcReduction="10000"/>
+          </a:bodyPr>
+          <a:lstStyle>
+            <a:lvl1pPr marL="228600" indent="-228600" algn="l" defTabSz="914400" rtl="0" eaLnBrk="1" latinLnBrk="0" hangingPunct="1">
+              <a:lnSpc>
+                <a:spcPct val="90000"/>
+              </a:lnSpc>
+              <a:spcBef>
+                <a:spcPts val="1000"/>
+              </a:spcBef>
+              <a:buFont typeface="Arial" panose="020B0604020202020204" pitchFamily="34" charset="0"/>
+              <a:buChar char="•"/>
+              <a:defRPr sz="3200" kern="1200">
+                <a:solidFill>
+                  <a:schemeClr val="tx1"/>
+                </a:solidFill>
+                <a:latin typeface="+mn-lt"/>
+                <a:ea typeface="+mn-ea"/>
+                <a:cs typeface="+mn-cs"/>
+              </a:defRPr>
+            </a:lvl1pPr>
+            <a:lvl2pPr marL="685800" indent="-228600" algn="l" defTabSz="914400" rtl="0" eaLnBrk="1" latinLnBrk="0" hangingPunct="1">
+              <a:lnSpc>
+                <a:spcPct val="90000"/>
+              </a:lnSpc>
+              <a:spcBef>
+                <a:spcPts val="500"/>
+              </a:spcBef>
+              <a:buFont typeface="Arial" panose="020B0604020202020204" pitchFamily="34" charset="0"/>
+              <a:buChar char="•"/>
+              <a:defRPr sz="2800" kern="1200">
+                <a:solidFill>
+                  <a:schemeClr val="tx1"/>
+                </a:solidFill>
+                <a:latin typeface="+mn-lt"/>
+                <a:ea typeface="+mn-ea"/>
+                <a:cs typeface="+mn-cs"/>
+              </a:defRPr>
+            </a:lvl2pPr>
+            <a:lvl3pPr marL="1143000" indent="-228600" algn="l" defTabSz="914400" rtl="0" eaLnBrk="1" latinLnBrk="0" hangingPunct="1">
+              <a:lnSpc>
+                <a:spcPct val="90000"/>
+              </a:lnSpc>
+              <a:spcBef>
+                <a:spcPts val="500"/>
+              </a:spcBef>
+              <a:buFont typeface="Arial" panose="020B0604020202020204" pitchFamily="34" charset="0"/>
+              <a:buChar char="•"/>
+              <a:defRPr sz="2400" kern="1200">
+                <a:solidFill>
+                  <a:schemeClr val="tx1"/>
+                </a:solidFill>
+                <a:latin typeface="+mn-lt"/>
+                <a:ea typeface="+mn-ea"/>
+                <a:cs typeface="+mn-cs"/>
+              </a:defRPr>
+            </a:lvl3pPr>
+            <a:lvl4pPr marL="1600200" indent="-228600" algn="l" defTabSz="914400" rtl="0" eaLnBrk="1" latinLnBrk="0" hangingPunct="1">
+              <a:lnSpc>
+                <a:spcPct val="90000"/>
+              </a:lnSpc>
+              <a:spcBef>
+                <a:spcPts val="500"/>
+              </a:spcBef>
+              <a:buFont typeface="Arial" panose="020B0604020202020204" pitchFamily="34" charset="0"/>
+              <a:buChar char="•"/>
+              <a:defRPr sz="2000" kern="1200">
+                <a:solidFill>
+                  <a:schemeClr val="tx1"/>
+                </a:solidFill>
+                <a:latin typeface="+mn-lt"/>
+                <a:ea typeface="+mn-ea"/>
+                <a:cs typeface="+mn-cs"/>
+              </a:defRPr>
+            </a:lvl4pPr>
+            <a:lvl5pPr marL="2057400" indent="-228600" algn="l" defTabSz="914400" rtl="0" eaLnBrk="1" latinLnBrk="0" hangingPunct="1">
+              <a:lnSpc>
+                <a:spcPct val="90000"/>
+              </a:lnSpc>
+              <a:spcBef>
+                <a:spcPts val="500"/>
+              </a:spcBef>
+              <a:buFont typeface="Arial" panose="020B0604020202020204" pitchFamily="34" charset="0"/>
+              <a:buChar char="•"/>
+              <a:defRPr sz="2000" kern="1200">
+                <a:solidFill>
+                  <a:schemeClr val="tx1"/>
+                </a:solidFill>
+                <a:latin typeface="+mn-lt"/>
+                <a:ea typeface="+mn-ea"/>
+                <a:cs typeface="+mn-cs"/>
+              </a:defRPr>
+            </a:lvl5pPr>
+            <a:lvl6pPr marL="2514600" indent="-228600" algn="l" defTabSz="914400" rtl="0" eaLnBrk="1" latinLnBrk="0" hangingPunct="1">
+              <a:lnSpc>
+                <a:spcPct val="90000"/>
+              </a:lnSpc>
+              <a:spcBef>
+                <a:spcPts val="500"/>
+              </a:spcBef>
+              <a:buFont typeface="Arial" panose="020B0604020202020204" pitchFamily="34" charset="0"/>
+              <a:buChar char="•"/>
+              <a:defRPr sz="1800" kern="1200">
+                <a:solidFill>
+                  <a:schemeClr val="tx1"/>
+                </a:solidFill>
+                <a:latin typeface="+mn-lt"/>
+                <a:ea typeface="+mn-ea"/>
+                <a:cs typeface="+mn-cs"/>
+              </a:defRPr>
+            </a:lvl6pPr>
+            <a:lvl7pPr marL="2971800" indent="-228600" algn="l" defTabSz="914400" rtl="0" eaLnBrk="1" latinLnBrk="0" hangingPunct="1">
+              <a:lnSpc>
+                <a:spcPct val="90000"/>
+              </a:lnSpc>
+              <a:spcBef>
+                <a:spcPts val="500"/>
+              </a:spcBef>
+              <a:buFont typeface="Arial" panose="020B0604020202020204" pitchFamily="34" charset="0"/>
+              <a:buChar char="•"/>
+              <a:defRPr sz="1800" kern="1200">
+                <a:solidFill>
+                  <a:schemeClr val="tx1"/>
+                </a:solidFill>
+                <a:latin typeface="+mn-lt"/>
+                <a:ea typeface="+mn-ea"/>
+                <a:cs typeface="+mn-cs"/>
+              </a:defRPr>
+            </a:lvl7pPr>
+            <a:lvl8pPr marL="3429000" indent="-228600" algn="l" defTabSz="914400" rtl="0" eaLnBrk="1" latinLnBrk="0" hangingPunct="1">
+              <a:lnSpc>
+                <a:spcPct val="90000"/>
+              </a:lnSpc>
+              <a:spcBef>
+                <a:spcPts val="500"/>
+              </a:spcBef>
+              <a:buFont typeface="Arial" panose="020B0604020202020204" pitchFamily="34" charset="0"/>
+              <a:buChar char="•"/>
+              <a:defRPr sz="1800" kern="1200">
+                <a:solidFill>
+                  <a:schemeClr val="tx1"/>
+                </a:solidFill>
+                <a:latin typeface="+mn-lt"/>
+                <a:ea typeface="+mn-ea"/>
+                <a:cs typeface="+mn-cs"/>
+              </a:defRPr>
+            </a:lvl8pPr>
+            <a:lvl9pPr marL="3886200" indent="-228600" algn="l" defTabSz="914400" rtl="0" eaLnBrk="1" latinLnBrk="0" hangingPunct="1">
+              <a:lnSpc>
+                <a:spcPct val="90000"/>
+              </a:lnSpc>
+              <a:spcBef>
+                <a:spcPts val="500"/>
+              </a:spcBef>
+              <a:buFont typeface="Arial" panose="020B0604020202020204" pitchFamily="34" charset="0"/>
+              <a:buChar char="•"/>
+              <a:defRPr sz="1800" kern="1200">
+                <a:solidFill>
+                  <a:schemeClr val="tx1"/>
+                </a:solidFill>
+                <a:latin typeface="+mn-lt"/>
+                <a:ea typeface="+mn-ea"/>
+                <a:cs typeface="+mn-cs"/>
+              </a:defRPr>
+            </a:lvl9pPr>
+          </a:lstStyle>
+          <a:p>
+            <a:pPr marL="0" indent="0">
+              <a:buFont typeface="Arial" panose="020B0604020202020204" pitchFamily="34" charset="0"/>
+              <a:buNone/>
+            </a:pPr>
+            <a:r>
+              <a:rPr lang="en-US" altLang="ja-JP" dirty="0">
+                <a:solidFill>
+                  <a:srgbClr val="FFFFFF"/>
+                </a:solidFill>
+              </a:rPr>
+              <a:t>c</a:t>
+            </a:r>
+            <a:r>
+              <a:rPr lang="ja-JP" altLang="en-US" dirty="0"/>
+              <a:t>が未定義なのに使っているというエラー</a:t>
             </a:r>
             <a:endParaRPr lang="en-US" altLang="ja-JP" dirty="0"/>
           </a:p>
@@ -22946,7 +23929,12 @@
             <p:ph idx="1"/>
           </p:nvPr>
         </p:nvSpPr>
-        <p:spPr/>
+        <p:spPr>
+          <a:xfrm>
+            <a:off x="628650" y="1571315"/>
+            <a:ext cx="7886700" cy="686666"/>
+          </a:xfrm>
+        </p:spPr>
         <p:txBody>
           <a:bodyPr/>
           <a:lstStyle/>
@@ -22968,19 +23956,691 @@
             </a:r>
             <a:endParaRPr lang="en-US" altLang="ja-JP" dirty="0"/>
           </a:p>
+        </p:txBody>
+      </p:sp>
+      <p:sp>
+        <p:nvSpPr>
+          <p:cNvPr id="6" name="コンテンツ プレースホルダー 7">
+            <a:extLst>
+              <a:ext uri="{FF2B5EF4-FFF2-40B4-BE49-F238E27FC236}">
+                <a16:creationId xmlns:a16="http://schemas.microsoft.com/office/drawing/2014/main" id="{7CC29521-8975-438A-BD08-0582AD794C2B}"/>
+              </a:ext>
+            </a:extLst>
+          </p:cNvPr>
+          <p:cNvSpPr txBox="1">
+            <a:spLocks/>
+          </p:cNvSpPr>
+          <p:nvPr/>
+        </p:nvSpPr>
+        <p:spPr>
+          <a:xfrm>
+            <a:off x="628650" y="3598590"/>
+            <a:ext cx="7886700" cy="485883"/>
+          </a:xfrm>
+          <a:prstGeom prst="rect">
+            <a:avLst/>
+          </a:prstGeom>
+        </p:spPr>
+        <p:txBody>
+          <a:bodyPr vert="horz" lIns="91440" tIns="45720" rIns="91440" bIns="45720" rtlCol="0">
+            <a:normAutofit lnSpcReduction="10000"/>
+          </a:bodyPr>
+          <a:lstStyle>
+            <a:lvl1pPr marL="228600" indent="-228600" algn="l" defTabSz="914400" rtl="0" eaLnBrk="1" latinLnBrk="0" hangingPunct="1">
+              <a:lnSpc>
+                <a:spcPct val="90000"/>
+              </a:lnSpc>
+              <a:spcBef>
+                <a:spcPts val="1000"/>
+              </a:spcBef>
+              <a:buFont typeface="Arial" panose="020B0604020202020204" pitchFamily="34" charset="0"/>
+              <a:buChar char="•"/>
+              <a:defRPr sz="3200" kern="1200">
+                <a:solidFill>
+                  <a:schemeClr val="tx1"/>
+                </a:solidFill>
+                <a:latin typeface="+mn-lt"/>
+                <a:ea typeface="+mn-ea"/>
+                <a:cs typeface="+mn-cs"/>
+              </a:defRPr>
+            </a:lvl1pPr>
+            <a:lvl2pPr marL="685800" indent="-228600" algn="l" defTabSz="914400" rtl="0" eaLnBrk="1" latinLnBrk="0" hangingPunct="1">
+              <a:lnSpc>
+                <a:spcPct val="90000"/>
+              </a:lnSpc>
+              <a:spcBef>
+                <a:spcPts val="500"/>
+              </a:spcBef>
+              <a:buFont typeface="Arial" panose="020B0604020202020204" pitchFamily="34" charset="0"/>
+              <a:buChar char="•"/>
+              <a:defRPr sz="2800" kern="1200">
+                <a:solidFill>
+                  <a:schemeClr val="tx1"/>
+                </a:solidFill>
+                <a:latin typeface="+mn-lt"/>
+                <a:ea typeface="+mn-ea"/>
+                <a:cs typeface="+mn-cs"/>
+              </a:defRPr>
+            </a:lvl2pPr>
+            <a:lvl3pPr marL="1143000" indent="-228600" algn="l" defTabSz="914400" rtl="0" eaLnBrk="1" latinLnBrk="0" hangingPunct="1">
+              <a:lnSpc>
+                <a:spcPct val="90000"/>
+              </a:lnSpc>
+              <a:spcBef>
+                <a:spcPts val="500"/>
+              </a:spcBef>
+              <a:buFont typeface="Arial" panose="020B0604020202020204" pitchFamily="34" charset="0"/>
+              <a:buChar char="•"/>
+              <a:defRPr sz="2400" kern="1200">
+                <a:solidFill>
+                  <a:schemeClr val="tx1"/>
+                </a:solidFill>
+                <a:latin typeface="+mn-lt"/>
+                <a:ea typeface="+mn-ea"/>
+                <a:cs typeface="+mn-cs"/>
+              </a:defRPr>
+            </a:lvl3pPr>
+            <a:lvl4pPr marL="1600200" indent="-228600" algn="l" defTabSz="914400" rtl="0" eaLnBrk="1" latinLnBrk="0" hangingPunct="1">
+              <a:lnSpc>
+                <a:spcPct val="90000"/>
+              </a:lnSpc>
+              <a:spcBef>
+                <a:spcPts val="500"/>
+              </a:spcBef>
+              <a:buFont typeface="Arial" panose="020B0604020202020204" pitchFamily="34" charset="0"/>
+              <a:buChar char="•"/>
+              <a:defRPr sz="2000" kern="1200">
+                <a:solidFill>
+                  <a:schemeClr val="tx1"/>
+                </a:solidFill>
+                <a:latin typeface="+mn-lt"/>
+                <a:ea typeface="+mn-ea"/>
+                <a:cs typeface="+mn-cs"/>
+              </a:defRPr>
+            </a:lvl4pPr>
+            <a:lvl5pPr marL="2057400" indent="-228600" algn="l" defTabSz="914400" rtl="0" eaLnBrk="1" latinLnBrk="0" hangingPunct="1">
+              <a:lnSpc>
+                <a:spcPct val="90000"/>
+              </a:lnSpc>
+              <a:spcBef>
+                <a:spcPts val="500"/>
+              </a:spcBef>
+              <a:buFont typeface="Arial" panose="020B0604020202020204" pitchFamily="34" charset="0"/>
+              <a:buChar char="•"/>
+              <a:defRPr sz="2000" kern="1200">
+                <a:solidFill>
+                  <a:schemeClr val="tx1"/>
+                </a:solidFill>
+                <a:latin typeface="+mn-lt"/>
+                <a:ea typeface="+mn-ea"/>
+                <a:cs typeface="+mn-cs"/>
+              </a:defRPr>
+            </a:lvl5pPr>
+            <a:lvl6pPr marL="2514600" indent="-228600" algn="l" defTabSz="914400" rtl="0" eaLnBrk="1" latinLnBrk="0" hangingPunct="1">
+              <a:lnSpc>
+                <a:spcPct val="90000"/>
+              </a:lnSpc>
+              <a:spcBef>
+                <a:spcPts val="500"/>
+              </a:spcBef>
+              <a:buFont typeface="Arial" panose="020B0604020202020204" pitchFamily="34" charset="0"/>
+              <a:buChar char="•"/>
+              <a:defRPr sz="1800" kern="1200">
+                <a:solidFill>
+                  <a:schemeClr val="tx1"/>
+                </a:solidFill>
+                <a:latin typeface="+mn-lt"/>
+                <a:ea typeface="+mn-ea"/>
+                <a:cs typeface="+mn-cs"/>
+              </a:defRPr>
+            </a:lvl6pPr>
+            <a:lvl7pPr marL="2971800" indent="-228600" algn="l" defTabSz="914400" rtl="0" eaLnBrk="1" latinLnBrk="0" hangingPunct="1">
+              <a:lnSpc>
+                <a:spcPct val="90000"/>
+              </a:lnSpc>
+              <a:spcBef>
+                <a:spcPts val="500"/>
+              </a:spcBef>
+              <a:buFont typeface="Arial" panose="020B0604020202020204" pitchFamily="34" charset="0"/>
+              <a:buChar char="•"/>
+              <a:defRPr sz="1800" kern="1200">
+                <a:solidFill>
+                  <a:schemeClr val="tx1"/>
+                </a:solidFill>
+                <a:latin typeface="+mn-lt"/>
+                <a:ea typeface="+mn-ea"/>
+                <a:cs typeface="+mn-cs"/>
+              </a:defRPr>
+            </a:lvl7pPr>
+            <a:lvl8pPr marL="3429000" indent="-228600" algn="l" defTabSz="914400" rtl="0" eaLnBrk="1" latinLnBrk="0" hangingPunct="1">
+              <a:lnSpc>
+                <a:spcPct val="90000"/>
+              </a:lnSpc>
+              <a:spcBef>
+                <a:spcPts val="500"/>
+              </a:spcBef>
+              <a:buFont typeface="Arial" panose="020B0604020202020204" pitchFamily="34" charset="0"/>
+              <a:buChar char="•"/>
+              <a:defRPr sz="1800" kern="1200">
+                <a:solidFill>
+                  <a:schemeClr val="tx1"/>
+                </a:solidFill>
+                <a:latin typeface="+mn-lt"/>
+                <a:ea typeface="+mn-ea"/>
+                <a:cs typeface="+mn-cs"/>
+              </a:defRPr>
+            </a:lvl8pPr>
+            <a:lvl9pPr marL="3886200" indent="-228600" algn="l" defTabSz="914400" rtl="0" eaLnBrk="1" latinLnBrk="0" hangingPunct="1">
+              <a:lnSpc>
+                <a:spcPct val="90000"/>
+              </a:lnSpc>
+              <a:spcBef>
+                <a:spcPts val="500"/>
+              </a:spcBef>
+              <a:buFont typeface="Arial" panose="020B0604020202020204" pitchFamily="34" charset="0"/>
+              <a:buChar char="•"/>
+              <a:defRPr sz="1800" kern="1200">
+                <a:solidFill>
+                  <a:schemeClr val="tx1"/>
+                </a:solidFill>
+                <a:latin typeface="+mn-lt"/>
+                <a:ea typeface="+mn-ea"/>
+                <a:cs typeface="+mn-cs"/>
+              </a:defRPr>
+            </a:lvl9pPr>
+          </a:lstStyle>
           <a:p>
             <a:pPr marL="0" indent="0">
+              <a:buFont typeface="Arial" panose="020B0604020202020204" pitchFamily="34" charset="0"/>
+              <a:buNone/>
+            </a:pPr>
+            <a:r>
+              <a:rPr lang="ja-JP" altLang="en-US" dirty="0"/>
+              <a:t>エラー文</a:t>
+            </a:r>
+            <a:endParaRPr lang="en-US" altLang="ja-JP" dirty="0"/>
+          </a:p>
+          <a:p>
+            <a:pPr marL="0" indent="0">
+              <a:buFont typeface="Arial" panose="020B0604020202020204" pitchFamily="34" charset="0"/>
               <a:buNone/>
             </a:pPr>
             <a:endParaRPr lang="en-US" altLang="ja-JP" dirty="0"/>
           </a:p>
+        </p:txBody>
+      </p:sp>
+      <p:sp>
+        <p:nvSpPr>
+          <p:cNvPr id="3" name="正方形/長方形 2">
+            <a:extLst>
+              <a:ext uri="{FF2B5EF4-FFF2-40B4-BE49-F238E27FC236}">
+                <a16:creationId xmlns:a16="http://schemas.microsoft.com/office/drawing/2014/main" id="{2FE09673-BA8A-43A8-96AA-B41BFF1D04B8}"/>
+              </a:ext>
+            </a:extLst>
+          </p:cNvPr>
+          <p:cNvSpPr/>
+          <p:nvPr/>
+        </p:nvSpPr>
+        <p:spPr>
+          <a:xfrm>
+            <a:off x="628650" y="2066435"/>
+            <a:ext cx="7886700" cy="1200329"/>
+          </a:xfrm>
+          <a:prstGeom prst="rect">
+            <a:avLst/>
+          </a:prstGeom>
+          <a:solidFill>
+            <a:srgbClr val="FFFFFF"/>
+          </a:solidFill>
+        </p:spPr>
+        <p:txBody>
+          <a:bodyPr wrap="square">
+            <a:spAutoFit/>
+          </a:bodyPr>
+          <a:lstStyle/>
+          <a:p>
+            <a:r>
+              <a:rPr lang="en-US" dirty="0">
+                <a:solidFill>
+                  <a:srgbClr val="000000"/>
+                </a:solidFill>
+                <a:latin typeface="Consolas" panose="020B0609020204030204" pitchFamily="49" charset="0"/>
+              </a:rPr>
+              <a:t>a = </a:t>
+            </a:r>
+            <a:r>
+              <a:rPr lang="en-US" dirty="0">
+                <a:solidFill>
+                  <a:srgbClr val="098658"/>
+                </a:solidFill>
+                <a:latin typeface="Consolas" panose="020B0609020204030204" pitchFamily="49" charset="0"/>
+              </a:rPr>
+              <a:t>4</a:t>
+            </a:r>
+            <a:endParaRPr lang="en-US" dirty="0">
+              <a:solidFill>
+                <a:srgbClr val="000000"/>
+              </a:solidFill>
+              <a:latin typeface="Consolas" panose="020B0609020204030204" pitchFamily="49" charset="0"/>
+            </a:endParaRPr>
+          </a:p>
+          <a:p>
+            <a:r>
+              <a:rPr lang="en-US" dirty="0">
+                <a:solidFill>
+                  <a:srgbClr val="000000"/>
+                </a:solidFill>
+                <a:latin typeface="Consolas" panose="020B0609020204030204" pitchFamily="49" charset="0"/>
+              </a:rPr>
+              <a:t>b = </a:t>
+            </a:r>
+            <a:r>
+              <a:rPr lang="en-US" dirty="0">
+                <a:solidFill>
+                  <a:srgbClr val="098658"/>
+                </a:solidFill>
+                <a:latin typeface="Consolas" panose="020B0609020204030204" pitchFamily="49" charset="0"/>
+              </a:rPr>
+              <a:t>5</a:t>
+            </a:r>
+            <a:endParaRPr lang="en-US" dirty="0">
+              <a:solidFill>
+                <a:srgbClr val="000000"/>
+              </a:solidFill>
+              <a:latin typeface="Consolas" panose="020B0609020204030204" pitchFamily="49" charset="0"/>
+            </a:endParaRPr>
+          </a:p>
+          <a:p>
+            <a:r>
+              <a:rPr lang="en-US" dirty="0">
+                <a:solidFill>
+                  <a:srgbClr val="8F08C4"/>
+                </a:solidFill>
+                <a:latin typeface="Consolas" panose="020B0609020204030204" pitchFamily="49" charset="0"/>
+              </a:rPr>
+              <a:t>if</a:t>
+            </a:r>
+            <a:r>
+              <a:rPr lang="en-US" dirty="0">
+                <a:solidFill>
+                  <a:srgbClr val="000000"/>
+                </a:solidFill>
+                <a:latin typeface="Consolas" panose="020B0609020204030204" pitchFamily="49" charset="0"/>
+              </a:rPr>
+              <a:t> a &lt; b</a:t>
+            </a:r>
+          </a:p>
+          <a:p>
+            <a:r>
+              <a:rPr lang="en-US" dirty="0">
+                <a:solidFill>
+                  <a:srgbClr val="74531F"/>
+                </a:solidFill>
+                <a:latin typeface="Consolas" panose="020B0609020204030204" pitchFamily="49" charset="0"/>
+              </a:rPr>
+              <a:t>print</a:t>
+            </a:r>
+            <a:r>
+              <a:rPr lang="en-US" dirty="0">
+                <a:solidFill>
+                  <a:srgbClr val="000000"/>
+                </a:solidFill>
+                <a:latin typeface="Consolas" panose="020B0609020204030204" pitchFamily="49" charset="0"/>
+              </a:rPr>
+              <a:t>(b)</a:t>
+            </a:r>
+            <a:endParaRPr lang="en-US" b="0" dirty="0">
+              <a:solidFill>
+                <a:srgbClr val="000000"/>
+              </a:solidFill>
+              <a:effectLst/>
+              <a:latin typeface="Consolas" panose="020B0609020204030204" pitchFamily="49" charset="0"/>
+            </a:endParaRPr>
+          </a:p>
+        </p:txBody>
+      </p:sp>
+      <p:sp>
+        <p:nvSpPr>
+          <p:cNvPr id="4" name="正方形/長方形 3">
+            <a:extLst>
+              <a:ext uri="{FF2B5EF4-FFF2-40B4-BE49-F238E27FC236}">
+                <a16:creationId xmlns:a16="http://schemas.microsoft.com/office/drawing/2014/main" id="{369C89A5-58AC-433D-93E0-1C5F39789D0A}"/>
+              </a:ext>
+            </a:extLst>
+          </p:cNvPr>
+          <p:cNvSpPr/>
+          <p:nvPr/>
+        </p:nvSpPr>
+        <p:spPr>
+          <a:xfrm>
+            <a:off x="628650" y="4079856"/>
+            <a:ext cx="4572000" cy="1754326"/>
+          </a:xfrm>
+          <a:prstGeom prst="rect">
+            <a:avLst/>
+          </a:prstGeom>
+          <a:solidFill>
+            <a:srgbClr val="FFFFFF"/>
+          </a:solidFill>
+        </p:spPr>
+        <p:txBody>
+          <a:bodyPr>
+            <a:spAutoFit/>
+          </a:bodyPr>
+          <a:lstStyle/>
+          <a:p>
+            <a:r>
+              <a:rPr lang="en-US" dirty="0">
+                <a:solidFill>
+                  <a:srgbClr val="000000"/>
+                </a:solidFill>
+                <a:latin typeface="Consolas" panose="020B0609020204030204" pitchFamily="49" charset="0"/>
+              </a:rPr>
+              <a:t>  File "/home/</a:t>
+            </a:r>
+            <a:r>
+              <a:rPr lang="en-US" dirty="0" err="1">
+                <a:solidFill>
+                  <a:srgbClr val="000000"/>
+                </a:solidFill>
+                <a:latin typeface="Consolas" panose="020B0609020204030204" pitchFamily="49" charset="0"/>
+              </a:rPr>
+              <a:t>hira</a:t>
+            </a:r>
+            <a:r>
+              <a:rPr lang="en-US" dirty="0">
+                <a:solidFill>
+                  <a:srgbClr val="000000"/>
+                </a:solidFill>
+                <a:latin typeface="Consolas" panose="020B0609020204030204" pitchFamily="49" charset="0"/>
+              </a:rPr>
+              <a:t>/lab/</a:t>
+            </a:r>
+            <a:r>
+              <a:rPr lang="en-US" dirty="0" err="1">
+                <a:solidFill>
+                  <a:srgbClr val="000000"/>
+                </a:solidFill>
+                <a:latin typeface="Consolas" panose="020B0609020204030204" pitchFamily="49" charset="0"/>
+              </a:rPr>
+              <a:t>tes</a:t>
+            </a:r>
+            <a:r>
+              <a:rPr lang="en-US" dirty="0">
+                <a:solidFill>
+                  <a:srgbClr val="000000"/>
+                </a:solidFill>
+                <a:latin typeface="Consolas" panose="020B0609020204030204" pitchFamily="49" charset="0"/>
+              </a:rPr>
+              <a:t>/error3.py", line 4</a:t>
+            </a:r>
+          </a:p>
+          <a:p>
+            <a:r>
+              <a:rPr lang="en-US" dirty="0">
+                <a:solidFill>
+                  <a:srgbClr val="000000"/>
+                </a:solidFill>
+                <a:latin typeface="Consolas" panose="020B0609020204030204" pitchFamily="49" charset="0"/>
+              </a:rPr>
+              <a:t>    if a &lt; b</a:t>
+            </a:r>
+          </a:p>
+          <a:p>
+            <a:r>
+              <a:rPr lang="en-US" dirty="0">
+                <a:solidFill>
+                  <a:srgbClr val="000000"/>
+                </a:solidFill>
+                <a:latin typeface="Consolas" panose="020B0609020204030204" pitchFamily="49" charset="0"/>
+              </a:rPr>
+              <a:t>            ^</a:t>
+            </a:r>
+          </a:p>
+          <a:p>
+            <a:r>
+              <a:rPr lang="en-US" dirty="0" err="1">
+                <a:solidFill>
+                  <a:srgbClr val="000000"/>
+                </a:solidFill>
+                <a:latin typeface="Consolas" panose="020B0609020204030204" pitchFamily="49" charset="0"/>
+              </a:rPr>
+              <a:t>SyntaxError</a:t>
+            </a:r>
+            <a:r>
+              <a:rPr lang="en-US" dirty="0">
+                <a:solidFill>
+                  <a:srgbClr val="000000"/>
+                </a:solidFill>
+                <a:latin typeface="Consolas" panose="020B0609020204030204" pitchFamily="49" charset="0"/>
+              </a:rPr>
+              <a:t>: expected ':'</a:t>
+            </a:r>
+            <a:endParaRPr lang="en-US" b="0" dirty="0">
+              <a:solidFill>
+                <a:srgbClr val="000000"/>
+              </a:solidFill>
+              <a:effectLst/>
+              <a:latin typeface="Consolas" panose="020B0609020204030204" pitchFamily="49" charset="0"/>
+            </a:endParaRPr>
+          </a:p>
+        </p:txBody>
+      </p:sp>
+      <p:sp>
+        <p:nvSpPr>
+          <p:cNvPr id="9" name="コンテンツ プレースホルダー 7">
+            <a:extLst>
+              <a:ext uri="{FF2B5EF4-FFF2-40B4-BE49-F238E27FC236}">
+                <a16:creationId xmlns:a16="http://schemas.microsoft.com/office/drawing/2014/main" id="{B994F66E-D4C4-4808-87E5-A75E1AE06C9A}"/>
+              </a:ext>
+            </a:extLst>
+          </p:cNvPr>
+          <p:cNvSpPr txBox="1">
+            <a:spLocks/>
+          </p:cNvSpPr>
+          <p:nvPr/>
+        </p:nvSpPr>
+        <p:spPr>
+          <a:xfrm>
+            <a:off x="513195" y="6006991"/>
+            <a:ext cx="7886700" cy="485883"/>
+          </a:xfrm>
+          <a:prstGeom prst="rect">
+            <a:avLst/>
+          </a:prstGeom>
+        </p:spPr>
+        <p:txBody>
+          <a:bodyPr vert="horz" lIns="91440" tIns="45720" rIns="91440" bIns="45720" rtlCol="0">
+            <a:normAutofit fontScale="92500" lnSpcReduction="10000"/>
+          </a:bodyPr>
+          <a:lstStyle>
+            <a:lvl1pPr marL="228600" indent="-228600" algn="l" defTabSz="914400" rtl="0" eaLnBrk="1" latinLnBrk="0" hangingPunct="1">
+              <a:lnSpc>
+                <a:spcPct val="90000"/>
+              </a:lnSpc>
+              <a:spcBef>
+                <a:spcPts val="1000"/>
+              </a:spcBef>
+              <a:buFont typeface="Arial" panose="020B0604020202020204" pitchFamily="34" charset="0"/>
+              <a:buChar char="•"/>
+              <a:defRPr sz="3200" kern="1200">
+                <a:solidFill>
+                  <a:schemeClr val="tx1"/>
+                </a:solidFill>
+                <a:latin typeface="+mn-lt"/>
+                <a:ea typeface="+mn-ea"/>
+                <a:cs typeface="+mn-cs"/>
+              </a:defRPr>
+            </a:lvl1pPr>
+            <a:lvl2pPr marL="685800" indent="-228600" algn="l" defTabSz="914400" rtl="0" eaLnBrk="1" latinLnBrk="0" hangingPunct="1">
+              <a:lnSpc>
+                <a:spcPct val="90000"/>
+              </a:lnSpc>
+              <a:spcBef>
+                <a:spcPts val="500"/>
+              </a:spcBef>
+              <a:buFont typeface="Arial" panose="020B0604020202020204" pitchFamily="34" charset="0"/>
+              <a:buChar char="•"/>
+              <a:defRPr sz="2800" kern="1200">
+                <a:solidFill>
+                  <a:schemeClr val="tx1"/>
+                </a:solidFill>
+                <a:latin typeface="+mn-lt"/>
+                <a:ea typeface="+mn-ea"/>
+                <a:cs typeface="+mn-cs"/>
+              </a:defRPr>
+            </a:lvl2pPr>
+            <a:lvl3pPr marL="1143000" indent="-228600" algn="l" defTabSz="914400" rtl="0" eaLnBrk="1" latinLnBrk="0" hangingPunct="1">
+              <a:lnSpc>
+                <a:spcPct val="90000"/>
+              </a:lnSpc>
+              <a:spcBef>
+                <a:spcPts val="500"/>
+              </a:spcBef>
+              <a:buFont typeface="Arial" panose="020B0604020202020204" pitchFamily="34" charset="0"/>
+              <a:buChar char="•"/>
+              <a:defRPr sz="2400" kern="1200">
+                <a:solidFill>
+                  <a:schemeClr val="tx1"/>
+                </a:solidFill>
+                <a:latin typeface="+mn-lt"/>
+                <a:ea typeface="+mn-ea"/>
+                <a:cs typeface="+mn-cs"/>
+              </a:defRPr>
+            </a:lvl3pPr>
+            <a:lvl4pPr marL="1600200" indent="-228600" algn="l" defTabSz="914400" rtl="0" eaLnBrk="1" latinLnBrk="0" hangingPunct="1">
+              <a:lnSpc>
+                <a:spcPct val="90000"/>
+              </a:lnSpc>
+              <a:spcBef>
+                <a:spcPts val="500"/>
+              </a:spcBef>
+              <a:buFont typeface="Arial" panose="020B0604020202020204" pitchFamily="34" charset="0"/>
+              <a:buChar char="•"/>
+              <a:defRPr sz="2000" kern="1200">
+                <a:solidFill>
+                  <a:schemeClr val="tx1"/>
+                </a:solidFill>
+                <a:latin typeface="+mn-lt"/>
+                <a:ea typeface="+mn-ea"/>
+                <a:cs typeface="+mn-cs"/>
+              </a:defRPr>
+            </a:lvl4pPr>
+            <a:lvl5pPr marL="2057400" indent="-228600" algn="l" defTabSz="914400" rtl="0" eaLnBrk="1" latinLnBrk="0" hangingPunct="1">
+              <a:lnSpc>
+                <a:spcPct val="90000"/>
+              </a:lnSpc>
+              <a:spcBef>
+                <a:spcPts val="500"/>
+              </a:spcBef>
+              <a:buFont typeface="Arial" panose="020B0604020202020204" pitchFamily="34" charset="0"/>
+              <a:buChar char="•"/>
+              <a:defRPr sz="2000" kern="1200">
+                <a:solidFill>
+                  <a:schemeClr val="tx1"/>
+                </a:solidFill>
+                <a:latin typeface="+mn-lt"/>
+                <a:ea typeface="+mn-ea"/>
+                <a:cs typeface="+mn-cs"/>
+              </a:defRPr>
+            </a:lvl5pPr>
+            <a:lvl6pPr marL="2514600" indent="-228600" algn="l" defTabSz="914400" rtl="0" eaLnBrk="1" latinLnBrk="0" hangingPunct="1">
+              <a:lnSpc>
+                <a:spcPct val="90000"/>
+              </a:lnSpc>
+              <a:spcBef>
+                <a:spcPts val="500"/>
+              </a:spcBef>
+              <a:buFont typeface="Arial" panose="020B0604020202020204" pitchFamily="34" charset="0"/>
+              <a:buChar char="•"/>
+              <a:defRPr sz="1800" kern="1200">
+                <a:solidFill>
+                  <a:schemeClr val="tx1"/>
+                </a:solidFill>
+                <a:latin typeface="+mn-lt"/>
+                <a:ea typeface="+mn-ea"/>
+                <a:cs typeface="+mn-cs"/>
+              </a:defRPr>
+            </a:lvl6pPr>
+            <a:lvl7pPr marL="2971800" indent="-228600" algn="l" defTabSz="914400" rtl="0" eaLnBrk="1" latinLnBrk="0" hangingPunct="1">
+              <a:lnSpc>
+                <a:spcPct val="90000"/>
+              </a:lnSpc>
+              <a:spcBef>
+                <a:spcPts val="500"/>
+              </a:spcBef>
+              <a:buFont typeface="Arial" panose="020B0604020202020204" pitchFamily="34" charset="0"/>
+              <a:buChar char="•"/>
+              <a:defRPr sz="1800" kern="1200">
+                <a:solidFill>
+                  <a:schemeClr val="tx1"/>
+                </a:solidFill>
+                <a:latin typeface="+mn-lt"/>
+                <a:ea typeface="+mn-ea"/>
+                <a:cs typeface="+mn-cs"/>
+              </a:defRPr>
+            </a:lvl7pPr>
+            <a:lvl8pPr marL="3429000" indent="-228600" algn="l" defTabSz="914400" rtl="0" eaLnBrk="1" latinLnBrk="0" hangingPunct="1">
+              <a:lnSpc>
+                <a:spcPct val="90000"/>
+              </a:lnSpc>
+              <a:spcBef>
+                <a:spcPts val="500"/>
+              </a:spcBef>
+              <a:buFont typeface="Arial" panose="020B0604020202020204" pitchFamily="34" charset="0"/>
+              <a:buChar char="•"/>
+              <a:defRPr sz="1800" kern="1200">
+                <a:solidFill>
+                  <a:schemeClr val="tx1"/>
+                </a:solidFill>
+                <a:latin typeface="+mn-lt"/>
+                <a:ea typeface="+mn-ea"/>
+                <a:cs typeface="+mn-cs"/>
+              </a:defRPr>
+            </a:lvl8pPr>
+            <a:lvl9pPr marL="3886200" indent="-228600" algn="l" defTabSz="914400" rtl="0" eaLnBrk="1" latinLnBrk="0" hangingPunct="1">
+              <a:lnSpc>
+                <a:spcPct val="90000"/>
+              </a:lnSpc>
+              <a:spcBef>
+                <a:spcPts val="500"/>
+              </a:spcBef>
+              <a:buFont typeface="Arial" panose="020B0604020202020204" pitchFamily="34" charset="0"/>
+              <a:buChar char="•"/>
+              <a:defRPr sz="1800" kern="1200">
+                <a:solidFill>
+                  <a:schemeClr val="tx1"/>
+                </a:solidFill>
+                <a:latin typeface="+mn-lt"/>
+                <a:ea typeface="+mn-ea"/>
+                <a:cs typeface="+mn-cs"/>
+              </a:defRPr>
+            </a:lvl9pPr>
+          </a:lstStyle>
           <a:p>
             <a:pPr marL="0" indent="0">
+              <a:buFont typeface="Arial" panose="020B0604020202020204" pitchFamily="34" charset="0"/>
               <a:buNone/>
             </a:pPr>
             <a:r>
+              <a:rPr lang="en-US" altLang="ja-JP" dirty="0"/>
+              <a:t>If</a:t>
+            </a:r>
+            <a:r>
               <a:rPr lang="ja-JP" altLang="en-US" dirty="0"/>
-              <a:t>エラー文</a:t>
+              <a:t>文の最後に「</a:t>
+            </a:r>
+            <a:r>
+              <a:rPr lang="en-US" altLang="ja-JP" dirty="0">
+                <a:solidFill>
+                  <a:srgbClr val="FFFFFF"/>
+                </a:solidFill>
+              </a:rPr>
+              <a:t>:</a:t>
+            </a:r>
+            <a:r>
+              <a:rPr lang="ja-JP" altLang="en-US" dirty="0"/>
+              <a:t>」がないというエラー</a:t>
             </a:r>
             <a:endParaRPr lang="en-US" altLang="ja-JP" dirty="0"/>
           </a:p>
@@ -23090,7 +24750,12 @@
             <p:ph idx="1"/>
           </p:nvPr>
         </p:nvSpPr>
-        <p:spPr/>
+        <p:spPr>
+          <a:xfrm>
+            <a:off x="628650" y="1825625"/>
+            <a:ext cx="7886700" cy="649720"/>
+          </a:xfrm>
+        </p:spPr>
         <p:txBody>
           <a:bodyPr/>
           <a:lstStyle/>
@@ -23099,12 +24764,12 @@
               <a:buNone/>
             </a:pPr>
             <a:r>
-              <a:rPr lang="ja-JP" altLang="en-US" dirty="0"/>
+              <a:rPr lang="ja-JP" altLang="en-US"/>
               <a:t>例</a:t>
             </a:r>
             <a:r>
-              <a:rPr lang="en-US" altLang="ja-JP" dirty="0"/>
-              <a:t>-3)</a:t>
+              <a:rPr lang="en-US" altLang="ja-JP"/>
+              <a:t>-4)</a:t>
             </a:r>
             <a:r>
               <a:rPr lang="ja-JP" altLang="en-US"/>
@@ -23112,19 +24777,634 @@
             </a:r>
             <a:endParaRPr lang="en-US" altLang="ja-JP" dirty="0"/>
           </a:p>
+        </p:txBody>
+      </p:sp>
+      <p:sp>
+        <p:nvSpPr>
+          <p:cNvPr id="3" name="正方形/長方形 2">
+            <a:extLst>
+              <a:ext uri="{FF2B5EF4-FFF2-40B4-BE49-F238E27FC236}">
+                <a16:creationId xmlns:a16="http://schemas.microsoft.com/office/drawing/2014/main" id="{C5F5914A-3009-42D4-A4D4-0A2A3315C156}"/>
+              </a:ext>
+            </a:extLst>
+          </p:cNvPr>
+          <p:cNvSpPr/>
+          <p:nvPr/>
+        </p:nvSpPr>
+        <p:spPr>
+          <a:xfrm>
+            <a:off x="628650" y="2367125"/>
+            <a:ext cx="7886700" cy="923330"/>
+          </a:xfrm>
+          <a:prstGeom prst="rect">
+            <a:avLst/>
+          </a:prstGeom>
+          <a:solidFill>
+            <a:srgbClr val="FFFFFF"/>
+          </a:solidFill>
+        </p:spPr>
+        <p:txBody>
+          <a:bodyPr wrap="square">
+            <a:spAutoFit/>
+          </a:bodyPr>
+          <a:lstStyle/>
+          <a:p>
+            <a:r>
+              <a:rPr lang="en-US">
+                <a:solidFill>
+                  <a:srgbClr val="000000"/>
+                </a:solidFill>
+                <a:latin typeface="Consolas" panose="020B0609020204030204" pitchFamily="49" charset="0"/>
+              </a:rPr>
+              <a:t>a = </a:t>
+            </a:r>
+            <a:r>
+              <a:rPr lang="en-US">
+                <a:solidFill>
+                  <a:srgbClr val="E21F1F"/>
+                </a:solidFill>
+                <a:latin typeface="Consolas" panose="020B0609020204030204" pitchFamily="49" charset="0"/>
+              </a:rPr>
+              <a:t>"</a:t>
+            </a:r>
+            <a:r>
+              <a:rPr lang="en-US">
+                <a:solidFill>
+                  <a:srgbClr val="A31515"/>
+                </a:solidFill>
+                <a:latin typeface="Consolas" panose="020B0609020204030204" pitchFamily="49" charset="0"/>
+              </a:rPr>
+              <a:t>my age is</a:t>
+            </a:r>
+            <a:r>
+              <a:rPr lang="en-US">
+                <a:solidFill>
+                  <a:srgbClr val="E21F1F"/>
+                </a:solidFill>
+                <a:latin typeface="Consolas" panose="020B0609020204030204" pitchFamily="49" charset="0"/>
+              </a:rPr>
+              <a:t>"</a:t>
+            </a:r>
+            <a:endParaRPr lang="en-US">
+              <a:solidFill>
+                <a:srgbClr val="000000"/>
+              </a:solidFill>
+              <a:latin typeface="Consolas" panose="020B0609020204030204" pitchFamily="49" charset="0"/>
+            </a:endParaRPr>
+          </a:p>
+          <a:p>
+            <a:r>
+              <a:rPr lang="en-US">
+                <a:solidFill>
+                  <a:srgbClr val="000000"/>
+                </a:solidFill>
+                <a:latin typeface="Consolas" panose="020B0609020204030204" pitchFamily="49" charset="0"/>
+              </a:rPr>
+              <a:t>b = </a:t>
+            </a:r>
+            <a:r>
+              <a:rPr lang="en-US">
+                <a:solidFill>
+                  <a:srgbClr val="098658"/>
+                </a:solidFill>
+                <a:latin typeface="Consolas" panose="020B0609020204030204" pitchFamily="49" charset="0"/>
+              </a:rPr>
+              <a:t>41</a:t>
+            </a:r>
+            <a:endParaRPr lang="en-US">
+              <a:solidFill>
+                <a:srgbClr val="000000"/>
+              </a:solidFill>
+              <a:latin typeface="Consolas" panose="020B0609020204030204" pitchFamily="49" charset="0"/>
+            </a:endParaRPr>
+          </a:p>
+          <a:p>
+            <a:r>
+              <a:rPr lang="en-US">
+                <a:solidFill>
+                  <a:srgbClr val="74531F"/>
+                </a:solidFill>
+                <a:latin typeface="Consolas" panose="020B0609020204030204" pitchFamily="49" charset="0"/>
+              </a:rPr>
+              <a:t>print</a:t>
+            </a:r>
+            <a:r>
+              <a:rPr lang="en-US">
+                <a:solidFill>
+                  <a:srgbClr val="000000"/>
+                </a:solidFill>
+                <a:latin typeface="Consolas" panose="020B0609020204030204" pitchFamily="49" charset="0"/>
+              </a:rPr>
+              <a:t>(a + b)</a:t>
+            </a:r>
+            <a:endParaRPr lang="en-US" b="0" dirty="0">
+              <a:solidFill>
+                <a:srgbClr val="000000"/>
+              </a:solidFill>
+              <a:effectLst/>
+              <a:latin typeface="Consolas" panose="020B0609020204030204" pitchFamily="49" charset="0"/>
+            </a:endParaRPr>
+          </a:p>
+        </p:txBody>
+      </p:sp>
+      <p:sp>
+        <p:nvSpPr>
+          <p:cNvPr id="4" name="正方形/長方形 3">
+            <a:extLst>
+              <a:ext uri="{FF2B5EF4-FFF2-40B4-BE49-F238E27FC236}">
+                <a16:creationId xmlns:a16="http://schemas.microsoft.com/office/drawing/2014/main" id="{B928515D-A627-4404-9D3C-3742B1646A06}"/>
+              </a:ext>
+            </a:extLst>
+          </p:cNvPr>
+          <p:cNvSpPr/>
+          <p:nvPr/>
+        </p:nvSpPr>
+        <p:spPr>
+          <a:xfrm>
+            <a:off x="628650" y="4107337"/>
+            <a:ext cx="7886700" cy="923330"/>
+          </a:xfrm>
+          <a:prstGeom prst="rect">
+            <a:avLst/>
+          </a:prstGeom>
+          <a:solidFill>
+            <a:srgbClr val="FFFFFF"/>
+          </a:solidFill>
+        </p:spPr>
+        <p:txBody>
+          <a:bodyPr wrap="square">
+            <a:spAutoFit/>
+          </a:bodyPr>
+          <a:lstStyle/>
+          <a:p>
+            <a:r>
+              <a:rPr lang="en-US" dirty="0">
+                <a:solidFill>
+                  <a:srgbClr val="000000"/>
+                </a:solidFill>
+                <a:latin typeface="Consolas" panose="020B0609020204030204" pitchFamily="49" charset="0"/>
+              </a:rPr>
+              <a:t>  File "./error4.py", line 4, in &lt;module&gt;</a:t>
+            </a:r>
+          </a:p>
+          <a:p>
+            <a:r>
+              <a:rPr lang="en-US" dirty="0">
+                <a:solidFill>
+                  <a:srgbClr val="000000"/>
+                </a:solidFill>
+                <a:latin typeface="Consolas" panose="020B0609020204030204" pitchFamily="49" charset="0"/>
+              </a:rPr>
+              <a:t>    print(a + b)</a:t>
+            </a:r>
+          </a:p>
+          <a:p>
+            <a:r>
+              <a:rPr lang="en-US" dirty="0" err="1">
+                <a:solidFill>
+                  <a:srgbClr val="000000"/>
+                </a:solidFill>
+                <a:latin typeface="Consolas" panose="020B0609020204030204" pitchFamily="49" charset="0"/>
+              </a:rPr>
+              <a:t>TypeError</a:t>
+            </a:r>
+            <a:r>
+              <a:rPr lang="en-US" dirty="0">
+                <a:solidFill>
+                  <a:srgbClr val="000000"/>
+                </a:solidFill>
+                <a:latin typeface="Consolas" panose="020B0609020204030204" pitchFamily="49" charset="0"/>
+              </a:rPr>
+              <a:t>: can only concatenate str (not "int") to str</a:t>
+            </a:r>
+            <a:endParaRPr lang="en-US" b="0" dirty="0">
+              <a:solidFill>
+                <a:srgbClr val="000000"/>
+              </a:solidFill>
+              <a:effectLst/>
+              <a:latin typeface="Consolas" panose="020B0609020204030204" pitchFamily="49" charset="0"/>
+            </a:endParaRPr>
+          </a:p>
+        </p:txBody>
+      </p:sp>
+      <p:sp>
+        <p:nvSpPr>
+          <p:cNvPr id="7" name="コンテンツ プレースホルダー 7">
+            <a:extLst>
+              <a:ext uri="{FF2B5EF4-FFF2-40B4-BE49-F238E27FC236}">
+                <a16:creationId xmlns:a16="http://schemas.microsoft.com/office/drawing/2014/main" id="{8BE1975A-CC48-4AF4-9CBE-4066D70CB891}"/>
+              </a:ext>
+            </a:extLst>
+          </p:cNvPr>
+          <p:cNvSpPr txBox="1">
+            <a:spLocks/>
+          </p:cNvSpPr>
+          <p:nvPr/>
+        </p:nvSpPr>
+        <p:spPr>
+          <a:xfrm>
+            <a:off x="628650" y="3629890"/>
+            <a:ext cx="7886700" cy="500365"/>
+          </a:xfrm>
+          <a:prstGeom prst="rect">
+            <a:avLst/>
+          </a:prstGeom>
+        </p:spPr>
+        <p:txBody>
+          <a:bodyPr vert="horz" lIns="91440" tIns="45720" rIns="91440" bIns="45720" rtlCol="0">
+            <a:normAutofit lnSpcReduction="10000"/>
+          </a:bodyPr>
+          <a:lstStyle>
+            <a:lvl1pPr marL="228600" indent="-228600" algn="l" defTabSz="914400" rtl="0" eaLnBrk="1" latinLnBrk="0" hangingPunct="1">
+              <a:lnSpc>
+                <a:spcPct val="90000"/>
+              </a:lnSpc>
+              <a:spcBef>
+                <a:spcPts val="1000"/>
+              </a:spcBef>
+              <a:buFont typeface="Arial" panose="020B0604020202020204" pitchFamily="34" charset="0"/>
+              <a:buChar char="•"/>
+              <a:defRPr sz="3200" kern="1200">
+                <a:solidFill>
+                  <a:schemeClr val="tx1"/>
+                </a:solidFill>
+                <a:latin typeface="+mn-lt"/>
+                <a:ea typeface="+mn-ea"/>
+                <a:cs typeface="+mn-cs"/>
+              </a:defRPr>
+            </a:lvl1pPr>
+            <a:lvl2pPr marL="685800" indent="-228600" algn="l" defTabSz="914400" rtl="0" eaLnBrk="1" latinLnBrk="0" hangingPunct="1">
+              <a:lnSpc>
+                <a:spcPct val="90000"/>
+              </a:lnSpc>
+              <a:spcBef>
+                <a:spcPts val="500"/>
+              </a:spcBef>
+              <a:buFont typeface="Arial" panose="020B0604020202020204" pitchFamily="34" charset="0"/>
+              <a:buChar char="•"/>
+              <a:defRPr sz="2800" kern="1200">
+                <a:solidFill>
+                  <a:schemeClr val="tx1"/>
+                </a:solidFill>
+                <a:latin typeface="+mn-lt"/>
+                <a:ea typeface="+mn-ea"/>
+                <a:cs typeface="+mn-cs"/>
+              </a:defRPr>
+            </a:lvl2pPr>
+            <a:lvl3pPr marL="1143000" indent="-228600" algn="l" defTabSz="914400" rtl="0" eaLnBrk="1" latinLnBrk="0" hangingPunct="1">
+              <a:lnSpc>
+                <a:spcPct val="90000"/>
+              </a:lnSpc>
+              <a:spcBef>
+                <a:spcPts val="500"/>
+              </a:spcBef>
+              <a:buFont typeface="Arial" panose="020B0604020202020204" pitchFamily="34" charset="0"/>
+              <a:buChar char="•"/>
+              <a:defRPr sz="2400" kern="1200">
+                <a:solidFill>
+                  <a:schemeClr val="tx1"/>
+                </a:solidFill>
+                <a:latin typeface="+mn-lt"/>
+                <a:ea typeface="+mn-ea"/>
+                <a:cs typeface="+mn-cs"/>
+              </a:defRPr>
+            </a:lvl3pPr>
+            <a:lvl4pPr marL="1600200" indent="-228600" algn="l" defTabSz="914400" rtl="0" eaLnBrk="1" latinLnBrk="0" hangingPunct="1">
+              <a:lnSpc>
+                <a:spcPct val="90000"/>
+              </a:lnSpc>
+              <a:spcBef>
+                <a:spcPts val="500"/>
+              </a:spcBef>
+              <a:buFont typeface="Arial" panose="020B0604020202020204" pitchFamily="34" charset="0"/>
+              <a:buChar char="•"/>
+              <a:defRPr sz="2000" kern="1200">
+                <a:solidFill>
+                  <a:schemeClr val="tx1"/>
+                </a:solidFill>
+                <a:latin typeface="+mn-lt"/>
+                <a:ea typeface="+mn-ea"/>
+                <a:cs typeface="+mn-cs"/>
+              </a:defRPr>
+            </a:lvl4pPr>
+            <a:lvl5pPr marL="2057400" indent="-228600" algn="l" defTabSz="914400" rtl="0" eaLnBrk="1" latinLnBrk="0" hangingPunct="1">
+              <a:lnSpc>
+                <a:spcPct val="90000"/>
+              </a:lnSpc>
+              <a:spcBef>
+                <a:spcPts val="500"/>
+              </a:spcBef>
+              <a:buFont typeface="Arial" panose="020B0604020202020204" pitchFamily="34" charset="0"/>
+              <a:buChar char="•"/>
+              <a:defRPr sz="2000" kern="1200">
+                <a:solidFill>
+                  <a:schemeClr val="tx1"/>
+                </a:solidFill>
+                <a:latin typeface="+mn-lt"/>
+                <a:ea typeface="+mn-ea"/>
+                <a:cs typeface="+mn-cs"/>
+              </a:defRPr>
+            </a:lvl5pPr>
+            <a:lvl6pPr marL="2514600" indent="-228600" algn="l" defTabSz="914400" rtl="0" eaLnBrk="1" latinLnBrk="0" hangingPunct="1">
+              <a:lnSpc>
+                <a:spcPct val="90000"/>
+              </a:lnSpc>
+              <a:spcBef>
+                <a:spcPts val="500"/>
+              </a:spcBef>
+              <a:buFont typeface="Arial" panose="020B0604020202020204" pitchFamily="34" charset="0"/>
+              <a:buChar char="•"/>
+              <a:defRPr sz="1800" kern="1200">
+                <a:solidFill>
+                  <a:schemeClr val="tx1"/>
+                </a:solidFill>
+                <a:latin typeface="+mn-lt"/>
+                <a:ea typeface="+mn-ea"/>
+                <a:cs typeface="+mn-cs"/>
+              </a:defRPr>
+            </a:lvl6pPr>
+            <a:lvl7pPr marL="2971800" indent="-228600" algn="l" defTabSz="914400" rtl="0" eaLnBrk="1" latinLnBrk="0" hangingPunct="1">
+              <a:lnSpc>
+                <a:spcPct val="90000"/>
+              </a:lnSpc>
+              <a:spcBef>
+                <a:spcPts val="500"/>
+              </a:spcBef>
+              <a:buFont typeface="Arial" panose="020B0604020202020204" pitchFamily="34" charset="0"/>
+              <a:buChar char="•"/>
+              <a:defRPr sz="1800" kern="1200">
+                <a:solidFill>
+                  <a:schemeClr val="tx1"/>
+                </a:solidFill>
+                <a:latin typeface="+mn-lt"/>
+                <a:ea typeface="+mn-ea"/>
+                <a:cs typeface="+mn-cs"/>
+              </a:defRPr>
+            </a:lvl7pPr>
+            <a:lvl8pPr marL="3429000" indent="-228600" algn="l" defTabSz="914400" rtl="0" eaLnBrk="1" latinLnBrk="0" hangingPunct="1">
+              <a:lnSpc>
+                <a:spcPct val="90000"/>
+              </a:lnSpc>
+              <a:spcBef>
+                <a:spcPts val="500"/>
+              </a:spcBef>
+              <a:buFont typeface="Arial" panose="020B0604020202020204" pitchFamily="34" charset="0"/>
+              <a:buChar char="•"/>
+              <a:defRPr sz="1800" kern="1200">
+                <a:solidFill>
+                  <a:schemeClr val="tx1"/>
+                </a:solidFill>
+                <a:latin typeface="+mn-lt"/>
+                <a:ea typeface="+mn-ea"/>
+                <a:cs typeface="+mn-cs"/>
+              </a:defRPr>
+            </a:lvl8pPr>
+            <a:lvl9pPr marL="3886200" indent="-228600" algn="l" defTabSz="914400" rtl="0" eaLnBrk="1" latinLnBrk="0" hangingPunct="1">
+              <a:lnSpc>
+                <a:spcPct val="90000"/>
+              </a:lnSpc>
+              <a:spcBef>
+                <a:spcPts val="500"/>
+              </a:spcBef>
+              <a:buFont typeface="Arial" panose="020B0604020202020204" pitchFamily="34" charset="0"/>
+              <a:buChar char="•"/>
+              <a:defRPr sz="1800" kern="1200">
+                <a:solidFill>
+                  <a:schemeClr val="tx1"/>
+                </a:solidFill>
+                <a:latin typeface="+mn-lt"/>
+                <a:ea typeface="+mn-ea"/>
+                <a:cs typeface="+mn-cs"/>
+              </a:defRPr>
+            </a:lvl9pPr>
+          </a:lstStyle>
           <a:p>
             <a:pPr marL="0" indent="0">
+              <a:buFont typeface="Arial" panose="020B0604020202020204" pitchFamily="34" charset="0"/>
+              <a:buNone/>
+            </a:pPr>
+            <a:r>
+              <a:rPr lang="ja-JP" altLang="en-US" dirty="0"/>
+              <a:t>エラー文</a:t>
+            </a:r>
+            <a:endParaRPr lang="en-US" altLang="ja-JP" dirty="0"/>
+          </a:p>
+          <a:p>
+            <a:pPr marL="0" indent="0">
+              <a:buFont typeface="Arial" panose="020B0604020202020204" pitchFamily="34" charset="0"/>
               <a:buNone/>
             </a:pPr>
             <a:endParaRPr lang="en-US" altLang="ja-JP" dirty="0"/>
           </a:p>
+        </p:txBody>
+      </p:sp>
+      <p:sp>
+        <p:nvSpPr>
+          <p:cNvPr id="9" name="コンテンツ プレースホルダー 7">
+            <a:extLst>
+              <a:ext uri="{FF2B5EF4-FFF2-40B4-BE49-F238E27FC236}">
+                <a16:creationId xmlns:a16="http://schemas.microsoft.com/office/drawing/2014/main" id="{5E88A268-CFEB-4AB1-B37D-B409AC55BDAC}"/>
+              </a:ext>
+            </a:extLst>
+          </p:cNvPr>
+          <p:cNvSpPr txBox="1">
+            <a:spLocks/>
+          </p:cNvSpPr>
+          <p:nvPr/>
+        </p:nvSpPr>
+        <p:spPr>
+          <a:xfrm>
+            <a:off x="628650" y="5207625"/>
+            <a:ext cx="7886700" cy="1148726"/>
+          </a:xfrm>
+          <a:prstGeom prst="rect">
+            <a:avLst/>
+          </a:prstGeom>
+        </p:spPr>
+        <p:txBody>
+          <a:bodyPr vert="horz" lIns="91440" tIns="45720" rIns="91440" bIns="45720" rtlCol="0">
+            <a:normAutofit/>
+          </a:bodyPr>
+          <a:lstStyle>
+            <a:lvl1pPr marL="228600" indent="-228600" algn="l" defTabSz="914400" rtl="0" eaLnBrk="1" latinLnBrk="0" hangingPunct="1">
+              <a:lnSpc>
+                <a:spcPct val="90000"/>
+              </a:lnSpc>
+              <a:spcBef>
+                <a:spcPts val="1000"/>
+              </a:spcBef>
+              <a:buFont typeface="Arial" panose="020B0604020202020204" pitchFamily="34" charset="0"/>
+              <a:buChar char="•"/>
+              <a:defRPr sz="3200" kern="1200">
+                <a:solidFill>
+                  <a:schemeClr val="tx1"/>
+                </a:solidFill>
+                <a:latin typeface="+mn-lt"/>
+                <a:ea typeface="+mn-ea"/>
+                <a:cs typeface="+mn-cs"/>
+              </a:defRPr>
+            </a:lvl1pPr>
+            <a:lvl2pPr marL="685800" indent="-228600" algn="l" defTabSz="914400" rtl="0" eaLnBrk="1" latinLnBrk="0" hangingPunct="1">
+              <a:lnSpc>
+                <a:spcPct val="90000"/>
+              </a:lnSpc>
+              <a:spcBef>
+                <a:spcPts val="500"/>
+              </a:spcBef>
+              <a:buFont typeface="Arial" panose="020B0604020202020204" pitchFamily="34" charset="0"/>
+              <a:buChar char="•"/>
+              <a:defRPr sz="2800" kern="1200">
+                <a:solidFill>
+                  <a:schemeClr val="tx1"/>
+                </a:solidFill>
+                <a:latin typeface="+mn-lt"/>
+                <a:ea typeface="+mn-ea"/>
+                <a:cs typeface="+mn-cs"/>
+              </a:defRPr>
+            </a:lvl2pPr>
+            <a:lvl3pPr marL="1143000" indent="-228600" algn="l" defTabSz="914400" rtl="0" eaLnBrk="1" latinLnBrk="0" hangingPunct="1">
+              <a:lnSpc>
+                <a:spcPct val="90000"/>
+              </a:lnSpc>
+              <a:spcBef>
+                <a:spcPts val="500"/>
+              </a:spcBef>
+              <a:buFont typeface="Arial" panose="020B0604020202020204" pitchFamily="34" charset="0"/>
+              <a:buChar char="•"/>
+              <a:defRPr sz="2400" kern="1200">
+                <a:solidFill>
+                  <a:schemeClr val="tx1"/>
+                </a:solidFill>
+                <a:latin typeface="+mn-lt"/>
+                <a:ea typeface="+mn-ea"/>
+                <a:cs typeface="+mn-cs"/>
+              </a:defRPr>
+            </a:lvl3pPr>
+            <a:lvl4pPr marL="1600200" indent="-228600" algn="l" defTabSz="914400" rtl="0" eaLnBrk="1" latinLnBrk="0" hangingPunct="1">
+              <a:lnSpc>
+                <a:spcPct val="90000"/>
+              </a:lnSpc>
+              <a:spcBef>
+                <a:spcPts val="500"/>
+              </a:spcBef>
+              <a:buFont typeface="Arial" panose="020B0604020202020204" pitchFamily="34" charset="0"/>
+              <a:buChar char="•"/>
+              <a:defRPr sz="2000" kern="1200">
+                <a:solidFill>
+                  <a:schemeClr val="tx1"/>
+                </a:solidFill>
+                <a:latin typeface="+mn-lt"/>
+                <a:ea typeface="+mn-ea"/>
+                <a:cs typeface="+mn-cs"/>
+              </a:defRPr>
+            </a:lvl4pPr>
+            <a:lvl5pPr marL="2057400" indent="-228600" algn="l" defTabSz="914400" rtl="0" eaLnBrk="1" latinLnBrk="0" hangingPunct="1">
+              <a:lnSpc>
+                <a:spcPct val="90000"/>
+              </a:lnSpc>
+              <a:spcBef>
+                <a:spcPts val="500"/>
+              </a:spcBef>
+              <a:buFont typeface="Arial" panose="020B0604020202020204" pitchFamily="34" charset="0"/>
+              <a:buChar char="•"/>
+              <a:defRPr sz="2000" kern="1200">
+                <a:solidFill>
+                  <a:schemeClr val="tx1"/>
+                </a:solidFill>
+                <a:latin typeface="+mn-lt"/>
+                <a:ea typeface="+mn-ea"/>
+                <a:cs typeface="+mn-cs"/>
+              </a:defRPr>
+            </a:lvl5pPr>
+            <a:lvl6pPr marL="2514600" indent="-228600" algn="l" defTabSz="914400" rtl="0" eaLnBrk="1" latinLnBrk="0" hangingPunct="1">
+              <a:lnSpc>
+                <a:spcPct val="90000"/>
+              </a:lnSpc>
+              <a:spcBef>
+                <a:spcPts val="500"/>
+              </a:spcBef>
+              <a:buFont typeface="Arial" panose="020B0604020202020204" pitchFamily="34" charset="0"/>
+              <a:buChar char="•"/>
+              <a:defRPr sz="1800" kern="1200">
+                <a:solidFill>
+                  <a:schemeClr val="tx1"/>
+                </a:solidFill>
+                <a:latin typeface="+mn-lt"/>
+                <a:ea typeface="+mn-ea"/>
+                <a:cs typeface="+mn-cs"/>
+              </a:defRPr>
+            </a:lvl6pPr>
+            <a:lvl7pPr marL="2971800" indent="-228600" algn="l" defTabSz="914400" rtl="0" eaLnBrk="1" latinLnBrk="0" hangingPunct="1">
+              <a:lnSpc>
+                <a:spcPct val="90000"/>
+              </a:lnSpc>
+              <a:spcBef>
+                <a:spcPts val="500"/>
+              </a:spcBef>
+              <a:buFont typeface="Arial" panose="020B0604020202020204" pitchFamily="34" charset="0"/>
+              <a:buChar char="•"/>
+              <a:defRPr sz="1800" kern="1200">
+                <a:solidFill>
+                  <a:schemeClr val="tx1"/>
+                </a:solidFill>
+                <a:latin typeface="+mn-lt"/>
+                <a:ea typeface="+mn-ea"/>
+                <a:cs typeface="+mn-cs"/>
+              </a:defRPr>
+            </a:lvl7pPr>
+            <a:lvl8pPr marL="3429000" indent="-228600" algn="l" defTabSz="914400" rtl="0" eaLnBrk="1" latinLnBrk="0" hangingPunct="1">
+              <a:lnSpc>
+                <a:spcPct val="90000"/>
+              </a:lnSpc>
+              <a:spcBef>
+                <a:spcPts val="500"/>
+              </a:spcBef>
+              <a:buFont typeface="Arial" panose="020B0604020202020204" pitchFamily="34" charset="0"/>
+              <a:buChar char="•"/>
+              <a:defRPr sz="1800" kern="1200">
+                <a:solidFill>
+                  <a:schemeClr val="tx1"/>
+                </a:solidFill>
+                <a:latin typeface="+mn-lt"/>
+                <a:ea typeface="+mn-ea"/>
+                <a:cs typeface="+mn-cs"/>
+              </a:defRPr>
+            </a:lvl8pPr>
+            <a:lvl9pPr marL="3886200" indent="-228600" algn="l" defTabSz="914400" rtl="0" eaLnBrk="1" latinLnBrk="0" hangingPunct="1">
+              <a:lnSpc>
+                <a:spcPct val="90000"/>
+              </a:lnSpc>
+              <a:spcBef>
+                <a:spcPts val="500"/>
+              </a:spcBef>
+              <a:buFont typeface="Arial" panose="020B0604020202020204" pitchFamily="34" charset="0"/>
+              <a:buChar char="•"/>
+              <a:defRPr sz="1800" kern="1200">
+                <a:solidFill>
+                  <a:schemeClr val="tx1"/>
+                </a:solidFill>
+                <a:latin typeface="+mn-lt"/>
+                <a:ea typeface="+mn-ea"/>
+                <a:cs typeface="+mn-cs"/>
+              </a:defRPr>
+            </a:lvl9pPr>
+          </a:lstStyle>
           <a:p>
             <a:pPr marL="0" indent="0">
+              <a:buFont typeface="Arial" panose="020B0604020202020204" pitchFamily="34" charset="0"/>
               <a:buNone/>
             </a:pPr>
             <a:r>
               <a:rPr lang="ja-JP" altLang="en-US" dirty="0"/>
-              <a:t>エラー文</a:t>
+              <a:t>出力する際に</a:t>
+            </a:r>
+            <a:r>
+              <a:rPr lang="en-US" altLang="ja-JP" dirty="0"/>
+              <a:t>str</a:t>
+            </a:r>
+            <a:r>
+              <a:rPr lang="ja-JP" altLang="en-US" dirty="0"/>
+              <a:t>がある場合は，他の型を使えないというエラー</a:t>
             </a:r>
             <a:endParaRPr lang="en-US" altLang="ja-JP" dirty="0"/>
           </a:p>

</xml_diff>